<commit_message>
CSI1101 A2: finished operating system
</commit_message>
<xml_diff>
--- a/year_1/sem_2/CSI1101_computer_security/0b_assignment_2_[22MAY15_0900]/dev/CSI1101_PONCE_A2_v01.pptx
+++ b/year_1/sem_2/CSI1101_computer_security/0b_assignment_2_[22MAY15_0900]/dev/CSI1101_PONCE_A2_v01.pptx
@@ -2,7 +2,7 @@
 <file path=ppt/presentation.xml><?xml version="1.0" encoding="utf-8"?>
 <p:presentation xmlns:a="http://schemas.openxmlformats.org/drawingml/2006/main" xmlns:r="http://schemas.openxmlformats.org/officeDocument/2006/relationships" xmlns:p="http://schemas.openxmlformats.org/presentationml/2006/main" saveSubsetFonts="1">
   <p:sldMasterIdLst>
-    <p:sldMasterId id="2147483648" r:id="rId1"/>
+    <p:sldMasterId id="2147483684" r:id="rId1"/>
   </p:sldMasterIdLst>
   <p:sldIdLst>
     <p:sldId id="256" r:id="rId2"/>
@@ -14,11 +14,18 @@
     <p:sldId id="263" r:id="rId8"/>
     <p:sldId id="264" r:id="rId9"/>
     <p:sldId id="265" r:id="rId10"/>
-    <p:sldId id="266" r:id="rId11"/>
-    <p:sldId id="267" r:id="rId12"/>
-    <p:sldId id="268" r:id="rId13"/>
-    <p:sldId id="269" r:id="rId14"/>
-    <p:sldId id="270" r:id="rId15"/>
+    <p:sldId id="267" r:id="rId11"/>
+    <p:sldId id="268" r:id="rId12"/>
+    <p:sldId id="269" r:id="rId13"/>
+    <p:sldId id="270" r:id="rId14"/>
+    <p:sldId id="271" r:id="rId15"/>
+    <p:sldId id="266" r:id="rId16"/>
+    <p:sldId id="273" r:id="rId17"/>
+    <p:sldId id="274" r:id="rId18"/>
+    <p:sldId id="275" r:id="rId19"/>
+    <p:sldId id="276" r:id="rId20"/>
+    <p:sldId id="277" r:id="rId21"/>
+    <p:sldId id="272" r:id="rId22"/>
   </p:sldIdLst>
   <p:sldSz cx="12192000" cy="6858000"/>
   <p:notesSz cx="6858000" cy="9144000"/>
@@ -181,7 +188,7 @@
               <a:rPr lang="en-US" smtClean="0"/>
               <a:t>Click to edit Master title style</a:t>
             </a:r>
-            <a:endParaRPr lang="en-AU"/>
+            <a:endParaRPr lang="en-US" dirty="0"/>
           </a:p>
         </p:txBody>
       </p:sp>
@@ -246,7 +253,7 @@
               <a:rPr lang="en-US" smtClean="0"/>
               <a:t>Click to edit Master subtitle style</a:t>
             </a:r>
-            <a:endParaRPr lang="en-AU"/>
+            <a:endParaRPr lang="en-US" dirty="0"/>
           </a:p>
         </p:txBody>
       </p:sp>
@@ -318,7 +325,7 @@
     </p:spTree>
     <p:extLst>
       <p:ext uri="{BB962C8B-B14F-4D97-AF65-F5344CB8AC3E}">
-        <p14:creationId xmlns:p14="http://schemas.microsoft.com/office/powerpoint/2010/main" val="272051103"/>
+        <p14:creationId xmlns:p14="http://schemas.microsoft.com/office/powerpoint/2010/main" val="1535244421"/>
       </p:ext>
     </p:extLst>
   </p:cSld>
@@ -364,7 +371,7 @@
               <a:rPr lang="en-US" smtClean="0"/>
               <a:t>Click to edit Master title style</a:t>
             </a:r>
-            <a:endParaRPr lang="en-AU"/>
+            <a:endParaRPr lang="en-US" dirty="0"/>
           </a:p>
         </p:txBody>
       </p:sp>
@@ -416,7 +423,7 @@
               <a:rPr lang="en-US" smtClean="0"/>
               <a:t>Fifth level</a:t>
             </a:r>
-            <a:endParaRPr lang="en-AU"/>
+            <a:endParaRPr lang="en-US" dirty="0"/>
           </a:p>
         </p:txBody>
       </p:sp>
@@ -488,7 +495,7 @@
     </p:spTree>
     <p:extLst>
       <p:ext uri="{BB962C8B-B14F-4D97-AF65-F5344CB8AC3E}">
-        <p14:creationId xmlns:p14="http://schemas.microsoft.com/office/powerpoint/2010/main" val="2283658312"/>
+        <p14:creationId xmlns:p14="http://schemas.microsoft.com/office/powerpoint/2010/main" val="2276952706"/>
       </p:ext>
     </p:extLst>
   </p:cSld>
@@ -539,7 +546,7 @@
               <a:rPr lang="en-US" smtClean="0"/>
               <a:t>Click to edit Master title style</a:t>
             </a:r>
-            <a:endParaRPr lang="en-AU"/>
+            <a:endParaRPr lang="en-US" dirty="0"/>
           </a:p>
         </p:txBody>
       </p:sp>
@@ -596,7 +603,7 @@
               <a:rPr lang="en-US" smtClean="0"/>
               <a:t>Fifth level</a:t>
             </a:r>
-            <a:endParaRPr lang="en-AU"/>
+            <a:endParaRPr lang="en-US" dirty="0"/>
           </a:p>
         </p:txBody>
       </p:sp>
@@ -668,7 +675,7 @@
     </p:spTree>
     <p:extLst>
       <p:ext uri="{BB962C8B-B14F-4D97-AF65-F5344CB8AC3E}">
-        <p14:creationId xmlns:p14="http://schemas.microsoft.com/office/powerpoint/2010/main" val="1285363500"/>
+        <p14:creationId xmlns:p14="http://schemas.microsoft.com/office/powerpoint/2010/main" val="347847351"/>
       </p:ext>
     </p:extLst>
   </p:cSld>
@@ -714,7 +721,7 @@
               <a:rPr lang="en-US" smtClean="0"/>
               <a:t>Click to edit Master title style</a:t>
             </a:r>
-            <a:endParaRPr lang="en-AU"/>
+            <a:endParaRPr lang="en-US" dirty="0"/>
           </a:p>
         </p:txBody>
       </p:sp>
@@ -766,7 +773,7 @@
               <a:rPr lang="en-US" smtClean="0"/>
               <a:t>Fifth level</a:t>
             </a:r>
-            <a:endParaRPr lang="en-AU"/>
+            <a:endParaRPr lang="en-US" dirty="0"/>
           </a:p>
         </p:txBody>
       </p:sp>
@@ -838,7 +845,7 @@
     </p:spTree>
     <p:extLst>
       <p:ext uri="{BB962C8B-B14F-4D97-AF65-F5344CB8AC3E}">
-        <p14:creationId xmlns:p14="http://schemas.microsoft.com/office/powerpoint/2010/main" val="2886348581"/>
+        <p14:creationId xmlns:p14="http://schemas.microsoft.com/office/powerpoint/2010/main" val="2595404310"/>
       </p:ext>
     </p:extLst>
   </p:cSld>
@@ -893,7 +900,7 @@
               <a:rPr lang="en-US" smtClean="0"/>
               <a:t>Click to edit Master title style</a:t>
             </a:r>
-            <a:endParaRPr lang="en-AU"/>
+            <a:endParaRPr lang="en-US" dirty="0"/>
           </a:p>
         </p:txBody>
       </p:sp>
@@ -1084,7 +1091,7 @@
     </p:spTree>
     <p:extLst>
       <p:ext uri="{BB962C8B-B14F-4D97-AF65-F5344CB8AC3E}">
-        <p14:creationId xmlns:p14="http://schemas.microsoft.com/office/powerpoint/2010/main" val="1102562749"/>
+        <p14:creationId xmlns:p14="http://schemas.microsoft.com/office/powerpoint/2010/main" val="4138575386"/>
       </p:ext>
     </p:extLst>
   </p:cSld>
@@ -1130,7 +1137,7 @@
               <a:rPr lang="en-US" smtClean="0"/>
               <a:t>Click to edit Master title style</a:t>
             </a:r>
-            <a:endParaRPr lang="en-AU"/>
+            <a:endParaRPr lang="en-US" dirty="0"/>
           </a:p>
         </p:txBody>
       </p:sp>
@@ -1187,7 +1194,7 @@
               <a:rPr lang="en-US" smtClean="0"/>
               <a:t>Fifth level</a:t>
             </a:r>
-            <a:endParaRPr lang="en-AU"/>
+            <a:endParaRPr lang="en-US" dirty="0"/>
           </a:p>
         </p:txBody>
       </p:sp>
@@ -1244,7 +1251,7 @@
               <a:rPr lang="en-US" smtClean="0"/>
               <a:t>Fifth level</a:t>
             </a:r>
-            <a:endParaRPr lang="en-AU"/>
+            <a:endParaRPr lang="en-US" dirty="0"/>
           </a:p>
         </p:txBody>
       </p:sp>
@@ -1316,7 +1323,7 @@
     </p:spTree>
     <p:extLst>
       <p:ext uri="{BB962C8B-B14F-4D97-AF65-F5344CB8AC3E}">
-        <p14:creationId xmlns:p14="http://schemas.microsoft.com/office/powerpoint/2010/main" val="1735774898"/>
+        <p14:creationId xmlns:p14="http://schemas.microsoft.com/office/powerpoint/2010/main" val="2312032512"/>
       </p:ext>
     </p:extLst>
   </p:cSld>
@@ -1367,7 +1374,7 @@
               <a:rPr lang="en-US" smtClean="0"/>
               <a:t>Click to edit Master title style</a:t>
             </a:r>
-            <a:endParaRPr lang="en-AU"/>
+            <a:endParaRPr lang="en-US" dirty="0"/>
           </a:p>
         </p:txBody>
       </p:sp>
@@ -1489,7 +1496,7 @@
               <a:rPr lang="en-US" smtClean="0"/>
               <a:t>Fifth level</a:t>
             </a:r>
-            <a:endParaRPr lang="en-AU"/>
+            <a:endParaRPr lang="en-US" dirty="0"/>
           </a:p>
         </p:txBody>
       </p:sp>
@@ -1611,7 +1618,7 @@
               <a:rPr lang="en-US" smtClean="0"/>
               <a:t>Fifth level</a:t>
             </a:r>
-            <a:endParaRPr lang="en-AU"/>
+            <a:endParaRPr lang="en-US" dirty="0"/>
           </a:p>
         </p:txBody>
       </p:sp>
@@ -1683,7 +1690,7 @@
     </p:spTree>
     <p:extLst>
       <p:ext uri="{BB962C8B-B14F-4D97-AF65-F5344CB8AC3E}">
-        <p14:creationId xmlns:p14="http://schemas.microsoft.com/office/powerpoint/2010/main" val="2333456166"/>
+        <p14:creationId xmlns:p14="http://schemas.microsoft.com/office/powerpoint/2010/main" val="2211480531"/>
       </p:ext>
     </p:extLst>
   </p:cSld>
@@ -1729,7 +1736,7 @@
               <a:rPr lang="en-US" smtClean="0"/>
               <a:t>Click to edit Master title style</a:t>
             </a:r>
-            <a:endParaRPr lang="en-AU"/>
+            <a:endParaRPr lang="en-US" dirty="0"/>
           </a:p>
         </p:txBody>
       </p:sp>
@@ -1801,7 +1808,7 @@
     </p:spTree>
     <p:extLst>
       <p:ext uri="{BB962C8B-B14F-4D97-AF65-F5344CB8AC3E}">
-        <p14:creationId xmlns:p14="http://schemas.microsoft.com/office/powerpoint/2010/main" val="1066723924"/>
+        <p14:creationId xmlns:p14="http://schemas.microsoft.com/office/powerpoint/2010/main" val="959113036"/>
       </p:ext>
     </p:extLst>
   </p:cSld>
@@ -1896,7 +1903,7 @@
     </p:spTree>
     <p:extLst>
       <p:ext uri="{BB962C8B-B14F-4D97-AF65-F5344CB8AC3E}">
-        <p14:creationId xmlns:p14="http://schemas.microsoft.com/office/powerpoint/2010/main" val="3382877872"/>
+        <p14:creationId xmlns:p14="http://schemas.microsoft.com/office/powerpoint/2010/main" val="398014407"/>
       </p:ext>
     </p:extLst>
   </p:cSld>
@@ -1951,7 +1958,7 @@
               <a:rPr lang="en-US" smtClean="0"/>
               <a:t>Click to edit Master title style</a:t>
             </a:r>
-            <a:endParaRPr lang="en-AU"/>
+            <a:endParaRPr lang="en-US" dirty="0"/>
           </a:p>
         </p:txBody>
       </p:sp>
@@ -2036,7 +2043,7 @@
               <a:rPr lang="en-US" smtClean="0"/>
               <a:t>Fifth level</a:t>
             </a:r>
-            <a:endParaRPr lang="en-AU"/>
+            <a:endParaRPr lang="en-US" dirty="0"/>
           </a:p>
         </p:txBody>
       </p:sp>
@@ -2173,7 +2180,7 @@
     </p:spTree>
     <p:extLst>
       <p:ext uri="{BB962C8B-B14F-4D97-AF65-F5344CB8AC3E}">
-        <p14:creationId xmlns:p14="http://schemas.microsoft.com/office/powerpoint/2010/main" val="3466324875"/>
+        <p14:creationId xmlns:p14="http://schemas.microsoft.com/office/powerpoint/2010/main" val="3830101420"/>
       </p:ext>
     </p:extLst>
   </p:cSld>
@@ -2228,7 +2235,7 @@
               <a:rPr lang="en-US" smtClean="0"/>
               <a:t>Click to edit Master title style</a:t>
             </a:r>
-            <a:endParaRPr lang="en-AU"/>
+            <a:endParaRPr lang="en-US" dirty="0"/>
           </a:p>
         </p:txBody>
       </p:sp>
@@ -2236,7 +2243,7 @@
         <p:nvSpPr>
           <p:cNvPr id="3" name="Picture Placeholder 2"/>
           <p:cNvSpPr>
-            <a:spLocks noGrp="1"/>
+            <a:spLocks noGrp="1" noChangeAspect="1"/>
           </p:cNvSpPr>
           <p:nvPr>
             <p:ph type="pic" idx="1"/>
@@ -2249,7 +2256,7 @@
           </a:xfrm>
         </p:spPr>
         <p:txBody>
-          <a:bodyPr/>
+          <a:bodyPr anchor="t"/>
           <a:lstStyle>
             <a:lvl1pPr marL="0" indent="0">
               <a:buNone/>
@@ -2289,7 +2296,11 @@
             </a:lvl9pPr>
           </a:lstStyle>
           <a:p>
-            <a:endParaRPr lang="en-AU"/>
+            <a:r>
+              <a:rPr lang="en-US" smtClean="0"/>
+              <a:t>Click icon to add picture</a:t>
+            </a:r>
+            <a:endParaRPr lang="en-US" dirty="0"/>
           </a:p>
         </p:txBody>
       </p:sp>
@@ -2426,7 +2437,7 @@
     </p:spTree>
     <p:extLst>
       <p:ext uri="{BB962C8B-B14F-4D97-AF65-F5344CB8AC3E}">
-        <p14:creationId xmlns:p14="http://schemas.microsoft.com/office/powerpoint/2010/main" val="2572856337"/>
+        <p14:creationId xmlns:p14="http://schemas.microsoft.com/office/powerpoint/2010/main" val="2197186688"/>
       </p:ext>
     </p:extLst>
   </p:cSld>
@@ -2487,7 +2498,7 @@
               <a:rPr lang="en-US" smtClean="0"/>
               <a:t>Click to edit Master title style</a:t>
             </a:r>
-            <a:endParaRPr lang="en-AU"/>
+            <a:endParaRPr lang="en-US" dirty="0"/>
           </a:p>
         </p:txBody>
       </p:sp>
@@ -2549,7 +2560,7 @@
               <a:rPr lang="en-US" smtClean="0"/>
               <a:t>Fifth level</a:t>
             </a:r>
-            <a:endParaRPr lang="en-AU"/>
+            <a:endParaRPr lang="en-US" dirty="0"/>
           </a:p>
         </p:txBody>
       </p:sp>
@@ -2675,23 +2686,23 @@
     </p:spTree>
     <p:extLst>
       <p:ext uri="{BB962C8B-B14F-4D97-AF65-F5344CB8AC3E}">
-        <p14:creationId xmlns:p14="http://schemas.microsoft.com/office/powerpoint/2010/main" val="777889448"/>
+        <p14:creationId xmlns:p14="http://schemas.microsoft.com/office/powerpoint/2010/main" val="257262035"/>
       </p:ext>
     </p:extLst>
   </p:cSld>
   <p:clrMap bg1="lt1" tx1="dk1" bg2="lt2" tx2="dk2" accent1="accent1" accent2="accent2" accent3="accent3" accent4="accent4" accent5="accent5" accent6="accent6" hlink="hlink" folHlink="folHlink"/>
   <p:sldLayoutIdLst>
-    <p:sldLayoutId id="2147483649" r:id="rId1"/>
-    <p:sldLayoutId id="2147483650" r:id="rId2"/>
-    <p:sldLayoutId id="2147483651" r:id="rId3"/>
-    <p:sldLayoutId id="2147483652" r:id="rId4"/>
-    <p:sldLayoutId id="2147483653" r:id="rId5"/>
-    <p:sldLayoutId id="2147483654" r:id="rId6"/>
-    <p:sldLayoutId id="2147483655" r:id="rId7"/>
-    <p:sldLayoutId id="2147483656" r:id="rId8"/>
-    <p:sldLayoutId id="2147483657" r:id="rId9"/>
-    <p:sldLayoutId id="2147483658" r:id="rId10"/>
-    <p:sldLayoutId id="2147483659" r:id="rId11"/>
+    <p:sldLayoutId id="2147483685" r:id="rId1"/>
+    <p:sldLayoutId id="2147483686" r:id="rId2"/>
+    <p:sldLayoutId id="2147483687" r:id="rId3"/>
+    <p:sldLayoutId id="2147483688" r:id="rId4"/>
+    <p:sldLayoutId id="2147483689" r:id="rId5"/>
+    <p:sldLayoutId id="2147483690" r:id="rId6"/>
+    <p:sldLayoutId id="2147483691" r:id="rId7"/>
+    <p:sldLayoutId id="2147483692" r:id="rId8"/>
+    <p:sldLayoutId id="2147483693" r:id="rId9"/>
+    <p:sldLayoutId id="2147483694" r:id="rId10"/>
+    <p:sldLayoutId id="2147483695" r:id="rId11"/>
   </p:sldLayoutIdLst>
   <p:txStyles>
     <p:titleStyle>
@@ -3202,11 +3213,11 @@
   <p:clrMapOvr>
     <a:masterClrMapping/>
   </p:clrMapOvr>
-  <mc:AlternateContent xmlns:mc="http://schemas.openxmlformats.org/markup-compatibility/2006">
-    <mc:Choice xmlns:p14="http://schemas.microsoft.com/office/powerpoint/2010/main" Requires="p14">
+  <mc:AlternateContent xmlns:mc="http://schemas.openxmlformats.org/markup-compatibility/2006" xmlns:p14="http://schemas.microsoft.com/office/powerpoint/2010/main">
+    <mc:Choice Requires="p14">
       <p:transition p14:dur="0"/>
     </mc:Choice>
-    <mc:Fallback>
+    <mc:Fallback xmlns="">
       <p:transition/>
     </mc:Fallback>
   </mc:AlternateContent>
@@ -3268,17 +3279,59 @@
           <a:lstStyle/>
           <a:p>
             <a:r>
-              <a:rPr lang="en-AU" sz="3600" b="1" dirty="0" smtClean="0">
-                <a:solidFill>
-                  <a:srgbClr val="EEEEEE"/>
-                </a:solidFill>
-                <a:latin typeface="Open Sans" panose="020B0606030504020204" pitchFamily="34" charset="0"/>
-                <a:ea typeface="Open Sans" panose="020B0606030504020204" pitchFamily="34" charset="0"/>
-                <a:cs typeface="Open Sans" panose="020B0606030504020204" pitchFamily="34" charset="0"/>
-              </a:rPr>
-              <a:t>So when an operating system/program is no longer supported…</a:t>
-            </a:r>
-            <a:endParaRPr lang="en-AU" sz="3600" dirty="0">
+              <a:rPr lang="en-AU" sz="4400" b="1" dirty="0" smtClean="0">
+                <a:solidFill>
+                  <a:srgbClr val="EEEEEE"/>
+                </a:solidFill>
+                <a:latin typeface="Open Sans" panose="020B0606030504020204" pitchFamily="34" charset="0"/>
+                <a:ea typeface="Open Sans" panose="020B0606030504020204" pitchFamily="34" charset="0"/>
+                <a:cs typeface="Open Sans" panose="020B0606030504020204" pitchFamily="34" charset="0"/>
+              </a:rPr>
+              <a:t>So how can we fix it?</a:t>
+            </a:r>
+            <a:br>
+              <a:rPr lang="en-AU" sz="4400" b="1" dirty="0" smtClean="0">
+                <a:solidFill>
+                  <a:srgbClr val="EEEEEE"/>
+                </a:solidFill>
+                <a:latin typeface="Open Sans" panose="020B0606030504020204" pitchFamily="34" charset="0"/>
+                <a:ea typeface="Open Sans" panose="020B0606030504020204" pitchFamily="34" charset="0"/>
+                <a:cs typeface="Open Sans" panose="020B0606030504020204" pitchFamily="34" charset="0"/>
+              </a:rPr>
+            </a:br>
+            <a:r>
+              <a:rPr lang="en-AU" sz="4400" b="1" dirty="0" smtClean="0">
+                <a:solidFill>
+                  <a:srgbClr val="EEEEEE"/>
+                </a:solidFill>
+                <a:latin typeface="Open Sans" panose="020B0606030504020204" pitchFamily="34" charset="0"/>
+                <a:ea typeface="Open Sans" panose="020B0606030504020204" pitchFamily="34" charset="0"/>
+                <a:cs typeface="Open Sans" panose="020B0606030504020204" pitchFamily="34" charset="0"/>
+              </a:rPr>
+              <a:t/>
+            </a:r>
+            <a:br>
+              <a:rPr lang="en-AU" sz="4400" b="1" dirty="0" smtClean="0">
+                <a:solidFill>
+                  <a:srgbClr val="EEEEEE"/>
+                </a:solidFill>
+                <a:latin typeface="Open Sans" panose="020B0606030504020204" pitchFamily="34" charset="0"/>
+                <a:ea typeface="Open Sans" panose="020B0606030504020204" pitchFamily="34" charset="0"/>
+                <a:cs typeface="Open Sans" panose="020B0606030504020204" pitchFamily="34" charset="0"/>
+              </a:rPr>
+            </a:br>
+            <a:r>
+              <a:rPr lang="en-AU" sz="4400" b="1" dirty="0" smtClean="0">
+                <a:solidFill>
+                  <a:srgbClr val="EEEEEE"/>
+                </a:solidFill>
+                <a:latin typeface="Open Sans" panose="020B0606030504020204" pitchFamily="34" charset="0"/>
+                <a:ea typeface="Open Sans" panose="020B0606030504020204" pitchFamily="34" charset="0"/>
+                <a:cs typeface="Open Sans" panose="020B0606030504020204" pitchFamily="34" charset="0"/>
+              </a:rPr>
+              <a:t>Upgrade!</a:t>
+            </a:r>
+            <a:endParaRPr lang="en-AU" sz="4400" dirty="0">
               <a:solidFill>
                 <a:srgbClr val="EEEEEE"/>
               </a:solidFill>
@@ -3299,7 +3352,7 @@
         </p:nvSpPr>
         <p:spPr>
           <a:xfrm>
-            <a:off x="1524001" y="2278742"/>
+            <a:off x="1524001" y="2917370"/>
             <a:ext cx="9144000" cy="511630"/>
           </a:xfrm>
           <a:prstGeom prst="rect">
@@ -3371,7 +3424,10 @@
           </a:bodyPr>
           <a:lstStyle/>
           <a:p>
-            <a:pPr algn="ctr"/>
+            <a:pPr marL="285750" indent="-285750">
+              <a:buFont typeface="Arial" panose="020B0604020202020204" pitchFamily="34" charset="0"/>
+              <a:buChar char="•"/>
+            </a:pPr>
             <a:r>
               <a:rPr lang="en-AU" sz="2600" dirty="0" smtClean="0">
                 <a:solidFill>
@@ -3381,7 +3437,46 @@
                 <a:ea typeface="Open Sans" panose="020B0606030504020204" pitchFamily="34" charset="0"/>
                 <a:cs typeface="Open Sans" panose="020B0606030504020204" pitchFamily="34" charset="0"/>
               </a:rPr>
-              <a:t>Any known vulnerabilities after the end of support date will not be resolved, leaving the system susceptible to those vulnerabilities.</a:t>
+              <a:t>Upgrade to a modern version of Microsoft Windows</a:t>
+            </a:r>
+          </a:p>
+          <a:p>
+            <a:pPr marL="742950" lvl="1" indent="-285750">
+              <a:buFont typeface="Arial" panose="020B0604020202020204" pitchFamily="34" charset="0"/>
+              <a:buChar char="•"/>
+            </a:pPr>
+            <a:r>
+              <a:rPr lang="en-AU" sz="2600" dirty="0" err="1">
+                <a:solidFill>
+                  <a:srgbClr val="EEEEEE"/>
+                </a:solidFill>
+                <a:latin typeface="Open Sans" panose="020B0606030504020204" pitchFamily="34" charset="0"/>
+                <a:ea typeface="Open Sans" panose="020B0606030504020204" pitchFamily="34" charset="0"/>
+                <a:cs typeface="Open Sans" panose="020B0606030504020204" pitchFamily="34" charset="0"/>
+              </a:rPr>
+              <a:t>i</a:t>
+            </a:r>
+            <a:r>
+              <a:rPr lang="en-AU" sz="2600" dirty="0" err="1" smtClean="0">
+                <a:solidFill>
+                  <a:srgbClr val="EEEEEE"/>
+                </a:solidFill>
+                <a:latin typeface="Open Sans" panose="020B0606030504020204" pitchFamily="34" charset="0"/>
+                <a:ea typeface="Open Sans" panose="020B0606030504020204" pitchFamily="34" charset="0"/>
+                <a:cs typeface="Open Sans" panose="020B0606030504020204" pitchFamily="34" charset="0"/>
+              </a:rPr>
+              <a:t>e</a:t>
+            </a:r>
+            <a:r>
+              <a:rPr lang="en-AU" sz="2600" dirty="0" smtClean="0">
+                <a:solidFill>
+                  <a:srgbClr val="EEEEEE"/>
+                </a:solidFill>
+                <a:latin typeface="Open Sans" panose="020B0606030504020204" pitchFamily="34" charset="0"/>
+                <a:ea typeface="Open Sans" panose="020B0606030504020204" pitchFamily="34" charset="0"/>
+                <a:cs typeface="Open Sans" panose="020B0606030504020204" pitchFamily="34" charset="0"/>
+              </a:rPr>
+              <a:t>. Windows 8.1, Microsoft’s latest version of Windows</a:t>
             </a:r>
           </a:p>
         </p:txBody>
@@ -3389,7 +3484,7 @@
     </p:spTree>
     <p:extLst>
       <p:ext uri="{BB962C8B-B14F-4D97-AF65-F5344CB8AC3E}">
-        <p14:creationId xmlns:p14="http://schemas.microsoft.com/office/powerpoint/2010/main" val="3896399870"/>
+        <p14:creationId xmlns:p14="http://schemas.microsoft.com/office/powerpoint/2010/main" val="4161198573"/>
       </p:ext>
     </p:extLst>
   </p:cSld>
@@ -3446,7 +3541,7 @@
         </p:nvSpPr>
         <p:spPr>
           <a:xfrm>
-            <a:off x="1524000" y="0"/>
+            <a:off x="1524000" y="-1669143"/>
             <a:ext cx="9144000" cy="2917370"/>
           </a:xfrm>
         </p:spPr>
@@ -3466,51 +3561,9 @@
                 <a:ea typeface="Open Sans" panose="020B0606030504020204" pitchFamily="34" charset="0"/>
                 <a:cs typeface="Open Sans" panose="020B0606030504020204" pitchFamily="34" charset="0"/>
               </a:rPr>
-              <a:t>So how can we fix it?</a:t>
-            </a:r>
-            <a:br>
-              <a:rPr lang="en-AU" sz="4400" b="1" dirty="0" smtClean="0">
-                <a:solidFill>
-                  <a:srgbClr val="EEEEEE"/>
-                </a:solidFill>
-                <a:latin typeface="Open Sans" panose="020B0606030504020204" pitchFamily="34" charset="0"/>
-                <a:ea typeface="Open Sans" panose="020B0606030504020204" pitchFamily="34" charset="0"/>
-                <a:cs typeface="Open Sans" panose="020B0606030504020204" pitchFamily="34" charset="0"/>
-              </a:rPr>
-            </a:br>
-            <a:r>
-              <a:rPr lang="en-AU" sz="4400" b="1" dirty="0" smtClean="0">
-                <a:solidFill>
-                  <a:srgbClr val="EEEEEE"/>
-                </a:solidFill>
-                <a:latin typeface="Open Sans" panose="020B0606030504020204" pitchFamily="34" charset="0"/>
-                <a:ea typeface="Open Sans" panose="020B0606030504020204" pitchFamily="34" charset="0"/>
-                <a:cs typeface="Open Sans" panose="020B0606030504020204" pitchFamily="34" charset="0"/>
-              </a:rPr>
-              <a:t/>
-            </a:r>
-            <a:br>
-              <a:rPr lang="en-AU" sz="4400" b="1" dirty="0" smtClean="0">
-                <a:solidFill>
-                  <a:srgbClr val="EEEEEE"/>
-                </a:solidFill>
-                <a:latin typeface="Open Sans" panose="020B0606030504020204" pitchFamily="34" charset="0"/>
-                <a:ea typeface="Open Sans" panose="020B0606030504020204" pitchFamily="34" charset="0"/>
-                <a:cs typeface="Open Sans" panose="020B0606030504020204" pitchFamily="34" charset="0"/>
-              </a:rPr>
-            </a:br>
-            <a:r>
-              <a:rPr lang="en-AU" sz="4400" b="1" dirty="0" smtClean="0">
-                <a:solidFill>
-                  <a:srgbClr val="EEEEEE"/>
-                </a:solidFill>
-                <a:latin typeface="Open Sans" panose="020B0606030504020204" pitchFamily="34" charset="0"/>
-                <a:ea typeface="Open Sans" panose="020B0606030504020204" pitchFamily="34" charset="0"/>
-                <a:cs typeface="Open Sans" panose="020B0606030504020204" pitchFamily="34" charset="0"/>
-              </a:rPr>
-              <a:t>Upgrade!</a:t>
-            </a:r>
-            <a:endParaRPr lang="en-AU" sz="4400" dirty="0">
+              <a:t>Advantages to upgrading…</a:t>
+            </a:r>
+            <a:endParaRPr lang="en-AU" sz="2800" dirty="0">
               <a:solidFill>
                 <a:srgbClr val="EEEEEE"/>
               </a:solidFill>
@@ -3531,7 +3584,7 @@
         </p:nvSpPr>
         <p:spPr>
           <a:xfrm>
-            <a:off x="1524001" y="2917370"/>
+            <a:off x="1524001" y="1248227"/>
             <a:ext cx="9144000" cy="511630"/>
           </a:xfrm>
           <a:prstGeom prst="rect">
@@ -3589,8 +3642,8 @@
         </p:nvSpPr>
         <p:spPr>
           <a:xfrm>
-            <a:off x="1524000" y="3428999"/>
-            <a:ext cx="9144000" cy="1292662"/>
+            <a:off x="1524000" y="1759856"/>
+            <a:ext cx="9144000" cy="4493538"/>
           </a:xfrm>
           <a:prstGeom prst="rect">
             <a:avLst/>
@@ -3616,8 +3669,45 @@
                 <a:ea typeface="Open Sans" panose="020B0606030504020204" pitchFamily="34" charset="0"/>
                 <a:cs typeface="Open Sans" panose="020B0606030504020204" pitchFamily="34" charset="0"/>
               </a:rPr>
-              <a:t>Upgrade to a modern version of Microsoft Windows</a:t>
-            </a:r>
+              <a:t>Computer/s will no longer be susceptible to vulnerabilities associated with Windows Vista</a:t>
+            </a:r>
+          </a:p>
+          <a:p>
+            <a:pPr marL="285750" indent="-285750">
+              <a:buFont typeface="Arial" panose="020B0604020202020204" pitchFamily="34" charset="0"/>
+              <a:buChar char="•"/>
+            </a:pPr>
+            <a:r>
+              <a:rPr lang="en-AU" sz="2600" dirty="0" smtClean="0">
+                <a:solidFill>
+                  <a:srgbClr val="EEEEEE"/>
+                </a:solidFill>
+                <a:latin typeface="Open Sans" panose="020B0606030504020204" pitchFamily="34" charset="0"/>
+                <a:ea typeface="Open Sans" panose="020B0606030504020204" pitchFamily="34" charset="0"/>
+                <a:cs typeface="Open Sans" panose="020B0606030504020204" pitchFamily="34" charset="0"/>
+              </a:rPr>
+              <a:t>Microsoft’s support will be extended </a:t>
+            </a:r>
+            <a:r>
+              <a:rPr lang="en-AU" sz="2600" dirty="0" smtClean="0">
+                <a:solidFill>
+                  <a:srgbClr val="EEEEEE"/>
+                </a:solidFill>
+                <a:latin typeface="Open Sans" panose="020B0606030504020204" pitchFamily="34" charset="0"/>
+                <a:ea typeface="Open Sans" panose="020B0606030504020204" pitchFamily="34" charset="0"/>
+                <a:cs typeface="Open Sans" panose="020B0606030504020204" pitchFamily="34" charset="0"/>
+                <a:hlinkClick r:id="rId2"/>
+              </a:rPr>
+              <a:t>(Microsoft, 2014)</a:t>
+            </a:r>
+            <a:endParaRPr lang="en-AU" sz="2600" dirty="0" smtClean="0">
+              <a:solidFill>
+                <a:srgbClr val="EEEEEE"/>
+              </a:solidFill>
+              <a:latin typeface="Open Sans" panose="020B0606030504020204" pitchFamily="34" charset="0"/>
+              <a:ea typeface="Open Sans" panose="020B0606030504020204" pitchFamily="34" charset="0"/>
+              <a:cs typeface="Open Sans" panose="020B0606030504020204" pitchFamily="34" charset="0"/>
+            </a:endParaRPr>
           </a:p>
           <a:p>
             <a:pPr marL="742950" lvl="1" indent="-285750">
@@ -3625,6 +3715,68 @@
               <a:buChar char="•"/>
             </a:pPr>
             <a:r>
+              <a:rPr lang="en-AU" sz="2600" dirty="0" err="1" smtClean="0">
+                <a:solidFill>
+                  <a:srgbClr val="EEEEEE"/>
+                </a:solidFill>
+                <a:latin typeface="Open Sans" panose="020B0606030504020204" pitchFamily="34" charset="0"/>
+                <a:ea typeface="Open Sans" panose="020B0606030504020204" pitchFamily="34" charset="0"/>
+                <a:cs typeface="Open Sans" panose="020B0606030504020204" pitchFamily="34" charset="0"/>
+              </a:rPr>
+              <a:t>ie</a:t>
+            </a:r>
+            <a:r>
+              <a:rPr lang="en-AU" sz="2600" dirty="0" smtClean="0">
+                <a:solidFill>
+                  <a:srgbClr val="EEEEEE"/>
+                </a:solidFill>
+                <a:latin typeface="Open Sans" panose="020B0606030504020204" pitchFamily="34" charset="0"/>
+                <a:ea typeface="Open Sans" panose="020B0606030504020204" pitchFamily="34" charset="0"/>
+                <a:cs typeface="Open Sans" panose="020B0606030504020204" pitchFamily="34" charset="0"/>
+              </a:rPr>
+              <a:t>. Microsoft Windows 8.1 support ends 9 January 2018</a:t>
+            </a:r>
+          </a:p>
+          <a:p>
+            <a:pPr marL="1200150" lvl="2" indent="-285750">
+              <a:buFont typeface="Arial" panose="020B0604020202020204" pitchFamily="34" charset="0"/>
+              <a:buChar char="•"/>
+            </a:pPr>
+            <a:r>
+              <a:rPr lang="en-AU" sz="2600" dirty="0" smtClean="0">
+                <a:solidFill>
+                  <a:srgbClr val="EEEEEE"/>
+                </a:solidFill>
+                <a:latin typeface="Open Sans" panose="020B0606030504020204" pitchFamily="34" charset="0"/>
+                <a:ea typeface="Open Sans" panose="020B0606030504020204" pitchFamily="34" charset="0"/>
+                <a:cs typeface="Open Sans" panose="020B0606030504020204" pitchFamily="34" charset="0"/>
+              </a:rPr>
+              <a:t>Extended support ends 10 January 2023</a:t>
+            </a:r>
+          </a:p>
+          <a:p>
+            <a:pPr marL="285750" indent="-285750">
+              <a:buFont typeface="Arial" panose="020B0604020202020204" pitchFamily="34" charset="0"/>
+              <a:buChar char="•"/>
+            </a:pPr>
+            <a:r>
+              <a:rPr lang="en-AU" sz="2600" dirty="0" smtClean="0">
+                <a:solidFill>
+                  <a:srgbClr val="EEEEEE"/>
+                </a:solidFill>
+                <a:latin typeface="Open Sans" panose="020B0606030504020204" pitchFamily="34" charset="0"/>
+                <a:ea typeface="Open Sans" panose="020B0606030504020204" pitchFamily="34" charset="0"/>
+                <a:cs typeface="Open Sans" panose="020B0606030504020204" pitchFamily="34" charset="0"/>
+              </a:rPr>
+              <a:t>Software included with operating system such as Internet Explorer or Windows Defender will also be upgraded</a:t>
+            </a:r>
+          </a:p>
+          <a:p>
+            <a:pPr marL="742950" lvl="1" indent="-285750">
+              <a:buFont typeface="Arial" panose="020B0604020202020204" pitchFamily="34" charset="0"/>
+              <a:buChar char="•"/>
+            </a:pPr>
+            <a:r>
               <a:rPr lang="en-AU" sz="2600" dirty="0" err="1">
                 <a:solidFill>
                   <a:srgbClr val="EEEEEE"/>
@@ -3655,15 +3807,59 @@
                 <a:ea typeface="Open Sans" panose="020B0606030504020204" pitchFamily="34" charset="0"/>
                 <a:cs typeface="Open Sans" panose="020B0606030504020204" pitchFamily="34" charset="0"/>
               </a:rPr>
-              <a:t>. Windows 8.1, Microsoft’s latest version of Windows</a:t>
-            </a:r>
+              <a:t>. Windows 8.1 ships with Internet Explorer 11 </a:t>
+            </a:r>
+            <a:r>
+              <a:rPr lang="en-AU" sz="2600" dirty="0" smtClean="0">
+                <a:solidFill>
+                  <a:srgbClr val="EEEEEE"/>
+                </a:solidFill>
+                <a:latin typeface="Open Sans" panose="020B0606030504020204" pitchFamily="34" charset="0"/>
+                <a:ea typeface="Open Sans" panose="020B0606030504020204" pitchFamily="34" charset="0"/>
+                <a:cs typeface="Open Sans" panose="020B0606030504020204" pitchFamily="34" charset="0"/>
+                <a:hlinkClick r:id="rId3"/>
+              </a:rPr>
+              <a:t>(Microsoft, </a:t>
+            </a:r>
+            <a:r>
+              <a:rPr lang="en-AU" sz="2600" dirty="0" err="1" smtClean="0">
+                <a:solidFill>
+                  <a:srgbClr val="EEEEEE"/>
+                </a:solidFill>
+                <a:latin typeface="Open Sans" panose="020B0606030504020204" pitchFamily="34" charset="0"/>
+                <a:ea typeface="Open Sans" panose="020B0606030504020204" pitchFamily="34" charset="0"/>
+                <a:cs typeface="Open Sans" panose="020B0606030504020204" pitchFamily="34" charset="0"/>
+                <a:hlinkClick r:id="rId3"/>
+              </a:rPr>
+              <a:t>n.d.</a:t>
+            </a:r>
+            <a:r>
+              <a:rPr lang="en-AU" sz="2600" dirty="0" smtClean="0">
+                <a:solidFill>
+                  <a:srgbClr val="EEEEEE"/>
+                </a:solidFill>
+                <a:latin typeface="Open Sans" panose="020B0606030504020204" pitchFamily="34" charset="0"/>
+                <a:ea typeface="Open Sans" panose="020B0606030504020204" pitchFamily="34" charset="0"/>
+                <a:cs typeface="Open Sans" panose="020B0606030504020204" pitchFamily="34" charset="0"/>
+                <a:hlinkClick r:id="rId3"/>
+              </a:rPr>
+              <a:t>)</a:t>
+            </a:r>
+            <a:endParaRPr lang="en-AU" sz="2600" dirty="0" smtClean="0">
+              <a:solidFill>
+                <a:srgbClr val="EEEEEE"/>
+              </a:solidFill>
+              <a:latin typeface="Open Sans" panose="020B0606030504020204" pitchFamily="34" charset="0"/>
+              <a:ea typeface="Open Sans" panose="020B0606030504020204" pitchFamily="34" charset="0"/>
+              <a:cs typeface="Open Sans" panose="020B0606030504020204" pitchFamily="34" charset="0"/>
+            </a:endParaRPr>
           </a:p>
         </p:txBody>
       </p:sp>
     </p:spTree>
     <p:extLst>
       <p:ext uri="{BB962C8B-B14F-4D97-AF65-F5344CB8AC3E}">
-        <p14:creationId xmlns:p14="http://schemas.microsoft.com/office/powerpoint/2010/main" val="4161198573"/>
+        <p14:creationId xmlns:p14="http://schemas.microsoft.com/office/powerpoint/2010/main" val="2396806829"/>
       </p:ext>
     </p:extLst>
   </p:cSld>
@@ -3720,7 +3916,7 @@
         </p:nvSpPr>
         <p:spPr>
           <a:xfrm>
-            <a:off x="1524000" y="-1669143"/>
+            <a:off x="1524000" y="-1146629"/>
             <a:ext cx="9144000" cy="2917370"/>
           </a:xfrm>
         </p:spPr>
@@ -3740,7 +3936,7 @@
                 <a:ea typeface="Open Sans" panose="020B0606030504020204" pitchFamily="34" charset="0"/>
                 <a:cs typeface="Open Sans" panose="020B0606030504020204" pitchFamily="34" charset="0"/>
               </a:rPr>
-              <a:t>Advantages to upgrading…</a:t>
+              <a:t>Disadvantages to upgrading…</a:t>
             </a:r>
             <a:endParaRPr lang="en-AU" sz="2800" dirty="0">
               <a:solidFill>
@@ -3763,7 +3959,7 @@
         </p:nvSpPr>
         <p:spPr>
           <a:xfrm>
-            <a:off x="1524001" y="1248227"/>
+            <a:off x="1524001" y="1770741"/>
             <a:ext cx="9144000" cy="511630"/>
           </a:xfrm>
           <a:prstGeom prst="rect">
@@ -3821,8 +4017,8 @@
         </p:nvSpPr>
         <p:spPr>
           <a:xfrm>
-            <a:off x="1524000" y="1759856"/>
-            <a:ext cx="9144000" cy="4493538"/>
+            <a:off x="1524000" y="2282370"/>
+            <a:ext cx="9144000" cy="3693319"/>
           </a:xfrm>
           <a:prstGeom prst="rect">
             <a:avLst/>
@@ -3848,7 +4044,7 @@
                 <a:ea typeface="Open Sans" panose="020B0606030504020204" pitchFamily="34" charset="0"/>
                 <a:cs typeface="Open Sans" panose="020B0606030504020204" pitchFamily="34" charset="0"/>
               </a:rPr>
-              <a:t>Computer/s will no longer be susceptible to vulnerabilities associated with Windows Vista</a:t>
+              <a:t>New license for each copy of OS must be purchased</a:t>
             </a:r>
           </a:p>
           <a:p>
@@ -3865,8 +4061,14 @@
                 <a:ea typeface="Open Sans" panose="020B0606030504020204" pitchFamily="34" charset="0"/>
                 <a:cs typeface="Open Sans" panose="020B0606030504020204" pitchFamily="34" charset="0"/>
               </a:rPr>
-              <a:t>Microsoft’s support will be extended </a:t>
-            </a:r>
+              <a:t>Current hardware may need upgraded to run new OS</a:t>
+            </a:r>
+          </a:p>
+          <a:p>
+            <a:pPr marL="285750" indent="-285750">
+              <a:buFont typeface="Arial" panose="020B0604020202020204" pitchFamily="34" charset="0"/>
+              <a:buChar char="•"/>
+            </a:pPr>
             <a:r>
               <a:rPr lang="en-AU" sz="2600" dirty="0" smtClean="0">
                 <a:solidFill>
@@ -3875,18 +4077,43 @@
                 <a:latin typeface="Open Sans" panose="020B0606030504020204" pitchFamily="34" charset="0"/>
                 <a:ea typeface="Open Sans" panose="020B0606030504020204" pitchFamily="34" charset="0"/>
                 <a:cs typeface="Open Sans" panose="020B0606030504020204" pitchFamily="34" charset="0"/>
-                <a:hlinkClick r:id="rId2"/>
-              </a:rPr>
-              <a:t>(Microsoft, 2014)</a:t>
-            </a:r>
-            <a:endParaRPr lang="en-AU" sz="2600" dirty="0" smtClean="0">
-              <a:solidFill>
-                <a:srgbClr val="EEEEEE"/>
-              </a:solidFill>
-              <a:latin typeface="Open Sans" panose="020B0606030504020204" pitchFamily="34" charset="0"/>
-              <a:ea typeface="Open Sans" panose="020B0606030504020204" pitchFamily="34" charset="0"/>
-              <a:cs typeface="Open Sans" panose="020B0606030504020204" pitchFamily="34" charset="0"/>
-            </a:endParaRPr>
+              </a:rPr>
+              <a:t>Deployment of new OS may require down time</a:t>
+            </a:r>
+          </a:p>
+          <a:p>
+            <a:pPr marL="285750" indent="-285750">
+              <a:buFont typeface="Arial" panose="020B0604020202020204" pitchFamily="34" charset="0"/>
+              <a:buChar char="•"/>
+            </a:pPr>
+            <a:r>
+              <a:rPr lang="en-AU" sz="2600" dirty="0" smtClean="0">
+                <a:solidFill>
+                  <a:srgbClr val="EEEEEE"/>
+                </a:solidFill>
+                <a:latin typeface="Open Sans" panose="020B0606030504020204" pitchFamily="34" charset="0"/>
+                <a:ea typeface="Open Sans" panose="020B0606030504020204" pitchFamily="34" charset="0"/>
+                <a:cs typeface="Open Sans" panose="020B0606030504020204" pitchFamily="34" charset="0"/>
+              </a:rPr>
+              <a:t>Users may depend on software which may not be compatible with new OS</a:t>
+            </a:r>
+          </a:p>
+          <a:p>
+            <a:pPr marL="285750" indent="-285750">
+              <a:buFont typeface="Arial" panose="020B0604020202020204" pitchFamily="34" charset="0"/>
+              <a:buChar char="•"/>
+            </a:pPr>
+            <a:r>
+              <a:rPr lang="en-AU" sz="2600" dirty="0" smtClean="0">
+                <a:solidFill>
+                  <a:srgbClr val="EEEEEE"/>
+                </a:solidFill>
+                <a:latin typeface="Open Sans" panose="020B0606030504020204" pitchFamily="34" charset="0"/>
+                <a:ea typeface="Open Sans" panose="020B0606030504020204" pitchFamily="34" charset="0"/>
+                <a:cs typeface="Open Sans" panose="020B0606030504020204" pitchFamily="34" charset="0"/>
+              </a:rPr>
+              <a:t>Staff may require training in use of new OS</a:t>
+            </a:r>
           </a:p>
           <a:p>
             <a:pPr marL="742950" lvl="1" indent="-285750">
@@ -3894,17 +4121,6 @@
               <a:buChar char="•"/>
             </a:pPr>
             <a:r>
-              <a:rPr lang="en-AU" sz="2600" dirty="0" err="1" smtClean="0">
-                <a:solidFill>
-                  <a:srgbClr val="EEEEEE"/>
-                </a:solidFill>
-                <a:latin typeface="Open Sans" panose="020B0606030504020204" pitchFamily="34" charset="0"/>
-                <a:ea typeface="Open Sans" panose="020B0606030504020204" pitchFamily="34" charset="0"/>
-                <a:cs typeface="Open Sans" panose="020B0606030504020204" pitchFamily="34" charset="0"/>
-              </a:rPr>
-              <a:t>ie</a:t>
-            </a:r>
-            <a:r>
               <a:rPr lang="en-AU" sz="2600" dirty="0" smtClean="0">
                 <a:solidFill>
                   <a:srgbClr val="EEEEEE"/>
@@ -3913,24 +4129,7 @@
                 <a:ea typeface="Open Sans" panose="020B0606030504020204" pitchFamily="34" charset="0"/>
                 <a:cs typeface="Open Sans" panose="020B0606030504020204" pitchFamily="34" charset="0"/>
               </a:rPr>
-              <a:t>. Microsoft Windows 8.1 support ends 9 January 2018</a:t>
-            </a:r>
-          </a:p>
-          <a:p>
-            <a:pPr marL="1200150" lvl="2" indent="-285750">
-              <a:buFont typeface="Arial" panose="020B0604020202020204" pitchFamily="34" charset="0"/>
-              <a:buChar char="•"/>
-            </a:pPr>
-            <a:r>
-              <a:rPr lang="en-AU" sz="2600" dirty="0" smtClean="0">
-                <a:solidFill>
-                  <a:srgbClr val="EEEEEE"/>
-                </a:solidFill>
-                <a:latin typeface="Open Sans" panose="020B0606030504020204" pitchFamily="34" charset="0"/>
-                <a:ea typeface="Open Sans" panose="020B0606030504020204" pitchFamily="34" charset="0"/>
-                <a:cs typeface="Open Sans" panose="020B0606030504020204" pitchFamily="34" charset="0"/>
-              </a:rPr>
-              <a:t>Extended support ends 10 January 2023</a:t>
+              <a:t>User interface may have evolved since Vista</a:t>
             </a:r>
           </a:p>
           <a:p>
@@ -3947,98 +4146,15 @@
                 <a:ea typeface="Open Sans" panose="020B0606030504020204" pitchFamily="34" charset="0"/>
                 <a:cs typeface="Open Sans" panose="020B0606030504020204" pitchFamily="34" charset="0"/>
               </a:rPr>
-              <a:t>Software included with operating system such as Internet Explorer or Windows Defender will also be upgraded</a:t>
-            </a:r>
-          </a:p>
-          <a:p>
-            <a:pPr marL="742950" lvl="1" indent="-285750">
-              <a:buFont typeface="Arial" panose="020B0604020202020204" pitchFamily="34" charset="0"/>
-              <a:buChar char="•"/>
-            </a:pPr>
-            <a:r>
-              <a:rPr lang="en-AU" sz="2600" dirty="0" err="1">
-                <a:solidFill>
-                  <a:srgbClr val="EEEEEE"/>
-                </a:solidFill>
-                <a:latin typeface="Open Sans" panose="020B0606030504020204" pitchFamily="34" charset="0"/>
-                <a:ea typeface="Open Sans" panose="020B0606030504020204" pitchFamily="34" charset="0"/>
-                <a:cs typeface="Open Sans" panose="020B0606030504020204" pitchFamily="34" charset="0"/>
-              </a:rPr>
-              <a:t>i</a:t>
-            </a:r>
-            <a:r>
-              <a:rPr lang="en-AU" sz="2600" dirty="0" err="1" smtClean="0">
-                <a:solidFill>
-                  <a:srgbClr val="EEEEEE"/>
-                </a:solidFill>
-                <a:latin typeface="Open Sans" panose="020B0606030504020204" pitchFamily="34" charset="0"/>
-                <a:ea typeface="Open Sans" panose="020B0606030504020204" pitchFamily="34" charset="0"/>
-                <a:cs typeface="Open Sans" panose="020B0606030504020204" pitchFamily="34" charset="0"/>
-              </a:rPr>
-              <a:t>e</a:t>
-            </a:r>
-            <a:r>
-              <a:rPr lang="en-AU" sz="2600" dirty="0" smtClean="0">
-                <a:solidFill>
-                  <a:srgbClr val="EEEEEE"/>
-                </a:solidFill>
-                <a:latin typeface="Open Sans" panose="020B0606030504020204" pitchFamily="34" charset="0"/>
-                <a:ea typeface="Open Sans" panose="020B0606030504020204" pitchFamily="34" charset="0"/>
-                <a:cs typeface="Open Sans" panose="020B0606030504020204" pitchFamily="34" charset="0"/>
-              </a:rPr>
-              <a:t>. Windows 8.1 ships with Internet Explorer 11 </a:t>
-            </a:r>
-            <a:r>
-              <a:rPr lang="en-AU" sz="2600" dirty="0" smtClean="0">
-                <a:solidFill>
-                  <a:srgbClr val="EEEEEE"/>
-                </a:solidFill>
-                <a:latin typeface="Open Sans" panose="020B0606030504020204" pitchFamily="34" charset="0"/>
-                <a:ea typeface="Open Sans" panose="020B0606030504020204" pitchFamily="34" charset="0"/>
-                <a:cs typeface="Open Sans" panose="020B0606030504020204" pitchFamily="34" charset="0"/>
-                <a:hlinkClick r:id="rId3"/>
-              </a:rPr>
-              <a:t>(Microsoft, </a:t>
-            </a:r>
-            <a:r>
-              <a:rPr lang="en-AU" sz="2600" dirty="0" err="1" smtClean="0">
-                <a:solidFill>
-                  <a:srgbClr val="EEEEEE"/>
-                </a:solidFill>
-                <a:latin typeface="Open Sans" panose="020B0606030504020204" pitchFamily="34" charset="0"/>
-                <a:ea typeface="Open Sans" panose="020B0606030504020204" pitchFamily="34" charset="0"/>
-                <a:cs typeface="Open Sans" panose="020B0606030504020204" pitchFamily="34" charset="0"/>
-                <a:hlinkClick r:id="rId3"/>
-              </a:rPr>
-              <a:t>n.d</a:t>
-            </a:r>
-            <a:r>
-              <a:rPr lang="en-AU" sz="2600" dirty="0" smtClean="0">
-                <a:solidFill>
-                  <a:srgbClr val="EEEEEE"/>
-                </a:solidFill>
-                <a:latin typeface="Open Sans" panose="020B0606030504020204" pitchFamily="34" charset="0"/>
-                <a:ea typeface="Open Sans" panose="020B0606030504020204" pitchFamily="34" charset="0"/>
-                <a:cs typeface="Open Sans" panose="020B0606030504020204" pitchFamily="34" charset="0"/>
-                <a:hlinkClick r:id="rId3"/>
-              </a:rPr>
-              <a:t>)</a:t>
-            </a:r>
-            <a:endParaRPr lang="en-AU" sz="2600" dirty="0" smtClean="0">
-              <a:solidFill>
-                <a:srgbClr val="EEEEEE"/>
-              </a:solidFill>
-              <a:latin typeface="Open Sans" panose="020B0606030504020204" pitchFamily="34" charset="0"/>
-              <a:ea typeface="Open Sans" panose="020B0606030504020204" pitchFamily="34" charset="0"/>
-              <a:cs typeface="Open Sans" panose="020B0606030504020204" pitchFamily="34" charset="0"/>
-            </a:endParaRPr>
+              <a:t>Computer/s will then become susceptible to unresolved vulnerabilities in new OS</a:t>
+            </a:r>
           </a:p>
         </p:txBody>
       </p:sp>
     </p:spTree>
     <p:extLst>
       <p:ext uri="{BB962C8B-B14F-4D97-AF65-F5344CB8AC3E}">
-        <p14:creationId xmlns:p14="http://schemas.microsoft.com/office/powerpoint/2010/main" val="2396806829"/>
+        <p14:creationId xmlns:p14="http://schemas.microsoft.com/office/powerpoint/2010/main" val="1946741167"/>
       </p:ext>
     </p:extLst>
   </p:cSld>
@@ -4095,7 +4211,7 @@
         </p:nvSpPr>
         <p:spPr>
           <a:xfrm>
-            <a:off x="1524000" y="-1146629"/>
+            <a:off x="1524000" y="-580571"/>
             <a:ext cx="9144000" cy="2917370"/>
           </a:xfrm>
         </p:spPr>
@@ -4105,7 +4221,6 @@
           </a:bodyPr>
           <a:lstStyle/>
           <a:p>
-            <a:pPr algn="l"/>
             <a:r>
               <a:rPr lang="en-AU" sz="4400" b="1" dirty="0" smtClean="0">
                 <a:solidFill>
@@ -4115,7 +4230,49 @@
                 <a:ea typeface="Open Sans" panose="020B0606030504020204" pitchFamily="34" charset="0"/>
                 <a:cs typeface="Open Sans" panose="020B0606030504020204" pitchFamily="34" charset="0"/>
               </a:rPr>
-              <a:t>Disadvantages to upgrading…</a:t>
+              <a:t>What’s the alternative option?</a:t>
+            </a:r>
+            <a:br>
+              <a:rPr lang="en-AU" sz="4400" b="1" dirty="0" smtClean="0">
+                <a:solidFill>
+                  <a:srgbClr val="EEEEEE"/>
+                </a:solidFill>
+                <a:latin typeface="Open Sans" panose="020B0606030504020204" pitchFamily="34" charset="0"/>
+                <a:ea typeface="Open Sans" panose="020B0606030504020204" pitchFamily="34" charset="0"/>
+                <a:cs typeface="Open Sans" panose="020B0606030504020204" pitchFamily="34" charset="0"/>
+              </a:rPr>
+            </a:br>
+            <a:r>
+              <a:rPr lang="en-AU" sz="4400" b="1" dirty="0">
+                <a:solidFill>
+                  <a:srgbClr val="EEEEEE"/>
+                </a:solidFill>
+                <a:latin typeface="Open Sans" panose="020B0606030504020204" pitchFamily="34" charset="0"/>
+                <a:ea typeface="Open Sans" panose="020B0606030504020204" pitchFamily="34" charset="0"/>
+                <a:cs typeface="Open Sans" panose="020B0606030504020204" pitchFamily="34" charset="0"/>
+              </a:rPr>
+              <a:t/>
+            </a:r>
+            <a:br>
+              <a:rPr lang="en-AU" sz="4400" b="1" dirty="0">
+                <a:solidFill>
+                  <a:srgbClr val="EEEEEE"/>
+                </a:solidFill>
+                <a:latin typeface="Open Sans" panose="020B0606030504020204" pitchFamily="34" charset="0"/>
+                <a:ea typeface="Open Sans" panose="020B0606030504020204" pitchFamily="34" charset="0"/>
+                <a:cs typeface="Open Sans" panose="020B0606030504020204" pitchFamily="34" charset="0"/>
+              </a:rPr>
+            </a:br>
+            <a:r>
+              <a:rPr lang="en-AU" sz="4400" b="1" dirty="0" smtClean="0">
+                <a:solidFill>
+                  <a:srgbClr val="EEEEEE"/>
+                </a:solidFill>
+                <a:latin typeface="Open Sans" panose="020B0606030504020204" pitchFamily="34" charset="0"/>
+                <a:ea typeface="Open Sans" panose="020B0606030504020204" pitchFamily="34" charset="0"/>
+                <a:cs typeface="Open Sans" panose="020B0606030504020204" pitchFamily="34" charset="0"/>
+              </a:rPr>
+              <a:t>Update!</a:t>
             </a:r>
             <a:endParaRPr lang="en-AU" sz="2800" dirty="0">
               <a:solidFill>
@@ -4138,7 +4295,7 @@
         </p:nvSpPr>
         <p:spPr>
           <a:xfrm>
-            <a:off x="1524001" y="1770741"/>
+            <a:off x="1524001" y="2336799"/>
             <a:ext cx="9144000" cy="511630"/>
           </a:xfrm>
           <a:prstGeom prst="rect">
@@ -4196,7 +4353,7 @@
         </p:nvSpPr>
         <p:spPr>
           <a:xfrm>
-            <a:off x="1524000" y="2282370"/>
+            <a:off x="1524000" y="2848428"/>
             <a:ext cx="9144000" cy="3693319"/>
           </a:xfrm>
           <a:prstGeom prst="rect">
@@ -4223,7 +4380,24 @@
                 <a:ea typeface="Open Sans" panose="020B0606030504020204" pitchFamily="34" charset="0"/>
                 <a:cs typeface="Open Sans" panose="020B0606030504020204" pitchFamily="34" charset="0"/>
               </a:rPr>
-              <a:t>New license for each copy of OS must be purchased</a:t>
+              <a:t>Service packs and security updates must be installed</a:t>
+            </a:r>
+          </a:p>
+          <a:p>
+            <a:pPr marL="742950" lvl="1" indent="-285750">
+              <a:buFont typeface="Arial" panose="020B0604020202020204" pitchFamily="34" charset="0"/>
+              <a:buChar char="•"/>
+            </a:pPr>
+            <a:r>
+              <a:rPr lang="en-AU" sz="2600" dirty="0" smtClean="0">
+                <a:solidFill>
+                  <a:srgbClr val="EEEEEE"/>
+                </a:solidFill>
+                <a:latin typeface="Open Sans" panose="020B0606030504020204" pitchFamily="34" charset="0"/>
+                <a:ea typeface="Open Sans" panose="020B0606030504020204" pitchFamily="34" charset="0"/>
+                <a:cs typeface="Open Sans" panose="020B0606030504020204" pitchFamily="34" charset="0"/>
+              </a:rPr>
+              <a:t>Blue Ink’s computers do not have any installed</a:t>
             </a:r>
           </a:p>
           <a:p>
@@ -4240,14 +4414,19 @@
                 <a:ea typeface="Open Sans" panose="020B0606030504020204" pitchFamily="34" charset="0"/>
                 <a:cs typeface="Open Sans" panose="020B0606030504020204" pitchFamily="34" charset="0"/>
               </a:rPr>
-              <a:t>Current hardware may need upgraded to run new OS</a:t>
-            </a:r>
-          </a:p>
-          <a:p>
-            <a:pPr marL="285750" indent="-285750">
-              <a:buFont typeface="Arial" panose="020B0604020202020204" pitchFamily="34" charset="0"/>
-              <a:buChar char="•"/>
-            </a:pPr>
+              <a:t>At the moment, </a:t>
+            </a:r>
+            <a:r>
+              <a:rPr lang="en-AU" sz="2600" b="1" dirty="0" smtClean="0">
+                <a:solidFill>
+                  <a:srgbClr val="EEEEEE"/>
+                </a:solidFill>
+                <a:latin typeface="Open Sans" panose="020B0606030504020204" pitchFamily="34" charset="0"/>
+                <a:ea typeface="Open Sans" panose="020B0606030504020204" pitchFamily="34" charset="0"/>
+                <a:cs typeface="Open Sans" panose="020B0606030504020204" pitchFamily="34" charset="0"/>
+              </a:rPr>
+              <a:t>524 known vulnerabilities</a:t>
+            </a:r>
             <a:r>
               <a:rPr lang="en-AU" sz="2600" dirty="0" smtClean="0">
                 <a:solidFill>
@@ -4257,14 +4436,8 @@
                 <a:ea typeface="Open Sans" panose="020B0606030504020204" pitchFamily="34" charset="0"/>
                 <a:cs typeface="Open Sans" panose="020B0606030504020204" pitchFamily="34" charset="0"/>
               </a:rPr>
-              <a:t>Deployment of new OS may require down time</a:t>
-            </a:r>
-          </a:p>
-          <a:p>
-            <a:pPr marL="285750" indent="-285750">
-              <a:buFont typeface="Arial" panose="020B0604020202020204" pitchFamily="34" charset="0"/>
-              <a:buChar char="•"/>
-            </a:pPr>
+              <a:t> exist for all versions of Windows Vista </a:t>
+            </a:r>
             <a:r>
               <a:rPr lang="en-AU" sz="2600" dirty="0" smtClean="0">
                 <a:solidFill>
@@ -4273,15 +4446,22 @@
                 <a:latin typeface="Open Sans" panose="020B0606030504020204" pitchFamily="34" charset="0"/>
                 <a:ea typeface="Open Sans" panose="020B0606030504020204" pitchFamily="34" charset="0"/>
                 <a:cs typeface="Open Sans" panose="020B0606030504020204" pitchFamily="34" charset="0"/>
-              </a:rPr>
-              <a:t>Users may depend on software which may not be compatible with new OS</a:t>
-            </a:r>
-          </a:p>
-          <a:p>
-            <a:pPr marL="285750" indent="-285750">
-              <a:buFont typeface="Arial" panose="020B0604020202020204" pitchFamily="34" charset="0"/>
-              <a:buChar char="•"/>
-            </a:pPr>
+                <a:hlinkClick r:id="rId2"/>
+              </a:rPr>
+              <a:t>(</a:t>
+            </a:r>
+            <a:r>
+              <a:rPr lang="en-AU" sz="2600" dirty="0" err="1" smtClean="0">
+                <a:solidFill>
+                  <a:srgbClr val="EEEEEE"/>
+                </a:solidFill>
+                <a:latin typeface="Open Sans" panose="020B0606030504020204" pitchFamily="34" charset="0"/>
+                <a:ea typeface="Open Sans" panose="020B0606030504020204" pitchFamily="34" charset="0"/>
+                <a:cs typeface="Open Sans" panose="020B0606030504020204" pitchFamily="34" charset="0"/>
+                <a:hlinkClick r:id="rId2"/>
+              </a:rPr>
+              <a:t>Ozkan</a:t>
+            </a:r>
             <a:r>
               <a:rPr lang="en-AU" sz="2600" dirty="0" smtClean="0">
                 <a:solidFill>
@@ -4290,42 +4470,9 @@
                 <a:latin typeface="Open Sans" panose="020B0606030504020204" pitchFamily="34" charset="0"/>
                 <a:ea typeface="Open Sans" panose="020B0606030504020204" pitchFamily="34" charset="0"/>
                 <a:cs typeface="Open Sans" panose="020B0606030504020204" pitchFamily="34" charset="0"/>
-              </a:rPr>
-              <a:t>Staff may require training in use of new OS</a:t>
-            </a:r>
-          </a:p>
-          <a:p>
-            <a:pPr marL="742950" lvl="1" indent="-285750">
-              <a:buFont typeface="Arial" panose="020B0604020202020204" pitchFamily="34" charset="0"/>
-              <a:buChar char="•"/>
-            </a:pPr>
-            <a:r>
-              <a:rPr lang="en-AU" sz="2600" dirty="0" smtClean="0">
-                <a:solidFill>
-                  <a:srgbClr val="EEEEEE"/>
-                </a:solidFill>
-                <a:latin typeface="Open Sans" panose="020B0606030504020204" pitchFamily="34" charset="0"/>
-                <a:ea typeface="Open Sans" panose="020B0606030504020204" pitchFamily="34" charset="0"/>
-                <a:cs typeface="Open Sans" panose="020B0606030504020204" pitchFamily="34" charset="0"/>
-              </a:rPr>
-              <a:t>User interface may have evolved since Vista</a:t>
-            </a:r>
-          </a:p>
-          <a:p>
-            <a:pPr marL="285750" indent="-285750">
-              <a:buFont typeface="Arial" panose="020B0604020202020204" pitchFamily="34" charset="0"/>
-              <a:buChar char="•"/>
-            </a:pPr>
-            <a:r>
-              <a:rPr lang="en-AU" sz="2600" dirty="0" smtClean="0">
-                <a:solidFill>
-                  <a:srgbClr val="EEEEEE"/>
-                </a:solidFill>
-                <a:latin typeface="Open Sans" panose="020B0606030504020204" pitchFamily="34" charset="0"/>
-                <a:ea typeface="Open Sans" panose="020B0606030504020204" pitchFamily="34" charset="0"/>
-                <a:cs typeface="Open Sans" panose="020B0606030504020204" pitchFamily="34" charset="0"/>
-              </a:rPr>
-              <a:t>Computer/s will then become susceptible to unresolved vulnerabilities in new OS</a:t>
+                <a:hlinkClick r:id="rId2"/>
+              </a:rPr>
+              <a:t>, 2015)</a:t>
             </a:r>
             <a:endParaRPr lang="en-AU" sz="2600" dirty="0" smtClean="0">
               <a:solidFill>
@@ -4336,12 +4483,74 @@
               <a:cs typeface="Open Sans" panose="020B0606030504020204" pitchFamily="34" charset="0"/>
             </a:endParaRPr>
           </a:p>
+          <a:p>
+            <a:pPr marL="742950" lvl="1" indent="-285750">
+              <a:buFont typeface="Arial" panose="020B0604020202020204" pitchFamily="34" charset="0"/>
+              <a:buChar char="•"/>
+            </a:pPr>
+            <a:r>
+              <a:rPr lang="en-AU" sz="2600" dirty="0" smtClean="0">
+                <a:solidFill>
+                  <a:srgbClr val="EEEEEE"/>
+                </a:solidFill>
+                <a:latin typeface="Open Sans" panose="020B0606030504020204" pitchFamily="34" charset="0"/>
+                <a:ea typeface="Open Sans" panose="020B0606030504020204" pitchFamily="34" charset="0"/>
+                <a:cs typeface="Open Sans" panose="020B0606030504020204" pitchFamily="34" charset="0"/>
+              </a:rPr>
+              <a:t>From SP0 through to SP2</a:t>
+            </a:r>
+          </a:p>
+          <a:p>
+            <a:pPr marL="285750" indent="-285750">
+              <a:buFont typeface="Arial" panose="020B0604020202020204" pitchFamily="34" charset="0"/>
+              <a:buChar char="•"/>
+            </a:pPr>
+            <a:r>
+              <a:rPr lang="en-AU" sz="2600" dirty="0" smtClean="0">
+                <a:solidFill>
+                  <a:srgbClr val="EEEEEE"/>
+                </a:solidFill>
+                <a:latin typeface="Open Sans" panose="020B0606030504020204" pitchFamily="34" charset="0"/>
+                <a:ea typeface="Open Sans" panose="020B0606030504020204" pitchFamily="34" charset="0"/>
+                <a:cs typeface="Open Sans" panose="020B0606030504020204" pitchFamily="34" charset="0"/>
+              </a:rPr>
+              <a:t>Right now, Blue Ink’s computers are susceptible to all of them</a:t>
+            </a:r>
+          </a:p>
+          <a:p>
+            <a:pPr marL="285750" indent="-285750">
+              <a:buFont typeface="Arial" panose="020B0604020202020204" pitchFamily="34" charset="0"/>
+              <a:buChar char="•"/>
+            </a:pPr>
+            <a:endParaRPr lang="en-AU" sz="2600" dirty="0">
+              <a:solidFill>
+                <a:srgbClr val="EEEEEE"/>
+              </a:solidFill>
+              <a:latin typeface="Open Sans" panose="020B0606030504020204" pitchFamily="34" charset="0"/>
+              <a:ea typeface="Open Sans" panose="020B0606030504020204" pitchFamily="34" charset="0"/>
+              <a:cs typeface="Open Sans" panose="020B0606030504020204" pitchFamily="34" charset="0"/>
+            </a:endParaRPr>
+          </a:p>
+          <a:p>
+            <a:pPr algn="ctr"/>
+            <a:r>
+              <a:rPr lang="en-AU" sz="2600" dirty="0" smtClean="0">
+                <a:solidFill>
+                  <a:srgbClr val="EEEEEE"/>
+                </a:solidFill>
+                <a:latin typeface="Open Sans" panose="020B0606030504020204" pitchFamily="34" charset="0"/>
+                <a:ea typeface="Open Sans" panose="020B0606030504020204" pitchFamily="34" charset="0"/>
+                <a:cs typeface="Open Sans" panose="020B0606030504020204" pitchFamily="34" charset="0"/>
+              </a:rPr>
+              <a:t>Including…</a:t>
+            </a:r>
+          </a:p>
         </p:txBody>
       </p:sp>
     </p:spTree>
     <p:extLst>
       <p:ext uri="{BB962C8B-B14F-4D97-AF65-F5344CB8AC3E}">
-        <p14:creationId xmlns:p14="http://schemas.microsoft.com/office/powerpoint/2010/main" val="1946741167"/>
+        <p14:creationId xmlns:p14="http://schemas.microsoft.com/office/powerpoint/2010/main" val="1811827100"/>
       </p:ext>
     </p:extLst>
   </p:cSld>
@@ -4398,7 +4607,7 @@
         </p:nvSpPr>
         <p:spPr>
           <a:xfrm>
-            <a:off x="1524000" y="-580571"/>
+            <a:off x="1524000" y="-638628"/>
             <a:ext cx="9144000" cy="2917370"/>
           </a:xfrm>
         </p:spPr>
@@ -4418,7 +4627,7 @@
                 <a:ea typeface="Open Sans" panose="020B0606030504020204" pitchFamily="34" charset="0"/>
                 <a:cs typeface="Open Sans" panose="020B0606030504020204" pitchFamily="34" charset="0"/>
               </a:rPr>
-              <a:t>What’s the alternative option?</a:t>
+              <a:t>CVE-2008-0951</a:t>
             </a:r>
             <a:br>
               <a:rPr lang="en-AU" sz="4400" b="1" dirty="0" smtClean="0">
@@ -4431,38 +4640,53 @@
               </a:rPr>
             </a:br>
             <a:r>
-              <a:rPr lang="en-AU" sz="4400" b="1" dirty="0">
-                <a:solidFill>
-                  <a:srgbClr val="EEEEEE"/>
-                </a:solidFill>
-                <a:latin typeface="Open Sans" panose="020B0606030504020204" pitchFamily="34" charset="0"/>
-                <a:ea typeface="Open Sans" panose="020B0606030504020204" pitchFamily="34" charset="0"/>
-                <a:cs typeface="Open Sans" panose="020B0606030504020204" pitchFamily="34" charset="0"/>
-              </a:rPr>
-              <a:t/>
-            </a:r>
-            <a:br>
-              <a:rPr lang="en-AU" sz="4400" b="1" dirty="0">
-                <a:solidFill>
-                  <a:srgbClr val="EEEEEE"/>
-                </a:solidFill>
-                <a:latin typeface="Open Sans" panose="020B0606030504020204" pitchFamily="34" charset="0"/>
-                <a:ea typeface="Open Sans" panose="020B0606030504020204" pitchFamily="34" charset="0"/>
-                <a:cs typeface="Open Sans" panose="020B0606030504020204" pitchFamily="34" charset="0"/>
-              </a:rPr>
-            </a:br>
-            <a:r>
-              <a:rPr lang="en-AU" sz="4400" b="1" dirty="0" smtClean="0">
-                <a:solidFill>
-                  <a:srgbClr val="EEEEEE"/>
-                </a:solidFill>
-                <a:latin typeface="Open Sans" panose="020B0606030504020204" pitchFamily="34" charset="0"/>
-                <a:ea typeface="Open Sans" panose="020B0606030504020204" pitchFamily="34" charset="0"/>
-                <a:cs typeface="Open Sans" panose="020B0606030504020204" pitchFamily="34" charset="0"/>
-              </a:rPr>
-              <a:t>Update!</a:t>
-            </a:r>
-            <a:endParaRPr lang="en-AU" sz="2800" dirty="0">
+              <a:rPr lang="en-AU" sz="3200" b="1" dirty="0" smtClean="0">
+                <a:solidFill>
+                  <a:srgbClr val="EEEEEE"/>
+                </a:solidFill>
+                <a:latin typeface="Open Sans" panose="020B0606030504020204" pitchFamily="34" charset="0"/>
+                <a:ea typeface="Open Sans" panose="020B0606030504020204" pitchFamily="34" charset="0"/>
+                <a:cs typeface="Open Sans" panose="020B0606030504020204" pitchFamily="34" charset="0"/>
+              </a:rPr>
+              <a:t>Auto-run vulnerability </a:t>
+            </a:r>
+            <a:r>
+              <a:rPr lang="en-AU" sz="3200" b="1" dirty="0" smtClean="0">
+                <a:solidFill>
+                  <a:srgbClr val="EEEEEE"/>
+                </a:solidFill>
+                <a:latin typeface="Open Sans" panose="020B0606030504020204" pitchFamily="34" charset="0"/>
+                <a:ea typeface="Open Sans" panose="020B0606030504020204" pitchFamily="34" charset="0"/>
+                <a:cs typeface="Open Sans" panose="020B0606030504020204" pitchFamily="34" charset="0"/>
+                <a:hlinkClick r:id="rId2"/>
+              </a:rPr>
+              <a:t>(</a:t>
+            </a:r>
+            <a:r>
+              <a:rPr lang="en-AU" sz="3200" b="1" dirty="0" err="1" smtClean="0">
+                <a:solidFill>
+                  <a:srgbClr val="EEEEEE"/>
+                </a:solidFill>
+                <a:latin typeface="Open Sans" panose="020B0606030504020204" pitchFamily="34" charset="0"/>
+                <a:ea typeface="Open Sans" panose="020B0606030504020204" pitchFamily="34" charset="0"/>
+                <a:cs typeface="Open Sans" panose="020B0606030504020204" pitchFamily="34" charset="0"/>
+                <a:hlinkClick r:id="rId2"/>
+              </a:rPr>
+              <a:t>SecurityFocus</a:t>
+            </a:r>
+            <a:r>
+              <a:rPr lang="en-AU" sz="3200" b="1" dirty="0" smtClean="0">
+                <a:solidFill>
+                  <a:srgbClr val="EEEEEE"/>
+                </a:solidFill>
+                <a:latin typeface="Open Sans" panose="020B0606030504020204" pitchFamily="34" charset="0"/>
+                <a:ea typeface="Open Sans" panose="020B0606030504020204" pitchFamily="34" charset="0"/>
+                <a:cs typeface="Open Sans" panose="020B0606030504020204" pitchFamily="34" charset="0"/>
+                <a:hlinkClick r:id="rId2"/>
+              </a:rPr>
+              <a:t>, 2008)</a:t>
+            </a:r>
+            <a:endParaRPr lang="en-AU" sz="3200" dirty="0">
               <a:solidFill>
                 <a:srgbClr val="EEEEEE"/>
               </a:solidFill>
@@ -4483,7 +4707,7 @@
         </p:nvSpPr>
         <p:spPr>
           <a:xfrm>
-            <a:off x="1524001" y="2336799"/>
+            <a:off x="1524001" y="2278742"/>
             <a:ext cx="9144000" cy="511630"/>
           </a:xfrm>
           <a:prstGeom prst="rect">
@@ -4541,8 +4765,8 @@
         </p:nvSpPr>
         <p:spPr>
           <a:xfrm>
-            <a:off x="1524000" y="2848428"/>
-            <a:ext cx="9144000" cy="3693319"/>
+            <a:off x="1524000" y="2790371"/>
+            <a:ext cx="9144000" cy="2092881"/>
           </a:xfrm>
           <a:prstGeom prst="rect">
             <a:avLst/>
@@ -4568,7 +4792,7 @@
                 <a:ea typeface="Open Sans" panose="020B0606030504020204" pitchFamily="34" charset="0"/>
                 <a:cs typeface="Open Sans" panose="020B0606030504020204" pitchFamily="34" charset="0"/>
               </a:rPr>
-              <a:t>Service packs and security updates must be installed</a:t>
+              <a:t>Allows an attacker to include malicious code on removable media</a:t>
             </a:r>
           </a:p>
           <a:p>
@@ -4577,6 +4801,28 @@
               <a:buChar char="•"/>
             </a:pPr>
             <a:r>
+              <a:rPr lang="en-AU" sz="2600" dirty="0" err="1">
+                <a:solidFill>
+                  <a:srgbClr val="EEEEEE"/>
+                </a:solidFill>
+                <a:latin typeface="Open Sans" panose="020B0606030504020204" pitchFamily="34" charset="0"/>
+                <a:ea typeface="Open Sans" panose="020B0606030504020204" pitchFamily="34" charset="0"/>
+                <a:cs typeface="Open Sans" panose="020B0606030504020204" pitchFamily="34" charset="0"/>
+              </a:rPr>
+              <a:t>i</a:t>
+            </a:r>
+            <a:r>
+              <a:rPr lang="en-AU" sz="2600" dirty="0" err="1" smtClean="0">
+                <a:solidFill>
+                  <a:srgbClr val="EEEEEE"/>
+                </a:solidFill>
+                <a:latin typeface="Open Sans" panose="020B0606030504020204" pitchFamily="34" charset="0"/>
+                <a:ea typeface="Open Sans" panose="020B0606030504020204" pitchFamily="34" charset="0"/>
+                <a:cs typeface="Open Sans" panose="020B0606030504020204" pitchFamily="34" charset="0"/>
+              </a:rPr>
+              <a:t>e</a:t>
+            </a:r>
+            <a:r>
               <a:rPr lang="en-AU" sz="2600" dirty="0" smtClean="0">
                 <a:solidFill>
                   <a:srgbClr val="EEEEEE"/>
@@ -4585,7 +4831,7 @@
                 <a:ea typeface="Open Sans" panose="020B0606030504020204" pitchFamily="34" charset="0"/>
                 <a:cs typeface="Open Sans" panose="020B0606030504020204" pitchFamily="34" charset="0"/>
               </a:rPr>
-              <a:t>Blue Ink’s computers do not have any installed</a:t>
+              <a:t>. CD-ROM or USB drive</a:t>
             </a:r>
           </a:p>
           <a:p>
@@ -4602,19 +4848,186 @@
                 <a:ea typeface="Open Sans" panose="020B0606030504020204" pitchFamily="34" charset="0"/>
                 <a:cs typeface="Open Sans" panose="020B0606030504020204" pitchFamily="34" charset="0"/>
               </a:rPr>
-              <a:t>At the moment, </a:t>
-            </a:r>
-            <a:r>
-              <a:rPr lang="en-AU" sz="2600" b="1" dirty="0" smtClean="0">
-                <a:solidFill>
-                  <a:srgbClr val="EEEEEE"/>
-                </a:solidFill>
-                <a:latin typeface="Open Sans" panose="020B0606030504020204" pitchFamily="34" charset="0"/>
-                <a:ea typeface="Open Sans" panose="020B0606030504020204" pitchFamily="34" charset="0"/>
-                <a:cs typeface="Open Sans" panose="020B0606030504020204" pitchFamily="34" charset="0"/>
-              </a:rPr>
-              <a:t>524 known vulnerabilities</a:t>
-            </a:r>
+              <a:t>The malicious code will be executed once the removable media is inserted into the computer</a:t>
+            </a:r>
+          </a:p>
+        </p:txBody>
+      </p:sp>
+    </p:spTree>
+    <p:extLst>
+      <p:ext uri="{BB962C8B-B14F-4D97-AF65-F5344CB8AC3E}">
+        <p14:creationId xmlns:p14="http://schemas.microsoft.com/office/powerpoint/2010/main" val="310235068"/>
+      </p:ext>
+    </p:extLst>
+  </p:cSld>
+  <p:clrMapOvr>
+    <a:masterClrMapping/>
+  </p:clrMapOvr>
+  <p:transition spd="slow">
+    <p:push/>
+  </p:transition>
+  <p:timing>
+    <p:tnLst>
+      <p:par>
+        <p:cTn id="1" dur="indefinite" restart="never" nodeType="tmRoot"/>
+      </p:par>
+    </p:tnLst>
+  </p:timing>
+</p:sld>
+</file>
+
+<file path=ppt/slides/slide15.xml><?xml version="1.0" encoding="utf-8"?>
+<p:sld xmlns:a="http://schemas.openxmlformats.org/drawingml/2006/main" xmlns:r="http://schemas.openxmlformats.org/officeDocument/2006/relationships" xmlns:p="http://schemas.openxmlformats.org/presentationml/2006/main">
+  <p:cSld>
+    <p:bg>
+      <p:bgPr>
+        <a:solidFill>
+          <a:srgbClr val="111111"/>
+        </a:solidFill>
+        <a:effectLst/>
+      </p:bgPr>
+    </p:bg>
+    <p:spTree>
+      <p:nvGrpSpPr>
+        <p:cNvPr id="1" name=""/>
+        <p:cNvGrpSpPr/>
+        <p:nvPr/>
+      </p:nvGrpSpPr>
+      <p:grpSpPr>
+        <a:xfrm>
+          <a:off x="0" y="0"/>
+          <a:ext cx="0" cy="0"/>
+          <a:chOff x="0" y="0"/>
+          <a:chExt cx="0" cy="0"/>
+        </a:xfrm>
+      </p:grpSpPr>
+      <p:sp>
+        <p:nvSpPr>
+          <p:cNvPr id="4" name="Title 3"/>
+          <p:cNvSpPr>
+            <a:spLocks noGrp="1"/>
+          </p:cNvSpPr>
+          <p:nvPr>
+            <p:ph type="ctrTitle"/>
+          </p:nvPr>
+        </p:nvSpPr>
+        <p:spPr>
+          <a:xfrm>
+            <a:off x="1524000" y="-2196698"/>
+            <a:ext cx="9144000" cy="2917370"/>
+          </a:xfrm>
+        </p:spPr>
+        <p:txBody>
+          <a:bodyPr anchor="b">
+            <a:normAutofit/>
+          </a:bodyPr>
+          <a:lstStyle/>
+          <a:p>
+            <a:r>
+              <a:rPr lang="en-AU" sz="3600" b="1" dirty="0" smtClean="0">
+                <a:solidFill>
+                  <a:srgbClr val="EEEEEE"/>
+                </a:solidFill>
+                <a:latin typeface="Open Sans" panose="020B0606030504020204" pitchFamily="34" charset="0"/>
+                <a:ea typeface="Open Sans" panose="020B0606030504020204" pitchFamily="34" charset="0"/>
+                <a:cs typeface="Open Sans" panose="020B0606030504020204" pitchFamily="34" charset="0"/>
+              </a:rPr>
+              <a:t>Without any updates…</a:t>
+            </a:r>
+            <a:endParaRPr lang="en-AU" sz="3600" dirty="0">
+              <a:solidFill>
+                <a:srgbClr val="EEEEEE"/>
+              </a:solidFill>
+              <a:latin typeface="Open Sans" panose="020B0606030504020204" pitchFamily="34" charset="0"/>
+              <a:ea typeface="Open Sans" panose="020B0606030504020204" pitchFamily="34" charset="0"/>
+              <a:cs typeface="Open Sans" panose="020B0606030504020204" pitchFamily="34" charset="0"/>
+            </a:endParaRPr>
+          </a:p>
+        </p:txBody>
+      </p:sp>
+      <p:sp>
+        <p:nvSpPr>
+          <p:cNvPr id="6" name="Title 3"/>
+          <p:cNvSpPr txBox="1">
+            <a:spLocks/>
+          </p:cNvSpPr>
+          <p:nvPr/>
+        </p:nvSpPr>
+        <p:spPr>
+          <a:xfrm>
+            <a:off x="1524001" y="2278742"/>
+            <a:ext cx="9144000" cy="511630"/>
+          </a:xfrm>
+          <a:prstGeom prst="rect">
+            <a:avLst/>
+          </a:prstGeom>
+        </p:spPr>
+        <p:txBody>
+          <a:bodyPr vert="horz" lIns="91440" tIns="45720" rIns="91440" bIns="45720" rtlCol="0" anchor="t">
+            <a:normAutofit lnSpcReduction="10000"/>
+          </a:bodyPr>
+          <a:lstStyle>
+            <a:lvl1pPr algn="ctr" defTabSz="914400" rtl="0" eaLnBrk="1" latinLnBrk="0" hangingPunct="1">
+              <a:lnSpc>
+                <a:spcPct val="90000"/>
+              </a:lnSpc>
+              <a:spcBef>
+                <a:spcPct val="0"/>
+              </a:spcBef>
+              <a:buNone/>
+              <a:defRPr sz="6000" kern="1200">
+                <a:solidFill>
+                  <a:schemeClr val="tx1"/>
+                </a:solidFill>
+                <a:latin typeface="+mj-lt"/>
+                <a:ea typeface="+mj-ea"/>
+                <a:cs typeface="+mj-cs"/>
+              </a:defRPr>
+            </a:lvl1pPr>
+          </a:lstStyle>
+          <a:p>
+            <a:pPr algn="l">
+              <a:lnSpc>
+                <a:spcPct val="100000"/>
+              </a:lnSpc>
+            </a:pPr>
+            <a:r>
+              <a:rPr lang="en-AU" sz="2800" dirty="0" smtClean="0">
+                <a:solidFill>
+                  <a:srgbClr val="111111"/>
+                </a:solidFill>
+                <a:latin typeface="Open Sans" panose="020B0606030504020204" pitchFamily="34" charset="0"/>
+                <a:ea typeface="Open Sans" panose="020B0606030504020204" pitchFamily="34" charset="0"/>
+                <a:cs typeface="Open Sans" panose="020B0606030504020204" pitchFamily="34" charset="0"/>
+              </a:rPr>
+              <a:t>separator</a:t>
+            </a:r>
+          </a:p>
+        </p:txBody>
+      </p:sp>
+      <p:sp>
+        <p:nvSpPr>
+          <p:cNvPr id="2" name="TextBox 1"/>
+          <p:cNvSpPr txBox="1"/>
+          <p:nvPr/>
+        </p:nvSpPr>
+        <p:spPr>
+          <a:xfrm>
+            <a:off x="1524000" y="1232301"/>
+            <a:ext cx="9144000" cy="2092881"/>
+          </a:xfrm>
+          <a:prstGeom prst="rect">
+            <a:avLst/>
+          </a:prstGeom>
+          <a:noFill/>
+        </p:spPr>
+        <p:txBody>
+          <a:bodyPr wrap="square" rtlCol="0">
+            <a:spAutoFit/>
+          </a:bodyPr>
+          <a:lstStyle/>
+          <a:p>
+            <a:pPr algn="ctr"/>
             <a:r>
               <a:rPr lang="en-AU" sz="2600" dirty="0" smtClean="0">
                 <a:solidFill>
@@ -4624,8 +5037,22 @@
                 <a:ea typeface="Open Sans" panose="020B0606030504020204" pitchFamily="34" charset="0"/>
                 <a:cs typeface="Open Sans" panose="020B0606030504020204" pitchFamily="34" charset="0"/>
               </a:rPr>
-              <a:t> exist for all versions of Windows Vista </a:t>
-            </a:r>
+              <a:t>Blue Ink’s computers are susceptible to all 524 known vulnerabilities.</a:t>
+            </a:r>
+          </a:p>
+          <a:p>
+            <a:pPr algn="ctr"/>
+            <a:endParaRPr lang="en-AU" sz="2600" dirty="0">
+              <a:solidFill>
+                <a:srgbClr val="EEEEEE"/>
+              </a:solidFill>
+              <a:latin typeface="Open Sans" panose="020B0606030504020204" pitchFamily="34" charset="0"/>
+              <a:ea typeface="Open Sans" panose="020B0606030504020204" pitchFamily="34" charset="0"/>
+              <a:cs typeface="Open Sans" panose="020B0606030504020204" pitchFamily="34" charset="0"/>
+            </a:endParaRPr>
+          </a:p>
+          <a:p>
+            <a:pPr algn="ctr"/>
             <a:r>
               <a:rPr lang="en-AU" sz="2600" dirty="0" smtClean="0">
                 <a:solidFill>
@@ -4634,33 +5061,8 @@
                 <a:latin typeface="Open Sans" panose="020B0606030504020204" pitchFamily="34" charset="0"/>
                 <a:ea typeface="Open Sans" panose="020B0606030504020204" pitchFamily="34" charset="0"/>
                 <a:cs typeface="Open Sans" panose="020B0606030504020204" pitchFamily="34" charset="0"/>
-                <a:hlinkClick r:id="rId2"/>
-              </a:rPr>
-              <a:t>(</a:t>
-            </a:r>
-            <a:r>
-              <a:rPr lang="en-AU" sz="2600" dirty="0" err="1" smtClean="0">
-                <a:solidFill>
-                  <a:srgbClr val="EEEEEE"/>
-                </a:solidFill>
-                <a:latin typeface="Open Sans" panose="020B0606030504020204" pitchFamily="34" charset="0"/>
-                <a:ea typeface="Open Sans" panose="020B0606030504020204" pitchFamily="34" charset="0"/>
-                <a:cs typeface="Open Sans" panose="020B0606030504020204" pitchFamily="34" charset="0"/>
-                <a:hlinkClick r:id="rId2"/>
-              </a:rPr>
-              <a:t>Ozkan</a:t>
-            </a:r>
-            <a:r>
-              <a:rPr lang="en-AU" sz="2600" dirty="0" smtClean="0">
-                <a:solidFill>
-                  <a:srgbClr val="EEEEEE"/>
-                </a:solidFill>
-                <a:latin typeface="Open Sans" panose="020B0606030504020204" pitchFamily="34" charset="0"/>
-                <a:ea typeface="Open Sans" panose="020B0606030504020204" pitchFamily="34" charset="0"/>
-                <a:cs typeface="Open Sans" panose="020B0606030504020204" pitchFamily="34" charset="0"/>
-                <a:hlinkClick r:id="rId2"/>
-              </a:rPr>
-              <a:t>, 2015)</a:t>
+              </a:rPr>
+              <a:t>Lack of updates have also kept included software such as Internet Explorer severely outdated.</a:t>
             </a:r>
             <a:endParaRPr lang="en-AU" sz="2600" dirty="0" smtClean="0">
               <a:solidFill>
@@ -4671,46 +5073,687 @@
               <a:cs typeface="Open Sans" panose="020B0606030504020204" pitchFamily="34" charset="0"/>
             </a:endParaRPr>
           </a:p>
-          <a:p>
-            <a:pPr marL="742950" lvl="1" indent="-285750">
-              <a:buFont typeface="Arial" panose="020B0604020202020204" pitchFamily="34" charset="0"/>
-              <a:buChar char="•"/>
-            </a:pPr>
-            <a:r>
-              <a:rPr lang="en-AU" sz="2600" dirty="0" smtClean="0">
-                <a:solidFill>
-                  <a:srgbClr val="EEEEEE"/>
-                </a:solidFill>
-                <a:latin typeface="Open Sans" panose="020B0606030504020204" pitchFamily="34" charset="0"/>
-                <a:ea typeface="Open Sans" panose="020B0606030504020204" pitchFamily="34" charset="0"/>
-                <a:cs typeface="Open Sans" panose="020B0606030504020204" pitchFamily="34" charset="0"/>
-              </a:rPr>
-              <a:t>From SP0 through to SP2</a:t>
-            </a:r>
-          </a:p>
-          <a:p>
-            <a:pPr marL="285750" indent="-285750">
-              <a:buFont typeface="Arial" panose="020B0604020202020204" pitchFamily="34" charset="0"/>
-              <a:buChar char="•"/>
-            </a:pPr>
-            <a:r>
-              <a:rPr lang="en-AU" sz="2600" dirty="0" smtClean="0">
-                <a:solidFill>
-                  <a:srgbClr val="EEEEEE"/>
-                </a:solidFill>
-                <a:latin typeface="Open Sans" panose="020B0606030504020204" pitchFamily="34" charset="0"/>
-                <a:ea typeface="Open Sans" panose="020B0606030504020204" pitchFamily="34" charset="0"/>
-                <a:cs typeface="Open Sans" panose="020B0606030504020204" pitchFamily="34" charset="0"/>
-              </a:rPr>
-              <a:t>Right now, Blue Ink’s computers are susceptible to all of them</a:t>
-            </a:r>
-          </a:p>
-          <a:p>
-            <a:pPr marL="285750" indent="-285750">
-              <a:buFont typeface="Arial" panose="020B0604020202020204" pitchFamily="34" charset="0"/>
-              <a:buChar char="•"/>
-            </a:pPr>
-            <a:endParaRPr lang="en-AU" sz="2600" dirty="0">
+        </p:txBody>
+      </p:sp>
+      <p:graphicFrame>
+        <p:nvGraphicFramePr>
+          <p:cNvPr id="3" name="Table 2"/>
+          <p:cNvGraphicFramePr>
+            <a:graphicFrameLocks noGrp="1"/>
+          </p:cNvGraphicFramePr>
+          <p:nvPr>
+            <p:extLst>
+              <p:ext uri="{D42A27DB-BD31-4B8C-83A1-F6EECF244321}">
+                <p14:modId xmlns:p14="http://schemas.microsoft.com/office/powerpoint/2010/main" val="712543593"/>
+              </p:ext>
+            </p:extLst>
+          </p:nvPr>
+        </p:nvGraphicFramePr>
+        <p:xfrm>
+          <a:off x="2494845" y="3830764"/>
+          <a:ext cx="7224888" cy="1584960"/>
+        </p:xfrm>
+        <a:graphic>
+          <a:graphicData uri="http://schemas.openxmlformats.org/drawingml/2006/table">
+            <a:tbl>
+              <a:tblPr firstRow="1" bandRow="1">
+                <a:tableStyleId>{073A0DAA-6AF3-43AB-8588-CEC1D06C72B9}</a:tableStyleId>
+              </a:tblPr>
+              <a:tblGrid>
+                <a:gridCol w="3632513"/>
+                <a:gridCol w="3592375"/>
+              </a:tblGrid>
+              <a:tr h="370840">
+                <a:tc>
+                  <a:txBody>
+                    <a:bodyPr/>
+                    <a:lstStyle/>
+                    <a:p>
+                      <a:r>
+                        <a:rPr lang="en-AU" sz="2000" dirty="0" smtClean="0">
+                          <a:solidFill>
+                            <a:srgbClr val="EEEEEE"/>
+                          </a:solidFill>
+                          <a:latin typeface="Open Sans" panose="020B0606030504020204" pitchFamily="34" charset="0"/>
+                          <a:ea typeface="Open Sans" panose="020B0606030504020204" pitchFamily="34" charset="0"/>
+                          <a:cs typeface="Open Sans" panose="020B0606030504020204" pitchFamily="34" charset="0"/>
+                        </a:rPr>
+                        <a:t>Internet</a:t>
+                      </a:r>
+                      <a:r>
+                        <a:rPr lang="en-AU" sz="2000" baseline="0" dirty="0" smtClean="0">
+                          <a:solidFill>
+                            <a:srgbClr val="EEEEEE"/>
+                          </a:solidFill>
+                          <a:latin typeface="Open Sans" panose="020B0606030504020204" pitchFamily="34" charset="0"/>
+                          <a:ea typeface="Open Sans" panose="020B0606030504020204" pitchFamily="34" charset="0"/>
+                          <a:cs typeface="Open Sans" panose="020B0606030504020204" pitchFamily="34" charset="0"/>
+                        </a:rPr>
+                        <a:t> Explorer version</a:t>
+                      </a:r>
+                      <a:endParaRPr lang="en-AU" sz="2000" dirty="0">
+                        <a:solidFill>
+                          <a:srgbClr val="EEEEEE"/>
+                        </a:solidFill>
+                        <a:latin typeface="Open Sans" panose="020B0606030504020204" pitchFamily="34" charset="0"/>
+                        <a:ea typeface="Open Sans" panose="020B0606030504020204" pitchFamily="34" charset="0"/>
+                        <a:cs typeface="Open Sans" panose="020B0606030504020204" pitchFamily="34" charset="0"/>
+                      </a:endParaRPr>
+                    </a:p>
+                  </a:txBody>
+                  <a:tcPr>
+                    <a:lnL w="12700" cap="flat" cmpd="sng" algn="ctr">
+                      <a:noFill/>
+                      <a:prstDash val="solid"/>
+                      <a:round/>
+                      <a:headEnd type="none" w="med" len="med"/>
+                      <a:tailEnd type="none" w="med" len="med"/>
+                    </a:lnL>
+                    <a:lnR w="12700" cap="flat" cmpd="sng" algn="ctr">
+                      <a:solidFill>
+                        <a:srgbClr val="EEEEEE"/>
+                      </a:solidFill>
+                      <a:prstDash val="solid"/>
+                      <a:round/>
+                      <a:headEnd type="none" w="med" len="med"/>
+                      <a:tailEnd type="none" w="med" len="med"/>
+                    </a:lnR>
+                    <a:lnT w="12700" cap="flat" cmpd="sng" algn="ctr">
+                      <a:noFill/>
+                      <a:prstDash val="solid"/>
+                      <a:round/>
+                      <a:headEnd type="none" w="med" len="med"/>
+                      <a:tailEnd type="none" w="med" len="med"/>
+                    </a:lnT>
+                    <a:lnB w="12700" cap="flat" cmpd="sng" algn="ctr">
+                      <a:solidFill>
+                        <a:srgbClr val="EEEEEE"/>
+                      </a:solidFill>
+                      <a:prstDash val="solid"/>
+                      <a:round/>
+                      <a:headEnd type="none" w="med" len="med"/>
+                      <a:tailEnd type="none" w="med" len="med"/>
+                    </a:lnB>
+                    <a:lnTlToBr w="12700" cmpd="sng">
+                      <a:noFill/>
+                      <a:prstDash val="solid"/>
+                    </a:lnTlToBr>
+                    <a:lnBlToTr w="12700" cmpd="sng">
+                      <a:noFill/>
+                      <a:prstDash val="solid"/>
+                    </a:lnBlToTr>
+                    <a:noFill/>
+                  </a:tcPr>
+                </a:tc>
+                <a:tc>
+                  <a:txBody>
+                    <a:bodyPr/>
+                    <a:lstStyle/>
+                    <a:p>
+                      <a:r>
+                        <a:rPr lang="en-AU" sz="2000" dirty="0" smtClean="0">
+                          <a:solidFill>
+                            <a:srgbClr val="EEEEEE"/>
+                          </a:solidFill>
+                          <a:latin typeface="Open Sans" panose="020B0606030504020204" pitchFamily="34" charset="0"/>
+                          <a:ea typeface="Open Sans" panose="020B0606030504020204" pitchFamily="34" charset="0"/>
+                          <a:cs typeface="Open Sans" panose="020B0606030504020204" pitchFamily="34" charset="0"/>
+                        </a:rPr>
+                        <a:t>No. of</a:t>
+                      </a:r>
+                      <a:r>
+                        <a:rPr lang="en-AU" sz="2000" baseline="0" dirty="0" smtClean="0">
+                          <a:solidFill>
+                            <a:srgbClr val="EEEEEE"/>
+                          </a:solidFill>
+                          <a:latin typeface="Open Sans" panose="020B0606030504020204" pitchFamily="34" charset="0"/>
+                          <a:ea typeface="Open Sans" panose="020B0606030504020204" pitchFamily="34" charset="0"/>
+                          <a:cs typeface="Open Sans" panose="020B0606030504020204" pitchFamily="34" charset="0"/>
+                        </a:rPr>
+                        <a:t> vulnerabilities</a:t>
+                      </a:r>
+                      <a:endParaRPr lang="en-AU" sz="2000" dirty="0">
+                        <a:solidFill>
+                          <a:srgbClr val="EEEEEE"/>
+                        </a:solidFill>
+                        <a:latin typeface="Open Sans" panose="020B0606030504020204" pitchFamily="34" charset="0"/>
+                        <a:ea typeface="Open Sans" panose="020B0606030504020204" pitchFamily="34" charset="0"/>
+                        <a:cs typeface="Open Sans" panose="020B0606030504020204" pitchFamily="34" charset="0"/>
+                      </a:endParaRPr>
+                    </a:p>
+                  </a:txBody>
+                  <a:tcPr>
+                    <a:lnL w="12700" cap="flat" cmpd="sng" algn="ctr">
+                      <a:solidFill>
+                        <a:srgbClr val="EEEEEE"/>
+                      </a:solidFill>
+                      <a:prstDash val="solid"/>
+                      <a:round/>
+                      <a:headEnd type="none" w="med" len="med"/>
+                      <a:tailEnd type="none" w="med" len="med"/>
+                    </a:lnL>
+                    <a:lnR w="12700" cap="flat" cmpd="sng" algn="ctr">
+                      <a:noFill/>
+                      <a:prstDash val="solid"/>
+                      <a:round/>
+                      <a:headEnd type="none" w="med" len="med"/>
+                      <a:tailEnd type="none" w="med" len="med"/>
+                    </a:lnR>
+                    <a:lnT w="12700" cap="flat" cmpd="sng" algn="ctr">
+                      <a:noFill/>
+                      <a:prstDash val="solid"/>
+                      <a:round/>
+                      <a:headEnd type="none" w="med" len="med"/>
+                      <a:tailEnd type="none" w="med" len="med"/>
+                    </a:lnT>
+                    <a:lnB w="12700" cap="flat" cmpd="sng" algn="ctr">
+                      <a:solidFill>
+                        <a:srgbClr val="EEEEEE"/>
+                      </a:solidFill>
+                      <a:prstDash val="solid"/>
+                      <a:round/>
+                      <a:headEnd type="none" w="med" len="med"/>
+                      <a:tailEnd type="none" w="med" len="med"/>
+                    </a:lnB>
+                    <a:lnTlToBr w="12700" cmpd="sng">
+                      <a:noFill/>
+                      <a:prstDash val="solid"/>
+                    </a:lnTlToBr>
+                    <a:lnBlToTr w="12700" cmpd="sng">
+                      <a:noFill/>
+                      <a:prstDash val="solid"/>
+                    </a:lnBlToTr>
+                    <a:noFill/>
+                  </a:tcPr>
+                </a:tc>
+              </a:tr>
+              <a:tr h="370840">
+                <a:tc>
+                  <a:txBody>
+                    <a:bodyPr/>
+                    <a:lstStyle/>
+                    <a:p>
+                      <a:r>
+                        <a:rPr lang="en-AU" sz="2000" dirty="0" smtClean="0">
+                          <a:solidFill>
+                            <a:srgbClr val="EEEEEE"/>
+                          </a:solidFill>
+                          <a:latin typeface="Open Sans" panose="020B0606030504020204" pitchFamily="34" charset="0"/>
+                          <a:ea typeface="Open Sans" panose="020B0606030504020204" pitchFamily="34" charset="0"/>
+                          <a:cs typeface="Open Sans" panose="020B0606030504020204" pitchFamily="34" charset="0"/>
+                        </a:rPr>
+                        <a:t>IE 7</a:t>
+                      </a:r>
+                      <a:endParaRPr lang="en-AU" sz="2000" dirty="0">
+                        <a:solidFill>
+                          <a:srgbClr val="EEEEEE"/>
+                        </a:solidFill>
+                        <a:latin typeface="Open Sans" panose="020B0606030504020204" pitchFamily="34" charset="0"/>
+                        <a:ea typeface="Open Sans" panose="020B0606030504020204" pitchFamily="34" charset="0"/>
+                        <a:cs typeface="Open Sans" panose="020B0606030504020204" pitchFamily="34" charset="0"/>
+                      </a:endParaRPr>
+                    </a:p>
+                  </a:txBody>
+                  <a:tcPr>
+                    <a:lnL w="12700" cap="flat" cmpd="sng" algn="ctr">
+                      <a:noFill/>
+                      <a:prstDash val="solid"/>
+                      <a:round/>
+                      <a:headEnd type="none" w="med" len="med"/>
+                      <a:tailEnd type="none" w="med" len="med"/>
+                    </a:lnL>
+                    <a:lnR w="12700" cap="flat" cmpd="sng" algn="ctr">
+                      <a:solidFill>
+                        <a:srgbClr val="EEEEEE"/>
+                      </a:solidFill>
+                      <a:prstDash val="solid"/>
+                      <a:round/>
+                      <a:headEnd type="none" w="med" len="med"/>
+                      <a:tailEnd type="none" w="med" len="med"/>
+                    </a:lnR>
+                    <a:lnT w="12700" cap="flat" cmpd="sng" algn="ctr">
+                      <a:solidFill>
+                        <a:srgbClr val="EEEEEE"/>
+                      </a:solidFill>
+                      <a:prstDash val="solid"/>
+                      <a:round/>
+                      <a:headEnd type="none" w="med" len="med"/>
+                      <a:tailEnd type="none" w="med" len="med"/>
+                    </a:lnT>
+                    <a:lnB w="12700" cap="flat" cmpd="sng" algn="ctr">
+                      <a:solidFill>
+                        <a:srgbClr val="EEEEEE"/>
+                      </a:solidFill>
+                      <a:prstDash val="solid"/>
+                      <a:round/>
+                      <a:headEnd type="none" w="med" len="med"/>
+                      <a:tailEnd type="none" w="med" len="med"/>
+                    </a:lnB>
+                    <a:lnTlToBr w="12700" cmpd="sng">
+                      <a:noFill/>
+                      <a:prstDash val="solid"/>
+                    </a:lnTlToBr>
+                    <a:lnBlToTr w="12700" cmpd="sng">
+                      <a:noFill/>
+                      <a:prstDash val="solid"/>
+                    </a:lnBlToTr>
+                    <a:noFill/>
+                  </a:tcPr>
+                </a:tc>
+                <a:tc>
+                  <a:txBody>
+                    <a:bodyPr/>
+                    <a:lstStyle/>
+                    <a:p>
+                      <a:r>
+                        <a:rPr lang="en-AU" sz="2000" dirty="0" smtClean="0">
+                          <a:solidFill>
+                            <a:srgbClr val="EEEEEE"/>
+                          </a:solidFill>
+                          <a:latin typeface="Open Sans" panose="020B0606030504020204" pitchFamily="34" charset="0"/>
+                          <a:ea typeface="Open Sans" panose="020B0606030504020204" pitchFamily="34" charset="0"/>
+                          <a:cs typeface="Open Sans" panose="020B0606030504020204" pitchFamily="34" charset="0"/>
+                        </a:rPr>
+                        <a:t>206</a:t>
+                      </a:r>
+                      <a:endParaRPr lang="en-AU" sz="2000" dirty="0">
+                        <a:solidFill>
+                          <a:srgbClr val="EEEEEE"/>
+                        </a:solidFill>
+                        <a:latin typeface="Open Sans" panose="020B0606030504020204" pitchFamily="34" charset="0"/>
+                        <a:ea typeface="Open Sans" panose="020B0606030504020204" pitchFamily="34" charset="0"/>
+                        <a:cs typeface="Open Sans" panose="020B0606030504020204" pitchFamily="34" charset="0"/>
+                      </a:endParaRPr>
+                    </a:p>
+                  </a:txBody>
+                  <a:tcPr>
+                    <a:lnL w="12700" cap="flat" cmpd="sng" algn="ctr">
+                      <a:solidFill>
+                        <a:srgbClr val="EEEEEE"/>
+                      </a:solidFill>
+                      <a:prstDash val="solid"/>
+                      <a:round/>
+                      <a:headEnd type="none" w="med" len="med"/>
+                      <a:tailEnd type="none" w="med" len="med"/>
+                    </a:lnL>
+                    <a:lnR w="12700" cap="flat" cmpd="sng" algn="ctr">
+                      <a:noFill/>
+                      <a:prstDash val="solid"/>
+                      <a:round/>
+                      <a:headEnd type="none" w="med" len="med"/>
+                      <a:tailEnd type="none" w="med" len="med"/>
+                    </a:lnR>
+                    <a:lnT w="12700" cap="flat" cmpd="sng" algn="ctr">
+                      <a:solidFill>
+                        <a:srgbClr val="EEEEEE"/>
+                      </a:solidFill>
+                      <a:prstDash val="solid"/>
+                      <a:round/>
+                      <a:headEnd type="none" w="med" len="med"/>
+                      <a:tailEnd type="none" w="med" len="med"/>
+                    </a:lnT>
+                    <a:lnB w="12700" cap="flat" cmpd="sng" algn="ctr">
+                      <a:solidFill>
+                        <a:srgbClr val="EEEEEE"/>
+                      </a:solidFill>
+                      <a:prstDash val="solid"/>
+                      <a:round/>
+                      <a:headEnd type="none" w="med" len="med"/>
+                      <a:tailEnd type="none" w="med" len="med"/>
+                    </a:lnB>
+                    <a:lnTlToBr w="12700" cmpd="sng">
+                      <a:noFill/>
+                      <a:prstDash val="solid"/>
+                    </a:lnTlToBr>
+                    <a:lnBlToTr w="12700" cmpd="sng">
+                      <a:noFill/>
+                      <a:prstDash val="solid"/>
+                    </a:lnBlToTr>
+                    <a:noFill/>
+                  </a:tcPr>
+                </a:tc>
+              </a:tr>
+              <a:tr h="370840">
+                <a:tc>
+                  <a:txBody>
+                    <a:bodyPr/>
+                    <a:lstStyle/>
+                    <a:p>
+                      <a:r>
+                        <a:rPr lang="en-AU" sz="2000" dirty="0" smtClean="0">
+                          <a:solidFill>
+                            <a:srgbClr val="EEEEEE"/>
+                          </a:solidFill>
+                          <a:latin typeface="Open Sans" panose="020B0606030504020204" pitchFamily="34" charset="0"/>
+                          <a:ea typeface="Open Sans" panose="020B0606030504020204" pitchFamily="34" charset="0"/>
+                          <a:cs typeface="Open Sans" panose="020B0606030504020204" pitchFamily="34" charset="0"/>
+                        </a:rPr>
+                        <a:t>IE</a:t>
+                      </a:r>
+                      <a:r>
+                        <a:rPr lang="en-AU" sz="2000" baseline="0" dirty="0" smtClean="0">
+                          <a:solidFill>
+                            <a:srgbClr val="EEEEEE"/>
+                          </a:solidFill>
+                          <a:latin typeface="Open Sans" panose="020B0606030504020204" pitchFamily="34" charset="0"/>
+                          <a:ea typeface="Open Sans" panose="020B0606030504020204" pitchFamily="34" charset="0"/>
+                          <a:cs typeface="Open Sans" panose="020B0606030504020204" pitchFamily="34" charset="0"/>
+                        </a:rPr>
+                        <a:t> 8</a:t>
+                      </a:r>
+                      <a:endParaRPr lang="en-AU" sz="2000" dirty="0">
+                        <a:solidFill>
+                          <a:srgbClr val="EEEEEE"/>
+                        </a:solidFill>
+                        <a:latin typeface="Open Sans" panose="020B0606030504020204" pitchFamily="34" charset="0"/>
+                        <a:ea typeface="Open Sans" panose="020B0606030504020204" pitchFamily="34" charset="0"/>
+                        <a:cs typeface="Open Sans" panose="020B0606030504020204" pitchFamily="34" charset="0"/>
+                      </a:endParaRPr>
+                    </a:p>
+                  </a:txBody>
+                  <a:tcPr>
+                    <a:lnL w="12700" cap="flat" cmpd="sng" algn="ctr">
+                      <a:noFill/>
+                      <a:prstDash val="solid"/>
+                      <a:round/>
+                      <a:headEnd type="none" w="med" len="med"/>
+                      <a:tailEnd type="none" w="med" len="med"/>
+                    </a:lnL>
+                    <a:lnR w="12700" cap="flat" cmpd="sng" algn="ctr">
+                      <a:solidFill>
+                        <a:srgbClr val="EEEEEE"/>
+                      </a:solidFill>
+                      <a:prstDash val="solid"/>
+                      <a:round/>
+                      <a:headEnd type="none" w="med" len="med"/>
+                      <a:tailEnd type="none" w="med" len="med"/>
+                    </a:lnR>
+                    <a:lnT w="12700" cap="flat" cmpd="sng" algn="ctr">
+                      <a:solidFill>
+                        <a:srgbClr val="EEEEEE"/>
+                      </a:solidFill>
+                      <a:prstDash val="solid"/>
+                      <a:round/>
+                      <a:headEnd type="none" w="med" len="med"/>
+                      <a:tailEnd type="none" w="med" len="med"/>
+                    </a:lnT>
+                    <a:lnB w="12700" cap="flat" cmpd="sng" algn="ctr">
+                      <a:solidFill>
+                        <a:srgbClr val="EEEEEE"/>
+                      </a:solidFill>
+                      <a:prstDash val="solid"/>
+                      <a:round/>
+                      <a:headEnd type="none" w="med" len="med"/>
+                      <a:tailEnd type="none" w="med" len="med"/>
+                    </a:lnB>
+                    <a:lnTlToBr w="12700" cmpd="sng">
+                      <a:noFill/>
+                      <a:prstDash val="solid"/>
+                    </a:lnTlToBr>
+                    <a:lnBlToTr w="12700" cmpd="sng">
+                      <a:noFill/>
+                      <a:prstDash val="solid"/>
+                    </a:lnBlToTr>
+                    <a:noFill/>
+                  </a:tcPr>
+                </a:tc>
+                <a:tc>
+                  <a:txBody>
+                    <a:bodyPr/>
+                    <a:lstStyle/>
+                    <a:p>
+                      <a:r>
+                        <a:rPr lang="en-AU" sz="2000" dirty="0" smtClean="0">
+                          <a:solidFill>
+                            <a:srgbClr val="EEEEEE"/>
+                          </a:solidFill>
+                          <a:latin typeface="Open Sans" panose="020B0606030504020204" pitchFamily="34" charset="0"/>
+                          <a:ea typeface="Open Sans" panose="020B0606030504020204" pitchFamily="34" charset="0"/>
+                          <a:cs typeface="Open Sans" panose="020B0606030504020204" pitchFamily="34" charset="0"/>
+                        </a:rPr>
+                        <a:t>249</a:t>
+                      </a:r>
+                      <a:endParaRPr lang="en-AU" sz="2000" dirty="0">
+                        <a:solidFill>
+                          <a:srgbClr val="EEEEEE"/>
+                        </a:solidFill>
+                        <a:latin typeface="Open Sans" panose="020B0606030504020204" pitchFamily="34" charset="0"/>
+                        <a:ea typeface="Open Sans" panose="020B0606030504020204" pitchFamily="34" charset="0"/>
+                        <a:cs typeface="Open Sans" panose="020B0606030504020204" pitchFamily="34" charset="0"/>
+                      </a:endParaRPr>
+                    </a:p>
+                  </a:txBody>
+                  <a:tcPr>
+                    <a:lnL w="12700" cap="flat" cmpd="sng" algn="ctr">
+                      <a:solidFill>
+                        <a:srgbClr val="EEEEEE"/>
+                      </a:solidFill>
+                      <a:prstDash val="solid"/>
+                      <a:round/>
+                      <a:headEnd type="none" w="med" len="med"/>
+                      <a:tailEnd type="none" w="med" len="med"/>
+                    </a:lnL>
+                    <a:lnR w="12700" cap="flat" cmpd="sng" algn="ctr">
+                      <a:noFill/>
+                      <a:prstDash val="solid"/>
+                      <a:round/>
+                      <a:headEnd type="none" w="med" len="med"/>
+                      <a:tailEnd type="none" w="med" len="med"/>
+                    </a:lnR>
+                    <a:lnT w="12700" cap="flat" cmpd="sng" algn="ctr">
+                      <a:solidFill>
+                        <a:srgbClr val="EEEEEE"/>
+                      </a:solidFill>
+                      <a:prstDash val="solid"/>
+                      <a:round/>
+                      <a:headEnd type="none" w="med" len="med"/>
+                      <a:tailEnd type="none" w="med" len="med"/>
+                    </a:lnT>
+                    <a:lnB w="12700" cap="flat" cmpd="sng" algn="ctr">
+                      <a:solidFill>
+                        <a:srgbClr val="EEEEEE"/>
+                      </a:solidFill>
+                      <a:prstDash val="solid"/>
+                      <a:round/>
+                      <a:headEnd type="none" w="med" len="med"/>
+                      <a:tailEnd type="none" w="med" len="med"/>
+                    </a:lnB>
+                    <a:lnTlToBr w="12700" cmpd="sng">
+                      <a:noFill/>
+                      <a:prstDash val="solid"/>
+                    </a:lnTlToBr>
+                    <a:lnBlToTr w="12700" cmpd="sng">
+                      <a:noFill/>
+                      <a:prstDash val="solid"/>
+                    </a:lnBlToTr>
+                    <a:noFill/>
+                  </a:tcPr>
+                </a:tc>
+              </a:tr>
+              <a:tr h="370840">
+                <a:tc>
+                  <a:txBody>
+                    <a:bodyPr/>
+                    <a:lstStyle/>
+                    <a:p>
+                      <a:r>
+                        <a:rPr lang="en-AU" sz="2000" dirty="0" smtClean="0">
+                          <a:solidFill>
+                            <a:srgbClr val="EEEEEE"/>
+                          </a:solidFill>
+                          <a:latin typeface="Open Sans" panose="020B0606030504020204" pitchFamily="34" charset="0"/>
+                          <a:ea typeface="Open Sans" panose="020B0606030504020204" pitchFamily="34" charset="0"/>
+                          <a:cs typeface="Open Sans" panose="020B0606030504020204" pitchFamily="34" charset="0"/>
+                        </a:rPr>
+                        <a:t>IE 9 *</a:t>
+                      </a:r>
+                      <a:endParaRPr lang="en-AU" sz="2000" dirty="0">
+                        <a:solidFill>
+                          <a:srgbClr val="EEEEEE"/>
+                        </a:solidFill>
+                        <a:latin typeface="Open Sans" panose="020B0606030504020204" pitchFamily="34" charset="0"/>
+                        <a:ea typeface="Open Sans" panose="020B0606030504020204" pitchFamily="34" charset="0"/>
+                        <a:cs typeface="Open Sans" panose="020B0606030504020204" pitchFamily="34" charset="0"/>
+                      </a:endParaRPr>
+                    </a:p>
+                  </a:txBody>
+                  <a:tcPr>
+                    <a:lnL w="12700" cap="flat" cmpd="sng" algn="ctr">
+                      <a:noFill/>
+                      <a:prstDash val="solid"/>
+                      <a:round/>
+                      <a:headEnd type="none" w="med" len="med"/>
+                      <a:tailEnd type="none" w="med" len="med"/>
+                    </a:lnL>
+                    <a:lnR w="12700" cap="flat" cmpd="sng" algn="ctr">
+                      <a:solidFill>
+                        <a:srgbClr val="EEEEEE"/>
+                      </a:solidFill>
+                      <a:prstDash val="solid"/>
+                      <a:round/>
+                      <a:headEnd type="none" w="med" len="med"/>
+                      <a:tailEnd type="none" w="med" len="med"/>
+                    </a:lnR>
+                    <a:lnT w="12700" cap="flat" cmpd="sng" algn="ctr">
+                      <a:solidFill>
+                        <a:srgbClr val="EEEEEE"/>
+                      </a:solidFill>
+                      <a:prstDash val="solid"/>
+                      <a:round/>
+                      <a:headEnd type="none" w="med" len="med"/>
+                      <a:tailEnd type="none" w="med" len="med"/>
+                    </a:lnT>
+                    <a:lnB w="12700" cap="flat" cmpd="sng" algn="ctr">
+                      <a:noFill/>
+                      <a:prstDash val="solid"/>
+                      <a:round/>
+                      <a:headEnd type="none" w="med" len="med"/>
+                      <a:tailEnd type="none" w="med" len="med"/>
+                    </a:lnB>
+                    <a:lnTlToBr w="12700" cmpd="sng">
+                      <a:noFill/>
+                      <a:prstDash val="solid"/>
+                    </a:lnTlToBr>
+                    <a:lnBlToTr w="12700" cmpd="sng">
+                      <a:noFill/>
+                      <a:prstDash val="solid"/>
+                    </a:lnBlToTr>
+                    <a:noFill/>
+                  </a:tcPr>
+                </a:tc>
+                <a:tc>
+                  <a:txBody>
+                    <a:bodyPr/>
+                    <a:lstStyle/>
+                    <a:p>
+                      <a:r>
+                        <a:rPr lang="en-AU" sz="2000" dirty="0" smtClean="0">
+                          <a:solidFill>
+                            <a:srgbClr val="EEEEEE"/>
+                          </a:solidFill>
+                          <a:latin typeface="Open Sans" panose="020B0606030504020204" pitchFamily="34" charset="0"/>
+                          <a:ea typeface="Open Sans" panose="020B0606030504020204" pitchFamily="34" charset="0"/>
+                          <a:cs typeface="Open Sans" panose="020B0606030504020204" pitchFamily="34" charset="0"/>
+                        </a:rPr>
+                        <a:t>292</a:t>
+                      </a:r>
+                      <a:endParaRPr lang="en-AU" sz="2000" dirty="0">
+                        <a:solidFill>
+                          <a:srgbClr val="EEEEEE"/>
+                        </a:solidFill>
+                        <a:latin typeface="Open Sans" panose="020B0606030504020204" pitchFamily="34" charset="0"/>
+                        <a:ea typeface="Open Sans" panose="020B0606030504020204" pitchFamily="34" charset="0"/>
+                        <a:cs typeface="Open Sans" panose="020B0606030504020204" pitchFamily="34" charset="0"/>
+                      </a:endParaRPr>
+                    </a:p>
+                  </a:txBody>
+                  <a:tcPr>
+                    <a:lnL w="12700" cap="flat" cmpd="sng" algn="ctr">
+                      <a:solidFill>
+                        <a:srgbClr val="EEEEEE"/>
+                      </a:solidFill>
+                      <a:prstDash val="solid"/>
+                      <a:round/>
+                      <a:headEnd type="none" w="med" len="med"/>
+                      <a:tailEnd type="none" w="med" len="med"/>
+                    </a:lnL>
+                    <a:lnR w="12700" cap="flat" cmpd="sng" algn="ctr">
+                      <a:noFill/>
+                      <a:prstDash val="solid"/>
+                      <a:round/>
+                      <a:headEnd type="none" w="med" len="med"/>
+                      <a:tailEnd type="none" w="med" len="med"/>
+                    </a:lnR>
+                    <a:lnT w="12700" cap="flat" cmpd="sng" algn="ctr">
+                      <a:solidFill>
+                        <a:srgbClr val="EEEEEE"/>
+                      </a:solidFill>
+                      <a:prstDash val="solid"/>
+                      <a:round/>
+                      <a:headEnd type="none" w="med" len="med"/>
+                      <a:tailEnd type="none" w="med" len="med"/>
+                    </a:lnT>
+                    <a:lnB w="12700" cap="flat" cmpd="sng" algn="ctr">
+                      <a:noFill/>
+                      <a:prstDash val="solid"/>
+                      <a:round/>
+                      <a:headEnd type="none" w="med" len="med"/>
+                      <a:tailEnd type="none" w="med" len="med"/>
+                    </a:lnB>
+                    <a:lnTlToBr w="12700" cmpd="sng">
+                      <a:noFill/>
+                      <a:prstDash val="solid"/>
+                    </a:lnTlToBr>
+                    <a:lnBlToTr w="12700" cmpd="sng">
+                      <a:noFill/>
+                      <a:prstDash val="solid"/>
+                    </a:lnBlToTr>
+                    <a:noFill/>
+                  </a:tcPr>
+                </a:tc>
+              </a:tr>
+            </a:tbl>
+          </a:graphicData>
+        </a:graphic>
+      </p:graphicFrame>
+      <p:sp>
+        <p:nvSpPr>
+          <p:cNvPr id="7" name="TextBox 6"/>
+          <p:cNvSpPr txBox="1"/>
+          <p:nvPr/>
+        </p:nvSpPr>
+        <p:spPr>
+          <a:xfrm>
+            <a:off x="1524000" y="5646256"/>
+            <a:ext cx="9144000" cy="1015663"/>
+          </a:xfrm>
+          <a:prstGeom prst="rect">
+            <a:avLst/>
+          </a:prstGeom>
+          <a:noFill/>
+        </p:spPr>
+        <p:txBody>
+          <a:bodyPr wrap="square" rtlCol="0">
+            <a:spAutoFit/>
+          </a:bodyPr>
+          <a:lstStyle/>
+          <a:p>
+            <a:pPr algn="ctr"/>
+            <a:r>
+              <a:rPr lang="en-AU" dirty="0" smtClean="0">
+                <a:solidFill>
+                  <a:srgbClr val="EEEEEE"/>
+                </a:solidFill>
+                <a:latin typeface="Open Sans" panose="020B0606030504020204" pitchFamily="34" charset="0"/>
+                <a:ea typeface="Open Sans" panose="020B0606030504020204" pitchFamily="34" charset="0"/>
+                <a:cs typeface="Open Sans" panose="020B0606030504020204" pitchFamily="34" charset="0"/>
+              </a:rPr>
+              <a:t>* IE 9 is latest compatible version with Vista.</a:t>
+            </a:r>
+          </a:p>
+          <a:p>
+            <a:pPr algn="ctr"/>
+            <a:endParaRPr lang="en-AU" sz="2000" dirty="0">
               <a:solidFill>
                 <a:srgbClr val="EEEEEE"/>
               </a:solidFill>
@@ -4722,23 +5765,1584 @@
           <a:p>
             <a:pPr algn="ctr"/>
             <a:r>
-              <a:rPr lang="en-AU" sz="2600" dirty="0" smtClean="0">
-                <a:solidFill>
-                  <a:srgbClr val="EEEEEE"/>
-                </a:solidFill>
-                <a:latin typeface="Open Sans" panose="020B0606030504020204" pitchFamily="34" charset="0"/>
-                <a:ea typeface="Open Sans" panose="020B0606030504020204" pitchFamily="34" charset="0"/>
-                <a:cs typeface="Open Sans" panose="020B0606030504020204" pitchFamily="34" charset="0"/>
-              </a:rPr>
-              <a:t>Including…</a:t>
-            </a:r>
+              <a:rPr lang="en-AU" sz="2000" dirty="0" smtClean="0">
+                <a:solidFill>
+                  <a:srgbClr val="EEEEEE"/>
+                </a:solidFill>
+                <a:latin typeface="Open Sans" panose="020B0606030504020204" pitchFamily="34" charset="0"/>
+                <a:ea typeface="Open Sans" panose="020B0606030504020204" pitchFamily="34" charset="0"/>
+                <a:cs typeface="Open Sans" panose="020B0606030504020204" pitchFamily="34" charset="0"/>
+              </a:rPr>
+              <a:t>Excerpt of IE vulnerabilities list </a:t>
+            </a:r>
+            <a:r>
+              <a:rPr lang="en-AU" sz="2000" dirty="0" smtClean="0">
+                <a:solidFill>
+                  <a:srgbClr val="EEEEEE"/>
+                </a:solidFill>
+                <a:latin typeface="Open Sans" panose="020B0606030504020204" pitchFamily="34" charset="0"/>
+                <a:ea typeface="Open Sans" panose="020B0606030504020204" pitchFamily="34" charset="0"/>
+                <a:cs typeface="Open Sans" panose="020B0606030504020204" pitchFamily="34" charset="0"/>
+                <a:hlinkClick r:id="rId2"/>
+              </a:rPr>
+              <a:t>(</a:t>
+            </a:r>
+            <a:r>
+              <a:rPr lang="en-AU" sz="2000" dirty="0" err="1" smtClean="0">
+                <a:solidFill>
+                  <a:srgbClr val="EEEEEE"/>
+                </a:solidFill>
+                <a:latin typeface="Open Sans" panose="020B0606030504020204" pitchFamily="34" charset="0"/>
+                <a:ea typeface="Open Sans" panose="020B0606030504020204" pitchFamily="34" charset="0"/>
+                <a:cs typeface="Open Sans" panose="020B0606030504020204" pitchFamily="34" charset="0"/>
+                <a:hlinkClick r:id="rId2"/>
+              </a:rPr>
+              <a:t>Ozkan</a:t>
+            </a:r>
+            <a:r>
+              <a:rPr lang="en-AU" sz="2000" dirty="0" smtClean="0">
+                <a:solidFill>
+                  <a:srgbClr val="EEEEEE"/>
+                </a:solidFill>
+                <a:latin typeface="Open Sans" panose="020B0606030504020204" pitchFamily="34" charset="0"/>
+                <a:ea typeface="Open Sans" panose="020B0606030504020204" pitchFamily="34" charset="0"/>
+                <a:cs typeface="Open Sans" panose="020B0606030504020204" pitchFamily="34" charset="0"/>
+                <a:hlinkClick r:id="rId2"/>
+              </a:rPr>
+              <a:t>, </a:t>
+            </a:r>
+            <a:r>
+              <a:rPr lang="en-AU" sz="2000" dirty="0" err="1" smtClean="0">
+                <a:solidFill>
+                  <a:srgbClr val="EEEEEE"/>
+                </a:solidFill>
+                <a:latin typeface="Open Sans" panose="020B0606030504020204" pitchFamily="34" charset="0"/>
+                <a:ea typeface="Open Sans" panose="020B0606030504020204" pitchFamily="34" charset="0"/>
+                <a:cs typeface="Open Sans" panose="020B0606030504020204" pitchFamily="34" charset="0"/>
+                <a:hlinkClick r:id="rId2"/>
+              </a:rPr>
+              <a:t>n.d.</a:t>
+            </a:r>
+            <a:r>
+              <a:rPr lang="en-AU" sz="2000" dirty="0" smtClean="0">
+                <a:solidFill>
+                  <a:srgbClr val="EEEEEE"/>
+                </a:solidFill>
+                <a:latin typeface="Open Sans" panose="020B0606030504020204" pitchFamily="34" charset="0"/>
+                <a:ea typeface="Open Sans" panose="020B0606030504020204" pitchFamily="34" charset="0"/>
+                <a:cs typeface="Open Sans" panose="020B0606030504020204" pitchFamily="34" charset="0"/>
+                <a:hlinkClick r:id="rId2"/>
+              </a:rPr>
+              <a:t>)</a:t>
+            </a:r>
+            <a:r>
+              <a:rPr lang="en-AU" sz="2000" dirty="0" smtClean="0">
+                <a:solidFill>
+                  <a:srgbClr val="EEEEEE"/>
+                </a:solidFill>
+                <a:latin typeface="Open Sans" panose="020B0606030504020204" pitchFamily="34" charset="0"/>
+                <a:ea typeface="Open Sans" panose="020B0606030504020204" pitchFamily="34" charset="0"/>
+                <a:cs typeface="Open Sans" panose="020B0606030504020204" pitchFamily="34" charset="0"/>
+              </a:rPr>
+              <a:t>.</a:t>
+            </a:r>
+            <a:endParaRPr lang="en-AU" sz="2000" dirty="0" smtClean="0">
+              <a:solidFill>
+                <a:srgbClr val="EEEEEE"/>
+              </a:solidFill>
+              <a:latin typeface="Open Sans" panose="020B0606030504020204" pitchFamily="34" charset="0"/>
+              <a:ea typeface="Open Sans" panose="020B0606030504020204" pitchFamily="34" charset="0"/>
+              <a:cs typeface="Open Sans" panose="020B0606030504020204" pitchFamily="34" charset="0"/>
+            </a:endParaRPr>
           </a:p>
         </p:txBody>
       </p:sp>
     </p:spTree>
     <p:extLst>
       <p:ext uri="{BB962C8B-B14F-4D97-AF65-F5344CB8AC3E}">
-        <p14:creationId xmlns:p14="http://schemas.microsoft.com/office/powerpoint/2010/main" val="1811827100"/>
+        <p14:creationId xmlns:p14="http://schemas.microsoft.com/office/powerpoint/2010/main" val="3896399870"/>
+      </p:ext>
+    </p:extLst>
+  </p:cSld>
+  <p:clrMapOvr>
+    <a:masterClrMapping/>
+  </p:clrMapOvr>
+  <p:transition spd="slow">
+    <p:push/>
+  </p:transition>
+  <p:timing>
+    <p:tnLst>
+      <p:par>
+        <p:cTn id="1" dur="indefinite" restart="never" nodeType="tmRoot"/>
+      </p:par>
+    </p:tnLst>
+  </p:timing>
+</p:sld>
+</file>
+
+<file path=ppt/slides/slide16.xml><?xml version="1.0" encoding="utf-8"?>
+<p:sld xmlns:a="http://schemas.openxmlformats.org/drawingml/2006/main" xmlns:r="http://schemas.openxmlformats.org/officeDocument/2006/relationships" xmlns:p="http://schemas.openxmlformats.org/presentationml/2006/main">
+  <p:cSld>
+    <p:bg>
+      <p:bgPr>
+        <a:solidFill>
+          <a:srgbClr val="111111"/>
+        </a:solidFill>
+        <a:effectLst/>
+      </p:bgPr>
+    </p:bg>
+    <p:spTree>
+      <p:nvGrpSpPr>
+        <p:cNvPr id="1" name=""/>
+        <p:cNvGrpSpPr/>
+        <p:nvPr/>
+      </p:nvGrpSpPr>
+      <p:grpSpPr>
+        <a:xfrm>
+          <a:off x="0" y="0"/>
+          <a:ext cx="0" cy="0"/>
+          <a:chOff x="0" y="0"/>
+          <a:chExt cx="0" cy="0"/>
+        </a:xfrm>
+      </p:grpSpPr>
+      <p:sp>
+        <p:nvSpPr>
+          <p:cNvPr id="4" name="Title 3"/>
+          <p:cNvSpPr>
+            <a:spLocks noGrp="1"/>
+          </p:cNvSpPr>
+          <p:nvPr>
+            <p:ph type="ctrTitle"/>
+          </p:nvPr>
+        </p:nvSpPr>
+        <p:spPr>
+          <a:xfrm>
+            <a:off x="1524000" y="-638628"/>
+            <a:ext cx="9144000" cy="2917370"/>
+          </a:xfrm>
+        </p:spPr>
+        <p:txBody>
+          <a:bodyPr anchor="b">
+            <a:normAutofit/>
+          </a:bodyPr>
+          <a:lstStyle/>
+          <a:p>
+            <a:pPr algn="l"/>
+            <a:r>
+              <a:rPr lang="en-AU" sz="4400" b="1" dirty="0">
+                <a:solidFill>
+                  <a:srgbClr val="EEEEEE"/>
+                </a:solidFill>
+                <a:latin typeface="Open Sans" panose="020B0606030504020204" pitchFamily="34" charset="0"/>
+                <a:ea typeface="Open Sans" panose="020B0606030504020204" pitchFamily="34" charset="0"/>
+                <a:cs typeface="Open Sans" panose="020B0606030504020204" pitchFamily="34" charset="0"/>
+              </a:rPr>
+              <a:t>CVE-2013-3918</a:t>
+            </a:r>
+            <a:r>
+              <a:rPr lang="en-AU" sz="4400" b="1" dirty="0" smtClean="0">
+                <a:solidFill>
+                  <a:srgbClr val="EEEEEE"/>
+                </a:solidFill>
+                <a:latin typeface="Open Sans" panose="020B0606030504020204" pitchFamily="34" charset="0"/>
+                <a:ea typeface="Open Sans" panose="020B0606030504020204" pitchFamily="34" charset="0"/>
+                <a:cs typeface="Open Sans" panose="020B0606030504020204" pitchFamily="34" charset="0"/>
+              </a:rPr>
+              <a:t/>
+            </a:r>
+            <a:br>
+              <a:rPr lang="en-AU" sz="4400" b="1" dirty="0" smtClean="0">
+                <a:solidFill>
+                  <a:srgbClr val="EEEEEE"/>
+                </a:solidFill>
+                <a:latin typeface="Open Sans" panose="020B0606030504020204" pitchFamily="34" charset="0"/>
+                <a:ea typeface="Open Sans" panose="020B0606030504020204" pitchFamily="34" charset="0"/>
+                <a:cs typeface="Open Sans" panose="020B0606030504020204" pitchFamily="34" charset="0"/>
+              </a:rPr>
+            </a:br>
+            <a:r>
+              <a:rPr lang="en-AU" sz="3200" b="1" dirty="0" smtClean="0">
+                <a:solidFill>
+                  <a:srgbClr val="EEEEEE"/>
+                </a:solidFill>
+                <a:latin typeface="Open Sans" panose="020B0606030504020204" pitchFamily="34" charset="0"/>
+                <a:ea typeface="Open Sans" panose="020B0606030504020204" pitchFamily="34" charset="0"/>
+                <a:cs typeface="Open Sans" panose="020B0606030504020204" pitchFamily="34" charset="0"/>
+              </a:rPr>
+              <a:t>Active-X Control </a:t>
+            </a:r>
+            <a:r>
+              <a:rPr lang="en-AU" sz="3200" b="1" dirty="0" smtClean="0">
+                <a:solidFill>
+                  <a:srgbClr val="EEEEEE"/>
+                </a:solidFill>
+                <a:latin typeface="Open Sans" panose="020B0606030504020204" pitchFamily="34" charset="0"/>
+                <a:ea typeface="Open Sans" panose="020B0606030504020204" pitchFamily="34" charset="0"/>
+                <a:cs typeface="Open Sans" panose="020B0606030504020204" pitchFamily="34" charset="0"/>
+              </a:rPr>
+              <a:t>vulnerability </a:t>
+            </a:r>
+            <a:r>
+              <a:rPr lang="en-AU" sz="3200" b="1" dirty="0" smtClean="0">
+                <a:solidFill>
+                  <a:srgbClr val="EEEEEE"/>
+                </a:solidFill>
+                <a:latin typeface="Open Sans" panose="020B0606030504020204" pitchFamily="34" charset="0"/>
+                <a:ea typeface="Open Sans" panose="020B0606030504020204" pitchFamily="34" charset="0"/>
+                <a:cs typeface="Open Sans" panose="020B0606030504020204" pitchFamily="34" charset="0"/>
+                <a:hlinkClick r:id="rId2"/>
+              </a:rPr>
+              <a:t>(</a:t>
+            </a:r>
+            <a:r>
+              <a:rPr lang="en-AU" sz="3200" b="1" dirty="0" smtClean="0">
+                <a:solidFill>
+                  <a:srgbClr val="EEEEEE"/>
+                </a:solidFill>
+                <a:latin typeface="Open Sans" panose="020B0606030504020204" pitchFamily="34" charset="0"/>
+                <a:ea typeface="Open Sans" panose="020B0606030504020204" pitchFamily="34" charset="0"/>
+                <a:cs typeface="Open Sans" panose="020B0606030504020204" pitchFamily="34" charset="0"/>
+                <a:hlinkClick r:id="rId2"/>
+              </a:rPr>
+              <a:t>Microsoft</a:t>
+            </a:r>
+            <a:r>
+              <a:rPr lang="en-AU" sz="3200" b="1" dirty="0" smtClean="0">
+                <a:solidFill>
+                  <a:srgbClr val="EEEEEE"/>
+                </a:solidFill>
+                <a:latin typeface="Open Sans" panose="020B0606030504020204" pitchFamily="34" charset="0"/>
+                <a:ea typeface="Open Sans" panose="020B0606030504020204" pitchFamily="34" charset="0"/>
+                <a:cs typeface="Open Sans" panose="020B0606030504020204" pitchFamily="34" charset="0"/>
+                <a:hlinkClick r:id="rId2"/>
+              </a:rPr>
+              <a:t>, 2013; </a:t>
+            </a:r>
+            <a:r>
+              <a:rPr lang="en-AU" sz="3200" b="1" dirty="0" err="1" smtClean="0">
+                <a:solidFill>
+                  <a:srgbClr val="EEEEEE"/>
+                </a:solidFill>
+                <a:latin typeface="Open Sans" panose="020B0606030504020204" pitchFamily="34" charset="0"/>
+                <a:ea typeface="Open Sans" panose="020B0606030504020204" pitchFamily="34" charset="0"/>
+                <a:cs typeface="Open Sans" panose="020B0606030504020204" pitchFamily="34" charset="0"/>
+                <a:hlinkClick r:id="rId3"/>
+              </a:rPr>
+              <a:t>Ozkan</a:t>
+            </a:r>
+            <a:r>
+              <a:rPr lang="en-AU" sz="3200" b="1" dirty="0" smtClean="0">
+                <a:solidFill>
+                  <a:srgbClr val="EEEEEE"/>
+                </a:solidFill>
+                <a:latin typeface="Open Sans" panose="020B0606030504020204" pitchFamily="34" charset="0"/>
+                <a:ea typeface="Open Sans" panose="020B0606030504020204" pitchFamily="34" charset="0"/>
+                <a:cs typeface="Open Sans" panose="020B0606030504020204" pitchFamily="34" charset="0"/>
+                <a:hlinkClick r:id="rId3"/>
+              </a:rPr>
+              <a:t>, 2013)</a:t>
+            </a:r>
+            <a:endParaRPr lang="en-AU" sz="3200" dirty="0">
+              <a:solidFill>
+                <a:srgbClr val="EEEEEE"/>
+              </a:solidFill>
+              <a:latin typeface="Open Sans" panose="020B0606030504020204" pitchFamily="34" charset="0"/>
+              <a:ea typeface="Open Sans" panose="020B0606030504020204" pitchFamily="34" charset="0"/>
+              <a:cs typeface="Open Sans" panose="020B0606030504020204" pitchFamily="34" charset="0"/>
+            </a:endParaRPr>
+          </a:p>
+        </p:txBody>
+      </p:sp>
+      <p:sp>
+        <p:nvSpPr>
+          <p:cNvPr id="6" name="Title 3"/>
+          <p:cNvSpPr txBox="1">
+            <a:spLocks/>
+          </p:cNvSpPr>
+          <p:nvPr/>
+        </p:nvSpPr>
+        <p:spPr>
+          <a:xfrm>
+            <a:off x="1524001" y="2278742"/>
+            <a:ext cx="9144000" cy="511630"/>
+          </a:xfrm>
+          <a:prstGeom prst="rect">
+            <a:avLst/>
+          </a:prstGeom>
+        </p:spPr>
+        <p:txBody>
+          <a:bodyPr vert="horz" lIns="91440" tIns="45720" rIns="91440" bIns="45720" rtlCol="0" anchor="t">
+            <a:normAutofit lnSpcReduction="10000"/>
+          </a:bodyPr>
+          <a:lstStyle>
+            <a:lvl1pPr algn="ctr" defTabSz="914400" rtl="0" eaLnBrk="1" latinLnBrk="0" hangingPunct="1">
+              <a:lnSpc>
+                <a:spcPct val="90000"/>
+              </a:lnSpc>
+              <a:spcBef>
+                <a:spcPct val="0"/>
+              </a:spcBef>
+              <a:buNone/>
+              <a:defRPr sz="6000" kern="1200">
+                <a:solidFill>
+                  <a:schemeClr val="tx1"/>
+                </a:solidFill>
+                <a:latin typeface="+mj-lt"/>
+                <a:ea typeface="+mj-ea"/>
+                <a:cs typeface="+mj-cs"/>
+              </a:defRPr>
+            </a:lvl1pPr>
+          </a:lstStyle>
+          <a:p>
+            <a:pPr algn="l">
+              <a:lnSpc>
+                <a:spcPct val="100000"/>
+              </a:lnSpc>
+            </a:pPr>
+            <a:r>
+              <a:rPr lang="en-AU" sz="2800" dirty="0" smtClean="0">
+                <a:solidFill>
+                  <a:srgbClr val="111111"/>
+                </a:solidFill>
+                <a:latin typeface="Open Sans" panose="020B0606030504020204" pitchFamily="34" charset="0"/>
+                <a:ea typeface="Open Sans" panose="020B0606030504020204" pitchFamily="34" charset="0"/>
+                <a:cs typeface="Open Sans" panose="020B0606030504020204" pitchFamily="34" charset="0"/>
+              </a:rPr>
+              <a:t>separator</a:t>
+            </a:r>
+          </a:p>
+        </p:txBody>
+      </p:sp>
+      <p:sp>
+        <p:nvSpPr>
+          <p:cNvPr id="2" name="TextBox 1"/>
+          <p:cNvSpPr txBox="1"/>
+          <p:nvPr/>
+        </p:nvSpPr>
+        <p:spPr>
+          <a:xfrm>
+            <a:off x="1524000" y="2790371"/>
+            <a:ext cx="9144000" cy="2893100"/>
+          </a:xfrm>
+          <a:prstGeom prst="rect">
+            <a:avLst/>
+          </a:prstGeom>
+          <a:noFill/>
+        </p:spPr>
+        <p:txBody>
+          <a:bodyPr wrap="square" rtlCol="0">
+            <a:spAutoFit/>
+          </a:bodyPr>
+          <a:lstStyle/>
+          <a:p>
+            <a:pPr marL="285750" indent="-285750">
+              <a:buFont typeface="Arial" panose="020B0604020202020204" pitchFamily="34" charset="0"/>
+              <a:buChar char="•"/>
+            </a:pPr>
+            <a:r>
+              <a:rPr lang="en-AU" sz="2600" dirty="0" smtClean="0">
+                <a:solidFill>
+                  <a:srgbClr val="EEEEEE"/>
+                </a:solidFill>
+                <a:latin typeface="Open Sans" panose="020B0606030504020204" pitchFamily="34" charset="0"/>
+                <a:ea typeface="Open Sans" panose="020B0606030504020204" pitchFamily="34" charset="0"/>
+                <a:cs typeface="Open Sans" panose="020B0606030504020204" pitchFamily="34" charset="0"/>
+              </a:rPr>
+              <a:t>A vulnerability in Internet Explorer 7</a:t>
+            </a:r>
+          </a:p>
+          <a:p>
+            <a:pPr marL="285750" indent="-285750">
+              <a:buFont typeface="Arial" panose="020B0604020202020204" pitchFamily="34" charset="0"/>
+              <a:buChar char="•"/>
+            </a:pPr>
+            <a:r>
+              <a:rPr lang="en-AU" sz="2600" dirty="0" smtClean="0">
+                <a:solidFill>
+                  <a:srgbClr val="EEEEEE"/>
+                </a:solidFill>
+                <a:latin typeface="Open Sans" panose="020B0606030504020204" pitchFamily="34" charset="0"/>
+                <a:ea typeface="Open Sans" panose="020B0606030504020204" pitchFamily="34" charset="0"/>
+                <a:cs typeface="Open Sans" panose="020B0606030504020204" pitchFamily="34" charset="0"/>
+              </a:rPr>
+              <a:t>Allows an attacker to remotely execute code on a victim’s computer through a malicious website</a:t>
+            </a:r>
+          </a:p>
+          <a:p>
+            <a:pPr marL="285750" indent="-285750">
+              <a:buFont typeface="Arial" panose="020B0604020202020204" pitchFamily="34" charset="0"/>
+              <a:buChar char="•"/>
+            </a:pPr>
+            <a:r>
+              <a:rPr lang="en-AU" sz="2600" dirty="0" smtClean="0">
+                <a:solidFill>
+                  <a:srgbClr val="EEEEEE"/>
+                </a:solidFill>
+                <a:latin typeface="Open Sans" panose="020B0606030504020204" pitchFamily="34" charset="0"/>
+                <a:ea typeface="Open Sans" panose="020B0606030504020204" pitchFamily="34" charset="0"/>
+                <a:cs typeface="Open Sans" panose="020B0606030504020204" pitchFamily="34" charset="0"/>
+              </a:rPr>
+              <a:t>Was exploited in a “watering hole attack” which silently propagated malware on website viewer’s computers </a:t>
+            </a:r>
+            <a:r>
+              <a:rPr lang="en-AU" sz="2600" dirty="0" smtClean="0">
+                <a:solidFill>
+                  <a:srgbClr val="EEEEEE"/>
+                </a:solidFill>
+                <a:latin typeface="Open Sans" panose="020B0606030504020204" pitchFamily="34" charset="0"/>
+                <a:ea typeface="Open Sans" panose="020B0606030504020204" pitchFamily="34" charset="0"/>
+                <a:cs typeface="Open Sans" panose="020B0606030504020204" pitchFamily="34" charset="0"/>
+                <a:hlinkClick r:id="rId4"/>
+              </a:rPr>
+              <a:t>(Chen &amp; </a:t>
+            </a:r>
+            <a:r>
+              <a:rPr lang="en-AU" sz="2600" dirty="0" err="1" smtClean="0">
+                <a:solidFill>
+                  <a:srgbClr val="EEEEEE"/>
+                </a:solidFill>
+                <a:latin typeface="Open Sans" panose="020B0606030504020204" pitchFamily="34" charset="0"/>
+                <a:ea typeface="Open Sans" panose="020B0606030504020204" pitchFamily="34" charset="0"/>
+                <a:cs typeface="Open Sans" panose="020B0606030504020204" pitchFamily="34" charset="0"/>
+                <a:hlinkClick r:id="rId4"/>
+              </a:rPr>
+              <a:t>Casalden</a:t>
+            </a:r>
+            <a:r>
+              <a:rPr lang="en-AU" sz="2600" dirty="0" smtClean="0">
+                <a:solidFill>
+                  <a:srgbClr val="EEEEEE"/>
+                </a:solidFill>
+                <a:latin typeface="Open Sans" panose="020B0606030504020204" pitchFamily="34" charset="0"/>
+                <a:ea typeface="Open Sans" panose="020B0606030504020204" pitchFamily="34" charset="0"/>
+                <a:cs typeface="Open Sans" panose="020B0606030504020204" pitchFamily="34" charset="0"/>
+                <a:hlinkClick r:id="rId4"/>
+              </a:rPr>
+              <a:t>, 2013; </a:t>
+            </a:r>
+            <a:r>
+              <a:rPr lang="en-AU" sz="2600" dirty="0" smtClean="0">
+                <a:solidFill>
+                  <a:srgbClr val="EEEEEE"/>
+                </a:solidFill>
+                <a:latin typeface="Open Sans" panose="020B0606030504020204" pitchFamily="34" charset="0"/>
+                <a:ea typeface="Open Sans" panose="020B0606030504020204" pitchFamily="34" charset="0"/>
+                <a:cs typeface="Open Sans" panose="020B0606030504020204" pitchFamily="34" charset="0"/>
+                <a:hlinkClick r:id="rId5"/>
+              </a:rPr>
+              <a:t>Moran, 2013; </a:t>
+            </a:r>
+            <a:r>
+              <a:rPr lang="en-AU" sz="2600" dirty="0" smtClean="0">
+                <a:solidFill>
+                  <a:srgbClr val="EEEEEE"/>
+                </a:solidFill>
+                <a:latin typeface="Open Sans" panose="020B0606030504020204" pitchFamily="34" charset="0"/>
+                <a:ea typeface="Open Sans" panose="020B0606030504020204" pitchFamily="34" charset="0"/>
+                <a:cs typeface="Open Sans" panose="020B0606030504020204" pitchFamily="34" charset="0"/>
+                <a:hlinkClick r:id="rId6"/>
+              </a:rPr>
+              <a:t>Wilson, 2013)</a:t>
+            </a:r>
+            <a:endParaRPr lang="en-AU" sz="2600" dirty="0" smtClean="0">
+              <a:solidFill>
+                <a:srgbClr val="EEEEEE"/>
+              </a:solidFill>
+              <a:latin typeface="Open Sans" panose="020B0606030504020204" pitchFamily="34" charset="0"/>
+              <a:ea typeface="Open Sans" panose="020B0606030504020204" pitchFamily="34" charset="0"/>
+              <a:cs typeface="Open Sans" panose="020B0606030504020204" pitchFamily="34" charset="0"/>
+            </a:endParaRPr>
+          </a:p>
+          <a:p>
+            <a:pPr marL="285750" indent="-285750">
+              <a:buFont typeface="Arial" panose="020B0604020202020204" pitchFamily="34" charset="0"/>
+              <a:buChar char="•"/>
+            </a:pPr>
+            <a:r>
+              <a:rPr lang="en-AU" sz="2600" dirty="0" smtClean="0">
+                <a:solidFill>
+                  <a:srgbClr val="EEEEEE"/>
+                </a:solidFill>
+                <a:latin typeface="Open Sans" panose="020B0606030504020204" pitchFamily="34" charset="0"/>
+                <a:ea typeface="Open Sans" panose="020B0606030504020204" pitchFamily="34" charset="0"/>
+                <a:cs typeface="Open Sans" panose="020B0606030504020204" pitchFamily="34" charset="0"/>
+              </a:rPr>
+              <a:t>Blue Ink’s computers are currently not safe from it</a:t>
+            </a:r>
+            <a:endParaRPr lang="en-AU" sz="2600" dirty="0" smtClean="0">
+              <a:solidFill>
+                <a:srgbClr val="EEEEEE"/>
+              </a:solidFill>
+              <a:latin typeface="Open Sans" panose="020B0606030504020204" pitchFamily="34" charset="0"/>
+              <a:ea typeface="Open Sans" panose="020B0606030504020204" pitchFamily="34" charset="0"/>
+              <a:cs typeface="Open Sans" panose="020B0606030504020204" pitchFamily="34" charset="0"/>
+            </a:endParaRPr>
+          </a:p>
+        </p:txBody>
+      </p:sp>
+    </p:spTree>
+    <p:extLst>
+      <p:ext uri="{BB962C8B-B14F-4D97-AF65-F5344CB8AC3E}">
+        <p14:creationId xmlns:p14="http://schemas.microsoft.com/office/powerpoint/2010/main" val="1606794754"/>
+      </p:ext>
+    </p:extLst>
+  </p:cSld>
+  <p:clrMapOvr>
+    <a:masterClrMapping/>
+  </p:clrMapOvr>
+  <p:transition spd="slow">
+    <p:push/>
+  </p:transition>
+  <p:timing>
+    <p:tnLst>
+      <p:par>
+        <p:cTn id="1" dur="indefinite" restart="never" nodeType="tmRoot"/>
+      </p:par>
+    </p:tnLst>
+  </p:timing>
+</p:sld>
+</file>
+
+<file path=ppt/slides/slide17.xml><?xml version="1.0" encoding="utf-8"?>
+<p:sld xmlns:a="http://schemas.openxmlformats.org/drawingml/2006/main" xmlns:r="http://schemas.openxmlformats.org/officeDocument/2006/relationships" xmlns:p="http://schemas.openxmlformats.org/presentationml/2006/main">
+  <p:cSld>
+    <p:bg>
+      <p:bgPr>
+        <a:solidFill>
+          <a:srgbClr val="111111"/>
+        </a:solidFill>
+        <a:effectLst/>
+      </p:bgPr>
+    </p:bg>
+    <p:spTree>
+      <p:nvGrpSpPr>
+        <p:cNvPr id="1" name=""/>
+        <p:cNvGrpSpPr/>
+        <p:nvPr/>
+      </p:nvGrpSpPr>
+      <p:grpSpPr>
+        <a:xfrm>
+          <a:off x="0" y="0"/>
+          <a:ext cx="0" cy="0"/>
+          <a:chOff x="0" y="0"/>
+          <a:chExt cx="0" cy="0"/>
+        </a:xfrm>
+      </p:grpSpPr>
+      <p:sp>
+        <p:nvSpPr>
+          <p:cNvPr id="4" name="Title 3"/>
+          <p:cNvSpPr>
+            <a:spLocks noGrp="1"/>
+          </p:cNvSpPr>
+          <p:nvPr>
+            <p:ph type="ctrTitle"/>
+          </p:nvPr>
+        </p:nvSpPr>
+        <p:spPr>
+          <a:xfrm>
+            <a:off x="1524000" y="-2023883"/>
+            <a:ext cx="9144000" cy="2917370"/>
+          </a:xfrm>
+        </p:spPr>
+        <p:txBody>
+          <a:bodyPr anchor="b">
+            <a:normAutofit/>
+          </a:bodyPr>
+          <a:lstStyle/>
+          <a:p>
+            <a:pPr algn="l"/>
+            <a:r>
+              <a:rPr lang="en-AU" sz="4400" b="1" dirty="0" smtClean="0">
+                <a:solidFill>
+                  <a:srgbClr val="EEEEEE"/>
+                </a:solidFill>
+                <a:latin typeface="Open Sans" panose="020B0606030504020204" pitchFamily="34" charset="0"/>
+                <a:ea typeface="Open Sans" panose="020B0606030504020204" pitchFamily="34" charset="0"/>
+                <a:cs typeface="Open Sans" panose="020B0606030504020204" pitchFamily="34" charset="0"/>
+              </a:rPr>
+              <a:t>Windows Defender</a:t>
+            </a:r>
+            <a:endParaRPr lang="en-AU" sz="2800" dirty="0">
+              <a:solidFill>
+                <a:srgbClr val="EEEEEE"/>
+              </a:solidFill>
+              <a:latin typeface="Open Sans" panose="020B0606030504020204" pitchFamily="34" charset="0"/>
+              <a:ea typeface="Open Sans" panose="020B0606030504020204" pitchFamily="34" charset="0"/>
+              <a:cs typeface="Open Sans" panose="020B0606030504020204" pitchFamily="34" charset="0"/>
+            </a:endParaRPr>
+          </a:p>
+        </p:txBody>
+      </p:sp>
+      <p:sp>
+        <p:nvSpPr>
+          <p:cNvPr id="6" name="Title 3"/>
+          <p:cNvSpPr txBox="1">
+            <a:spLocks/>
+          </p:cNvSpPr>
+          <p:nvPr/>
+        </p:nvSpPr>
+        <p:spPr>
+          <a:xfrm>
+            <a:off x="1524001" y="893487"/>
+            <a:ext cx="9144000" cy="511630"/>
+          </a:xfrm>
+          <a:prstGeom prst="rect">
+            <a:avLst/>
+          </a:prstGeom>
+        </p:spPr>
+        <p:txBody>
+          <a:bodyPr vert="horz" lIns="91440" tIns="45720" rIns="91440" bIns="45720" rtlCol="0" anchor="t">
+            <a:normAutofit lnSpcReduction="10000"/>
+          </a:bodyPr>
+          <a:lstStyle>
+            <a:lvl1pPr algn="ctr" defTabSz="914400" rtl="0" eaLnBrk="1" latinLnBrk="0" hangingPunct="1">
+              <a:lnSpc>
+                <a:spcPct val="90000"/>
+              </a:lnSpc>
+              <a:spcBef>
+                <a:spcPct val="0"/>
+              </a:spcBef>
+              <a:buNone/>
+              <a:defRPr sz="6000" kern="1200">
+                <a:solidFill>
+                  <a:schemeClr val="tx1"/>
+                </a:solidFill>
+                <a:latin typeface="+mj-lt"/>
+                <a:ea typeface="+mj-ea"/>
+                <a:cs typeface="+mj-cs"/>
+              </a:defRPr>
+            </a:lvl1pPr>
+          </a:lstStyle>
+          <a:p>
+            <a:pPr algn="l">
+              <a:lnSpc>
+                <a:spcPct val="100000"/>
+              </a:lnSpc>
+            </a:pPr>
+            <a:r>
+              <a:rPr lang="en-AU" sz="2800" dirty="0" smtClean="0">
+                <a:solidFill>
+                  <a:srgbClr val="111111"/>
+                </a:solidFill>
+                <a:latin typeface="Open Sans" panose="020B0606030504020204" pitchFamily="34" charset="0"/>
+                <a:ea typeface="Open Sans" panose="020B0606030504020204" pitchFamily="34" charset="0"/>
+                <a:cs typeface="Open Sans" panose="020B0606030504020204" pitchFamily="34" charset="0"/>
+              </a:rPr>
+              <a:t>separator</a:t>
+            </a:r>
+          </a:p>
+        </p:txBody>
+      </p:sp>
+      <p:sp>
+        <p:nvSpPr>
+          <p:cNvPr id="2" name="TextBox 1"/>
+          <p:cNvSpPr txBox="1"/>
+          <p:nvPr/>
+        </p:nvSpPr>
+        <p:spPr>
+          <a:xfrm>
+            <a:off x="1524000" y="1405116"/>
+            <a:ext cx="9144000" cy="3693319"/>
+          </a:xfrm>
+          <a:prstGeom prst="rect">
+            <a:avLst/>
+          </a:prstGeom>
+          <a:noFill/>
+        </p:spPr>
+        <p:txBody>
+          <a:bodyPr wrap="square" rtlCol="0">
+            <a:spAutoFit/>
+          </a:bodyPr>
+          <a:lstStyle/>
+          <a:p>
+            <a:pPr marL="285750" indent="-285750">
+              <a:buFont typeface="Arial" panose="020B0604020202020204" pitchFamily="34" charset="0"/>
+              <a:buChar char="•"/>
+            </a:pPr>
+            <a:r>
+              <a:rPr lang="en-AU" sz="2600" dirty="0" smtClean="0">
+                <a:solidFill>
+                  <a:srgbClr val="EEEEEE"/>
+                </a:solidFill>
+                <a:latin typeface="Open Sans" panose="020B0606030504020204" pitchFamily="34" charset="0"/>
+                <a:ea typeface="Open Sans" panose="020B0606030504020204" pitchFamily="34" charset="0"/>
+                <a:cs typeface="Open Sans" panose="020B0606030504020204" pitchFamily="34" charset="0"/>
+              </a:rPr>
+              <a:t>Also affected by lack of updates</a:t>
+            </a:r>
+          </a:p>
+          <a:p>
+            <a:pPr marL="285750" indent="-285750">
+              <a:buFont typeface="Arial" panose="020B0604020202020204" pitchFamily="34" charset="0"/>
+              <a:buChar char="•"/>
+            </a:pPr>
+            <a:r>
+              <a:rPr lang="en-AU" sz="2600" dirty="0" smtClean="0">
+                <a:solidFill>
+                  <a:srgbClr val="EEEEEE"/>
+                </a:solidFill>
+                <a:latin typeface="Open Sans" panose="020B0606030504020204" pitchFamily="34" charset="0"/>
+                <a:ea typeface="Open Sans" panose="020B0606030504020204" pitchFamily="34" charset="0"/>
+                <a:cs typeface="Open Sans" panose="020B0606030504020204" pitchFamily="34" charset="0"/>
+              </a:rPr>
+              <a:t>Severely obsolete virus/malware signatures list</a:t>
+            </a:r>
+          </a:p>
+          <a:p>
+            <a:pPr marL="742950" lvl="1" indent="-285750">
+              <a:buFont typeface="Arial" panose="020B0604020202020204" pitchFamily="34" charset="0"/>
+              <a:buChar char="•"/>
+            </a:pPr>
+            <a:r>
+              <a:rPr lang="en-AU" sz="2600" dirty="0" smtClean="0">
+                <a:solidFill>
+                  <a:srgbClr val="EEEEEE"/>
+                </a:solidFill>
+                <a:latin typeface="Open Sans" panose="020B0606030504020204" pitchFamily="34" charset="0"/>
+                <a:ea typeface="Open Sans" panose="020B0606030504020204" pitchFamily="34" charset="0"/>
+                <a:cs typeface="Open Sans" panose="020B0606030504020204" pitchFamily="34" charset="0"/>
+              </a:rPr>
+              <a:t>No updates since version 1.0.0.0 on 14 July 2006</a:t>
+            </a:r>
+          </a:p>
+          <a:p>
+            <a:pPr marL="285750" indent="-285750">
+              <a:buFont typeface="Arial" panose="020B0604020202020204" pitchFamily="34" charset="0"/>
+              <a:buChar char="•"/>
+            </a:pPr>
+            <a:r>
+              <a:rPr lang="en-AU" sz="2600" dirty="0" smtClean="0">
+                <a:solidFill>
+                  <a:srgbClr val="EEEEEE"/>
+                </a:solidFill>
+                <a:latin typeface="Open Sans" panose="020B0606030504020204" pitchFamily="34" charset="0"/>
+                <a:ea typeface="Open Sans" panose="020B0606030504020204" pitchFamily="34" charset="0"/>
+                <a:cs typeface="Open Sans" panose="020B0606030504020204" pitchFamily="34" charset="0"/>
+              </a:rPr>
+              <a:t>In order for anti-malware/virus program to be effective, it must have its signatures list regularly updated</a:t>
+            </a:r>
+          </a:p>
+          <a:p>
+            <a:pPr marL="742950" lvl="1" indent="-285750">
+              <a:buFont typeface="Arial" panose="020B0604020202020204" pitchFamily="34" charset="0"/>
+              <a:buChar char="•"/>
+            </a:pPr>
+            <a:r>
+              <a:rPr lang="en-AU" sz="2600" dirty="0" smtClean="0">
+                <a:solidFill>
+                  <a:srgbClr val="EEEEEE"/>
+                </a:solidFill>
+                <a:latin typeface="Open Sans" panose="020B0606030504020204" pitchFamily="34" charset="0"/>
+                <a:ea typeface="Open Sans" panose="020B0606030504020204" pitchFamily="34" charset="0"/>
+                <a:cs typeface="Open Sans" panose="020B0606030504020204" pitchFamily="34" charset="0"/>
+              </a:rPr>
+              <a:t>So that it can protect the computer from current known threats (Goodrich &amp; </a:t>
+            </a:r>
+            <a:r>
+              <a:rPr lang="en-AU" sz="2600" dirty="0" err="1" smtClean="0">
+                <a:solidFill>
+                  <a:srgbClr val="EEEEEE"/>
+                </a:solidFill>
+                <a:latin typeface="Open Sans" panose="020B0606030504020204" pitchFamily="34" charset="0"/>
+                <a:ea typeface="Open Sans" panose="020B0606030504020204" pitchFamily="34" charset="0"/>
+                <a:cs typeface="Open Sans" panose="020B0606030504020204" pitchFamily="34" charset="0"/>
+              </a:rPr>
+              <a:t>Tamassia</a:t>
+            </a:r>
+            <a:r>
+              <a:rPr lang="en-AU" sz="2600" dirty="0" smtClean="0">
+                <a:solidFill>
+                  <a:srgbClr val="EEEEEE"/>
+                </a:solidFill>
+                <a:latin typeface="Open Sans" panose="020B0606030504020204" pitchFamily="34" charset="0"/>
+                <a:ea typeface="Open Sans" panose="020B0606030504020204" pitchFamily="34" charset="0"/>
+                <a:cs typeface="Open Sans" panose="020B0606030504020204" pitchFamily="34" charset="0"/>
+              </a:rPr>
+              <a:t>, 2011)</a:t>
+            </a:r>
+          </a:p>
+          <a:p>
+            <a:pPr marL="285750" indent="-285750">
+              <a:buFont typeface="Arial" panose="020B0604020202020204" pitchFamily="34" charset="0"/>
+              <a:buChar char="•"/>
+            </a:pPr>
+            <a:r>
+              <a:rPr lang="en-AU" sz="2600" dirty="0" smtClean="0">
+                <a:solidFill>
+                  <a:srgbClr val="EEEEEE"/>
+                </a:solidFill>
+                <a:latin typeface="Open Sans" panose="020B0606030504020204" pitchFamily="34" charset="0"/>
+                <a:ea typeface="Open Sans" panose="020B0606030504020204" pitchFamily="34" charset="0"/>
+                <a:cs typeface="Open Sans" panose="020B0606030504020204" pitchFamily="34" charset="0"/>
+              </a:rPr>
+              <a:t>Blue Ink’s computers failed to detect </a:t>
+            </a:r>
+            <a:r>
+              <a:rPr lang="en-AU" sz="2600" dirty="0" smtClean="0">
+                <a:solidFill>
+                  <a:srgbClr val="EEEEEE"/>
+                </a:solidFill>
+                <a:latin typeface="Open Sans" panose="020B0606030504020204" pitchFamily="34" charset="0"/>
+                <a:ea typeface="Open Sans" panose="020B0606030504020204" pitchFamily="34" charset="0"/>
+                <a:cs typeface="Open Sans" panose="020B0606030504020204" pitchFamily="34" charset="0"/>
+                <a:hlinkClick r:id="rId2"/>
+              </a:rPr>
+              <a:t>www.eicar.org</a:t>
+            </a:r>
+            <a:r>
+              <a:rPr lang="en-AU" sz="2600" dirty="0" smtClean="0">
+                <a:solidFill>
+                  <a:srgbClr val="EEEEEE"/>
+                </a:solidFill>
+                <a:latin typeface="Open Sans" panose="020B0606030504020204" pitchFamily="34" charset="0"/>
+                <a:ea typeface="Open Sans" panose="020B0606030504020204" pitchFamily="34" charset="0"/>
+                <a:cs typeface="Open Sans" panose="020B0606030504020204" pitchFamily="34" charset="0"/>
+              </a:rPr>
+              <a:t> pseudo-viruses</a:t>
+            </a:r>
+            <a:endParaRPr lang="en-AU" sz="2600" dirty="0" smtClean="0">
+              <a:solidFill>
+                <a:srgbClr val="EEEEEE"/>
+              </a:solidFill>
+              <a:latin typeface="Open Sans" panose="020B0606030504020204" pitchFamily="34" charset="0"/>
+              <a:ea typeface="Open Sans" panose="020B0606030504020204" pitchFamily="34" charset="0"/>
+              <a:cs typeface="Open Sans" panose="020B0606030504020204" pitchFamily="34" charset="0"/>
+            </a:endParaRPr>
+          </a:p>
+        </p:txBody>
+      </p:sp>
+      <p:pic>
+        <p:nvPicPr>
+          <p:cNvPr id="3" name="Picture 2"/>
+          <p:cNvPicPr>
+            <a:picLocks noChangeAspect="1"/>
+          </p:cNvPicPr>
+          <p:nvPr/>
+        </p:nvPicPr>
+        <p:blipFill>
+          <a:blip r:embed="rId3">
+            <a:extLst>
+              <a:ext uri="{28A0092B-C50C-407E-A947-70E740481C1C}">
+                <a14:useLocalDpi xmlns:a14="http://schemas.microsoft.com/office/drawing/2010/main" val="0"/>
+              </a:ext>
+            </a:extLst>
+          </a:blip>
+          <a:stretch>
+            <a:fillRect/>
+          </a:stretch>
+        </p:blipFill>
+        <p:spPr>
+          <a:xfrm>
+            <a:off x="5339301" y="4886254"/>
+            <a:ext cx="5803174" cy="1447619"/>
+          </a:xfrm>
+          <a:prstGeom prst="rect">
+            <a:avLst/>
+          </a:prstGeom>
+        </p:spPr>
+      </p:pic>
+    </p:spTree>
+    <p:extLst>
+      <p:ext uri="{BB962C8B-B14F-4D97-AF65-F5344CB8AC3E}">
+        <p14:creationId xmlns:p14="http://schemas.microsoft.com/office/powerpoint/2010/main" val="3674376758"/>
+      </p:ext>
+    </p:extLst>
+  </p:cSld>
+  <p:clrMapOvr>
+    <a:masterClrMapping/>
+  </p:clrMapOvr>
+  <p:transition spd="slow">
+    <p:push/>
+  </p:transition>
+  <p:timing>
+    <p:tnLst>
+      <p:par>
+        <p:cTn id="1" dur="indefinite" restart="never" nodeType="tmRoot"/>
+      </p:par>
+    </p:tnLst>
+  </p:timing>
+</p:sld>
+</file>
+
+<file path=ppt/slides/slide18.xml><?xml version="1.0" encoding="utf-8"?>
+<p:sld xmlns:a="http://schemas.openxmlformats.org/drawingml/2006/main" xmlns:r="http://schemas.openxmlformats.org/officeDocument/2006/relationships" xmlns:p="http://schemas.openxmlformats.org/presentationml/2006/main">
+  <p:cSld>
+    <p:bg>
+      <p:bgPr>
+        <a:solidFill>
+          <a:srgbClr val="111111"/>
+        </a:solidFill>
+        <a:effectLst/>
+      </p:bgPr>
+    </p:bg>
+    <p:spTree>
+      <p:nvGrpSpPr>
+        <p:cNvPr id="1" name=""/>
+        <p:cNvGrpSpPr/>
+        <p:nvPr/>
+      </p:nvGrpSpPr>
+      <p:grpSpPr>
+        <a:xfrm>
+          <a:off x="0" y="0"/>
+          <a:ext cx="0" cy="0"/>
+          <a:chOff x="0" y="0"/>
+          <a:chExt cx="0" cy="0"/>
+        </a:xfrm>
+      </p:grpSpPr>
+      <p:pic>
+        <p:nvPicPr>
+          <p:cNvPr id="5" name="Picture 4"/>
+          <p:cNvPicPr>
+            <a:picLocks noChangeAspect="1"/>
+          </p:cNvPicPr>
+          <p:nvPr/>
+        </p:nvPicPr>
+        <p:blipFill>
+          <a:blip r:embed="rId2">
+            <a:extLst>
+              <a:ext uri="{28A0092B-C50C-407E-A947-70E740481C1C}">
+                <a14:useLocalDpi xmlns:a14="http://schemas.microsoft.com/office/drawing/2010/main" val="0"/>
+              </a:ext>
+            </a:extLst>
+          </a:blip>
+          <a:stretch>
+            <a:fillRect/>
+          </a:stretch>
+        </p:blipFill>
+        <p:spPr>
+          <a:xfrm>
+            <a:off x="6762044" y="3160709"/>
+            <a:ext cx="4120444" cy="3165937"/>
+          </a:xfrm>
+          <a:prstGeom prst="rect">
+            <a:avLst/>
+          </a:prstGeom>
+        </p:spPr>
+      </p:pic>
+      <p:sp>
+        <p:nvSpPr>
+          <p:cNvPr id="4" name="Title 3"/>
+          <p:cNvSpPr>
+            <a:spLocks noGrp="1"/>
+          </p:cNvSpPr>
+          <p:nvPr>
+            <p:ph type="ctrTitle"/>
+          </p:nvPr>
+        </p:nvSpPr>
+        <p:spPr>
+          <a:xfrm>
+            <a:off x="1524000" y="-1490133"/>
+            <a:ext cx="9144000" cy="2917370"/>
+          </a:xfrm>
+        </p:spPr>
+        <p:txBody>
+          <a:bodyPr anchor="b">
+            <a:normAutofit/>
+          </a:bodyPr>
+          <a:lstStyle/>
+          <a:p>
+            <a:pPr algn="l"/>
+            <a:r>
+              <a:rPr lang="en-AU" sz="4400" b="1" dirty="0" smtClean="0">
+                <a:solidFill>
+                  <a:srgbClr val="EEEEEE"/>
+                </a:solidFill>
+                <a:latin typeface="Open Sans" panose="020B0606030504020204" pitchFamily="34" charset="0"/>
+                <a:ea typeface="Open Sans" panose="020B0606030504020204" pitchFamily="34" charset="0"/>
+                <a:cs typeface="Open Sans" panose="020B0606030504020204" pitchFamily="34" charset="0"/>
+              </a:rPr>
+              <a:t>So how can we fix it</a:t>
+            </a:r>
+            <a:r>
+              <a:rPr lang="en-AU" sz="4400" b="1" dirty="0" smtClean="0">
+                <a:solidFill>
+                  <a:srgbClr val="EEEEEE"/>
+                </a:solidFill>
+                <a:latin typeface="Open Sans" panose="020B0606030504020204" pitchFamily="34" charset="0"/>
+                <a:ea typeface="Open Sans" panose="020B0606030504020204" pitchFamily="34" charset="0"/>
+                <a:cs typeface="Open Sans" panose="020B0606030504020204" pitchFamily="34" charset="0"/>
+              </a:rPr>
+              <a:t>?</a:t>
+            </a:r>
+            <a:endParaRPr lang="en-AU" sz="4400" dirty="0">
+              <a:solidFill>
+                <a:srgbClr val="EEEEEE"/>
+              </a:solidFill>
+              <a:latin typeface="Open Sans" panose="020B0606030504020204" pitchFamily="34" charset="0"/>
+              <a:ea typeface="Open Sans" panose="020B0606030504020204" pitchFamily="34" charset="0"/>
+              <a:cs typeface="Open Sans" panose="020B0606030504020204" pitchFamily="34" charset="0"/>
+            </a:endParaRPr>
+          </a:p>
+        </p:txBody>
+      </p:sp>
+      <p:sp>
+        <p:nvSpPr>
+          <p:cNvPr id="6" name="Title 3"/>
+          <p:cNvSpPr txBox="1">
+            <a:spLocks/>
+          </p:cNvSpPr>
+          <p:nvPr/>
+        </p:nvSpPr>
+        <p:spPr>
+          <a:xfrm>
+            <a:off x="1524001" y="1427237"/>
+            <a:ext cx="9144000" cy="511630"/>
+          </a:xfrm>
+          <a:prstGeom prst="rect">
+            <a:avLst/>
+          </a:prstGeom>
+        </p:spPr>
+        <p:txBody>
+          <a:bodyPr vert="horz" lIns="91440" tIns="45720" rIns="91440" bIns="45720" rtlCol="0" anchor="t">
+            <a:normAutofit lnSpcReduction="10000"/>
+          </a:bodyPr>
+          <a:lstStyle>
+            <a:lvl1pPr algn="ctr" defTabSz="914400" rtl="0" eaLnBrk="1" latinLnBrk="0" hangingPunct="1">
+              <a:lnSpc>
+                <a:spcPct val="90000"/>
+              </a:lnSpc>
+              <a:spcBef>
+                <a:spcPct val="0"/>
+              </a:spcBef>
+              <a:buNone/>
+              <a:defRPr sz="6000" kern="1200">
+                <a:solidFill>
+                  <a:schemeClr val="tx1"/>
+                </a:solidFill>
+                <a:latin typeface="+mj-lt"/>
+                <a:ea typeface="+mj-ea"/>
+                <a:cs typeface="+mj-cs"/>
+              </a:defRPr>
+            </a:lvl1pPr>
+          </a:lstStyle>
+          <a:p>
+            <a:pPr algn="l">
+              <a:lnSpc>
+                <a:spcPct val="100000"/>
+              </a:lnSpc>
+            </a:pPr>
+            <a:r>
+              <a:rPr lang="en-AU" sz="2800" dirty="0" smtClean="0">
+                <a:solidFill>
+                  <a:srgbClr val="111111"/>
+                </a:solidFill>
+                <a:latin typeface="Open Sans" panose="020B0606030504020204" pitchFamily="34" charset="0"/>
+                <a:ea typeface="Open Sans" panose="020B0606030504020204" pitchFamily="34" charset="0"/>
+                <a:cs typeface="Open Sans" panose="020B0606030504020204" pitchFamily="34" charset="0"/>
+              </a:rPr>
+              <a:t>separator</a:t>
+            </a:r>
+          </a:p>
+        </p:txBody>
+      </p:sp>
+      <p:sp>
+        <p:nvSpPr>
+          <p:cNvPr id="2" name="TextBox 1"/>
+          <p:cNvSpPr txBox="1"/>
+          <p:nvPr/>
+        </p:nvSpPr>
+        <p:spPr>
+          <a:xfrm>
+            <a:off x="1524000" y="1938866"/>
+            <a:ext cx="9144000" cy="1292662"/>
+          </a:xfrm>
+          <a:prstGeom prst="rect">
+            <a:avLst/>
+          </a:prstGeom>
+          <a:noFill/>
+        </p:spPr>
+        <p:txBody>
+          <a:bodyPr wrap="square" rtlCol="0">
+            <a:spAutoFit/>
+          </a:bodyPr>
+          <a:lstStyle/>
+          <a:p>
+            <a:pPr marL="285750" indent="-285750">
+              <a:buFont typeface="Arial" panose="020B0604020202020204" pitchFamily="34" charset="0"/>
+              <a:buChar char="•"/>
+            </a:pPr>
+            <a:r>
+              <a:rPr lang="en-AU" sz="2600" dirty="0" smtClean="0">
+                <a:solidFill>
+                  <a:srgbClr val="EEEEEE"/>
+                </a:solidFill>
+                <a:latin typeface="Open Sans" panose="020B0606030504020204" pitchFamily="34" charset="0"/>
+                <a:ea typeface="Open Sans" panose="020B0606030504020204" pitchFamily="34" charset="0"/>
+                <a:cs typeface="Open Sans" panose="020B0606030504020204" pitchFamily="34" charset="0"/>
+              </a:rPr>
+              <a:t>Enable “Automatic Updates” in Vista</a:t>
+            </a:r>
+          </a:p>
+          <a:p>
+            <a:pPr marL="285750" indent="-285750">
+              <a:buFont typeface="Arial" panose="020B0604020202020204" pitchFamily="34" charset="0"/>
+              <a:buChar char="•"/>
+            </a:pPr>
+            <a:r>
+              <a:rPr lang="en-AU" sz="2600" dirty="0" smtClean="0">
+                <a:solidFill>
+                  <a:srgbClr val="EEEEEE"/>
+                </a:solidFill>
+                <a:latin typeface="Open Sans" panose="020B0606030504020204" pitchFamily="34" charset="0"/>
+                <a:ea typeface="Open Sans" panose="020B0606030504020204" pitchFamily="34" charset="0"/>
+                <a:cs typeface="Open Sans" panose="020B0606030504020204" pitchFamily="34" charset="0"/>
+              </a:rPr>
+              <a:t>Click the highlighted icon in the Notification Area </a:t>
+            </a:r>
+            <a:r>
+              <a:rPr lang="en-AU" sz="2600" dirty="0" smtClean="0">
+                <a:solidFill>
+                  <a:srgbClr val="EEEEEE"/>
+                </a:solidFill>
+                <a:latin typeface="Open Sans" panose="020B0606030504020204" pitchFamily="34" charset="0"/>
+                <a:ea typeface="Open Sans" panose="020B0606030504020204" pitchFamily="34" charset="0"/>
+                <a:cs typeface="Open Sans" panose="020B0606030504020204" pitchFamily="34" charset="0"/>
+              </a:rPr>
+              <a:t>on the right side of the task bar</a:t>
+            </a:r>
+          </a:p>
+        </p:txBody>
+      </p:sp>
+      <p:pic>
+        <p:nvPicPr>
+          <p:cNvPr id="3" name="Picture 2"/>
+          <p:cNvPicPr>
+            <a:picLocks noChangeAspect="1"/>
+          </p:cNvPicPr>
+          <p:nvPr/>
+        </p:nvPicPr>
+        <p:blipFill>
+          <a:blip r:embed="rId3">
+            <a:extLst>
+              <a:ext uri="{28A0092B-C50C-407E-A947-70E740481C1C}">
+                <a14:useLocalDpi xmlns:a14="http://schemas.microsoft.com/office/drawing/2010/main" val="0"/>
+              </a:ext>
+            </a:extLst>
+          </a:blip>
+          <a:stretch>
+            <a:fillRect/>
+          </a:stretch>
+        </p:blipFill>
+        <p:spPr>
+          <a:xfrm>
+            <a:off x="1769701" y="4625059"/>
+            <a:ext cx="2692063" cy="1701587"/>
+          </a:xfrm>
+          <a:prstGeom prst="rect">
+            <a:avLst/>
+          </a:prstGeom>
+        </p:spPr>
+      </p:pic>
+      <p:sp>
+        <p:nvSpPr>
+          <p:cNvPr id="8" name="TextBox 7"/>
+          <p:cNvSpPr txBox="1"/>
+          <p:nvPr/>
+        </p:nvSpPr>
+        <p:spPr>
+          <a:xfrm>
+            <a:off x="1524000" y="3160709"/>
+            <a:ext cx="5238044" cy="892552"/>
+          </a:xfrm>
+          <a:prstGeom prst="rect">
+            <a:avLst/>
+          </a:prstGeom>
+          <a:noFill/>
+        </p:spPr>
+        <p:txBody>
+          <a:bodyPr wrap="square" rtlCol="0">
+            <a:spAutoFit/>
+          </a:bodyPr>
+          <a:lstStyle/>
+          <a:p>
+            <a:pPr marL="285750" indent="-285750">
+              <a:buFont typeface="Arial" panose="020B0604020202020204" pitchFamily="34" charset="0"/>
+              <a:buChar char="•"/>
+            </a:pPr>
+            <a:r>
+              <a:rPr lang="en-AU" sz="2600" dirty="0" smtClean="0">
+                <a:solidFill>
+                  <a:srgbClr val="EEEEEE"/>
+                </a:solidFill>
+                <a:latin typeface="Open Sans" panose="020B0606030504020204" pitchFamily="34" charset="0"/>
+                <a:ea typeface="Open Sans" panose="020B0606030504020204" pitchFamily="34" charset="0"/>
+                <a:cs typeface="Open Sans" panose="020B0606030504020204" pitchFamily="34" charset="0"/>
+              </a:rPr>
+              <a:t>Then select “Have Windows install updates automatically”</a:t>
+            </a:r>
+            <a:endParaRPr lang="en-AU" sz="2600" dirty="0" smtClean="0">
+              <a:solidFill>
+                <a:srgbClr val="EEEEEE"/>
+              </a:solidFill>
+              <a:latin typeface="Open Sans" panose="020B0606030504020204" pitchFamily="34" charset="0"/>
+              <a:ea typeface="Open Sans" panose="020B0606030504020204" pitchFamily="34" charset="0"/>
+              <a:cs typeface="Open Sans" panose="020B0606030504020204" pitchFamily="34" charset="0"/>
+            </a:endParaRPr>
+          </a:p>
+        </p:txBody>
+      </p:sp>
+    </p:spTree>
+    <p:extLst>
+      <p:ext uri="{BB962C8B-B14F-4D97-AF65-F5344CB8AC3E}">
+        <p14:creationId xmlns:p14="http://schemas.microsoft.com/office/powerpoint/2010/main" val="2494457597"/>
+      </p:ext>
+    </p:extLst>
+  </p:cSld>
+  <p:clrMapOvr>
+    <a:masterClrMapping/>
+  </p:clrMapOvr>
+  <p:transition spd="slow">
+    <p:push/>
+  </p:transition>
+  <p:timing>
+    <p:tnLst>
+      <p:par>
+        <p:cTn id="1" dur="indefinite" restart="never" nodeType="tmRoot"/>
+      </p:par>
+    </p:tnLst>
+  </p:timing>
+</p:sld>
+</file>
+
+<file path=ppt/slides/slide19.xml><?xml version="1.0" encoding="utf-8"?>
+<p:sld xmlns:a="http://schemas.openxmlformats.org/drawingml/2006/main" xmlns:r="http://schemas.openxmlformats.org/officeDocument/2006/relationships" xmlns:p="http://schemas.openxmlformats.org/presentationml/2006/main">
+  <p:cSld>
+    <p:bg>
+      <p:bgPr>
+        <a:solidFill>
+          <a:srgbClr val="111111"/>
+        </a:solidFill>
+        <a:effectLst/>
+      </p:bgPr>
+    </p:bg>
+    <p:spTree>
+      <p:nvGrpSpPr>
+        <p:cNvPr id="1" name=""/>
+        <p:cNvGrpSpPr/>
+        <p:nvPr/>
+      </p:nvGrpSpPr>
+      <p:grpSpPr>
+        <a:xfrm>
+          <a:off x="0" y="0"/>
+          <a:ext cx="0" cy="0"/>
+          <a:chOff x="0" y="0"/>
+          <a:chExt cx="0" cy="0"/>
+        </a:xfrm>
+      </p:grpSpPr>
+      <p:sp>
+        <p:nvSpPr>
+          <p:cNvPr id="4" name="Title 3"/>
+          <p:cNvSpPr>
+            <a:spLocks noGrp="1"/>
+          </p:cNvSpPr>
+          <p:nvPr>
+            <p:ph type="ctrTitle"/>
+          </p:nvPr>
+        </p:nvSpPr>
+        <p:spPr>
+          <a:xfrm>
+            <a:off x="1524000" y="-1669142"/>
+            <a:ext cx="9144000" cy="2917370"/>
+          </a:xfrm>
+        </p:spPr>
+        <p:txBody>
+          <a:bodyPr anchor="b">
+            <a:normAutofit/>
+          </a:bodyPr>
+          <a:lstStyle/>
+          <a:p>
+            <a:pPr algn="l"/>
+            <a:r>
+              <a:rPr lang="en-AU" sz="4400" b="1" dirty="0" smtClean="0">
+                <a:solidFill>
+                  <a:srgbClr val="EEEEEE"/>
+                </a:solidFill>
+                <a:latin typeface="Open Sans" panose="020B0606030504020204" pitchFamily="34" charset="0"/>
+                <a:ea typeface="Open Sans" panose="020B0606030504020204" pitchFamily="34" charset="0"/>
+                <a:cs typeface="Open Sans" panose="020B0606030504020204" pitchFamily="34" charset="0"/>
+              </a:rPr>
+              <a:t>Advantages to </a:t>
+            </a:r>
+            <a:r>
+              <a:rPr lang="en-AU" sz="4400" b="1" dirty="0" smtClean="0">
+                <a:solidFill>
+                  <a:srgbClr val="EEEEEE"/>
+                </a:solidFill>
+                <a:latin typeface="Open Sans" panose="020B0606030504020204" pitchFamily="34" charset="0"/>
+                <a:ea typeface="Open Sans" panose="020B0606030504020204" pitchFamily="34" charset="0"/>
+                <a:cs typeface="Open Sans" panose="020B0606030504020204" pitchFamily="34" charset="0"/>
+              </a:rPr>
+              <a:t>updating…</a:t>
+            </a:r>
+            <a:endParaRPr lang="en-AU" sz="2800" dirty="0">
+              <a:solidFill>
+                <a:srgbClr val="EEEEEE"/>
+              </a:solidFill>
+              <a:latin typeface="Open Sans" panose="020B0606030504020204" pitchFamily="34" charset="0"/>
+              <a:ea typeface="Open Sans" panose="020B0606030504020204" pitchFamily="34" charset="0"/>
+              <a:cs typeface="Open Sans" panose="020B0606030504020204" pitchFamily="34" charset="0"/>
+            </a:endParaRPr>
+          </a:p>
+        </p:txBody>
+      </p:sp>
+      <p:sp>
+        <p:nvSpPr>
+          <p:cNvPr id="6" name="Title 3"/>
+          <p:cNvSpPr txBox="1">
+            <a:spLocks/>
+          </p:cNvSpPr>
+          <p:nvPr/>
+        </p:nvSpPr>
+        <p:spPr>
+          <a:xfrm>
+            <a:off x="1524001" y="1248227"/>
+            <a:ext cx="9144000" cy="511630"/>
+          </a:xfrm>
+          <a:prstGeom prst="rect">
+            <a:avLst/>
+          </a:prstGeom>
+        </p:spPr>
+        <p:txBody>
+          <a:bodyPr vert="horz" lIns="91440" tIns="45720" rIns="91440" bIns="45720" rtlCol="0" anchor="t">
+            <a:normAutofit lnSpcReduction="10000"/>
+          </a:bodyPr>
+          <a:lstStyle>
+            <a:lvl1pPr algn="ctr" defTabSz="914400" rtl="0" eaLnBrk="1" latinLnBrk="0" hangingPunct="1">
+              <a:lnSpc>
+                <a:spcPct val="90000"/>
+              </a:lnSpc>
+              <a:spcBef>
+                <a:spcPct val="0"/>
+              </a:spcBef>
+              <a:buNone/>
+              <a:defRPr sz="6000" kern="1200">
+                <a:solidFill>
+                  <a:schemeClr val="tx1"/>
+                </a:solidFill>
+                <a:latin typeface="+mj-lt"/>
+                <a:ea typeface="+mj-ea"/>
+                <a:cs typeface="+mj-cs"/>
+              </a:defRPr>
+            </a:lvl1pPr>
+          </a:lstStyle>
+          <a:p>
+            <a:pPr algn="l">
+              <a:lnSpc>
+                <a:spcPct val="100000"/>
+              </a:lnSpc>
+            </a:pPr>
+            <a:r>
+              <a:rPr lang="en-AU" sz="2800" dirty="0" smtClean="0">
+                <a:solidFill>
+                  <a:srgbClr val="111111"/>
+                </a:solidFill>
+                <a:latin typeface="Open Sans" panose="020B0606030504020204" pitchFamily="34" charset="0"/>
+                <a:ea typeface="Open Sans" panose="020B0606030504020204" pitchFamily="34" charset="0"/>
+                <a:cs typeface="Open Sans" panose="020B0606030504020204" pitchFamily="34" charset="0"/>
+              </a:rPr>
+              <a:t>separator</a:t>
+            </a:r>
+          </a:p>
+        </p:txBody>
+      </p:sp>
+      <p:sp>
+        <p:nvSpPr>
+          <p:cNvPr id="2" name="TextBox 1"/>
+          <p:cNvSpPr txBox="1"/>
+          <p:nvPr/>
+        </p:nvSpPr>
+        <p:spPr>
+          <a:xfrm>
+            <a:off x="1524000" y="1759857"/>
+            <a:ext cx="9144000" cy="4093428"/>
+          </a:xfrm>
+          <a:prstGeom prst="rect">
+            <a:avLst/>
+          </a:prstGeom>
+          <a:noFill/>
+        </p:spPr>
+        <p:txBody>
+          <a:bodyPr wrap="square" rtlCol="0">
+            <a:spAutoFit/>
+          </a:bodyPr>
+          <a:lstStyle/>
+          <a:p>
+            <a:pPr marL="285750" indent="-285750">
+              <a:buFont typeface="Arial" panose="020B0604020202020204" pitchFamily="34" charset="0"/>
+              <a:buChar char="•"/>
+            </a:pPr>
+            <a:r>
+              <a:rPr lang="en-AU" sz="2600" dirty="0" smtClean="0">
+                <a:solidFill>
+                  <a:srgbClr val="EEEEEE"/>
+                </a:solidFill>
+                <a:latin typeface="Open Sans" panose="020B0606030504020204" pitchFamily="34" charset="0"/>
+                <a:ea typeface="Open Sans" panose="020B0606030504020204" pitchFamily="34" charset="0"/>
+                <a:cs typeface="Open Sans" panose="020B0606030504020204" pitchFamily="34" charset="0"/>
+              </a:rPr>
+              <a:t>No cost involved when installing service </a:t>
+            </a:r>
+            <a:r>
+              <a:rPr lang="en-AU" sz="2600" dirty="0">
+                <a:solidFill>
+                  <a:srgbClr val="EEEEEE"/>
+                </a:solidFill>
+                <a:latin typeface="Open Sans" panose="020B0606030504020204" pitchFamily="34" charset="0"/>
+                <a:ea typeface="Open Sans" panose="020B0606030504020204" pitchFamily="34" charset="0"/>
+                <a:cs typeface="Open Sans" panose="020B0606030504020204" pitchFamily="34" charset="0"/>
+              </a:rPr>
+              <a:t>p</a:t>
+            </a:r>
+            <a:r>
+              <a:rPr lang="en-AU" sz="2600" dirty="0" smtClean="0">
+                <a:solidFill>
+                  <a:srgbClr val="EEEEEE"/>
+                </a:solidFill>
+                <a:latin typeface="Open Sans" panose="020B0606030504020204" pitchFamily="34" charset="0"/>
+                <a:ea typeface="Open Sans" panose="020B0606030504020204" pitchFamily="34" charset="0"/>
+                <a:cs typeface="Open Sans" panose="020B0606030504020204" pitchFamily="34" charset="0"/>
+              </a:rPr>
+              <a:t>acks or security updates</a:t>
+            </a:r>
+          </a:p>
+          <a:p>
+            <a:pPr marL="285750" indent="-285750">
+              <a:buFont typeface="Arial" panose="020B0604020202020204" pitchFamily="34" charset="0"/>
+              <a:buChar char="•"/>
+            </a:pPr>
+            <a:r>
+              <a:rPr lang="en-AU" sz="2600" dirty="0" smtClean="0">
+                <a:solidFill>
+                  <a:srgbClr val="EEEEEE"/>
+                </a:solidFill>
+                <a:latin typeface="Open Sans" panose="020B0606030504020204" pitchFamily="34" charset="0"/>
+                <a:ea typeface="Open Sans" panose="020B0606030504020204" pitchFamily="34" charset="0"/>
+                <a:cs typeface="Open Sans" panose="020B0606030504020204" pitchFamily="34" charset="0"/>
+              </a:rPr>
+              <a:t>Most known vulnerabilities will be secure</a:t>
+            </a:r>
+          </a:p>
+          <a:p>
+            <a:pPr marL="742950" lvl="1" indent="-285750">
+              <a:buFont typeface="Arial" panose="020B0604020202020204" pitchFamily="34" charset="0"/>
+              <a:buChar char="•"/>
+            </a:pPr>
+            <a:r>
+              <a:rPr lang="en-AU" sz="2600" dirty="0" err="1">
+                <a:solidFill>
+                  <a:srgbClr val="EEEEEE"/>
+                </a:solidFill>
+                <a:latin typeface="Open Sans" panose="020B0606030504020204" pitchFamily="34" charset="0"/>
+                <a:ea typeface="Open Sans" panose="020B0606030504020204" pitchFamily="34" charset="0"/>
+                <a:cs typeface="Open Sans" panose="020B0606030504020204" pitchFamily="34" charset="0"/>
+              </a:rPr>
+              <a:t>i</a:t>
+            </a:r>
+            <a:r>
+              <a:rPr lang="en-AU" sz="2600" dirty="0" err="1" smtClean="0">
+                <a:solidFill>
+                  <a:srgbClr val="EEEEEE"/>
+                </a:solidFill>
+                <a:latin typeface="Open Sans" panose="020B0606030504020204" pitchFamily="34" charset="0"/>
+                <a:ea typeface="Open Sans" panose="020B0606030504020204" pitchFamily="34" charset="0"/>
+                <a:cs typeface="Open Sans" panose="020B0606030504020204" pitchFamily="34" charset="0"/>
+              </a:rPr>
+              <a:t>e</a:t>
+            </a:r>
+            <a:r>
+              <a:rPr lang="en-AU" sz="2600" dirty="0" smtClean="0">
+                <a:solidFill>
+                  <a:srgbClr val="EEEEEE"/>
+                </a:solidFill>
+                <a:latin typeface="Open Sans" panose="020B0606030504020204" pitchFamily="34" charset="0"/>
+                <a:ea typeface="Open Sans" panose="020B0606030504020204" pitchFamily="34" charset="0"/>
+                <a:cs typeface="Open Sans" panose="020B0606030504020204" pitchFamily="34" charset="0"/>
+              </a:rPr>
+              <a:t>. Auto-run and Active-X Control vulnerabilities will be mitigated</a:t>
+            </a:r>
+          </a:p>
+          <a:p>
+            <a:pPr marL="285750" indent="-285750">
+              <a:buFont typeface="Arial" panose="020B0604020202020204" pitchFamily="34" charset="0"/>
+              <a:buChar char="•"/>
+            </a:pPr>
+            <a:r>
+              <a:rPr lang="en-AU" sz="2600" dirty="0" smtClean="0">
+                <a:solidFill>
+                  <a:srgbClr val="EEEEEE"/>
+                </a:solidFill>
+                <a:latin typeface="Open Sans" panose="020B0606030504020204" pitchFamily="34" charset="0"/>
+                <a:ea typeface="Open Sans" panose="020B0606030504020204" pitchFamily="34" charset="0"/>
+                <a:cs typeface="Open Sans" panose="020B0606030504020204" pitchFamily="34" charset="0"/>
+              </a:rPr>
+              <a:t>Internet Explorer will be updated to version 9</a:t>
+            </a:r>
+          </a:p>
+          <a:p>
+            <a:pPr marL="285750" indent="-285750">
+              <a:buFont typeface="Arial" panose="020B0604020202020204" pitchFamily="34" charset="0"/>
+              <a:buChar char="•"/>
+            </a:pPr>
+            <a:r>
+              <a:rPr lang="en-AU" sz="2600" dirty="0" smtClean="0">
+                <a:solidFill>
+                  <a:srgbClr val="EEEEEE"/>
+                </a:solidFill>
+                <a:latin typeface="Open Sans" panose="020B0606030504020204" pitchFamily="34" charset="0"/>
+                <a:ea typeface="Open Sans" panose="020B0606030504020204" pitchFamily="34" charset="0"/>
+                <a:cs typeface="Open Sans" panose="020B0606030504020204" pitchFamily="34" charset="0"/>
+              </a:rPr>
+              <a:t>Windows Defender will be updated with latest signatures</a:t>
+            </a:r>
+          </a:p>
+          <a:p>
+            <a:pPr marL="285750" indent="-285750">
+              <a:buFont typeface="Arial" panose="020B0604020202020204" pitchFamily="34" charset="0"/>
+              <a:buChar char="•"/>
+            </a:pPr>
+            <a:r>
+              <a:rPr lang="en-AU" sz="2600" dirty="0" smtClean="0">
+                <a:solidFill>
+                  <a:srgbClr val="EEEEEE"/>
+                </a:solidFill>
+                <a:latin typeface="Open Sans" panose="020B0606030504020204" pitchFamily="34" charset="0"/>
+                <a:ea typeface="Open Sans" panose="020B0606030504020204" pitchFamily="34" charset="0"/>
+                <a:cs typeface="Open Sans" panose="020B0606030504020204" pitchFamily="34" charset="0"/>
+              </a:rPr>
+              <a:t>Staff will not require training in use</a:t>
+            </a:r>
+          </a:p>
+          <a:p>
+            <a:pPr marL="742950" lvl="1" indent="-285750">
+              <a:buFont typeface="Arial" panose="020B0604020202020204" pitchFamily="34" charset="0"/>
+              <a:buChar char="•"/>
+            </a:pPr>
+            <a:r>
+              <a:rPr lang="en-AU" sz="2600" dirty="0" smtClean="0">
+                <a:solidFill>
+                  <a:srgbClr val="EEEEEE"/>
+                </a:solidFill>
+                <a:latin typeface="Open Sans" panose="020B0606030504020204" pitchFamily="34" charset="0"/>
+                <a:ea typeface="Open Sans" panose="020B0606030504020204" pitchFamily="34" charset="0"/>
+                <a:cs typeface="Open Sans" panose="020B0606030504020204" pitchFamily="34" charset="0"/>
+              </a:rPr>
+              <a:t>No changes to user interface</a:t>
+            </a:r>
+            <a:endParaRPr lang="en-AU" sz="2600" dirty="0" smtClean="0">
+              <a:solidFill>
+                <a:srgbClr val="EEEEEE"/>
+              </a:solidFill>
+              <a:latin typeface="Open Sans" panose="020B0606030504020204" pitchFamily="34" charset="0"/>
+              <a:ea typeface="Open Sans" panose="020B0606030504020204" pitchFamily="34" charset="0"/>
+              <a:cs typeface="Open Sans" panose="020B0606030504020204" pitchFamily="34" charset="0"/>
+            </a:endParaRPr>
+          </a:p>
+        </p:txBody>
+      </p:sp>
+    </p:spTree>
+    <p:extLst>
+      <p:ext uri="{BB962C8B-B14F-4D97-AF65-F5344CB8AC3E}">
+        <p14:creationId xmlns:p14="http://schemas.microsoft.com/office/powerpoint/2010/main" val="1029629349"/>
       </p:ext>
     </p:extLst>
   </p:cSld>
@@ -4850,6 +7454,469 @@
 </p:sld>
 </file>
 
+<file path=ppt/slides/slide20.xml><?xml version="1.0" encoding="utf-8"?>
+<p:sld xmlns:a="http://schemas.openxmlformats.org/drawingml/2006/main" xmlns:r="http://schemas.openxmlformats.org/officeDocument/2006/relationships" xmlns:p="http://schemas.openxmlformats.org/presentationml/2006/main">
+  <p:cSld>
+    <p:bg>
+      <p:bgPr>
+        <a:solidFill>
+          <a:srgbClr val="111111"/>
+        </a:solidFill>
+        <a:effectLst/>
+      </p:bgPr>
+    </p:bg>
+    <p:spTree>
+      <p:nvGrpSpPr>
+        <p:cNvPr id="1" name=""/>
+        <p:cNvGrpSpPr/>
+        <p:nvPr/>
+      </p:nvGrpSpPr>
+      <p:grpSpPr>
+        <a:xfrm>
+          <a:off x="0" y="0"/>
+          <a:ext cx="0" cy="0"/>
+          <a:chOff x="0" y="0"/>
+          <a:chExt cx="0" cy="0"/>
+        </a:xfrm>
+      </p:grpSpPr>
+      <p:sp>
+        <p:nvSpPr>
+          <p:cNvPr id="4" name="Title 3"/>
+          <p:cNvSpPr>
+            <a:spLocks noGrp="1"/>
+          </p:cNvSpPr>
+          <p:nvPr>
+            <p:ph type="ctrTitle"/>
+          </p:nvPr>
+        </p:nvSpPr>
+        <p:spPr>
+          <a:xfrm>
+            <a:off x="1524000" y="-1669142"/>
+            <a:ext cx="9144000" cy="2917370"/>
+          </a:xfrm>
+        </p:spPr>
+        <p:txBody>
+          <a:bodyPr anchor="b">
+            <a:normAutofit/>
+          </a:bodyPr>
+          <a:lstStyle/>
+          <a:p>
+            <a:pPr algn="l"/>
+            <a:r>
+              <a:rPr lang="en-AU" sz="4400" b="1" dirty="0" smtClean="0">
+                <a:solidFill>
+                  <a:srgbClr val="EEEEEE"/>
+                </a:solidFill>
+                <a:latin typeface="Open Sans" panose="020B0606030504020204" pitchFamily="34" charset="0"/>
+                <a:ea typeface="Open Sans" panose="020B0606030504020204" pitchFamily="34" charset="0"/>
+                <a:cs typeface="Open Sans" panose="020B0606030504020204" pitchFamily="34" charset="0"/>
+              </a:rPr>
+              <a:t>Disadvantages </a:t>
+            </a:r>
+            <a:r>
+              <a:rPr lang="en-AU" sz="4400" b="1" dirty="0" smtClean="0">
+                <a:solidFill>
+                  <a:srgbClr val="EEEEEE"/>
+                </a:solidFill>
+                <a:latin typeface="Open Sans" panose="020B0606030504020204" pitchFamily="34" charset="0"/>
+                <a:ea typeface="Open Sans" panose="020B0606030504020204" pitchFamily="34" charset="0"/>
+                <a:cs typeface="Open Sans" panose="020B0606030504020204" pitchFamily="34" charset="0"/>
+              </a:rPr>
+              <a:t>to </a:t>
+            </a:r>
+            <a:r>
+              <a:rPr lang="en-AU" sz="4400" b="1" dirty="0" smtClean="0">
+                <a:solidFill>
+                  <a:srgbClr val="EEEEEE"/>
+                </a:solidFill>
+                <a:latin typeface="Open Sans" panose="020B0606030504020204" pitchFamily="34" charset="0"/>
+                <a:ea typeface="Open Sans" panose="020B0606030504020204" pitchFamily="34" charset="0"/>
+                <a:cs typeface="Open Sans" panose="020B0606030504020204" pitchFamily="34" charset="0"/>
+              </a:rPr>
+              <a:t>updating…</a:t>
+            </a:r>
+            <a:endParaRPr lang="en-AU" sz="2800" dirty="0">
+              <a:solidFill>
+                <a:srgbClr val="EEEEEE"/>
+              </a:solidFill>
+              <a:latin typeface="Open Sans" panose="020B0606030504020204" pitchFamily="34" charset="0"/>
+              <a:ea typeface="Open Sans" panose="020B0606030504020204" pitchFamily="34" charset="0"/>
+              <a:cs typeface="Open Sans" panose="020B0606030504020204" pitchFamily="34" charset="0"/>
+            </a:endParaRPr>
+          </a:p>
+        </p:txBody>
+      </p:sp>
+      <p:sp>
+        <p:nvSpPr>
+          <p:cNvPr id="6" name="Title 3"/>
+          <p:cNvSpPr txBox="1">
+            <a:spLocks/>
+          </p:cNvSpPr>
+          <p:nvPr/>
+        </p:nvSpPr>
+        <p:spPr>
+          <a:xfrm>
+            <a:off x="1524001" y="1248227"/>
+            <a:ext cx="9144000" cy="511630"/>
+          </a:xfrm>
+          <a:prstGeom prst="rect">
+            <a:avLst/>
+          </a:prstGeom>
+        </p:spPr>
+        <p:txBody>
+          <a:bodyPr vert="horz" lIns="91440" tIns="45720" rIns="91440" bIns="45720" rtlCol="0" anchor="t">
+            <a:normAutofit lnSpcReduction="10000"/>
+          </a:bodyPr>
+          <a:lstStyle>
+            <a:lvl1pPr algn="ctr" defTabSz="914400" rtl="0" eaLnBrk="1" latinLnBrk="0" hangingPunct="1">
+              <a:lnSpc>
+                <a:spcPct val="90000"/>
+              </a:lnSpc>
+              <a:spcBef>
+                <a:spcPct val="0"/>
+              </a:spcBef>
+              <a:buNone/>
+              <a:defRPr sz="6000" kern="1200">
+                <a:solidFill>
+                  <a:schemeClr val="tx1"/>
+                </a:solidFill>
+                <a:latin typeface="+mj-lt"/>
+                <a:ea typeface="+mj-ea"/>
+                <a:cs typeface="+mj-cs"/>
+              </a:defRPr>
+            </a:lvl1pPr>
+          </a:lstStyle>
+          <a:p>
+            <a:pPr algn="l">
+              <a:lnSpc>
+                <a:spcPct val="100000"/>
+              </a:lnSpc>
+            </a:pPr>
+            <a:r>
+              <a:rPr lang="en-AU" sz="2800" dirty="0" smtClean="0">
+                <a:solidFill>
+                  <a:srgbClr val="111111"/>
+                </a:solidFill>
+                <a:latin typeface="Open Sans" panose="020B0606030504020204" pitchFamily="34" charset="0"/>
+                <a:ea typeface="Open Sans" panose="020B0606030504020204" pitchFamily="34" charset="0"/>
+                <a:cs typeface="Open Sans" panose="020B0606030504020204" pitchFamily="34" charset="0"/>
+              </a:rPr>
+              <a:t>separator</a:t>
+            </a:r>
+          </a:p>
+        </p:txBody>
+      </p:sp>
+      <p:sp>
+        <p:nvSpPr>
+          <p:cNvPr id="2" name="TextBox 1"/>
+          <p:cNvSpPr txBox="1"/>
+          <p:nvPr/>
+        </p:nvSpPr>
+        <p:spPr>
+          <a:xfrm>
+            <a:off x="1524000" y="1759857"/>
+            <a:ext cx="9144000" cy="4093428"/>
+          </a:xfrm>
+          <a:prstGeom prst="rect">
+            <a:avLst/>
+          </a:prstGeom>
+          <a:noFill/>
+        </p:spPr>
+        <p:txBody>
+          <a:bodyPr wrap="square" rtlCol="0">
+            <a:spAutoFit/>
+          </a:bodyPr>
+          <a:lstStyle/>
+          <a:p>
+            <a:pPr marL="285750" indent="-285750">
+              <a:buFont typeface="Arial" panose="020B0604020202020204" pitchFamily="34" charset="0"/>
+              <a:buChar char="•"/>
+            </a:pPr>
+            <a:r>
+              <a:rPr lang="en-AU" sz="2600" dirty="0">
+                <a:solidFill>
+                  <a:srgbClr val="EEEEEE"/>
+                </a:solidFill>
+                <a:latin typeface="Open Sans" panose="020B0606030504020204" pitchFamily="34" charset="0"/>
+                <a:ea typeface="Open Sans" panose="020B0606030504020204" pitchFamily="34" charset="0"/>
+                <a:cs typeface="Open Sans" panose="020B0606030504020204" pitchFamily="34" charset="0"/>
+              </a:rPr>
+              <a:t>Still vulnerable to latest threats until Microsoft patch them</a:t>
+            </a:r>
+          </a:p>
+          <a:p>
+            <a:pPr marL="285750" indent="-285750">
+              <a:buFont typeface="Arial" panose="020B0604020202020204" pitchFamily="34" charset="0"/>
+              <a:buChar char="•"/>
+            </a:pPr>
+            <a:r>
+              <a:rPr lang="en-AU" sz="2600" dirty="0">
+                <a:solidFill>
+                  <a:srgbClr val="EEEEEE"/>
+                </a:solidFill>
+                <a:latin typeface="Open Sans" panose="020B0606030504020204" pitchFamily="34" charset="0"/>
+                <a:ea typeface="Open Sans" panose="020B0606030504020204" pitchFamily="34" charset="0"/>
+                <a:cs typeface="Open Sans" panose="020B0606030504020204" pitchFamily="34" charset="0"/>
+              </a:rPr>
+              <a:t>Downloading all updates will cost bandwidth</a:t>
+            </a:r>
+          </a:p>
+          <a:p>
+            <a:pPr marL="285750" indent="-285750">
+              <a:buFont typeface="Arial" panose="020B0604020202020204" pitchFamily="34" charset="0"/>
+              <a:buChar char="•"/>
+            </a:pPr>
+            <a:r>
+              <a:rPr lang="en-AU" sz="2600" dirty="0">
+                <a:solidFill>
+                  <a:srgbClr val="EEEEEE"/>
+                </a:solidFill>
+                <a:latin typeface="Open Sans" panose="020B0606030504020204" pitchFamily="34" charset="0"/>
+                <a:ea typeface="Open Sans" panose="020B0606030504020204" pitchFamily="34" charset="0"/>
+                <a:cs typeface="Open Sans" panose="020B0606030504020204" pitchFamily="34" charset="0"/>
+              </a:rPr>
+              <a:t>May take time to download all updates</a:t>
+            </a:r>
+          </a:p>
+          <a:p>
+            <a:pPr marL="285750" indent="-285750">
+              <a:buFont typeface="Arial" panose="020B0604020202020204" pitchFamily="34" charset="0"/>
+              <a:buChar char="•"/>
+            </a:pPr>
+            <a:r>
+              <a:rPr lang="en-AU" sz="2600" dirty="0">
+                <a:solidFill>
+                  <a:srgbClr val="EEEEEE"/>
+                </a:solidFill>
+                <a:latin typeface="Open Sans" panose="020B0606030504020204" pitchFamily="34" charset="0"/>
+                <a:ea typeface="Open Sans" panose="020B0606030504020204" pitchFamily="34" charset="0"/>
+                <a:cs typeface="Open Sans" panose="020B0606030504020204" pitchFamily="34" charset="0"/>
+              </a:rPr>
+              <a:t>Internet Explorer 9 still susceptible to various vulnerabilities</a:t>
+            </a:r>
+          </a:p>
+          <a:p>
+            <a:pPr marL="285750" indent="-285750">
+              <a:buFont typeface="Arial" panose="020B0604020202020204" pitchFamily="34" charset="0"/>
+              <a:buChar char="•"/>
+            </a:pPr>
+            <a:r>
+              <a:rPr lang="en-AU" sz="2600" dirty="0">
+                <a:solidFill>
+                  <a:srgbClr val="EEEEEE"/>
+                </a:solidFill>
+                <a:latin typeface="Open Sans" panose="020B0606030504020204" pitchFamily="34" charset="0"/>
+                <a:ea typeface="Open Sans" panose="020B0606030504020204" pitchFamily="34" charset="0"/>
+                <a:cs typeface="Open Sans" panose="020B0606030504020204" pitchFamily="34" charset="0"/>
+              </a:rPr>
+              <a:t>Security updates will no longer be received after 11 April 2017</a:t>
+            </a:r>
+          </a:p>
+          <a:p>
+            <a:pPr marL="742950" lvl="1" indent="-285750">
+              <a:buFont typeface="Arial" panose="020B0604020202020204" pitchFamily="34" charset="0"/>
+              <a:buChar char="•"/>
+            </a:pPr>
+            <a:r>
+              <a:rPr lang="en-AU" sz="2600" dirty="0">
+                <a:solidFill>
+                  <a:srgbClr val="EEEEEE"/>
+                </a:solidFill>
+                <a:latin typeface="Open Sans" panose="020B0606030504020204" pitchFamily="34" charset="0"/>
+                <a:ea typeface="Open Sans" panose="020B0606030504020204" pitchFamily="34" charset="0"/>
+                <a:cs typeface="Open Sans" panose="020B0606030504020204" pitchFamily="34" charset="0"/>
+              </a:rPr>
+              <a:t>Any vulnerabilities after the last security update will not be resolved</a:t>
+            </a:r>
+          </a:p>
+        </p:txBody>
+      </p:sp>
+    </p:spTree>
+    <p:extLst>
+      <p:ext uri="{BB962C8B-B14F-4D97-AF65-F5344CB8AC3E}">
+        <p14:creationId xmlns:p14="http://schemas.microsoft.com/office/powerpoint/2010/main" val="3600139884"/>
+      </p:ext>
+    </p:extLst>
+  </p:cSld>
+  <p:clrMapOvr>
+    <a:masterClrMapping/>
+  </p:clrMapOvr>
+  <p:transition spd="slow">
+    <p:push/>
+  </p:transition>
+  <p:timing>
+    <p:tnLst>
+      <p:par>
+        <p:cTn id="1" dur="indefinite" restart="never" nodeType="tmRoot"/>
+      </p:par>
+    </p:tnLst>
+  </p:timing>
+</p:sld>
+</file>
+
+<file path=ppt/slides/slide21.xml><?xml version="1.0" encoding="utf-8"?>
+<p:sld xmlns:a="http://schemas.openxmlformats.org/drawingml/2006/main" xmlns:r="http://schemas.openxmlformats.org/officeDocument/2006/relationships" xmlns:p="http://schemas.openxmlformats.org/presentationml/2006/main">
+  <p:cSld>
+    <p:bg>
+      <p:bgPr>
+        <a:solidFill>
+          <a:srgbClr val="111111"/>
+        </a:solidFill>
+        <a:effectLst/>
+      </p:bgPr>
+    </p:bg>
+    <p:spTree>
+      <p:nvGrpSpPr>
+        <p:cNvPr id="1" name=""/>
+        <p:cNvGrpSpPr/>
+        <p:nvPr/>
+      </p:nvGrpSpPr>
+      <p:grpSpPr>
+        <a:xfrm>
+          <a:off x="0" y="0"/>
+          <a:ext cx="0" cy="0"/>
+          <a:chOff x="0" y="0"/>
+          <a:chExt cx="0" cy="0"/>
+        </a:xfrm>
+      </p:grpSpPr>
+      <p:sp>
+        <p:nvSpPr>
+          <p:cNvPr id="4" name="Title 3"/>
+          <p:cNvSpPr>
+            <a:spLocks noGrp="1"/>
+          </p:cNvSpPr>
+          <p:nvPr>
+            <p:ph type="ctrTitle"/>
+          </p:nvPr>
+        </p:nvSpPr>
+        <p:spPr>
+          <a:xfrm>
+            <a:off x="1524000" y="1"/>
+            <a:ext cx="9144000" cy="970843"/>
+          </a:xfrm>
+        </p:spPr>
+        <p:txBody>
+          <a:bodyPr anchor="b">
+            <a:normAutofit/>
+          </a:bodyPr>
+          <a:lstStyle/>
+          <a:p>
+            <a:pPr algn="l"/>
+            <a:r>
+              <a:rPr lang="en-AU" sz="4400" b="1" dirty="0" smtClean="0">
+                <a:solidFill>
+                  <a:srgbClr val="EEEEEE"/>
+                </a:solidFill>
+                <a:latin typeface="Open Sans" panose="020B0606030504020204" pitchFamily="34" charset="0"/>
+                <a:ea typeface="Open Sans" panose="020B0606030504020204" pitchFamily="34" charset="0"/>
+                <a:cs typeface="Open Sans" panose="020B0606030504020204" pitchFamily="34" charset="0"/>
+              </a:rPr>
+              <a:t>References</a:t>
+            </a:r>
+            <a:endParaRPr lang="en-AU" sz="2800" dirty="0">
+              <a:solidFill>
+                <a:srgbClr val="EEEEEE"/>
+              </a:solidFill>
+              <a:latin typeface="Open Sans" panose="020B0606030504020204" pitchFamily="34" charset="0"/>
+              <a:ea typeface="Open Sans" panose="020B0606030504020204" pitchFamily="34" charset="0"/>
+              <a:cs typeface="Open Sans" panose="020B0606030504020204" pitchFamily="34" charset="0"/>
+            </a:endParaRPr>
+          </a:p>
+        </p:txBody>
+      </p:sp>
+      <p:sp>
+        <p:nvSpPr>
+          <p:cNvPr id="5" name="Title 3"/>
+          <p:cNvSpPr txBox="1">
+            <a:spLocks/>
+          </p:cNvSpPr>
+          <p:nvPr/>
+        </p:nvSpPr>
+        <p:spPr>
+          <a:xfrm>
+            <a:off x="338667" y="970844"/>
+            <a:ext cx="11514666" cy="5339645"/>
+          </a:xfrm>
+          <a:prstGeom prst="rect">
+            <a:avLst/>
+          </a:prstGeom>
+        </p:spPr>
+        <p:txBody>
+          <a:bodyPr vert="horz" lIns="91440" tIns="45720" rIns="91440" bIns="45720" rtlCol="0" anchor="t">
+            <a:normAutofit/>
+          </a:bodyPr>
+          <a:lstStyle>
+            <a:lvl1pPr algn="ctr" defTabSz="914400" rtl="0" eaLnBrk="1" latinLnBrk="0" hangingPunct="1">
+              <a:lnSpc>
+                <a:spcPct val="90000"/>
+              </a:lnSpc>
+              <a:spcBef>
+                <a:spcPct val="0"/>
+              </a:spcBef>
+              <a:buNone/>
+              <a:defRPr sz="6000" kern="1200">
+                <a:solidFill>
+                  <a:schemeClr val="tx1"/>
+                </a:solidFill>
+                <a:latin typeface="+mj-lt"/>
+                <a:ea typeface="+mj-ea"/>
+                <a:cs typeface="+mj-cs"/>
+              </a:defRPr>
+            </a:lvl1pPr>
+          </a:lstStyle>
+          <a:p>
+            <a:pPr marL="457200" indent="-457200" algn="l">
+              <a:lnSpc>
+                <a:spcPct val="100000"/>
+              </a:lnSpc>
+              <a:buFont typeface="Arial" panose="020B0604020202020204" pitchFamily="34" charset="0"/>
+              <a:buChar char="•"/>
+            </a:pPr>
+            <a:r>
+              <a:rPr lang="en-AU" sz="2000" dirty="0">
+                <a:solidFill>
+                  <a:srgbClr val="EEEEEE"/>
+                </a:solidFill>
+                <a:latin typeface="Open Sans" panose="020B0606030504020204" pitchFamily="34" charset="0"/>
+                <a:ea typeface="Open Sans" panose="020B0606030504020204" pitchFamily="34" charset="0"/>
+                <a:cs typeface="Open Sans" panose="020B0606030504020204" pitchFamily="34" charset="0"/>
+              </a:rPr>
+              <a:t>Microsoft. (2015). Microsoft Support Lifecycle. Microsoft. Retrieved February 27, 2015, from http://support.microsoft.com/lifecycle/search/default.aspx?alpha=Vista</a:t>
+            </a:r>
+            <a:endParaRPr lang="en-AU" sz="2000" dirty="0">
+              <a:solidFill>
+                <a:srgbClr val="EEEEEE"/>
+              </a:solidFill>
+              <a:latin typeface="Open Sans" panose="020B0606030504020204" pitchFamily="34" charset="0"/>
+              <a:ea typeface="Open Sans" panose="020B0606030504020204" pitchFamily="34" charset="0"/>
+              <a:cs typeface="Open Sans" panose="020B0606030504020204" pitchFamily="34" charset="0"/>
+            </a:endParaRPr>
+          </a:p>
+        </p:txBody>
+      </p:sp>
+    </p:spTree>
+    <p:extLst>
+      <p:ext uri="{BB962C8B-B14F-4D97-AF65-F5344CB8AC3E}">
+        <p14:creationId xmlns:p14="http://schemas.microsoft.com/office/powerpoint/2010/main" val="636747076"/>
+      </p:ext>
+    </p:extLst>
+  </p:cSld>
+  <p:clrMapOvr>
+    <a:masterClrMapping/>
+  </p:clrMapOvr>
+  <p:transition spd="slow">
+    <p:push/>
+  </p:transition>
+  <p:timing>
+    <p:tnLst>
+      <p:par>
+        <p:cTn id="1" dur="indefinite" restart="never" nodeType="tmRoot"/>
+      </p:par>
+    </p:tnLst>
+  </p:timing>
+</p:sld>
+</file>
+
 <file path=ppt/slides/slide3.xml><?xml version="1.0" encoding="utf-8"?>
 <p:sld xmlns:a="http://schemas.openxmlformats.org/drawingml/2006/main" xmlns:r="http://schemas.openxmlformats.org/officeDocument/2006/relationships" xmlns:p="http://schemas.openxmlformats.org/presentationml/2006/main">
   <p:cSld>
@@ -5039,8 +8106,49 @@
                 <a:ea typeface="Open Sans" panose="020B0606030504020204" pitchFamily="34" charset="0"/>
                 <a:cs typeface="Open Sans" panose="020B0606030504020204" pitchFamily="34" charset="0"/>
               </a:rPr>
-              <a:t>A back-up strategy in place and out of scope</a:t>
-            </a:r>
+              <a:t>A back-up strategy </a:t>
+            </a:r>
+            <a:r>
+              <a:rPr lang="en-AU" sz="2800" dirty="0" smtClean="0">
+                <a:solidFill>
+                  <a:srgbClr val="EEEEEE"/>
+                </a:solidFill>
+                <a:latin typeface="Open Sans" panose="020B0606030504020204" pitchFamily="34" charset="0"/>
+                <a:ea typeface="Open Sans" panose="020B0606030504020204" pitchFamily="34" charset="0"/>
+                <a:cs typeface="Open Sans" panose="020B0606030504020204" pitchFamily="34" charset="0"/>
+              </a:rPr>
+              <a:t>is in </a:t>
+            </a:r>
+            <a:r>
+              <a:rPr lang="en-AU" sz="2800" dirty="0" smtClean="0">
+                <a:solidFill>
+                  <a:srgbClr val="EEEEEE"/>
+                </a:solidFill>
+                <a:latin typeface="Open Sans" panose="020B0606030504020204" pitchFamily="34" charset="0"/>
+                <a:ea typeface="Open Sans" panose="020B0606030504020204" pitchFamily="34" charset="0"/>
+                <a:cs typeface="Open Sans" panose="020B0606030504020204" pitchFamily="34" charset="0"/>
+              </a:rPr>
+              <a:t>place and out of </a:t>
+            </a:r>
+            <a:r>
+              <a:rPr lang="en-AU" sz="2800" dirty="0" smtClean="0">
+                <a:solidFill>
+                  <a:srgbClr val="EEEEEE"/>
+                </a:solidFill>
+                <a:latin typeface="Open Sans" panose="020B0606030504020204" pitchFamily="34" charset="0"/>
+                <a:ea typeface="Open Sans" panose="020B0606030504020204" pitchFamily="34" charset="0"/>
+                <a:cs typeface="Open Sans" panose="020B0606030504020204" pitchFamily="34" charset="0"/>
+              </a:rPr>
+              <a:t>scope</a:t>
+            </a:r>
+            <a:endParaRPr lang="en-AU" sz="2800" dirty="0" smtClean="0">
+              <a:solidFill>
+                <a:srgbClr val="EEEEEE"/>
+              </a:solidFill>
+              <a:latin typeface="Open Sans" panose="020B0606030504020204" pitchFamily="34" charset="0"/>
+              <a:ea typeface="Open Sans" panose="020B0606030504020204" pitchFamily="34" charset="0"/>
+              <a:cs typeface="Open Sans" panose="020B0606030504020204" pitchFamily="34" charset="0"/>
+            </a:endParaRPr>
           </a:p>
           <a:p>
             <a:pPr marL="457200" indent="-457200" algn="l">
@@ -6491,7 +9599,7 @@
 <file path=ppt/theme/theme1.xml><?xml version="1.0" encoding="utf-8"?>
 <a:theme xmlns:a="http://schemas.openxmlformats.org/drawingml/2006/main" name="Office Theme">
   <a:themeElements>
-    <a:clrScheme name="Custom 1">
+    <a:clrScheme name="My Colours">
       <a:dk1>
         <a:sysClr val="windowText" lastClr="000000"/>
       </a:dk1>
@@ -6526,10 +9634,10 @@
         <a:srgbClr val="E7AD52"/>
       </a:hlink>
       <a:folHlink>
-        <a:srgbClr val="954F72"/>
+        <a:srgbClr val="E7AD52"/>
       </a:folHlink>
     </a:clrScheme>
-    <a:fontScheme name="Office">
+    <a:fontScheme name="Office Theme">
       <a:majorFont>
         <a:latin typeface="Calibri Light" panose="020F0302020204030204"/>
         <a:ea typeface=""/>
@@ -6601,7 +9709,7 @@
         <a:font script="Geor" typeface="Sylfaen"/>
       </a:minorFont>
     </a:fontScheme>
-    <a:fmtScheme name="Office">
+    <a:fmtScheme name="Office Theme">
       <a:fillStyleLst>
         <a:solidFill>
           <a:schemeClr val="phClr"/>

</xml_diff>

<commit_message>
CSI1101 A2: finished user applications, todo user practices
</commit_message>
<xml_diff>
--- a/year_1/sem_2/CSI1101_computer_security/0b_assignment_2_[22MAY15_0900]/dev/CSI1101_PONCE_A2_v01.pptx
+++ b/year_1/sem_2/CSI1101_computer_security/0b_assignment_2_[22MAY15_0900]/dev/CSI1101_PONCE_A2_v01.pptx
@@ -12940,7 +12940,80 @@
   <p:timing>
     <p:tnLst>
       <p:par>
-        <p:cTn id="1" dur="indefinite" restart="never" nodeType="tmRoot"/>
+        <p:cTn id="1" dur="indefinite" restart="never" nodeType="tmRoot">
+          <p:childTnLst>
+            <p:seq concurrent="1" nextAc="seek">
+              <p:cTn id="2" restart="whenNotActive" fill="hold" evtFilter="cancelBubble" nodeType="interactiveSeq">
+                <p:stCondLst>
+                  <p:cond evt="onClick" delay="0">
+                    <p:tgtEl>
+                      <p:spTgt spid="7"/>
+                    </p:tgtEl>
+                  </p:cond>
+                </p:stCondLst>
+                <p:endSync evt="end" delay="0">
+                  <p:rtn val="all"/>
+                </p:endSync>
+                <p:childTnLst>
+                  <p:par>
+                    <p:cTn id="3" fill="hold">
+                      <p:stCondLst>
+                        <p:cond delay="0"/>
+                      </p:stCondLst>
+                      <p:childTnLst>
+                        <p:par>
+                          <p:cTn id="4" fill="hold">
+                            <p:stCondLst>
+                              <p:cond delay="0"/>
+                            </p:stCondLst>
+                            <p:childTnLst>
+                              <p:par>
+                                <p:cTn id="5" presetID="2" presetClass="mediacall" presetSubtype="0" fill="hold" nodeType="clickEffect">
+                                  <p:stCondLst>
+                                    <p:cond delay="0"/>
+                                  </p:stCondLst>
+                                  <p:childTnLst>
+                                    <p:cmd type="call" cmd="togglePause">
+                                      <p:cBhvr>
+                                        <p:cTn id="6" dur="1" fill="hold"/>
+                                        <p:tgtEl>
+                                          <p:spTgt spid="7"/>
+                                        </p:tgtEl>
+                                      </p:cBhvr>
+                                    </p:cmd>
+                                  </p:childTnLst>
+                                </p:cTn>
+                              </p:par>
+                            </p:childTnLst>
+                          </p:cTn>
+                        </p:par>
+                      </p:childTnLst>
+                    </p:cTn>
+                  </p:par>
+                </p:childTnLst>
+              </p:cTn>
+              <p:nextCondLst>
+                <p:cond evt="onClick" delay="0">
+                  <p:tgtEl>
+                    <p:spTgt spid="7"/>
+                  </p:tgtEl>
+                </p:cond>
+              </p:nextCondLst>
+            </p:seq>
+            <p:video>
+              <p:cMediaNode>
+                <p:cTn id="7" fill="hold" display="0">
+                  <p:stCondLst>
+                    <p:cond delay="indefinite"/>
+                  </p:stCondLst>
+                </p:cTn>
+                <p:tgtEl>
+                  <p:spTgt spid="7"/>
+                </p:tgtEl>
+              </p:cMediaNode>
+            </p:video>
+          </p:childTnLst>
+        </p:cTn>
       </p:par>
     </p:tnLst>
   </p:timing>

</xml_diff>

<commit_message>
CSI1101 A2: finished password protection, todo choosing password
</commit_message>
<xml_diff>
--- a/year_1/sem_2/CSI1101_computer_security/0b_assignment_2_[22MAY15_0900]/dev/CSI1101_PONCE_A2_v01.pptx
+++ b/year_1/sem_2/CSI1101_computer_security/0b_assignment_2_[22MAY15_0900]/dev/CSI1101_PONCE_A2_v01.pptx
@@ -40,8 +40,21 @@
     <p:sldId id="292" r:id="rId34"/>
     <p:sldId id="293" r:id="rId35"/>
     <p:sldId id="294" r:id="rId36"/>
-    <p:sldId id="291" r:id="rId37"/>
-    <p:sldId id="272" r:id="rId38"/>
+    <p:sldId id="295" r:id="rId37"/>
+    <p:sldId id="296" r:id="rId38"/>
+    <p:sldId id="297" r:id="rId39"/>
+    <p:sldId id="301" r:id="rId40"/>
+    <p:sldId id="298" r:id="rId41"/>
+    <p:sldId id="299" r:id="rId42"/>
+    <p:sldId id="300" r:id="rId43"/>
+    <p:sldId id="304" r:id="rId44"/>
+    <p:sldId id="302" r:id="rId45"/>
+    <p:sldId id="303" r:id="rId46"/>
+    <p:sldId id="305" r:id="rId47"/>
+    <p:sldId id="306" r:id="rId48"/>
+    <p:sldId id="307" r:id="rId49"/>
+    <p:sldId id="291" r:id="rId50"/>
+    <p:sldId id="272" r:id="rId51"/>
   </p:sldIdLst>
   <p:sldSz cx="12192000" cy="6858000"/>
   <p:notesSz cx="6858000" cy="9144000"/>
@@ -3930,18 +3943,7 @@
                 <a:ea typeface="Open Sans" panose="020B0606030504020204" pitchFamily="34" charset="0"/>
                 <a:cs typeface="Open Sans" panose="020B0606030504020204" pitchFamily="34" charset="0"/>
               </a:rPr>
-              <a:t>. Windows 8.1, Microsoft’s latest version of </a:t>
-            </a:r>
-            <a:r>
-              <a:rPr lang="en-AU" sz="2600" dirty="0" smtClean="0">
-                <a:solidFill>
-                  <a:srgbClr val="EEEEEE"/>
-                </a:solidFill>
-                <a:latin typeface="Open Sans" panose="020B0606030504020204" pitchFamily="34" charset="0"/>
-                <a:ea typeface="Open Sans" panose="020B0606030504020204" pitchFamily="34" charset="0"/>
-                <a:cs typeface="Open Sans" panose="020B0606030504020204" pitchFamily="34" charset="0"/>
-              </a:rPr>
-              <a:t>Windows</a:t>
+              <a:t>. Windows 8.1, Microsoft’s latest version of Windows</a:t>
             </a:r>
           </a:p>
           <a:p>
@@ -3960,14 +3962,6 @@
               </a:rPr>
               <a:t>Install service packs and/or security updates for your new operating system</a:t>
             </a:r>
-            <a:endParaRPr lang="en-AU" sz="2600" dirty="0" smtClean="0">
-              <a:solidFill>
-                <a:srgbClr val="EEEEEE"/>
-              </a:solidFill>
-              <a:latin typeface="Open Sans" panose="020B0606030504020204" pitchFamily="34" charset="0"/>
-              <a:ea typeface="Open Sans" panose="020B0606030504020204" pitchFamily="34" charset="0"/>
-              <a:cs typeface="Open Sans" panose="020B0606030504020204" pitchFamily="34" charset="0"/>
-            </a:endParaRPr>
           </a:p>
         </p:txBody>
       </p:sp>
@@ -5232,7 +5226,7 @@
         <p:spPr>
           <a:xfrm>
             <a:off x="1524000" y="2790371"/>
-            <a:ext cx="9144000" cy="2092881"/>
+            <a:ext cx="9144000" cy="2492990"/>
           </a:xfrm>
           <a:prstGeom prst="rect">
             <a:avLst/>
@@ -5258,7 +5252,46 @@
                 <a:ea typeface="Open Sans" panose="020B0606030504020204" pitchFamily="34" charset="0"/>
                 <a:cs typeface="Open Sans" panose="020B0606030504020204" pitchFamily="34" charset="0"/>
               </a:rPr>
-              <a:t>Allows an attacker to include malicious code on removable media</a:t>
+              <a:t>A vulnerability in Windows </a:t>
+            </a:r>
+            <a:r>
+              <a:rPr lang="en-AU" sz="2600" dirty="0" smtClean="0">
+                <a:solidFill>
+                  <a:srgbClr val="EEEEEE"/>
+                </a:solidFill>
+                <a:latin typeface="Open Sans" panose="020B0606030504020204" pitchFamily="34" charset="0"/>
+                <a:ea typeface="Open Sans" panose="020B0606030504020204" pitchFamily="34" charset="0"/>
+                <a:cs typeface="Open Sans" panose="020B0606030504020204" pitchFamily="34" charset="0"/>
+              </a:rPr>
+              <a:t>Vista</a:t>
+            </a:r>
+          </a:p>
+          <a:p>
+            <a:pPr marL="285750" indent="-285750">
+              <a:buFont typeface="Arial" panose="020B0604020202020204" pitchFamily="34" charset="0"/>
+              <a:buChar char="•"/>
+            </a:pPr>
+            <a:r>
+              <a:rPr lang="en-AU" sz="2600" dirty="0" smtClean="0">
+                <a:solidFill>
+                  <a:srgbClr val="EEEEEE"/>
+                </a:solidFill>
+                <a:latin typeface="Open Sans" panose="020B0606030504020204" pitchFamily="34" charset="0"/>
+                <a:ea typeface="Open Sans" panose="020B0606030504020204" pitchFamily="34" charset="0"/>
+                <a:cs typeface="Open Sans" panose="020B0606030504020204" pitchFamily="34" charset="0"/>
+              </a:rPr>
+              <a:t>Allows </a:t>
+            </a:r>
+            <a:r>
+              <a:rPr lang="en-AU" sz="2600" dirty="0" smtClean="0">
+                <a:solidFill>
+                  <a:srgbClr val="EEEEEE"/>
+                </a:solidFill>
+                <a:latin typeface="Open Sans" panose="020B0606030504020204" pitchFamily="34" charset="0"/>
+                <a:ea typeface="Open Sans" panose="020B0606030504020204" pitchFamily="34" charset="0"/>
+                <a:cs typeface="Open Sans" panose="020B0606030504020204" pitchFamily="34" charset="0"/>
+              </a:rPr>
+              <a:t>an attacker to include malicious code on removable media</a:t>
             </a:r>
           </a:p>
           <a:p>
@@ -6419,18 +6452,7 @@
                 <a:ea typeface="Open Sans" panose="020B0606030504020204" pitchFamily="34" charset="0"/>
                 <a:cs typeface="Open Sans" panose="020B0606030504020204" pitchFamily="34" charset="0"/>
               </a:rPr>
-              <a:t>Active-X Control </a:t>
-            </a:r>
-            <a:r>
-              <a:rPr lang="en-AU" sz="3200" b="1" dirty="0" smtClean="0">
-                <a:solidFill>
-                  <a:srgbClr val="EEEEEE"/>
-                </a:solidFill>
-                <a:latin typeface="Open Sans" panose="020B0606030504020204" pitchFamily="34" charset="0"/>
-                <a:ea typeface="Open Sans" panose="020B0606030504020204" pitchFamily="34" charset="0"/>
-                <a:cs typeface="Open Sans" panose="020B0606030504020204" pitchFamily="34" charset="0"/>
-              </a:rPr>
-              <a:t>vulnerability</a:t>
+              <a:t>Active-X Control vulnerability</a:t>
             </a:r>
             <a:br>
               <a:rPr lang="en-AU" sz="3200" b="1" dirty="0" smtClean="0">
@@ -6452,19 +6474,7 @@
                 <a:cs typeface="Open Sans" panose="020B0606030504020204" pitchFamily="34" charset="0"/>
                 <a:hlinkClick r:id="rId2"/>
               </a:rPr>
-              <a:t>(Microsoft</a:t>
-            </a:r>
-            <a:r>
-              <a:rPr lang="en-AU" sz="3200" b="1" dirty="0" smtClean="0">
-                <a:solidFill>
-                  <a:srgbClr val="EEEEEE"/>
-                </a:solidFill>
-                <a:latin typeface="Open Sans" panose="020B0606030504020204" pitchFamily="34" charset="0"/>
-                <a:ea typeface="Open Sans" panose="020B0606030504020204" pitchFamily="34" charset="0"/>
-                <a:cs typeface="Open Sans" panose="020B0606030504020204" pitchFamily="34" charset="0"/>
-                <a:hlinkClick r:id="rId2"/>
-              </a:rPr>
-              <a:t>, 2013; </a:t>
+              <a:t>(Microsoft, 2013; </a:t>
             </a:r>
             <a:r>
               <a:rPr lang="en-AU" sz="3200" b="1" dirty="0" err="1" smtClean="0">
@@ -6607,18 +6617,7 @@
                 <a:ea typeface="Open Sans" panose="020B0606030504020204" pitchFamily="34" charset="0"/>
                 <a:cs typeface="Open Sans" panose="020B0606030504020204" pitchFamily="34" charset="0"/>
               </a:rPr>
-              <a:t>Internet Explorer </a:t>
-            </a:r>
-            <a:r>
-              <a:rPr lang="en-AU" sz="2600" b="1" dirty="0" smtClean="0">
-                <a:solidFill>
-                  <a:srgbClr val="EEEEEE"/>
-                </a:solidFill>
-                <a:latin typeface="Open Sans" panose="020B0606030504020204" pitchFamily="34" charset="0"/>
-                <a:ea typeface="Open Sans" panose="020B0606030504020204" pitchFamily="34" charset="0"/>
-                <a:cs typeface="Open Sans" panose="020B0606030504020204" pitchFamily="34" charset="0"/>
-              </a:rPr>
-              <a:t>7</a:t>
+              <a:t>Internet Explorer 7</a:t>
             </a:r>
           </a:p>
           <a:p>
@@ -6635,27 +6634,8 @@
                 <a:ea typeface="Open Sans" panose="020B0606030504020204" pitchFamily="34" charset="0"/>
                 <a:cs typeface="Open Sans" panose="020B0606030504020204" pitchFamily="34" charset="0"/>
               </a:rPr>
-              <a:t>Currently installed </a:t>
-            </a:r>
-            <a:r>
-              <a:rPr lang="en-AU" sz="2600" dirty="0" smtClean="0">
-                <a:solidFill>
-                  <a:srgbClr val="EEEEEE"/>
-                </a:solidFill>
-                <a:latin typeface="Open Sans" panose="020B0606030504020204" pitchFamily="34" charset="0"/>
-                <a:ea typeface="Open Sans" panose="020B0606030504020204" pitchFamily="34" charset="0"/>
-                <a:cs typeface="Open Sans" panose="020B0606030504020204" pitchFamily="34" charset="0"/>
-              </a:rPr>
-              <a:t>on Blue Ink’s computers</a:t>
-            </a:r>
-            <a:endParaRPr lang="en-AU" sz="2600" dirty="0" smtClean="0">
-              <a:solidFill>
-                <a:srgbClr val="EEEEEE"/>
-              </a:solidFill>
-              <a:latin typeface="Open Sans" panose="020B0606030504020204" pitchFamily="34" charset="0"/>
-              <a:ea typeface="Open Sans" panose="020B0606030504020204" pitchFamily="34" charset="0"/>
-              <a:cs typeface="Open Sans" panose="020B0606030504020204" pitchFamily="34" charset="0"/>
-            </a:endParaRPr>
+              <a:t>Currently installed on Blue Ink’s computers</a:t>
+            </a:r>
           </a:p>
           <a:p>
             <a:pPr marL="285750" indent="-285750">
@@ -7273,7 +7253,29 @@
                 <a:ea typeface="Open Sans" panose="020B0606030504020204" pitchFamily="34" charset="0"/>
                 <a:cs typeface="Open Sans" panose="020B0606030504020204" pitchFamily="34" charset="0"/>
               </a:rPr>
-              <a:t>So how can we fix it?</a:t>
+              <a:t>So how </a:t>
+            </a:r>
+            <a:r>
+              <a:rPr lang="en-AU" sz="4400" b="1" dirty="0" smtClean="0">
+                <a:solidFill>
+                  <a:srgbClr val="EEEEEE"/>
+                </a:solidFill>
+                <a:latin typeface="Open Sans" panose="020B0606030504020204" pitchFamily="34" charset="0"/>
+                <a:ea typeface="Open Sans" panose="020B0606030504020204" pitchFamily="34" charset="0"/>
+                <a:cs typeface="Open Sans" panose="020B0606030504020204" pitchFamily="34" charset="0"/>
+              </a:rPr>
+              <a:t>can </a:t>
+            </a:r>
+            <a:r>
+              <a:rPr lang="en-AU" sz="4400" b="1" dirty="0" smtClean="0">
+                <a:solidFill>
+                  <a:srgbClr val="EEEEEE"/>
+                </a:solidFill>
+                <a:latin typeface="Open Sans" panose="020B0606030504020204" pitchFamily="34" charset="0"/>
+                <a:ea typeface="Open Sans" panose="020B0606030504020204" pitchFamily="34" charset="0"/>
+                <a:cs typeface="Open Sans" panose="020B0606030504020204" pitchFamily="34" charset="0"/>
+              </a:rPr>
+              <a:t>we fix it?</a:t>
             </a:r>
             <a:endParaRPr lang="en-AU" sz="4400" dirty="0">
               <a:solidFill>
@@ -8406,14 +8408,6 @@
               </a:rPr>
               <a:t>Could have been installed through propagation of malware</a:t>
             </a:r>
-            <a:endParaRPr lang="en-AU" sz="2600" dirty="0" smtClean="0">
-              <a:solidFill>
-                <a:srgbClr val="EEEEEE"/>
-              </a:solidFill>
-              <a:latin typeface="Open Sans" panose="020B0606030504020204" pitchFamily="34" charset="0"/>
-              <a:ea typeface="Open Sans" panose="020B0606030504020204" pitchFamily="34" charset="0"/>
-              <a:cs typeface="Open Sans" panose="020B0606030504020204" pitchFamily="34" charset="0"/>
-            </a:endParaRPr>
           </a:p>
         </p:txBody>
       </p:sp>
@@ -8732,14 +8726,6 @@
               </a:rPr>
               <a:t>The browser points to the location of the html file and supporting image file </a:t>
             </a:r>
-            <a:endParaRPr lang="en-AU" sz="2600" dirty="0" smtClean="0">
-              <a:solidFill>
-                <a:srgbClr val="EEEEEE"/>
-              </a:solidFill>
-              <a:latin typeface="Open Sans" panose="020B0606030504020204" pitchFamily="34" charset="0"/>
-              <a:ea typeface="Open Sans" panose="020B0606030504020204" pitchFamily="34" charset="0"/>
-              <a:cs typeface="Open Sans" panose="020B0606030504020204" pitchFamily="34" charset="0"/>
-            </a:endParaRPr>
           </a:p>
         </p:txBody>
       </p:sp>
@@ -8853,7 +8839,7 @@
                 <a:ea typeface="Open Sans" panose="020B0606030504020204" pitchFamily="34" charset="0"/>
                 <a:cs typeface="Open Sans" panose="020B0606030504020204" pitchFamily="34" charset="0"/>
               </a:rPr>
-              <a:t>So h</a:t>
+              <a:t>So how </a:t>
             </a:r>
             <a:r>
               <a:rPr lang="en-AU" sz="4400" b="1" dirty="0" smtClean="0">
@@ -8864,7 +8850,29 @@
                 <a:ea typeface="Open Sans" panose="020B0606030504020204" pitchFamily="34" charset="0"/>
                 <a:cs typeface="Open Sans" panose="020B0606030504020204" pitchFamily="34" charset="0"/>
               </a:rPr>
-              <a:t>ow do we fix it?</a:t>
+              <a:t>can</a:t>
+            </a:r>
+            <a:r>
+              <a:rPr lang="en-AU" sz="4400" b="1" dirty="0" smtClean="0">
+                <a:solidFill>
+                  <a:srgbClr val="EEEEEE"/>
+                </a:solidFill>
+                <a:latin typeface="Open Sans" panose="020B0606030504020204" pitchFamily="34" charset="0"/>
+                <a:ea typeface="Open Sans" panose="020B0606030504020204" pitchFamily="34" charset="0"/>
+                <a:cs typeface="Open Sans" panose="020B0606030504020204" pitchFamily="34" charset="0"/>
+              </a:rPr>
+              <a:t> </a:t>
+            </a:r>
+            <a:r>
+              <a:rPr lang="en-AU" sz="4400" b="1" dirty="0" smtClean="0">
+                <a:solidFill>
+                  <a:srgbClr val="EEEEEE"/>
+                </a:solidFill>
+                <a:latin typeface="Open Sans" panose="020B0606030504020204" pitchFamily="34" charset="0"/>
+                <a:ea typeface="Open Sans" panose="020B0606030504020204" pitchFamily="34" charset="0"/>
+                <a:cs typeface="Open Sans" panose="020B0606030504020204" pitchFamily="34" charset="0"/>
+              </a:rPr>
+              <a:t>we fix it?</a:t>
             </a:r>
             <a:endParaRPr lang="en-AU" sz="3200" dirty="0">
               <a:solidFill>
@@ -9025,14 +9033,6 @@
               </a:rPr>
               <a:t>Or stick with Windows Defender</a:t>
             </a:r>
-            <a:endParaRPr lang="en-AU" sz="2600" dirty="0" smtClean="0">
-              <a:solidFill>
-                <a:srgbClr val="EEEEEE"/>
-              </a:solidFill>
-              <a:latin typeface="Open Sans" panose="020B0606030504020204" pitchFamily="34" charset="0"/>
-              <a:ea typeface="Open Sans" panose="020B0606030504020204" pitchFamily="34" charset="0"/>
-              <a:cs typeface="Open Sans" panose="020B0606030504020204" pitchFamily="34" charset="0"/>
-            </a:endParaRPr>
           </a:p>
         </p:txBody>
       </p:sp>
@@ -9176,18 +9176,7 @@
                 <a:ea typeface="Open Sans" panose="020B0606030504020204" pitchFamily="34" charset="0"/>
                 <a:cs typeface="Open Sans" panose="020B0606030504020204" pitchFamily="34" charset="0"/>
               </a:rPr>
-              <a:t>Some a</a:t>
-            </a:r>
-            <a:r>
-              <a:rPr lang="en-AU" sz="4400" b="1" dirty="0" smtClean="0">
-                <a:solidFill>
-                  <a:srgbClr val="EEEEEE"/>
-                </a:solidFill>
-                <a:latin typeface="Open Sans" panose="020B0606030504020204" pitchFamily="34" charset="0"/>
-                <a:ea typeface="Open Sans" panose="020B0606030504020204" pitchFamily="34" charset="0"/>
-                <a:cs typeface="Open Sans" panose="020B0606030504020204" pitchFamily="34" charset="0"/>
-              </a:rPr>
-              <a:t>nti-virus suggestions…</a:t>
+              <a:t>Some anti-virus suggestions…</a:t>
             </a:r>
             <a:endParaRPr lang="en-AU" sz="2800" dirty="0">
               <a:solidFill>
@@ -9348,19 +9337,7 @@
                 <a:cs typeface="Open Sans" panose="020B0606030504020204" pitchFamily="34" charset="0"/>
                 <a:hlinkClick r:id="rId4"/>
               </a:rPr>
-              <a:t>Kas</a:t>
-            </a:r>
-            <a:r>
-              <a:rPr lang="en-AU" sz="2600" dirty="0" smtClean="0">
-                <a:solidFill>
-                  <a:srgbClr val="EEEEEE"/>
-                </a:solidFill>
-                <a:latin typeface="Open Sans" panose="020B0606030504020204" pitchFamily="34" charset="0"/>
-                <a:ea typeface="Open Sans" panose="020B0606030504020204" pitchFamily="34" charset="0"/>
-                <a:cs typeface="Open Sans" panose="020B0606030504020204" pitchFamily="34" charset="0"/>
-                <a:hlinkClick r:id="rId4"/>
-              </a:rPr>
-              <a:t>persky Business</a:t>
+              <a:t>Kaspersky Business</a:t>
             </a:r>
             <a:endParaRPr lang="en-AU" sz="2600" dirty="0" smtClean="0">
               <a:solidFill>
@@ -10022,17 +9999,6 @@
               </a:rPr>
               <a:t>CVE-2014-1522</a:t>
             </a:r>
-            <a:r>
-              <a:rPr lang="en-AU" sz="4400" b="1" dirty="0" smtClean="0">
-                <a:solidFill>
-                  <a:srgbClr val="EEEEEE"/>
-                </a:solidFill>
-                <a:latin typeface="Open Sans" panose="020B0606030504020204" pitchFamily="34" charset="0"/>
-                <a:ea typeface="Open Sans" panose="020B0606030504020204" pitchFamily="34" charset="0"/>
-                <a:cs typeface="Open Sans" panose="020B0606030504020204" pitchFamily="34" charset="0"/>
-              </a:rPr>
-              <a:t/>
-            </a:r>
             <a:br>
               <a:rPr lang="en-AU" sz="4400" b="1" dirty="0" smtClean="0">
                 <a:solidFill>
@@ -10253,14 +10219,6 @@
               </a:rPr>
               <a:t>Or cause denial-of-service conditions</a:t>
             </a:r>
-            <a:endParaRPr lang="en-AU" sz="2600" dirty="0" smtClean="0">
-              <a:solidFill>
-                <a:srgbClr val="EEEEEE"/>
-              </a:solidFill>
-              <a:latin typeface="Open Sans" panose="020B0606030504020204" pitchFamily="34" charset="0"/>
-              <a:ea typeface="Open Sans" panose="020B0606030504020204" pitchFamily="34" charset="0"/>
-              <a:cs typeface="Open Sans" panose="020B0606030504020204" pitchFamily="34" charset="0"/>
-            </a:endParaRPr>
           </a:p>
         </p:txBody>
       </p:sp>
@@ -10346,17 +10304,6 @@
               </a:rPr>
               <a:t>CVE-2009-3959</a:t>
             </a:r>
-            <a:r>
-              <a:rPr lang="en-AU" sz="4400" b="1" dirty="0" smtClean="0">
-                <a:solidFill>
-                  <a:srgbClr val="EEEEEE"/>
-                </a:solidFill>
-                <a:latin typeface="Open Sans" panose="020B0606030504020204" pitchFamily="34" charset="0"/>
-                <a:ea typeface="Open Sans" panose="020B0606030504020204" pitchFamily="34" charset="0"/>
-                <a:cs typeface="Open Sans" panose="020B0606030504020204" pitchFamily="34" charset="0"/>
-              </a:rPr>
-              <a:t/>
-            </a:r>
             <a:br>
               <a:rPr lang="en-AU" sz="4400" b="1" dirty="0" smtClean="0">
                 <a:solidFill>
@@ -10400,31 +10347,7 @@
                 <a:cs typeface="Open Sans" panose="020B0606030504020204" pitchFamily="34" charset="0"/>
                 <a:hlinkClick r:id="rId3"/>
               </a:rPr>
-              <a:t>SecurityTracker</a:t>
-            </a:r>
-            <a:r>
-              <a:rPr lang="en-AU" sz="3200" b="1" dirty="0" smtClean="0">
-                <a:solidFill>
-                  <a:srgbClr val="EEEEEE"/>
-                </a:solidFill>
-                <a:latin typeface="Open Sans" panose="020B0606030504020204" pitchFamily="34" charset="0"/>
-                <a:ea typeface="Open Sans" panose="020B0606030504020204" pitchFamily="34" charset="0"/>
-                <a:cs typeface="Open Sans" panose="020B0606030504020204" pitchFamily="34" charset="0"/>
-                <a:hlinkClick r:id="rId3"/>
-              </a:rPr>
-              <a:t>, 2010</a:t>
-            </a:r>
-            <a:r>
-              <a:rPr lang="en-AU" sz="3200" b="1" dirty="0" smtClean="0">
-                <a:solidFill>
-                  <a:srgbClr val="EEEEEE"/>
-                </a:solidFill>
-                <a:latin typeface="Open Sans" panose="020B0606030504020204" pitchFamily="34" charset="0"/>
-                <a:ea typeface="Open Sans" panose="020B0606030504020204" pitchFamily="34" charset="0"/>
-                <a:cs typeface="Open Sans" panose="020B0606030504020204" pitchFamily="34" charset="0"/>
-                <a:hlinkClick r:id="rId3"/>
-              </a:rPr>
-              <a:t>)</a:t>
+              <a:t>SecurityTracker, 2010)</a:t>
             </a:r>
             <a:endParaRPr lang="en-AU" sz="3200" dirty="0">
               <a:solidFill>
@@ -10613,14 +10536,6 @@
               </a:rPr>
               <a:t>Or cause denial-of-service conditions</a:t>
             </a:r>
-            <a:endParaRPr lang="en-AU" sz="2600" dirty="0" smtClean="0">
-              <a:solidFill>
-                <a:srgbClr val="EEEEEE"/>
-              </a:solidFill>
-              <a:latin typeface="Open Sans" panose="020B0606030504020204" pitchFamily="34" charset="0"/>
-              <a:ea typeface="Open Sans" panose="020B0606030504020204" pitchFamily="34" charset="0"/>
-              <a:cs typeface="Open Sans" panose="020B0606030504020204" pitchFamily="34" charset="0"/>
-            </a:endParaRPr>
           </a:p>
         </p:txBody>
       </p:sp>
@@ -10706,17 +10621,6 @@
               </a:rPr>
               <a:t>CVE-2006-2198</a:t>
             </a:r>
-            <a:r>
-              <a:rPr lang="en-AU" sz="4400" b="1" dirty="0" smtClean="0">
-                <a:solidFill>
-                  <a:srgbClr val="EEEEEE"/>
-                </a:solidFill>
-                <a:latin typeface="Open Sans" panose="020B0606030504020204" pitchFamily="34" charset="0"/>
-                <a:ea typeface="Open Sans" panose="020B0606030504020204" pitchFamily="34" charset="0"/>
-                <a:cs typeface="Open Sans" panose="020B0606030504020204" pitchFamily="34" charset="0"/>
-              </a:rPr>
-              <a:t/>
-            </a:r>
             <a:br>
               <a:rPr lang="en-AU" sz="4400" b="1" dirty="0" smtClean="0">
                 <a:solidFill>
@@ -10947,14 +10851,6 @@
               </a:rPr>
               <a:t>Macro executes even if macros are disabled</a:t>
             </a:r>
-            <a:endParaRPr lang="en-AU" sz="2600" dirty="0" smtClean="0">
-              <a:solidFill>
-                <a:srgbClr val="EEEEEE"/>
-              </a:solidFill>
-              <a:latin typeface="Open Sans" panose="020B0606030504020204" pitchFamily="34" charset="0"/>
-              <a:ea typeface="Open Sans" panose="020B0606030504020204" pitchFamily="34" charset="0"/>
-              <a:cs typeface="Open Sans" panose="020B0606030504020204" pitchFamily="34" charset="0"/>
-            </a:endParaRPr>
           </a:p>
         </p:txBody>
       </p:sp>
@@ -11037,7 +10933,29 @@
                 <a:ea typeface="Open Sans" panose="020B0606030504020204" pitchFamily="34" charset="0"/>
                 <a:cs typeface="Open Sans" panose="020B0606030504020204" pitchFamily="34" charset="0"/>
               </a:rPr>
-              <a:t>So how can we fix it?</a:t>
+              <a:t>So how </a:t>
+            </a:r>
+            <a:r>
+              <a:rPr lang="en-AU" sz="4400" b="1" dirty="0" smtClean="0">
+                <a:solidFill>
+                  <a:srgbClr val="EEEEEE"/>
+                </a:solidFill>
+                <a:latin typeface="Open Sans" panose="020B0606030504020204" pitchFamily="34" charset="0"/>
+                <a:ea typeface="Open Sans" panose="020B0606030504020204" pitchFamily="34" charset="0"/>
+                <a:cs typeface="Open Sans" panose="020B0606030504020204" pitchFamily="34" charset="0"/>
+              </a:rPr>
+              <a:t>can </a:t>
+            </a:r>
+            <a:r>
+              <a:rPr lang="en-AU" sz="4400" b="1" dirty="0" smtClean="0">
+                <a:solidFill>
+                  <a:srgbClr val="EEEEEE"/>
+                </a:solidFill>
+                <a:latin typeface="Open Sans" panose="020B0606030504020204" pitchFamily="34" charset="0"/>
+                <a:ea typeface="Open Sans" panose="020B0606030504020204" pitchFamily="34" charset="0"/>
+                <a:cs typeface="Open Sans" panose="020B0606030504020204" pitchFamily="34" charset="0"/>
+              </a:rPr>
+              <a:t>we fix it?</a:t>
             </a:r>
             <a:br>
               <a:rPr lang="en-AU" sz="4400" b="1" dirty="0" smtClean="0">
@@ -11206,14 +11124,6 @@
               </a:rPr>
               <a:t>In order to mitigate as many vulnerabilities as possible, it is important to install updates to programs regularly</a:t>
             </a:r>
-            <a:endParaRPr lang="en-AU" sz="2600" dirty="0" smtClean="0">
-              <a:solidFill>
-                <a:srgbClr val="EEEEEE"/>
-              </a:solidFill>
-              <a:latin typeface="Open Sans" panose="020B0606030504020204" pitchFamily="34" charset="0"/>
-              <a:ea typeface="Open Sans" panose="020B0606030504020204" pitchFamily="34" charset="0"/>
-              <a:cs typeface="Open Sans" panose="020B0606030504020204" pitchFamily="34" charset="0"/>
-            </a:endParaRPr>
           </a:p>
         </p:txBody>
       </p:sp>
@@ -12488,8 +12398,11 @@
                 <a:ea typeface="Open Sans" panose="020B0606030504020204" pitchFamily="34" charset="0"/>
                 <a:cs typeface="Open Sans" panose="020B0606030504020204" pitchFamily="34" charset="0"/>
               </a:rPr>
-              <a:t>* Adobe Reader 10.1.4 is latest version that supports legacy OS like</a:t>
-            </a:r>
+              <a:t>* Adobe Reader 10.1.4 is latest version that supports legacy OS like Vista.</a:t>
+            </a:r>
+          </a:p>
+          <a:p>
+            <a:pPr algn="ctr"/>
             <a:r>
               <a:rPr lang="en-AU" dirty="0" smtClean="0">
                 <a:solidFill>
@@ -12499,52 +12412,8 @@
                 <a:ea typeface="Open Sans" panose="020B0606030504020204" pitchFamily="34" charset="0"/>
                 <a:cs typeface="Open Sans" panose="020B0606030504020204" pitchFamily="34" charset="0"/>
               </a:rPr>
-              <a:t> </a:t>
-            </a:r>
-            <a:r>
-              <a:rPr lang="en-AU" dirty="0" smtClean="0">
-                <a:solidFill>
-                  <a:srgbClr val="EEEEEE"/>
-                </a:solidFill>
-                <a:latin typeface="Open Sans" panose="020B0606030504020204" pitchFamily="34" charset="0"/>
-                <a:ea typeface="Open Sans" panose="020B0606030504020204" pitchFamily="34" charset="0"/>
-                <a:cs typeface="Open Sans" panose="020B0606030504020204" pitchFamily="34" charset="0"/>
-              </a:rPr>
-              <a:t>Vista</a:t>
-            </a:r>
-            <a:r>
-              <a:rPr lang="en-AU" dirty="0" smtClean="0">
-                <a:solidFill>
-                  <a:srgbClr val="EEEEEE"/>
-                </a:solidFill>
-                <a:latin typeface="Open Sans" panose="020B0606030504020204" pitchFamily="34" charset="0"/>
-                <a:ea typeface="Open Sans" panose="020B0606030504020204" pitchFamily="34" charset="0"/>
-                <a:cs typeface="Open Sans" panose="020B0606030504020204" pitchFamily="34" charset="0"/>
-              </a:rPr>
-              <a:t>.</a:t>
-            </a:r>
-          </a:p>
-          <a:p>
-            <a:pPr algn="ctr"/>
-            <a:r>
-              <a:rPr lang="en-AU" dirty="0" smtClean="0">
-                <a:solidFill>
-                  <a:srgbClr val="EEEEEE"/>
-                </a:solidFill>
-                <a:latin typeface="Open Sans" panose="020B0606030504020204" pitchFamily="34" charset="0"/>
-                <a:ea typeface="Open Sans" panose="020B0606030504020204" pitchFamily="34" charset="0"/>
-                <a:cs typeface="Open Sans" panose="020B0606030504020204" pitchFamily="34" charset="0"/>
-              </a:rPr>
               <a:t>Later versions of Adobe Reader no longer support Vista.</a:t>
             </a:r>
-            <a:endParaRPr lang="en-AU" dirty="0" smtClean="0">
-              <a:solidFill>
-                <a:srgbClr val="EEEEEE"/>
-              </a:solidFill>
-              <a:latin typeface="Open Sans" panose="020B0606030504020204" pitchFamily="34" charset="0"/>
-              <a:ea typeface="Open Sans" panose="020B0606030504020204" pitchFamily="34" charset="0"/>
-              <a:cs typeface="Open Sans" panose="020B0606030504020204" pitchFamily="34" charset="0"/>
-            </a:endParaRPr>
           </a:p>
           <a:p>
             <a:pPr algn="ctr"/>
@@ -12570,14 +12439,6 @@
               </a:rPr>
               <a:t>Click the latest version number to view the download page.</a:t>
             </a:r>
-            <a:endParaRPr lang="en-AU" sz="2000" dirty="0" smtClean="0">
-              <a:solidFill>
-                <a:srgbClr val="EEEEEE"/>
-              </a:solidFill>
-              <a:latin typeface="Open Sans" panose="020B0606030504020204" pitchFamily="34" charset="0"/>
-              <a:ea typeface="Open Sans" panose="020B0606030504020204" pitchFamily="34" charset="0"/>
-              <a:cs typeface="Open Sans" panose="020B0606030504020204" pitchFamily="34" charset="0"/>
-            </a:endParaRPr>
           </a:p>
         </p:txBody>
       </p:sp>
@@ -12874,6 +12735,2845 @@
 </file>
 
 <file path=ppt/slides/slide36.xml><?xml version="1.0" encoding="utf-8"?>
+<p:sld xmlns:a="http://schemas.openxmlformats.org/drawingml/2006/main" xmlns:r="http://schemas.openxmlformats.org/officeDocument/2006/relationships" xmlns:p="http://schemas.openxmlformats.org/presentationml/2006/main">
+  <p:cSld>
+    <p:bg>
+      <p:bgPr>
+        <a:solidFill>
+          <a:srgbClr val="111111"/>
+        </a:solidFill>
+        <a:effectLst/>
+      </p:bgPr>
+    </p:bg>
+    <p:spTree>
+      <p:nvGrpSpPr>
+        <p:cNvPr id="1" name=""/>
+        <p:cNvGrpSpPr/>
+        <p:nvPr/>
+      </p:nvGrpSpPr>
+      <p:grpSpPr>
+        <a:xfrm>
+          <a:off x="0" y="0"/>
+          <a:ext cx="0" cy="0"/>
+          <a:chOff x="0" y="0"/>
+          <a:chExt cx="0" cy="0"/>
+        </a:xfrm>
+      </p:grpSpPr>
+      <p:sp>
+        <p:nvSpPr>
+          <p:cNvPr id="4" name="Title 3"/>
+          <p:cNvSpPr>
+            <a:spLocks noGrp="1"/>
+          </p:cNvSpPr>
+          <p:nvPr>
+            <p:ph type="ctrTitle"/>
+          </p:nvPr>
+        </p:nvSpPr>
+        <p:spPr>
+          <a:xfrm>
+            <a:off x="1524000" y="0"/>
+            <a:ext cx="9144000" cy="6858000"/>
+          </a:xfrm>
+        </p:spPr>
+        <p:txBody>
+          <a:bodyPr anchor="ctr">
+            <a:normAutofit/>
+          </a:bodyPr>
+          <a:lstStyle/>
+          <a:p>
+            <a:r>
+              <a:rPr lang="en-AU" sz="9600" b="1" dirty="0" smtClean="0">
+                <a:solidFill>
+                  <a:srgbClr val="EEEEEE"/>
+                </a:solidFill>
+                <a:latin typeface="Open Sans" panose="020B0606030504020204" pitchFamily="34" charset="0"/>
+                <a:ea typeface="Open Sans" panose="020B0606030504020204" pitchFamily="34" charset="0"/>
+                <a:cs typeface="Open Sans" panose="020B0606030504020204" pitchFamily="34" charset="0"/>
+              </a:rPr>
+              <a:t>User practices</a:t>
+            </a:r>
+            <a:endParaRPr lang="en-AU" sz="9600" b="1" dirty="0">
+              <a:solidFill>
+                <a:srgbClr val="EEEEEE"/>
+              </a:solidFill>
+              <a:latin typeface="Open Sans" panose="020B0606030504020204" pitchFamily="34" charset="0"/>
+              <a:ea typeface="Open Sans" panose="020B0606030504020204" pitchFamily="34" charset="0"/>
+              <a:cs typeface="Open Sans" panose="020B0606030504020204" pitchFamily="34" charset="0"/>
+            </a:endParaRPr>
+          </a:p>
+        </p:txBody>
+      </p:sp>
+    </p:spTree>
+    <p:extLst>
+      <p:ext uri="{BB962C8B-B14F-4D97-AF65-F5344CB8AC3E}">
+        <p14:creationId xmlns:p14="http://schemas.microsoft.com/office/powerpoint/2010/main" val="1922387779"/>
+      </p:ext>
+    </p:extLst>
+  </p:cSld>
+  <p:clrMapOvr>
+    <a:masterClrMapping/>
+  </p:clrMapOvr>
+  <p:transition spd="slow">
+    <p:push/>
+  </p:transition>
+  <p:timing>
+    <p:tnLst>
+      <p:par>
+        <p:cTn id="1" dur="indefinite" restart="never" nodeType="tmRoot"/>
+      </p:par>
+    </p:tnLst>
+  </p:timing>
+</p:sld>
+</file>
+
+<file path=ppt/slides/slide37.xml><?xml version="1.0" encoding="utf-8"?>
+<p:sld xmlns:a="http://schemas.openxmlformats.org/drawingml/2006/main" xmlns:r="http://schemas.openxmlformats.org/officeDocument/2006/relationships" xmlns:p="http://schemas.openxmlformats.org/presentationml/2006/main">
+  <p:cSld>
+    <p:bg>
+      <p:bgPr>
+        <a:solidFill>
+          <a:srgbClr val="111111"/>
+        </a:solidFill>
+        <a:effectLst/>
+      </p:bgPr>
+    </p:bg>
+    <p:spTree>
+      <p:nvGrpSpPr>
+        <p:cNvPr id="1" name=""/>
+        <p:cNvGrpSpPr/>
+        <p:nvPr/>
+      </p:nvGrpSpPr>
+      <p:grpSpPr>
+        <a:xfrm>
+          <a:off x="0" y="0"/>
+          <a:ext cx="0" cy="0"/>
+          <a:chOff x="0" y="0"/>
+          <a:chExt cx="0" cy="0"/>
+        </a:xfrm>
+      </p:grpSpPr>
+      <p:sp>
+        <p:nvSpPr>
+          <p:cNvPr id="4" name="Title 3"/>
+          <p:cNvSpPr>
+            <a:spLocks noGrp="1"/>
+          </p:cNvSpPr>
+          <p:nvPr>
+            <p:ph type="ctrTitle"/>
+          </p:nvPr>
+        </p:nvSpPr>
+        <p:spPr>
+          <a:xfrm>
+            <a:off x="1524000" y="-1470455"/>
+            <a:ext cx="9144000" cy="2917370"/>
+          </a:xfrm>
+        </p:spPr>
+        <p:txBody>
+          <a:bodyPr anchor="b">
+            <a:normAutofit/>
+          </a:bodyPr>
+          <a:lstStyle/>
+          <a:p>
+            <a:pPr algn="l"/>
+            <a:r>
+              <a:rPr lang="en-AU" sz="4400" b="1" dirty="0" smtClean="0">
+                <a:solidFill>
+                  <a:srgbClr val="EEEEEE"/>
+                </a:solidFill>
+                <a:latin typeface="Open Sans" panose="020B0606030504020204" pitchFamily="34" charset="0"/>
+                <a:ea typeface="Open Sans" panose="020B0606030504020204" pitchFamily="34" charset="0"/>
+                <a:cs typeface="Open Sans" panose="020B0606030504020204" pitchFamily="34" charset="0"/>
+              </a:rPr>
+              <a:t>Password protection</a:t>
+            </a:r>
+            <a:endParaRPr lang="en-AU" sz="3200" dirty="0">
+              <a:solidFill>
+                <a:srgbClr val="EEEEEE"/>
+              </a:solidFill>
+              <a:latin typeface="Open Sans" panose="020B0606030504020204" pitchFamily="34" charset="0"/>
+              <a:ea typeface="Open Sans" panose="020B0606030504020204" pitchFamily="34" charset="0"/>
+              <a:cs typeface="Open Sans" panose="020B0606030504020204" pitchFamily="34" charset="0"/>
+            </a:endParaRPr>
+          </a:p>
+        </p:txBody>
+      </p:sp>
+      <p:sp>
+        <p:nvSpPr>
+          <p:cNvPr id="6" name="Title 3"/>
+          <p:cNvSpPr txBox="1">
+            <a:spLocks/>
+          </p:cNvSpPr>
+          <p:nvPr/>
+        </p:nvSpPr>
+        <p:spPr>
+          <a:xfrm>
+            <a:off x="1524001" y="1446915"/>
+            <a:ext cx="9144000" cy="511630"/>
+          </a:xfrm>
+          <a:prstGeom prst="rect">
+            <a:avLst/>
+          </a:prstGeom>
+        </p:spPr>
+        <p:txBody>
+          <a:bodyPr vert="horz" lIns="91440" tIns="45720" rIns="91440" bIns="45720" rtlCol="0" anchor="t">
+            <a:normAutofit lnSpcReduction="10000"/>
+          </a:bodyPr>
+          <a:lstStyle>
+            <a:lvl1pPr algn="ctr" defTabSz="914400" rtl="0" eaLnBrk="1" latinLnBrk="0" hangingPunct="1">
+              <a:lnSpc>
+                <a:spcPct val="90000"/>
+              </a:lnSpc>
+              <a:spcBef>
+                <a:spcPct val="0"/>
+              </a:spcBef>
+              <a:buNone/>
+              <a:defRPr sz="6000" kern="1200">
+                <a:solidFill>
+                  <a:schemeClr val="tx1"/>
+                </a:solidFill>
+                <a:latin typeface="+mj-lt"/>
+                <a:ea typeface="+mj-ea"/>
+                <a:cs typeface="+mj-cs"/>
+              </a:defRPr>
+            </a:lvl1pPr>
+          </a:lstStyle>
+          <a:p>
+            <a:pPr algn="l">
+              <a:lnSpc>
+                <a:spcPct val="100000"/>
+              </a:lnSpc>
+            </a:pPr>
+            <a:r>
+              <a:rPr lang="en-AU" sz="2800" dirty="0" smtClean="0">
+                <a:solidFill>
+                  <a:srgbClr val="111111"/>
+                </a:solidFill>
+                <a:latin typeface="Open Sans" panose="020B0606030504020204" pitchFamily="34" charset="0"/>
+                <a:ea typeface="Open Sans" panose="020B0606030504020204" pitchFamily="34" charset="0"/>
+                <a:cs typeface="Open Sans" panose="020B0606030504020204" pitchFamily="34" charset="0"/>
+              </a:rPr>
+              <a:t>separator</a:t>
+            </a:r>
+          </a:p>
+        </p:txBody>
+      </p:sp>
+      <p:sp>
+        <p:nvSpPr>
+          <p:cNvPr id="2" name="TextBox 1"/>
+          <p:cNvSpPr txBox="1"/>
+          <p:nvPr/>
+        </p:nvSpPr>
+        <p:spPr>
+          <a:xfrm>
+            <a:off x="1524000" y="1958544"/>
+            <a:ext cx="9144000" cy="3293209"/>
+          </a:xfrm>
+          <a:prstGeom prst="rect">
+            <a:avLst/>
+          </a:prstGeom>
+          <a:noFill/>
+        </p:spPr>
+        <p:txBody>
+          <a:bodyPr wrap="square" rtlCol="0">
+            <a:spAutoFit/>
+          </a:bodyPr>
+          <a:lstStyle/>
+          <a:p>
+            <a:pPr marL="285750" indent="-285750">
+              <a:buFont typeface="Arial" panose="020B0604020202020204" pitchFamily="34" charset="0"/>
+              <a:buChar char="•"/>
+            </a:pPr>
+            <a:r>
+              <a:rPr lang="en-AU" sz="2600" dirty="0" smtClean="0">
+                <a:solidFill>
+                  <a:srgbClr val="EEEEEE"/>
+                </a:solidFill>
+                <a:latin typeface="Open Sans" panose="020B0606030504020204" pitchFamily="34" charset="0"/>
+                <a:ea typeface="Open Sans" panose="020B0606030504020204" pitchFamily="34" charset="0"/>
+                <a:cs typeface="Open Sans" panose="020B0606030504020204" pitchFamily="34" charset="0"/>
+              </a:rPr>
+              <a:t>Blue Ink’s computers automatically log into the user “gree</a:t>
+            </a:r>
+            <a:r>
+              <a:rPr lang="en-AU" sz="2600" dirty="0" smtClean="0">
+                <a:solidFill>
+                  <a:srgbClr val="EEEEEE"/>
+                </a:solidFill>
+                <a:latin typeface="Open Sans" panose="020B0606030504020204" pitchFamily="34" charset="0"/>
+                <a:ea typeface="Open Sans" panose="020B0606030504020204" pitchFamily="34" charset="0"/>
+                <a:cs typeface="Open Sans" panose="020B0606030504020204" pitchFamily="34" charset="0"/>
+              </a:rPr>
+              <a:t>n” account without authentication</a:t>
+            </a:r>
+          </a:p>
+          <a:p>
+            <a:pPr marL="285750" indent="-285750">
+              <a:buFont typeface="Arial" panose="020B0604020202020204" pitchFamily="34" charset="0"/>
+              <a:buChar char="•"/>
+            </a:pPr>
+            <a:r>
+              <a:rPr lang="en-AU" sz="2600" dirty="0" smtClean="0">
+                <a:solidFill>
+                  <a:srgbClr val="EEEEEE"/>
+                </a:solidFill>
+                <a:latin typeface="Open Sans" panose="020B0606030504020204" pitchFamily="34" charset="0"/>
+                <a:ea typeface="Open Sans" panose="020B0606030504020204" pitchFamily="34" charset="0"/>
+                <a:cs typeface="Open Sans" panose="020B0606030504020204" pitchFamily="34" charset="0"/>
+              </a:rPr>
+              <a:t>The screensaver is also not password protected</a:t>
+            </a:r>
+          </a:p>
+          <a:p>
+            <a:pPr marL="285750" indent="-285750">
+              <a:buFont typeface="Arial" panose="020B0604020202020204" pitchFamily="34" charset="0"/>
+              <a:buChar char="•"/>
+            </a:pPr>
+            <a:r>
+              <a:rPr lang="en-AU" sz="2600" dirty="0" smtClean="0">
+                <a:solidFill>
+                  <a:srgbClr val="EEEEEE"/>
+                </a:solidFill>
+                <a:latin typeface="Open Sans" panose="020B0606030504020204" pitchFamily="34" charset="0"/>
+                <a:ea typeface="Open Sans" panose="020B0606030504020204" pitchFamily="34" charset="0"/>
+                <a:cs typeface="Open Sans" panose="020B0606030504020204" pitchFamily="34" charset="0"/>
+              </a:rPr>
+              <a:t>This would allow an attacker to gain access to Blue Ink’s computers and network resources by simply</a:t>
+            </a:r>
+          </a:p>
+          <a:p>
+            <a:pPr marL="742950" lvl="1" indent="-285750">
+              <a:buFont typeface="Arial" panose="020B0604020202020204" pitchFamily="34" charset="0"/>
+              <a:buChar char="•"/>
+            </a:pPr>
+            <a:r>
+              <a:rPr lang="en-AU" sz="2600" dirty="0" smtClean="0">
+                <a:solidFill>
+                  <a:srgbClr val="EEEEEE"/>
+                </a:solidFill>
+                <a:latin typeface="Open Sans" panose="020B0606030504020204" pitchFamily="34" charset="0"/>
+                <a:ea typeface="Open Sans" panose="020B0606030504020204" pitchFamily="34" charset="0"/>
+                <a:cs typeface="Open Sans" panose="020B0606030504020204" pitchFamily="34" charset="0"/>
+              </a:rPr>
+              <a:t>Turning on the computer</a:t>
+            </a:r>
+          </a:p>
+          <a:p>
+            <a:pPr marL="742950" lvl="1" indent="-285750">
+              <a:buFont typeface="Arial" panose="020B0604020202020204" pitchFamily="34" charset="0"/>
+              <a:buChar char="•"/>
+            </a:pPr>
+            <a:r>
+              <a:rPr lang="en-AU" sz="2600" dirty="0" smtClean="0">
+                <a:solidFill>
+                  <a:srgbClr val="EEEEEE"/>
+                </a:solidFill>
+                <a:latin typeface="Open Sans" panose="020B0606030504020204" pitchFamily="34" charset="0"/>
+                <a:ea typeface="Open Sans" panose="020B0606030504020204" pitchFamily="34" charset="0"/>
+                <a:cs typeface="Open Sans" panose="020B0606030504020204" pitchFamily="34" charset="0"/>
+              </a:rPr>
+              <a:t>Use the computer while the victim was not at his/her desk</a:t>
+            </a:r>
+            <a:endParaRPr lang="en-AU" sz="2600" dirty="0" smtClean="0">
+              <a:solidFill>
+                <a:srgbClr val="EEEEEE"/>
+              </a:solidFill>
+              <a:latin typeface="Open Sans" panose="020B0606030504020204" pitchFamily="34" charset="0"/>
+              <a:ea typeface="Open Sans" panose="020B0606030504020204" pitchFamily="34" charset="0"/>
+              <a:cs typeface="Open Sans" panose="020B0606030504020204" pitchFamily="34" charset="0"/>
+            </a:endParaRPr>
+          </a:p>
+        </p:txBody>
+      </p:sp>
+    </p:spTree>
+    <p:extLst>
+      <p:ext uri="{BB962C8B-B14F-4D97-AF65-F5344CB8AC3E}">
+        <p14:creationId xmlns:p14="http://schemas.microsoft.com/office/powerpoint/2010/main" val="2308221820"/>
+      </p:ext>
+    </p:extLst>
+  </p:cSld>
+  <p:clrMapOvr>
+    <a:masterClrMapping/>
+  </p:clrMapOvr>
+  <p:transition spd="slow">
+    <p:push/>
+  </p:transition>
+  <p:timing>
+    <p:tnLst>
+      <p:par>
+        <p:cTn id="1" dur="indefinite" restart="never" nodeType="tmRoot"/>
+      </p:par>
+    </p:tnLst>
+  </p:timing>
+</p:sld>
+</file>
+
+<file path=ppt/slides/slide38.xml><?xml version="1.0" encoding="utf-8"?>
+<p:sld xmlns:a="http://schemas.openxmlformats.org/drawingml/2006/main" xmlns:r="http://schemas.openxmlformats.org/officeDocument/2006/relationships" xmlns:p="http://schemas.openxmlformats.org/presentationml/2006/main">
+  <p:cSld>
+    <p:bg>
+      <p:bgPr>
+        <a:solidFill>
+          <a:srgbClr val="111111"/>
+        </a:solidFill>
+        <a:effectLst/>
+      </p:bgPr>
+    </p:bg>
+    <p:spTree>
+      <p:nvGrpSpPr>
+        <p:cNvPr id="1" name=""/>
+        <p:cNvGrpSpPr/>
+        <p:nvPr/>
+      </p:nvGrpSpPr>
+      <p:grpSpPr>
+        <a:xfrm>
+          <a:off x="0" y="0"/>
+          <a:ext cx="0" cy="0"/>
+          <a:chOff x="0" y="0"/>
+          <a:chExt cx="0" cy="0"/>
+        </a:xfrm>
+      </p:grpSpPr>
+      <p:sp>
+        <p:nvSpPr>
+          <p:cNvPr id="4" name="Title 3"/>
+          <p:cNvSpPr>
+            <a:spLocks noGrp="1"/>
+          </p:cNvSpPr>
+          <p:nvPr>
+            <p:ph type="ctrTitle"/>
+          </p:nvPr>
+        </p:nvSpPr>
+        <p:spPr>
+          <a:xfrm>
+            <a:off x="1524000" y="0"/>
+            <a:ext cx="9144000" cy="2917370"/>
+          </a:xfrm>
+        </p:spPr>
+        <p:txBody>
+          <a:bodyPr anchor="b">
+            <a:normAutofit/>
+          </a:bodyPr>
+          <a:lstStyle/>
+          <a:p>
+            <a:pPr algn="l"/>
+            <a:r>
+              <a:rPr lang="en-AU" sz="4400" b="1" dirty="0" smtClean="0">
+                <a:solidFill>
+                  <a:srgbClr val="EEEEEE"/>
+                </a:solidFill>
+                <a:latin typeface="Open Sans" panose="020B0606030504020204" pitchFamily="34" charset="0"/>
+                <a:ea typeface="Open Sans" panose="020B0606030504020204" pitchFamily="34" charset="0"/>
+                <a:cs typeface="Open Sans" panose="020B0606030504020204" pitchFamily="34" charset="0"/>
+              </a:rPr>
+              <a:t>So how can we fix it?</a:t>
+            </a:r>
+            <a:endParaRPr lang="en-AU" sz="3200" dirty="0">
+              <a:solidFill>
+                <a:srgbClr val="EEEEEE"/>
+              </a:solidFill>
+              <a:latin typeface="Open Sans" panose="020B0606030504020204" pitchFamily="34" charset="0"/>
+              <a:ea typeface="Open Sans" panose="020B0606030504020204" pitchFamily="34" charset="0"/>
+              <a:cs typeface="Open Sans" panose="020B0606030504020204" pitchFamily="34" charset="0"/>
+            </a:endParaRPr>
+          </a:p>
+        </p:txBody>
+      </p:sp>
+      <p:sp>
+        <p:nvSpPr>
+          <p:cNvPr id="6" name="Title 3"/>
+          <p:cNvSpPr txBox="1">
+            <a:spLocks/>
+          </p:cNvSpPr>
+          <p:nvPr/>
+        </p:nvSpPr>
+        <p:spPr>
+          <a:xfrm>
+            <a:off x="1524001" y="2917370"/>
+            <a:ext cx="9144000" cy="511630"/>
+          </a:xfrm>
+          <a:prstGeom prst="rect">
+            <a:avLst/>
+          </a:prstGeom>
+        </p:spPr>
+        <p:txBody>
+          <a:bodyPr vert="horz" lIns="91440" tIns="45720" rIns="91440" bIns="45720" rtlCol="0" anchor="t">
+            <a:normAutofit lnSpcReduction="10000"/>
+          </a:bodyPr>
+          <a:lstStyle>
+            <a:lvl1pPr algn="ctr" defTabSz="914400" rtl="0" eaLnBrk="1" latinLnBrk="0" hangingPunct="1">
+              <a:lnSpc>
+                <a:spcPct val="90000"/>
+              </a:lnSpc>
+              <a:spcBef>
+                <a:spcPct val="0"/>
+              </a:spcBef>
+              <a:buNone/>
+              <a:defRPr sz="6000" kern="1200">
+                <a:solidFill>
+                  <a:schemeClr val="tx1"/>
+                </a:solidFill>
+                <a:latin typeface="+mj-lt"/>
+                <a:ea typeface="+mj-ea"/>
+                <a:cs typeface="+mj-cs"/>
+              </a:defRPr>
+            </a:lvl1pPr>
+          </a:lstStyle>
+          <a:p>
+            <a:pPr algn="l">
+              <a:lnSpc>
+                <a:spcPct val="100000"/>
+              </a:lnSpc>
+            </a:pPr>
+            <a:r>
+              <a:rPr lang="en-AU" sz="2800" dirty="0" smtClean="0">
+                <a:solidFill>
+                  <a:srgbClr val="111111"/>
+                </a:solidFill>
+                <a:latin typeface="Open Sans" panose="020B0606030504020204" pitchFamily="34" charset="0"/>
+                <a:ea typeface="Open Sans" panose="020B0606030504020204" pitchFamily="34" charset="0"/>
+                <a:cs typeface="Open Sans" panose="020B0606030504020204" pitchFamily="34" charset="0"/>
+              </a:rPr>
+              <a:t>separator</a:t>
+            </a:r>
+          </a:p>
+        </p:txBody>
+      </p:sp>
+      <p:sp>
+        <p:nvSpPr>
+          <p:cNvPr id="2" name="TextBox 1"/>
+          <p:cNvSpPr txBox="1"/>
+          <p:nvPr/>
+        </p:nvSpPr>
+        <p:spPr>
+          <a:xfrm>
+            <a:off x="1524000" y="3428999"/>
+            <a:ext cx="9144000" cy="892552"/>
+          </a:xfrm>
+          <a:prstGeom prst="rect">
+            <a:avLst/>
+          </a:prstGeom>
+          <a:noFill/>
+        </p:spPr>
+        <p:txBody>
+          <a:bodyPr wrap="square" rtlCol="0">
+            <a:spAutoFit/>
+          </a:bodyPr>
+          <a:lstStyle/>
+          <a:p>
+            <a:pPr marL="285750" indent="-285750">
+              <a:buFont typeface="Arial" panose="020B0604020202020204" pitchFamily="34" charset="0"/>
+              <a:buChar char="•"/>
+            </a:pPr>
+            <a:r>
+              <a:rPr lang="en-AU" sz="2600" dirty="0" smtClean="0">
+                <a:solidFill>
+                  <a:srgbClr val="EEEEEE"/>
+                </a:solidFill>
+                <a:latin typeface="Open Sans" panose="020B0606030504020204" pitchFamily="34" charset="0"/>
+                <a:ea typeface="Open Sans" panose="020B0606030504020204" pitchFamily="34" charset="0"/>
+                <a:cs typeface="Open Sans" panose="020B0606030504020204" pitchFamily="34" charset="0"/>
+              </a:rPr>
+              <a:t>Set a password for the account</a:t>
+            </a:r>
+          </a:p>
+          <a:p>
+            <a:pPr marL="285750" indent="-285750">
+              <a:buFont typeface="Arial" panose="020B0604020202020204" pitchFamily="34" charset="0"/>
+              <a:buChar char="•"/>
+            </a:pPr>
+            <a:r>
+              <a:rPr lang="en-AU" sz="2600" dirty="0" smtClean="0">
+                <a:solidFill>
+                  <a:srgbClr val="EEEEEE"/>
+                </a:solidFill>
+                <a:latin typeface="Open Sans" panose="020B0606030504020204" pitchFamily="34" charset="0"/>
+                <a:ea typeface="Open Sans" panose="020B0606030504020204" pitchFamily="34" charset="0"/>
+                <a:cs typeface="Open Sans" panose="020B0606030504020204" pitchFamily="34" charset="0"/>
+              </a:rPr>
+              <a:t>Password protect the screen saver</a:t>
+            </a:r>
+            <a:endParaRPr lang="en-AU" sz="2600" dirty="0" smtClean="0">
+              <a:solidFill>
+                <a:srgbClr val="EEEEEE"/>
+              </a:solidFill>
+              <a:latin typeface="Open Sans" panose="020B0606030504020204" pitchFamily="34" charset="0"/>
+              <a:ea typeface="Open Sans" panose="020B0606030504020204" pitchFamily="34" charset="0"/>
+              <a:cs typeface="Open Sans" panose="020B0606030504020204" pitchFamily="34" charset="0"/>
+            </a:endParaRPr>
+          </a:p>
+        </p:txBody>
+      </p:sp>
+    </p:spTree>
+    <p:extLst>
+      <p:ext uri="{BB962C8B-B14F-4D97-AF65-F5344CB8AC3E}">
+        <p14:creationId xmlns:p14="http://schemas.microsoft.com/office/powerpoint/2010/main" val="2559076153"/>
+      </p:ext>
+    </p:extLst>
+  </p:cSld>
+  <p:clrMapOvr>
+    <a:masterClrMapping/>
+  </p:clrMapOvr>
+  <p:transition spd="slow">
+    <p:push/>
+  </p:transition>
+  <p:timing>
+    <p:tnLst>
+      <p:par>
+        <p:cTn id="1" dur="indefinite" restart="never" nodeType="tmRoot"/>
+      </p:par>
+    </p:tnLst>
+  </p:timing>
+</p:sld>
+</file>
+
+<file path=ppt/slides/slide39.xml><?xml version="1.0" encoding="utf-8"?>
+<p:sld xmlns:a="http://schemas.openxmlformats.org/drawingml/2006/main" xmlns:r="http://schemas.openxmlformats.org/officeDocument/2006/relationships" xmlns:p="http://schemas.openxmlformats.org/presentationml/2006/main">
+  <p:cSld>
+    <p:bg>
+      <p:bgPr>
+        <a:solidFill>
+          <a:srgbClr val="111111"/>
+        </a:solidFill>
+        <a:effectLst/>
+      </p:bgPr>
+    </p:bg>
+    <p:spTree>
+      <p:nvGrpSpPr>
+        <p:cNvPr id="1" name=""/>
+        <p:cNvGrpSpPr/>
+        <p:nvPr/>
+      </p:nvGrpSpPr>
+      <p:grpSpPr>
+        <a:xfrm>
+          <a:off x="0" y="0"/>
+          <a:ext cx="0" cy="0"/>
+          <a:chOff x="0" y="0"/>
+          <a:chExt cx="0" cy="0"/>
+        </a:xfrm>
+      </p:grpSpPr>
+      <p:sp>
+        <p:nvSpPr>
+          <p:cNvPr id="4" name="Title 3"/>
+          <p:cNvSpPr>
+            <a:spLocks noGrp="1"/>
+          </p:cNvSpPr>
+          <p:nvPr>
+            <p:ph type="ctrTitle"/>
+          </p:nvPr>
+        </p:nvSpPr>
+        <p:spPr>
+          <a:xfrm>
+            <a:off x="1524000" y="-1470455"/>
+            <a:ext cx="9144000" cy="2917370"/>
+          </a:xfrm>
+        </p:spPr>
+        <p:txBody>
+          <a:bodyPr anchor="b">
+            <a:normAutofit/>
+          </a:bodyPr>
+          <a:lstStyle/>
+          <a:p>
+            <a:pPr algn="l"/>
+            <a:r>
+              <a:rPr lang="en-AU" sz="4400" b="1" dirty="0" smtClean="0">
+                <a:solidFill>
+                  <a:srgbClr val="EEEEEE"/>
+                </a:solidFill>
+                <a:latin typeface="Open Sans" panose="020B0606030504020204" pitchFamily="34" charset="0"/>
+                <a:ea typeface="Open Sans" panose="020B0606030504020204" pitchFamily="34" charset="0"/>
+                <a:cs typeface="Open Sans" panose="020B0606030504020204" pitchFamily="34" charset="0"/>
+              </a:rPr>
+              <a:t>Set a password for the account:</a:t>
+            </a:r>
+            <a:endParaRPr lang="en-AU" sz="3200" dirty="0">
+              <a:solidFill>
+                <a:srgbClr val="EEEEEE"/>
+              </a:solidFill>
+              <a:latin typeface="Open Sans" panose="020B0606030504020204" pitchFamily="34" charset="0"/>
+              <a:ea typeface="Open Sans" panose="020B0606030504020204" pitchFamily="34" charset="0"/>
+              <a:cs typeface="Open Sans" panose="020B0606030504020204" pitchFamily="34" charset="0"/>
+            </a:endParaRPr>
+          </a:p>
+        </p:txBody>
+      </p:sp>
+      <p:sp>
+        <p:nvSpPr>
+          <p:cNvPr id="6" name="Title 3"/>
+          <p:cNvSpPr txBox="1">
+            <a:spLocks/>
+          </p:cNvSpPr>
+          <p:nvPr/>
+        </p:nvSpPr>
+        <p:spPr>
+          <a:xfrm>
+            <a:off x="1524001" y="1446915"/>
+            <a:ext cx="9144000" cy="511630"/>
+          </a:xfrm>
+          <a:prstGeom prst="rect">
+            <a:avLst/>
+          </a:prstGeom>
+        </p:spPr>
+        <p:txBody>
+          <a:bodyPr vert="horz" lIns="91440" tIns="45720" rIns="91440" bIns="45720" rtlCol="0" anchor="t">
+            <a:normAutofit lnSpcReduction="10000"/>
+          </a:bodyPr>
+          <a:lstStyle>
+            <a:lvl1pPr algn="ctr" defTabSz="914400" rtl="0" eaLnBrk="1" latinLnBrk="0" hangingPunct="1">
+              <a:lnSpc>
+                <a:spcPct val="90000"/>
+              </a:lnSpc>
+              <a:spcBef>
+                <a:spcPct val="0"/>
+              </a:spcBef>
+              <a:buNone/>
+              <a:defRPr sz="6000" kern="1200">
+                <a:solidFill>
+                  <a:schemeClr val="tx1"/>
+                </a:solidFill>
+                <a:latin typeface="+mj-lt"/>
+                <a:ea typeface="+mj-ea"/>
+                <a:cs typeface="+mj-cs"/>
+              </a:defRPr>
+            </a:lvl1pPr>
+          </a:lstStyle>
+          <a:p>
+            <a:pPr algn="l">
+              <a:lnSpc>
+                <a:spcPct val="100000"/>
+              </a:lnSpc>
+            </a:pPr>
+            <a:r>
+              <a:rPr lang="en-AU" sz="2800" dirty="0" smtClean="0">
+                <a:solidFill>
+                  <a:srgbClr val="111111"/>
+                </a:solidFill>
+                <a:latin typeface="Open Sans" panose="020B0606030504020204" pitchFamily="34" charset="0"/>
+                <a:ea typeface="Open Sans" panose="020B0606030504020204" pitchFamily="34" charset="0"/>
+                <a:cs typeface="Open Sans" panose="020B0606030504020204" pitchFamily="34" charset="0"/>
+              </a:rPr>
+              <a:t>separator</a:t>
+            </a:r>
+          </a:p>
+        </p:txBody>
+      </p:sp>
+      <p:sp>
+        <p:nvSpPr>
+          <p:cNvPr id="2" name="TextBox 1"/>
+          <p:cNvSpPr txBox="1"/>
+          <p:nvPr/>
+        </p:nvSpPr>
+        <p:spPr>
+          <a:xfrm>
+            <a:off x="1524000" y="1958544"/>
+            <a:ext cx="9144000" cy="492443"/>
+          </a:xfrm>
+          <a:prstGeom prst="rect">
+            <a:avLst/>
+          </a:prstGeom>
+          <a:noFill/>
+        </p:spPr>
+        <p:txBody>
+          <a:bodyPr wrap="square" rtlCol="0">
+            <a:spAutoFit/>
+          </a:bodyPr>
+          <a:lstStyle/>
+          <a:p>
+            <a:pPr marL="285750" indent="-285750">
+              <a:buFont typeface="Arial" panose="020B0604020202020204" pitchFamily="34" charset="0"/>
+              <a:buChar char="•"/>
+            </a:pPr>
+            <a:r>
+              <a:rPr lang="en-AU" sz="2600" dirty="0" smtClean="0">
+                <a:solidFill>
+                  <a:srgbClr val="EEEEEE"/>
+                </a:solidFill>
+                <a:latin typeface="Open Sans" panose="020B0606030504020204" pitchFamily="34" charset="0"/>
+                <a:ea typeface="Open Sans" panose="020B0606030504020204" pitchFamily="34" charset="0"/>
+                <a:cs typeface="Open Sans" panose="020B0606030504020204" pitchFamily="34" charset="0"/>
+              </a:rPr>
+              <a:t>Click “User Accounts” in the Control Panel</a:t>
+            </a:r>
+            <a:endParaRPr lang="en-AU" sz="2600" dirty="0" smtClean="0">
+              <a:solidFill>
+                <a:srgbClr val="EEEEEE"/>
+              </a:solidFill>
+              <a:latin typeface="Open Sans" panose="020B0606030504020204" pitchFamily="34" charset="0"/>
+              <a:ea typeface="Open Sans" panose="020B0606030504020204" pitchFamily="34" charset="0"/>
+              <a:cs typeface="Open Sans" panose="020B0606030504020204" pitchFamily="34" charset="0"/>
+            </a:endParaRPr>
+          </a:p>
+        </p:txBody>
+      </p:sp>
+      <p:pic>
+        <p:nvPicPr>
+          <p:cNvPr id="3" name="Picture 2"/>
+          <p:cNvPicPr>
+            <a:picLocks noChangeAspect="1"/>
+          </p:cNvPicPr>
+          <p:nvPr/>
+        </p:nvPicPr>
+        <p:blipFill>
+          <a:blip r:embed="rId2">
+            <a:extLst>
+              <a:ext uri="{28A0092B-C50C-407E-A947-70E740481C1C}">
+                <a14:useLocalDpi xmlns:a14="http://schemas.microsoft.com/office/drawing/2010/main" val="0"/>
+              </a:ext>
+            </a:extLst>
+          </a:blip>
+          <a:stretch>
+            <a:fillRect/>
+          </a:stretch>
+        </p:blipFill>
+        <p:spPr>
+          <a:xfrm>
+            <a:off x="1066800" y="2962616"/>
+            <a:ext cx="10058400" cy="1860803"/>
+          </a:xfrm>
+          <a:prstGeom prst="rect">
+            <a:avLst/>
+          </a:prstGeom>
+        </p:spPr>
+      </p:pic>
+    </p:spTree>
+    <p:extLst>
+      <p:ext uri="{BB962C8B-B14F-4D97-AF65-F5344CB8AC3E}">
+        <p14:creationId xmlns:p14="http://schemas.microsoft.com/office/powerpoint/2010/main" val="630264971"/>
+      </p:ext>
+    </p:extLst>
+  </p:cSld>
+  <p:clrMapOvr>
+    <a:masterClrMapping/>
+  </p:clrMapOvr>
+  <p:transition spd="slow">
+    <p:push/>
+  </p:transition>
+  <p:timing>
+    <p:tnLst>
+      <p:par>
+        <p:cTn id="1" dur="indefinite" restart="never" nodeType="tmRoot"/>
+      </p:par>
+    </p:tnLst>
+  </p:timing>
+</p:sld>
+</file>
+
+<file path=ppt/slides/slide4.xml><?xml version="1.0" encoding="utf-8"?>
+<p:sld xmlns:a="http://schemas.openxmlformats.org/drawingml/2006/main" xmlns:r="http://schemas.openxmlformats.org/officeDocument/2006/relationships" xmlns:p="http://schemas.openxmlformats.org/presentationml/2006/main">
+  <p:cSld>
+    <p:bg>
+      <p:bgPr>
+        <a:solidFill>
+          <a:srgbClr val="111111"/>
+        </a:solidFill>
+        <a:effectLst/>
+      </p:bgPr>
+    </p:bg>
+    <p:spTree>
+      <p:nvGrpSpPr>
+        <p:cNvPr id="1" name=""/>
+        <p:cNvGrpSpPr/>
+        <p:nvPr/>
+      </p:nvGrpSpPr>
+      <p:grpSpPr>
+        <a:xfrm>
+          <a:off x="0" y="0"/>
+          <a:ext cx="0" cy="0"/>
+          <a:chOff x="0" y="0"/>
+          <a:chExt cx="0" cy="0"/>
+        </a:xfrm>
+      </p:grpSpPr>
+      <p:sp>
+        <p:nvSpPr>
+          <p:cNvPr id="4" name="Title 3"/>
+          <p:cNvSpPr>
+            <a:spLocks noGrp="1"/>
+          </p:cNvSpPr>
+          <p:nvPr>
+            <p:ph type="ctrTitle"/>
+          </p:nvPr>
+        </p:nvSpPr>
+        <p:spPr>
+          <a:xfrm>
+            <a:off x="1524000" y="1"/>
+            <a:ext cx="9144000" cy="2917370"/>
+          </a:xfrm>
+        </p:spPr>
+        <p:txBody>
+          <a:bodyPr anchor="b">
+            <a:normAutofit/>
+          </a:bodyPr>
+          <a:lstStyle/>
+          <a:p>
+            <a:pPr algn="l"/>
+            <a:r>
+              <a:rPr lang="en-AU" sz="4400" b="1" dirty="0" smtClean="0">
+                <a:solidFill>
+                  <a:srgbClr val="EEEEEE"/>
+                </a:solidFill>
+                <a:latin typeface="Open Sans" panose="020B0606030504020204" pitchFamily="34" charset="0"/>
+                <a:ea typeface="Open Sans" panose="020B0606030504020204" pitchFamily="34" charset="0"/>
+                <a:cs typeface="Open Sans" panose="020B0606030504020204" pitchFamily="34" charset="0"/>
+              </a:rPr>
+              <a:t>In the previous report…</a:t>
+            </a:r>
+            <a:br>
+              <a:rPr lang="en-AU" sz="4400" b="1" dirty="0" smtClean="0">
+                <a:solidFill>
+                  <a:srgbClr val="EEEEEE"/>
+                </a:solidFill>
+                <a:latin typeface="Open Sans" panose="020B0606030504020204" pitchFamily="34" charset="0"/>
+                <a:ea typeface="Open Sans" panose="020B0606030504020204" pitchFamily="34" charset="0"/>
+                <a:cs typeface="Open Sans" panose="020B0606030504020204" pitchFamily="34" charset="0"/>
+              </a:rPr>
+            </a:br>
+            <a:r>
+              <a:rPr lang="en-AU" sz="4400" b="1" dirty="0">
+                <a:solidFill>
+                  <a:srgbClr val="EEEEEE"/>
+                </a:solidFill>
+                <a:latin typeface="Open Sans" panose="020B0606030504020204" pitchFamily="34" charset="0"/>
+                <a:ea typeface="Open Sans" panose="020B0606030504020204" pitchFamily="34" charset="0"/>
+                <a:cs typeface="Open Sans" panose="020B0606030504020204" pitchFamily="34" charset="0"/>
+              </a:rPr>
+              <a:t/>
+            </a:r>
+            <a:br>
+              <a:rPr lang="en-AU" sz="4400" b="1" dirty="0">
+                <a:solidFill>
+                  <a:srgbClr val="EEEEEE"/>
+                </a:solidFill>
+                <a:latin typeface="Open Sans" panose="020B0606030504020204" pitchFamily="34" charset="0"/>
+                <a:ea typeface="Open Sans" panose="020B0606030504020204" pitchFamily="34" charset="0"/>
+                <a:cs typeface="Open Sans" panose="020B0606030504020204" pitchFamily="34" charset="0"/>
+              </a:rPr>
+            </a:br>
+            <a:r>
+              <a:rPr lang="en-AU" sz="2800" dirty="0" smtClean="0">
+                <a:solidFill>
+                  <a:srgbClr val="EEEEEE"/>
+                </a:solidFill>
+                <a:latin typeface="Open Sans" panose="020B0606030504020204" pitchFamily="34" charset="0"/>
+                <a:ea typeface="Open Sans" panose="020B0606030504020204" pitchFamily="34" charset="0"/>
+                <a:cs typeface="Open Sans" panose="020B0606030504020204" pitchFamily="34" charset="0"/>
+              </a:rPr>
+              <a:t>We found security issues with:</a:t>
+            </a:r>
+            <a:endParaRPr lang="en-AU" sz="2800" dirty="0">
+              <a:solidFill>
+                <a:srgbClr val="EEEEEE"/>
+              </a:solidFill>
+              <a:latin typeface="Open Sans" panose="020B0606030504020204" pitchFamily="34" charset="0"/>
+              <a:ea typeface="Open Sans" panose="020B0606030504020204" pitchFamily="34" charset="0"/>
+              <a:cs typeface="Open Sans" panose="020B0606030504020204" pitchFamily="34" charset="0"/>
+            </a:endParaRPr>
+          </a:p>
+        </p:txBody>
+      </p:sp>
+      <p:sp>
+        <p:nvSpPr>
+          <p:cNvPr id="5" name="Title 3"/>
+          <p:cNvSpPr txBox="1">
+            <a:spLocks/>
+          </p:cNvSpPr>
+          <p:nvPr/>
+        </p:nvSpPr>
+        <p:spPr>
+          <a:xfrm>
+            <a:off x="1524000" y="3429001"/>
+            <a:ext cx="9144000" cy="3429000"/>
+          </a:xfrm>
+          <a:prstGeom prst="rect">
+            <a:avLst/>
+          </a:prstGeom>
+        </p:spPr>
+        <p:txBody>
+          <a:bodyPr vert="horz" lIns="91440" tIns="45720" rIns="91440" bIns="45720" rtlCol="0" anchor="t">
+            <a:normAutofit/>
+          </a:bodyPr>
+          <a:lstStyle>
+            <a:lvl1pPr algn="ctr" defTabSz="914400" rtl="0" eaLnBrk="1" latinLnBrk="0" hangingPunct="1">
+              <a:lnSpc>
+                <a:spcPct val="90000"/>
+              </a:lnSpc>
+              <a:spcBef>
+                <a:spcPct val="0"/>
+              </a:spcBef>
+              <a:buNone/>
+              <a:defRPr sz="6000" kern="1200">
+                <a:solidFill>
+                  <a:schemeClr val="tx1"/>
+                </a:solidFill>
+                <a:latin typeface="+mj-lt"/>
+                <a:ea typeface="+mj-ea"/>
+                <a:cs typeface="+mj-cs"/>
+              </a:defRPr>
+            </a:lvl1pPr>
+          </a:lstStyle>
+          <a:p>
+            <a:pPr marL="457200" indent="-457200" algn="l">
+              <a:lnSpc>
+                <a:spcPct val="100000"/>
+              </a:lnSpc>
+              <a:buFont typeface="Arial" panose="020B0604020202020204" pitchFamily="34" charset="0"/>
+              <a:buChar char="•"/>
+            </a:pPr>
+            <a:r>
+              <a:rPr lang="en-AU" sz="2800" dirty="0" smtClean="0">
+                <a:solidFill>
+                  <a:srgbClr val="EEEEEE"/>
+                </a:solidFill>
+                <a:latin typeface="Open Sans" panose="020B0606030504020204" pitchFamily="34" charset="0"/>
+                <a:ea typeface="Open Sans" panose="020B0606030504020204" pitchFamily="34" charset="0"/>
+                <a:cs typeface="Open Sans" panose="020B0606030504020204" pitchFamily="34" charset="0"/>
+              </a:rPr>
+              <a:t>The operating system</a:t>
+            </a:r>
+          </a:p>
+          <a:p>
+            <a:pPr marL="457200" indent="-457200" algn="l">
+              <a:lnSpc>
+                <a:spcPct val="100000"/>
+              </a:lnSpc>
+              <a:buFont typeface="Arial" panose="020B0604020202020204" pitchFamily="34" charset="0"/>
+              <a:buChar char="•"/>
+            </a:pPr>
+            <a:r>
+              <a:rPr lang="en-AU" sz="2800" dirty="0" smtClean="0">
+                <a:solidFill>
+                  <a:srgbClr val="EEEEEE"/>
+                </a:solidFill>
+                <a:latin typeface="Open Sans" panose="020B0606030504020204" pitchFamily="34" charset="0"/>
+                <a:ea typeface="Open Sans" panose="020B0606030504020204" pitchFamily="34" charset="0"/>
+                <a:cs typeface="Open Sans" panose="020B0606030504020204" pitchFamily="34" charset="0"/>
+              </a:rPr>
+              <a:t>Third party applications</a:t>
+            </a:r>
+          </a:p>
+          <a:p>
+            <a:pPr marL="457200" indent="-457200" algn="l">
+              <a:lnSpc>
+                <a:spcPct val="100000"/>
+              </a:lnSpc>
+              <a:buFont typeface="Arial" panose="020B0604020202020204" pitchFamily="34" charset="0"/>
+              <a:buChar char="•"/>
+            </a:pPr>
+            <a:r>
+              <a:rPr lang="en-AU" sz="2800" dirty="0" smtClean="0">
+                <a:solidFill>
+                  <a:srgbClr val="EEEEEE"/>
+                </a:solidFill>
+                <a:latin typeface="Open Sans" panose="020B0606030504020204" pitchFamily="34" charset="0"/>
+                <a:ea typeface="Open Sans" panose="020B0606030504020204" pitchFamily="34" charset="0"/>
+                <a:cs typeface="Open Sans" panose="020B0606030504020204" pitchFamily="34" charset="0"/>
+              </a:rPr>
+              <a:t>User practices</a:t>
+            </a:r>
+            <a:endParaRPr lang="en-AU" sz="2800" dirty="0">
+              <a:solidFill>
+                <a:srgbClr val="EEEEEE"/>
+              </a:solidFill>
+              <a:latin typeface="Open Sans" panose="020B0606030504020204" pitchFamily="34" charset="0"/>
+              <a:ea typeface="Open Sans" panose="020B0606030504020204" pitchFamily="34" charset="0"/>
+              <a:cs typeface="Open Sans" panose="020B0606030504020204" pitchFamily="34" charset="0"/>
+            </a:endParaRPr>
+          </a:p>
+        </p:txBody>
+      </p:sp>
+    </p:spTree>
+    <p:extLst>
+      <p:ext uri="{BB962C8B-B14F-4D97-AF65-F5344CB8AC3E}">
+        <p14:creationId xmlns:p14="http://schemas.microsoft.com/office/powerpoint/2010/main" val="3868876745"/>
+      </p:ext>
+    </p:extLst>
+  </p:cSld>
+  <p:clrMapOvr>
+    <a:masterClrMapping/>
+  </p:clrMapOvr>
+  <p:transition spd="slow">
+    <p:push/>
+  </p:transition>
+  <p:timing>
+    <p:tnLst>
+      <p:par>
+        <p:cTn id="1" dur="indefinite" restart="never" nodeType="tmRoot"/>
+      </p:par>
+    </p:tnLst>
+  </p:timing>
+</p:sld>
+</file>
+
+<file path=ppt/slides/slide40.xml><?xml version="1.0" encoding="utf-8"?>
+<p:sld xmlns:a="http://schemas.openxmlformats.org/drawingml/2006/main" xmlns:r="http://schemas.openxmlformats.org/officeDocument/2006/relationships" xmlns:p="http://schemas.openxmlformats.org/presentationml/2006/main">
+  <p:cSld>
+    <p:bg>
+      <p:bgPr>
+        <a:solidFill>
+          <a:srgbClr val="111111"/>
+        </a:solidFill>
+        <a:effectLst/>
+      </p:bgPr>
+    </p:bg>
+    <p:spTree>
+      <p:nvGrpSpPr>
+        <p:cNvPr id="1" name=""/>
+        <p:cNvGrpSpPr/>
+        <p:nvPr/>
+      </p:nvGrpSpPr>
+      <p:grpSpPr>
+        <a:xfrm>
+          <a:off x="0" y="0"/>
+          <a:ext cx="0" cy="0"/>
+          <a:chOff x="0" y="0"/>
+          <a:chExt cx="0" cy="0"/>
+        </a:xfrm>
+      </p:grpSpPr>
+      <p:sp>
+        <p:nvSpPr>
+          <p:cNvPr id="6" name="Title 3"/>
+          <p:cNvSpPr txBox="1">
+            <a:spLocks/>
+          </p:cNvSpPr>
+          <p:nvPr/>
+        </p:nvSpPr>
+        <p:spPr>
+          <a:xfrm>
+            <a:off x="1524001" y="1446915"/>
+            <a:ext cx="9144000" cy="511630"/>
+          </a:xfrm>
+          <a:prstGeom prst="rect">
+            <a:avLst/>
+          </a:prstGeom>
+        </p:spPr>
+        <p:txBody>
+          <a:bodyPr vert="horz" lIns="91440" tIns="45720" rIns="91440" bIns="45720" rtlCol="0" anchor="t">
+            <a:normAutofit lnSpcReduction="10000"/>
+          </a:bodyPr>
+          <a:lstStyle>
+            <a:lvl1pPr algn="ctr" defTabSz="914400" rtl="0" eaLnBrk="1" latinLnBrk="0" hangingPunct="1">
+              <a:lnSpc>
+                <a:spcPct val="90000"/>
+              </a:lnSpc>
+              <a:spcBef>
+                <a:spcPct val="0"/>
+              </a:spcBef>
+              <a:buNone/>
+              <a:defRPr sz="6000" kern="1200">
+                <a:solidFill>
+                  <a:schemeClr val="tx1"/>
+                </a:solidFill>
+                <a:latin typeface="+mj-lt"/>
+                <a:ea typeface="+mj-ea"/>
+                <a:cs typeface="+mj-cs"/>
+              </a:defRPr>
+            </a:lvl1pPr>
+          </a:lstStyle>
+          <a:p>
+            <a:pPr algn="l">
+              <a:lnSpc>
+                <a:spcPct val="100000"/>
+              </a:lnSpc>
+            </a:pPr>
+            <a:r>
+              <a:rPr lang="en-AU" sz="2800" dirty="0" smtClean="0">
+                <a:solidFill>
+                  <a:srgbClr val="111111"/>
+                </a:solidFill>
+                <a:latin typeface="Open Sans" panose="020B0606030504020204" pitchFamily="34" charset="0"/>
+                <a:ea typeface="Open Sans" panose="020B0606030504020204" pitchFamily="34" charset="0"/>
+                <a:cs typeface="Open Sans" panose="020B0606030504020204" pitchFamily="34" charset="0"/>
+              </a:rPr>
+              <a:t>separator</a:t>
+            </a:r>
+          </a:p>
+        </p:txBody>
+      </p:sp>
+      <p:sp>
+        <p:nvSpPr>
+          <p:cNvPr id="2" name="TextBox 1"/>
+          <p:cNvSpPr txBox="1"/>
+          <p:nvPr/>
+        </p:nvSpPr>
+        <p:spPr>
+          <a:xfrm>
+            <a:off x="1524000" y="1958544"/>
+            <a:ext cx="9144000" cy="492443"/>
+          </a:xfrm>
+          <a:prstGeom prst="rect">
+            <a:avLst/>
+          </a:prstGeom>
+          <a:noFill/>
+        </p:spPr>
+        <p:txBody>
+          <a:bodyPr wrap="square" rtlCol="0">
+            <a:spAutoFit/>
+          </a:bodyPr>
+          <a:lstStyle/>
+          <a:p>
+            <a:pPr marL="285750" indent="-285750">
+              <a:buFont typeface="Arial" panose="020B0604020202020204" pitchFamily="34" charset="0"/>
+              <a:buChar char="•"/>
+            </a:pPr>
+            <a:r>
+              <a:rPr lang="en-AU" sz="2600" dirty="0" smtClean="0">
+                <a:solidFill>
+                  <a:srgbClr val="EEEEEE"/>
+                </a:solidFill>
+                <a:latin typeface="Open Sans" panose="020B0606030504020204" pitchFamily="34" charset="0"/>
+                <a:ea typeface="Open Sans" panose="020B0606030504020204" pitchFamily="34" charset="0"/>
+                <a:cs typeface="Open Sans" panose="020B0606030504020204" pitchFamily="34" charset="0"/>
+              </a:rPr>
+              <a:t>Click “Change your Windows password”</a:t>
+            </a:r>
+            <a:endParaRPr lang="en-AU" sz="2600" dirty="0" smtClean="0">
+              <a:solidFill>
+                <a:srgbClr val="EEEEEE"/>
+              </a:solidFill>
+              <a:latin typeface="Open Sans" panose="020B0606030504020204" pitchFamily="34" charset="0"/>
+              <a:ea typeface="Open Sans" panose="020B0606030504020204" pitchFamily="34" charset="0"/>
+              <a:cs typeface="Open Sans" panose="020B0606030504020204" pitchFamily="34" charset="0"/>
+            </a:endParaRPr>
+          </a:p>
+        </p:txBody>
+      </p:sp>
+      <p:pic>
+        <p:nvPicPr>
+          <p:cNvPr id="7" name="Picture 6"/>
+          <p:cNvPicPr>
+            <a:picLocks noChangeAspect="1"/>
+          </p:cNvPicPr>
+          <p:nvPr/>
+        </p:nvPicPr>
+        <p:blipFill>
+          <a:blip r:embed="rId2">
+            <a:extLst>
+              <a:ext uri="{28A0092B-C50C-407E-A947-70E740481C1C}">
+                <a14:useLocalDpi xmlns:a14="http://schemas.microsoft.com/office/drawing/2010/main" val="0"/>
+              </a:ext>
+            </a:extLst>
+          </a:blip>
+          <a:stretch>
+            <a:fillRect/>
+          </a:stretch>
+        </p:blipFill>
+        <p:spPr>
+          <a:xfrm>
+            <a:off x="1066800" y="2962616"/>
+            <a:ext cx="10058400" cy="1986533"/>
+          </a:xfrm>
+          <a:prstGeom prst="rect">
+            <a:avLst/>
+          </a:prstGeom>
+        </p:spPr>
+      </p:pic>
+    </p:spTree>
+    <p:extLst>
+      <p:ext uri="{BB962C8B-B14F-4D97-AF65-F5344CB8AC3E}">
+        <p14:creationId xmlns:p14="http://schemas.microsoft.com/office/powerpoint/2010/main" val="221621838"/>
+      </p:ext>
+    </p:extLst>
+  </p:cSld>
+  <p:clrMapOvr>
+    <a:masterClrMapping/>
+  </p:clrMapOvr>
+  <p:transition spd="slow">
+    <p:push/>
+  </p:transition>
+  <p:timing>
+    <p:tnLst>
+      <p:par>
+        <p:cTn id="1" dur="indefinite" restart="never" nodeType="tmRoot"/>
+      </p:par>
+    </p:tnLst>
+  </p:timing>
+</p:sld>
+</file>
+
+<file path=ppt/slides/slide41.xml><?xml version="1.0" encoding="utf-8"?>
+<p:sld xmlns:a="http://schemas.openxmlformats.org/drawingml/2006/main" xmlns:r="http://schemas.openxmlformats.org/officeDocument/2006/relationships" xmlns:p="http://schemas.openxmlformats.org/presentationml/2006/main">
+  <p:cSld>
+    <p:bg>
+      <p:bgPr>
+        <a:solidFill>
+          <a:srgbClr val="111111"/>
+        </a:solidFill>
+        <a:effectLst/>
+      </p:bgPr>
+    </p:bg>
+    <p:spTree>
+      <p:nvGrpSpPr>
+        <p:cNvPr id="1" name=""/>
+        <p:cNvGrpSpPr/>
+        <p:nvPr/>
+      </p:nvGrpSpPr>
+      <p:grpSpPr>
+        <a:xfrm>
+          <a:off x="0" y="0"/>
+          <a:ext cx="0" cy="0"/>
+          <a:chOff x="0" y="0"/>
+          <a:chExt cx="0" cy="0"/>
+        </a:xfrm>
+      </p:grpSpPr>
+      <p:sp>
+        <p:nvSpPr>
+          <p:cNvPr id="6" name="Title 3"/>
+          <p:cNvSpPr txBox="1">
+            <a:spLocks/>
+          </p:cNvSpPr>
+          <p:nvPr/>
+        </p:nvSpPr>
+        <p:spPr>
+          <a:xfrm>
+            <a:off x="1524001" y="1446915"/>
+            <a:ext cx="9144000" cy="511630"/>
+          </a:xfrm>
+          <a:prstGeom prst="rect">
+            <a:avLst/>
+          </a:prstGeom>
+        </p:spPr>
+        <p:txBody>
+          <a:bodyPr vert="horz" lIns="91440" tIns="45720" rIns="91440" bIns="45720" rtlCol="0" anchor="t">
+            <a:normAutofit lnSpcReduction="10000"/>
+          </a:bodyPr>
+          <a:lstStyle>
+            <a:lvl1pPr algn="ctr" defTabSz="914400" rtl="0" eaLnBrk="1" latinLnBrk="0" hangingPunct="1">
+              <a:lnSpc>
+                <a:spcPct val="90000"/>
+              </a:lnSpc>
+              <a:spcBef>
+                <a:spcPct val="0"/>
+              </a:spcBef>
+              <a:buNone/>
+              <a:defRPr sz="6000" kern="1200">
+                <a:solidFill>
+                  <a:schemeClr val="tx1"/>
+                </a:solidFill>
+                <a:latin typeface="+mj-lt"/>
+                <a:ea typeface="+mj-ea"/>
+                <a:cs typeface="+mj-cs"/>
+              </a:defRPr>
+            </a:lvl1pPr>
+          </a:lstStyle>
+          <a:p>
+            <a:pPr algn="l">
+              <a:lnSpc>
+                <a:spcPct val="100000"/>
+              </a:lnSpc>
+            </a:pPr>
+            <a:r>
+              <a:rPr lang="en-AU" sz="2800" dirty="0" smtClean="0">
+                <a:solidFill>
+                  <a:srgbClr val="111111"/>
+                </a:solidFill>
+                <a:latin typeface="Open Sans" panose="020B0606030504020204" pitchFamily="34" charset="0"/>
+                <a:ea typeface="Open Sans" panose="020B0606030504020204" pitchFamily="34" charset="0"/>
+                <a:cs typeface="Open Sans" panose="020B0606030504020204" pitchFamily="34" charset="0"/>
+              </a:rPr>
+              <a:t>separator</a:t>
+            </a:r>
+          </a:p>
+        </p:txBody>
+      </p:sp>
+      <p:sp>
+        <p:nvSpPr>
+          <p:cNvPr id="2" name="TextBox 1"/>
+          <p:cNvSpPr txBox="1"/>
+          <p:nvPr/>
+        </p:nvSpPr>
+        <p:spPr>
+          <a:xfrm>
+            <a:off x="1524000" y="1958544"/>
+            <a:ext cx="9144000" cy="492443"/>
+          </a:xfrm>
+          <a:prstGeom prst="rect">
+            <a:avLst/>
+          </a:prstGeom>
+          <a:noFill/>
+        </p:spPr>
+        <p:txBody>
+          <a:bodyPr wrap="square" rtlCol="0">
+            <a:spAutoFit/>
+          </a:bodyPr>
+          <a:lstStyle/>
+          <a:p>
+            <a:pPr marL="285750" indent="-285750">
+              <a:buFont typeface="Arial" panose="020B0604020202020204" pitchFamily="34" charset="0"/>
+              <a:buChar char="•"/>
+            </a:pPr>
+            <a:r>
+              <a:rPr lang="en-AU" sz="2600" dirty="0" smtClean="0">
+                <a:solidFill>
+                  <a:srgbClr val="EEEEEE"/>
+                </a:solidFill>
+                <a:latin typeface="Open Sans" panose="020B0606030504020204" pitchFamily="34" charset="0"/>
+                <a:ea typeface="Open Sans" panose="020B0606030504020204" pitchFamily="34" charset="0"/>
+                <a:cs typeface="Open Sans" panose="020B0606030504020204" pitchFamily="34" charset="0"/>
+              </a:rPr>
+              <a:t>Click “Create password for your account”</a:t>
+            </a:r>
+            <a:endParaRPr lang="en-AU" sz="2600" dirty="0" smtClean="0">
+              <a:solidFill>
+                <a:srgbClr val="EEEEEE"/>
+              </a:solidFill>
+              <a:latin typeface="Open Sans" panose="020B0606030504020204" pitchFamily="34" charset="0"/>
+              <a:ea typeface="Open Sans" panose="020B0606030504020204" pitchFamily="34" charset="0"/>
+              <a:cs typeface="Open Sans" panose="020B0606030504020204" pitchFamily="34" charset="0"/>
+            </a:endParaRPr>
+          </a:p>
+        </p:txBody>
+      </p:sp>
+      <p:pic>
+        <p:nvPicPr>
+          <p:cNvPr id="3" name="Picture 2"/>
+          <p:cNvPicPr>
+            <a:picLocks noChangeAspect="1"/>
+          </p:cNvPicPr>
+          <p:nvPr/>
+        </p:nvPicPr>
+        <p:blipFill>
+          <a:blip r:embed="rId2">
+            <a:extLst>
+              <a:ext uri="{28A0092B-C50C-407E-A947-70E740481C1C}">
+                <a14:useLocalDpi xmlns:a14="http://schemas.microsoft.com/office/drawing/2010/main" val="0"/>
+              </a:ext>
+            </a:extLst>
+          </a:blip>
+          <a:stretch>
+            <a:fillRect/>
+          </a:stretch>
+        </p:blipFill>
+        <p:spPr>
+          <a:xfrm>
+            <a:off x="1066800" y="2962616"/>
+            <a:ext cx="10058400" cy="2061972"/>
+          </a:xfrm>
+          <a:prstGeom prst="rect">
+            <a:avLst/>
+          </a:prstGeom>
+        </p:spPr>
+      </p:pic>
+    </p:spTree>
+    <p:extLst>
+      <p:ext uri="{BB962C8B-B14F-4D97-AF65-F5344CB8AC3E}">
+        <p14:creationId xmlns:p14="http://schemas.microsoft.com/office/powerpoint/2010/main" val="675507325"/>
+      </p:ext>
+    </p:extLst>
+  </p:cSld>
+  <p:clrMapOvr>
+    <a:masterClrMapping/>
+  </p:clrMapOvr>
+  <p:transition spd="slow">
+    <p:push/>
+  </p:transition>
+  <p:timing>
+    <p:tnLst>
+      <p:par>
+        <p:cTn id="1" dur="indefinite" restart="never" nodeType="tmRoot"/>
+      </p:par>
+    </p:tnLst>
+  </p:timing>
+</p:sld>
+</file>
+
+<file path=ppt/slides/slide42.xml><?xml version="1.0" encoding="utf-8"?>
+<p:sld xmlns:a="http://schemas.openxmlformats.org/drawingml/2006/main" xmlns:r="http://schemas.openxmlformats.org/officeDocument/2006/relationships" xmlns:p="http://schemas.openxmlformats.org/presentationml/2006/main">
+  <p:cSld>
+    <p:bg>
+      <p:bgPr>
+        <a:solidFill>
+          <a:srgbClr val="111111"/>
+        </a:solidFill>
+        <a:effectLst/>
+      </p:bgPr>
+    </p:bg>
+    <p:spTree>
+      <p:nvGrpSpPr>
+        <p:cNvPr id="1" name=""/>
+        <p:cNvGrpSpPr/>
+        <p:nvPr/>
+      </p:nvGrpSpPr>
+      <p:grpSpPr>
+        <a:xfrm>
+          <a:off x="0" y="0"/>
+          <a:ext cx="0" cy="0"/>
+          <a:chOff x="0" y="0"/>
+          <a:chExt cx="0" cy="0"/>
+        </a:xfrm>
+      </p:grpSpPr>
+      <p:sp>
+        <p:nvSpPr>
+          <p:cNvPr id="6" name="Title 3"/>
+          <p:cNvSpPr txBox="1">
+            <a:spLocks/>
+          </p:cNvSpPr>
+          <p:nvPr/>
+        </p:nvSpPr>
+        <p:spPr>
+          <a:xfrm>
+            <a:off x="1524001" y="1446915"/>
+            <a:ext cx="9144000" cy="511630"/>
+          </a:xfrm>
+          <a:prstGeom prst="rect">
+            <a:avLst/>
+          </a:prstGeom>
+        </p:spPr>
+        <p:txBody>
+          <a:bodyPr vert="horz" lIns="91440" tIns="45720" rIns="91440" bIns="45720" rtlCol="0" anchor="t">
+            <a:normAutofit lnSpcReduction="10000"/>
+          </a:bodyPr>
+          <a:lstStyle>
+            <a:lvl1pPr algn="ctr" defTabSz="914400" rtl="0" eaLnBrk="1" latinLnBrk="0" hangingPunct="1">
+              <a:lnSpc>
+                <a:spcPct val="90000"/>
+              </a:lnSpc>
+              <a:spcBef>
+                <a:spcPct val="0"/>
+              </a:spcBef>
+              <a:buNone/>
+              <a:defRPr sz="6000" kern="1200">
+                <a:solidFill>
+                  <a:schemeClr val="tx1"/>
+                </a:solidFill>
+                <a:latin typeface="+mj-lt"/>
+                <a:ea typeface="+mj-ea"/>
+                <a:cs typeface="+mj-cs"/>
+              </a:defRPr>
+            </a:lvl1pPr>
+          </a:lstStyle>
+          <a:p>
+            <a:pPr algn="l">
+              <a:lnSpc>
+                <a:spcPct val="100000"/>
+              </a:lnSpc>
+            </a:pPr>
+            <a:r>
+              <a:rPr lang="en-AU" sz="2800" dirty="0" smtClean="0">
+                <a:solidFill>
+                  <a:srgbClr val="111111"/>
+                </a:solidFill>
+                <a:latin typeface="Open Sans" panose="020B0606030504020204" pitchFamily="34" charset="0"/>
+                <a:ea typeface="Open Sans" panose="020B0606030504020204" pitchFamily="34" charset="0"/>
+                <a:cs typeface="Open Sans" panose="020B0606030504020204" pitchFamily="34" charset="0"/>
+              </a:rPr>
+              <a:t>separator</a:t>
+            </a:r>
+          </a:p>
+        </p:txBody>
+      </p:sp>
+      <p:sp>
+        <p:nvSpPr>
+          <p:cNvPr id="2" name="TextBox 1"/>
+          <p:cNvSpPr txBox="1"/>
+          <p:nvPr/>
+        </p:nvSpPr>
+        <p:spPr>
+          <a:xfrm>
+            <a:off x="1524000" y="708250"/>
+            <a:ext cx="9144000" cy="892552"/>
+          </a:xfrm>
+          <a:prstGeom prst="rect">
+            <a:avLst/>
+          </a:prstGeom>
+          <a:noFill/>
+        </p:spPr>
+        <p:txBody>
+          <a:bodyPr wrap="square" rtlCol="0">
+            <a:spAutoFit/>
+          </a:bodyPr>
+          <a:lstStyle/>
+          <a:p>
+            <a:pPr marL="285750" indent="-285750">
+              <a:buFont typeface="Arial" panose="020B0604020202020204" pitchFamily="34" charset="0"/>
+              <a:buChar char="•"/>
+            </a:pPr>
+            <a:r>
+              <a:rPr lang="en-AU" sz="2600" dirty="0" smtClean="0">
+                <a:solidFill>
+                  <a:srgbClr val="EEEEEE"/>
+                </a:solidFill>
+                <a:latin typeface="Open Sans" panose="020B0606030504020204" pitchFamily="34" charset="0"/>
+                <a:ea typeface="Open Sans" panose="020B0606030504020204" pitchFamily="34" charset="0"/>
+                <a:cs typeface="Open Sans" panose="020B0606030504020204" pitchFamily="34" charset="0"/>
+              </a:rPr>
+              <a:t>Enter and confirm your new password and click “Create password”</a:t>
+            </a:r>
+            <a:endParaRPr lang="en-AU" sz="2600" dirty="0" smtClean="0">
+              <a:solidFill>
+                <a:srgbClr val="EEEEEE"/>
+              </a:solidFill>
+              <a:latin typeface="Open Sans" panose="020B0606030504020204" pitchFamily="34" charset="0"/>
+              <a:ea typeface="Open Sans" panose="020B0606030504020204" pitchFamily="34" charset="0"/>
+              <a:cs typeface="Open Sans" panose="020B0606030504020204" pitchFamily="34" charset="0"/>
+            </a:endParaRPr>
+          </a:p>
+        </p:txBody>
+      </p:sp>
+      <p:pic>
+        <p:nvPicPr>
+          <p:cNvPr id="4" name="Picture 3"/>
+          <p:cNvPicPr>
+            <a:picLocks noChangeAspect="1"/>
+          </p:cNvPicPr>
+          <p:nvPr/>
+        </p:nvPicPr>
+        <p:blipFill>
+          <a:blip r:embed="rId2">
+            <a:extLst>
+              <a:ext uri="{28A0092B-C50C-407E-A947-70E740481C1C}">
+                <a14:useLocalDpi xmlns:a14="http://schemas.microsoft.com/office/drawing/2010/main" val="0"/>
+              </a:ext>
+            </a:extLst>
+          </a:blip>
+          <a:stretch>
+            <a:fillRect/>
+          </a:stretch>
+        </p:blipFill>
+        <p:spPr>
+          <a:xfrm>
+            <a:off x="2284299" y="1958545"/>
+            <a:ext cx="7523072" cy="3911996"/>
+          </a:xfrm>
+          <a:prstGeom prst="rect">
+            <a:avLst/>
+          </a:prstGeom>
+        </p:spPr>
+      </p:pic>
+    </p:spTree>
+    <p:extLst>
+      <p:ext uri="{BB962C8B-B14F-4D97-AF65-F5344CB8AC3E}">
+        <p14:creationId xmlns:p14="http://schemas.microsoft.com/office/powerpoint/2010/main" val="401389463"/>
+      </p:ext>
+    </p:extLst>
+  </p:cSld>
+  <p:clrMapOvr>
+    <a:masterClrMapping/>
+  </p:clrMapOvr>
+  <p:transition spd="slow">
+    <p:push/>
+  </p:transition>
+  <p:timing>
+    <p:tnLst>
+      <p:par>
+        <p:cTn id="1" dur="indefinite" restart="never" nodeType="tmRoot"/>
+      </p:par>
+    </p:tnLst>
+  </p:timing>
+</p:sld>
+</file>
+
+<file path=ppt/slides/slide43.xml><?xml version="1.0" encoding="utf-8"?>
+<p:sld xmlns:a="http://schemas.openxmlformats.org/drawingml/2006/main" xmlns:r="http://schemas.openxmlformats.org/officeDocument/2006/relationships" xmlns:p="http://schemas.openxmlformats.org/presentationml/2006/main">
+  <p:cSld>
+    <p:bg>
+      <p:bgPr>
+        <a:solidFill>
+          <a:srgbClr val="111111"/>
+        </a:solidFill>
+        <a:effectLst/>
+      </p:bgPr>
+    </p:bg>
+    <p:spTree>
+      <p:nvGrpSpPr>
+        <p:cNvPr id="1" name=""/>
+        <p:cNvGrpSpPr/>
+        <p:nvPr/>
+      </p:nvGrpSpPr>
+      <p:grpSpPr>
+        <a:xfrm>
+          <a:off x="0" y="0"/>
+          <a:ext cx="0" cy="0"/>
+          <a:chOff x="0" y="0"/>
+          <a:chExt cx="0" cy="0"/>
+        </a:xfrm>
+      </p:grpSpPr>
+      <p:sp>
+        <p:nvSpPr>
+          <p:cNvPr id="4" name="Title 3"/>
+          <p:cNvSpPr>
+            <a:spLocks noGrp="1"/>
+          </p:cNvSpPr>
+          <p:nvPr>
+            <p:ph type="ctrTitle"/>
+          </p:nvPr>
+        </p:nvSpPr>
+        <p:spPr>
+          <a:xfrm>
+            <a:off x="1524000" y="0"/>
+            <a:ext cx="9144000" cy="2917370"/>
+          </a:xfrm>
+        </p:spPr>
+        <p:txBody>
+          <a:bodyPr anchor="b">
+            <a:normAutofit/>
+          </a:bodyPr>
+          <a:lstStyle/>
+          <a:p>
+            <a:pPr algn="l"/>
+            <a:r>
+              <a:rPr lang="en-AU" sz="4400" b="1" dirty="0" smtClean="0">
+                <a:solidFill>
+                  <a:srgbClr val="EEEEEE"/>
+                </a:solidFill>
+                <a:latin typeface="Open Sans" panose="020B0606030504020204" pitchFamily="34" charset="0"/>
+                <a:ea typeface="Open Sans" panose="020B0606030504020204" pitchFamily="34" charset="0"/>
+                <a:cs typeface="Open Sans" panose="020B0606030504020204" pitchFamily="34" charset="0"/>
+              </a:rPr>
+              <a:t>A password is now required…</a:t>
+            </a:r>
+            <a:endParaRPr lang="en-AU" sz="3200" dirty="0">
+              <a:solidFill>
+                <a:srgbClr val="EEEEEE"/>
+              </a:solidFill>
+              <a:latin typeface="Open Sans" panose="020B0606030504020204" pitchFamily="34" charset="0"/>
+              <a:ea typeface="Open Sans" panose="020B0606030504020204" pitchFamily="34" charset="0"/>
+              <a:cs typeface="Open Sans" panose="020B0606030504020204" pitchFamily="34" charset="0"/>
+            </a:endParaRPr>
+          </a:p>
+        </p:txBody>
+      </p:sp>
+      <p:sp>
+        <p:nvSpPr>
+          <p:cNvPr id="6" name="Title 3"/>
+          <p:cNvSpPr txBox="1">
+            <a:spLocks/>
+          </p:cNvSpPr>
+          <p:nvPr/>
+        </p:nvSpPr>
+        <p:spPr>
+          <a:xfrm>
+            <a:off x="1524001" y="2917370"/>
+            <a:ext cx="9144000" cy="511630"/>
+          </a:xfrm>
+          <a:prstGeom prst="rect">
+            <a:avLst/>
+          </a:prstGeom>
+        </p:spPr>
+        <p:txBody>
+          <a:bodyPr vert="horz" lIns="91440" tIns="45720" rIns="91440" bIns="45720" rtlCol="0" anchor="t">
+            <a:normAutofit lnSpcReduction="10000"/>
+          </a:bodyPr>
+          <a:lstStyle>
+            <a:lvl1pPr algn="ctr" defTabSz="914400" rtl="0" eaLnBrk="1" latinLnBrk="0" hangingPunct="1">
+              <a:lnSpc>
+                <a:spcPct val="90000"/>
+              </a:lnSpc>
+              <a:spcBef>
+                <a:spcPct val="0"/>
+              </a:spcBef>
+              <a:buNone/>
+              <a:defRPr sz="6000" kern="1200">
+                <a:solidFill>
+                  <a:schemeClr val="tx1"/>
+                </a:solidFill>
+                <a:latin typeface="+mj-lt"/>
+                <a:ea typeface="+mj-ea"/>
+                <a:cs typeface="+mj-cs"/>
+              </a:defRPr>
+            </a:lvl1pPr>
+          </a:lstStyle>
+          <a:p>
+            <a:pPr algn="l">
+              <a:lnSpc>
+                <a:spcPct val="100000"/>
+              </a:lnSpc>
+            </a:pPr>
+            <a:r>
+              <a:rPr lang="en-AU" sz="2800" dirty="0" smtClean="0">
+                <a:solidFill>
+                  <a:srgbClr val="111111"/>
+                </a:solidFill>
+                <a:latin typeface="Open Sans" panose="020B0606030504020204" pitchFamily="34" charset="0"/>
+                <a:ea typeface="Open Sans" panose="020B0606030504020204" pitchFamily="34" charset="0"/>
+                <a:cs typeface="Open Sans" panose="020B0606030504020204" pitchFamily="34" charset="0"/>
+              </a:rPr>
+              <a:t>separator</a:t>
+            </a:r>
+          </a:p>
+        </p:txBody>
+      </p:sp>
+      <p:sp>
+        <p:nvSpPr>
+          <p:cNvPr id="2" name="TextBox 1"/>
+          <p:cNvSpPr txBox="1"/>
+          <p:nvPr/>
+        </p:nvSpPr>
+        <p:spPr>
+          <a:xfrm>
+            <a:off x="1524000" y="3428999"/>
+            <a:ext cx="9144000" cy="892552"/>
+          </a:xfrm>
+          <a:prstGeom prst="rect">
+            <a:avLst/>
+          </a:prstGeom>
+          <a:noFill/>
+        </p:spPr>
+        <p:txBody>
+          <a:bodyPr wrap="square" rtlCol="0">
+            <a:spAutoFit/>
+          </a:bodyPr>
+          <a:lstStyle/>
+          <a:p>
+            <a:pPr marL="285750" indent="-285750">
+              <a:buFont typeface="Arial" panose="020B0604020202020204" pitchFamily="34" charset="0"/>
+              <a:buChar char="•"/>
+            </a:pPr>
+            <a:r>
+              <a:rPr lang="en-AU" sz="2600" dirty="0" smtClean="0">
+                <a:solidFill>
+                  <a:srgbClr val="EEEEEE"/>
+                </a:solidFill>
+                <a:latin typeface="Open Sans" panose="020B0606030504020204" pitchFamily="34" charset="0"/>
+                <a:ea typeface="Open Sans" panose="020B0606030504020204" pitchFamily="34" charset="0"/>
+                <a:cs typeface="Open Sans" panose="020B0606030504020204" pitchFamily="34" charset="0"/>
+              </a:rPr>
+              <a:t>In order to authenticate the user and log into the computer</a:t>
+            </a:r>
+            <a:endParaRPr lang="en-AU" sz="2600" dirty="0" smtClean="0">
+              <a:solidFill>
+                <a:srgbClr val="EEEEEE"/>
+              </a:solidFill>
+              <a:latin typeface="Open Sans" panose="020B0606030504020204" pitchFamily="34" charset="0"/>
+              <a:ea typeface="Open Sans" panose="020B0606030504020204" pitchFamily="34" charset="0"/>
+              <a:cs typeface="Open Sans" panose="020B0606030504020204" pitchFamily="34" charset="0"/>
+            </a:endParaRPr>
+          </a:p>
+        </p:txBody>
+      </p:sp>
+    </p:spTree>
+    <p:extLst>
+      <p:ext uri="{BB962C8B-B14F-4D97-AF65-F5344CB8AC3E}">
+        <p14:creationId xmlns:p14="http://schemas.microsoft.com/office/powerpoint/2010/main" val="944288107"/>
+      </p:ext>
+    </p:extLst>
+  </p:cSld>
+  <p:clrMapOvr>
+    <a:masterClrMapping/>
+  </p:clrMapOvr>
+  <p:transition spd="slow">
+    <p:push/>
+  </p:transition>
+  <p:timing>
+    <p:tnLst>
+      <p:par>
+        <p:cTn id="1" dur="indefinite" restart="never" nodeType="tmRoot"/>
+      </p:par>
+    </p:tnLst>
+  </p:timing>
+</p:sld>
+</file>
+
+<file path=ppt/slides/slide44.xml><?xml version="1.0" encoding="utf-8"?>
+<p:sld xmlns:a="http://schemas.openxmlformats.org/drawingml/2006/main" xmlns:r="http://schemas.openxmlformats.org/officeDocument/2006/relationships" xmlns:p="http://schemas.openxmlformats.org/presentationml/2006/main">
+  <p:cSld>
+    <p:bg>
+      <p:bgPr>
+        <a:solidFill>
+          <a:srgbClr val="111111"/>
+        </a:solidFill>
+        <a:effectLst/>
+      </p:bgPr>
+    </p:bg>
+    <p:spTree>
+      <p:nvGrpSpPr>
+        <p:cNvPr id="1" name=""/>
+        <p:cNvGrpSpPr/>
+        <p:nvPr/>
+      </p:nvGrpSpPr>
+      <p:grpSpPr>
+        <a:xfrm>
+          <a:off x="0" y="0"/>
+          <a:ext cx="0" cy="0"/>
+          <a:chOff x="0" y="0"/>
+          <a:chExt cx="0" cy="0"/>
+        </a:xfrm>
+      </p:grpSpPr>
+      <p:sp>
+        <p:nvSpPr>
+          <p:cNvPr id="4" name="Title 3"/>
+          <p:cNvSpPr>
+            <a:spLocks noGrp="1"/>
+          </p:cNvSpPr>
+          <p:nvPr>
+            <p:ph type="ctrTitle"/>
+          </p:nvPr>
+        </p:nvSpPr>
+        <p:spPr>
+          <a:xfrm>
+            <a:off x="1524000" y="-635077"/>
+            <a:ext cx="9144000" cy="2917370"/>
+          </a:xfrm>
+        </p:spPr>
+        <p:txBody>
+          <a:bodyPr anchor="b">
+            <a:normAutofit/>
+          </a:bodyPr>
+          <a:lstStyle/>
+          <a:p>
+            <a:pPr algn="l"/>
+            <a:r>
+              <a:rPr lang="en-AU" sz="4400" b="1" dirty="0" smtClean="0">
+                <a:solidFill>
+                  <a:srgbClr val="EEEEEE"/>
+                </a:solidFill>
+                <a:latin typeface="Open Sans" panose="020B0606030504020204" pitchFamily="34" charset="0"/>
+                <a:ea typeface="Open Sans" panose="020B0606030504020204" pitchFamily="34" charset="0"/>
+                <a:cs typeface="Open Sans" panose="020B0606030504020204" pitchFamily="34" charset="0"/>
+              </a:rPr>
+              <a:t>Password protect the screensaver</a:t>
+            </a:r>
+            <a:endParaRPr lang="en-AU" sz="3200" dirty="0">
+              <a:solidFill>
+                <a:srgbClr val="EEEEEE"/>
+              </a:solidFill>
+              <a:latin typeface="Open Sans" panose="020B0606030504020204" pitchFamily="34" charset="0"/>
+              <a:ea typeface="Open Sans" panose="020B0606030504020204" pitchFamily="34" charset="0"/>
+              <a:cs typeface="Open Sans" panose="020B0606030504020204" pitchFamily="34" charset="0"/>
+            </a:endParaRPr>
+          </a:p>
+        </p:txBody>
+      </p:sp>
+      <p:sp>
+        <p:nvSpPr>
+          <p:cNvPr id="6" name="Title 3"/>
+          <p:cNvSpPr txBox="1">
+            <a:spLocks/>
+          </p:cNvSpPr>
+          <p:nvPr/>
+        </p:nvSpPr>
+        <p:spPr>
+          <a:xfrm>
+            <a:off x="1524001" y="2282293"/>
+            <a:ext cx="9144000" cy="511630"/>
+          </a:xfrm>
+          <a:prstGeom prst="rect">
+            <a:avLst/>
+          </a:prstGeom>
+        </p:spPr>
+        <p:txBody>
+          <a:bodyPr vert="horz" lIns="91440" tIns="45720" rIns="91440" bIns="45720" rtlCol="0" anchor="t">
+            <a:normAutofit lnSpcReduction="10000"/>
+          </a:bodyPr>
+          <a:lstStyle>
+            <a:lvl1pPr algn="ctr" defTabSz="914400" rtl="0" eaLnBrk="1" latinLnBrk="0" hangingPunct="1">
+              <a:lnSpc>
+                <a:spcPct val="90000"/>
+              </a:lnSpc>
+              <a:spcBef>
+                <a:spcPct val="0"/>
+              </a:spcBef>
+              <a:buNone/>
+              <a:defRPr sz="6000" kern="1200">
+                <a:solidFill>
+                  <a:schemeClr val="tx1"/>
+                </a:solidFill>
+                <a:latin typeface="+mj-lt"/>
+                <a:ea typeface="+mj-ea"/>
+                <a:cs typeface="+mj-cs"/>
+              </a:defRPr>
+            </a:lvl1pPr>
+          </a:lstStyle>
+          <a:p>
+            <a:pPr algn="l">
+              <a:lnSpc>
+                <a:spcPct val="100000"/>
+              </a:lnSpc>
+            </a:pPr>
+            <a:r>
+              <a:rPr lang="en-AU" sz="2800" dirty="0" smtClean="0">
+                <a:solidFill>
+                  <a:srgbClr val="111111"/>
+                </a:solidFill>
+                <a:latin typeface="Open Sans" panose="020B0606030504020204" pitchFamily="34" charset="0"/>
+                <a:ea typeface="Open Sans" panose="020B0606030504020204" pitchFamily="34" charset="0"/>
+                <a:cs typeface="Open Sans" panose="020B0606030504020204" pitchFamily="34" charset="0"/>
+              </a:rPr>
+              <a:t>separator</a:t>
+            </a:r>
+          </a:p>
+        </p:txBody>
+      </p:sp>
+      <p:sp>
+        <p:nvSpPr>
+          <p:cNvPr id="2" name="TextBox 1"/>
+          <p:cNvSpPr txBox="1"/>
+          <p:nvPr/>
+        </p:nvSpPr>
+        <p:spPr>
+          <a:xfrm>
+            <a:off x="1524000" y="2793922"/>
+            <a:ext cx="9144000" cy="892552"/>
+          </a:xfrm>
+          <a:prstGeom prst="rect">
+            <a:avLst/>
+          </a:prstGeom>
+          <a:noFill/>
+        </p:spPr>
+        <p:txBody>
+          <a:bodyPr wrap="square" rtlCol="0">
+            <a:spAutoFit/>
+          </a:bodyPr>
+          <a:lstStyle/>
+          <a:p>
+            <a:pPr marL="285750" indent="-285750">
+              <a:buFont typeface="Arial" panose="020B0604020202020204" pitchFamily="34" charset="0"/>
+              <a:buChar char="•"/>
+            </a:pPr>
+            <a:r>
+              <a:rPr lang="en-AU" sz="2600" dirty="0" smtClean="0">
+                <a:solidFill>
+                  <a:srgbClr val="EEEEEE"/>
+                </a:solidFill>
+                <a:latin typeface="Open Sans" panose="020B0606030504020204" pitchFamily="34" charset="0"/>
+                <a:ea typeface="Open Sans" panose="020B0606030504020204" pitchFamily="34" charset="0"/>
+                <a:cs typeface="Open Sans" panose="020B0606030504020204" pitchFamily="34" charset="0"/>
+              </a:rPr>
+              <a:t>Right click anywhere on the desktop background</a:t>
+            </a:r>
+          </a:p>
+          <a:p>
+            <a:pPr marL="285750" indent="-285750">
+              <a:buFont typeface="Arial" panose="020B0604020202020204" pitchFamily="34" charset="0"/>
+              <a:buChar char="•"/>
+            </a:pPr>
+            <a:r>
+              <a:rPr lang="en-AU" sz="2600" dirty="0" smtClean="0">
+                <a:solidFill>
+                  <a:srgbClr val="EEEEEE"/>
+                </a:solidFill>
+                <a:latin typeface="Open Sans" panose="020B0606030504020204" pitchFamily="34" charset="0"/>
+                <a:ea typeface="Open Sans" panose="020B0606030504020204" pitchFamily="34" charset="0"/>
+                <a:cs typeface="Open Sans" panose="020B0606030504020204" pitchFamily="34" charset="0"/>
+              </a:rPr>
+              <a:t>Click “Personalize”</a:t>
+            </a:r>
+            <a:endParaRPr lang="en-AU" sz="2600" dirty="0" smtClean="0">
+              <a:solidFill>
+                <a:srgbClr val="EEEEEE"/>
+              </a:solidFill>
+              <a:latin typeface="Open Sans" panose="020B0606030504020204" pitchFamily="34" charset="0"/>
+              <a:ea typeface="Open Sans" panose="020B0606030504020204" pitchFamily="34" charset="0"/>
+              <a:cs typeface="Open Sans" panose="020B0606030504020204" pitchFamily="34" charset="0"/>
+            </a:endParaRPr>
+          </a:p>
+        </p:txBody>
+      </p:sp>
+      <p:pic>
+        <p:nvPicPr>
+          <p:cNvPr id="5" name="Picture 4"/>
+          <p:cNvPicPr>
+            <a:picLocks noChangeAspect="1"/>
+          </p:cNvPicPr>
+          <p:nvPr/>
+        </p:nvPicPr>
+        <p:blipFill>
+          <a:blip r:embed="rId2">
+            <a:extLst>
+              <a:ext uri="{28A0092B-C50C-407E-A947-70E740481C1C}">
+                <a14:useLocalDpi xmlns:a14="http://schemas.microsoft.com/office/drawing/2010/main" val="0"/>
+              </a:ext>
+            </a:extLst>
+          </a:blip>
+          <a:stretch>
+            <a:fillRect/>
+          </a:stretch>
+        </p:blipFill>
+        <p:spPr>
+          <a:xfrm>
+            <a:off x="5042032" y="4198103"/>
+            <a:ext cx="2107936" cy="2336508"/>
+          </a:xfrm>
+          <a:prstGeom prst="rect">
+            <a:avLst/>
+          </a:prstGeom>
+        </p:spPr>
+      </p:pic>
+    </p:spTree>
+    <p:extLst>
+      <p:ext uri="{BB962C8B-B14F-4D97-AF65-F5344CB8AC3E}">
+        <p14:creationId xmlns:p14="http://schemas.microsoft.com/office/powerpoint/2010/main" val="1434221249"/>
+      </p:ext>
+    </p:extLst>
+  </p:cSld>
+  <p:clrMapOvr>
+    <a:masterClrMapping/>
+  </p:clrMapOvr>
+  <p:transition spd="slow">
+    <p:push/>
+  </p:transition>
+  <p:timing>
+    <p:tnLst>
+      <p:par>
+        <p:cTn id="1" dur="indefinite" restart="never" nodeType="tmRoot"/>
+      </p:par>
+    </p:tnLst>
+  </p:timing>
+</p:sld>
+</file>
+
+<file path=ppt/slides/slide45.xml><?xml version="1.0" encoding="utf-8"?>
+<p:sld xmlns:a="http://schemas.openxmlformats.org/drawingml/2006/main" xmlns:r="http://schemas.openxmlformats.org/officeDocument/2006/relationships" xmlns:p="http://schemas.openxmlformats.org/presentationml/2006/main">
+  <p:cSld>
+    <p:bg>
+      <p:bgPr>
+        <a:solidFill>
+          <a:srgbClr val="111111"/>
+        </a:solidFill>
+        <a:effectLst/>
+      </p:bgPr>
+    </p:bg>
+    <p:spTree>
+      <p:nvGrpSpPr>
+        <p:cNvPr id="1" name=""/>
+        <p:cNvGrpSpPr/>
+        <p:nvPr/>
+      </p:nvGrpSpPr>
+      <p:grpSpPr>
+        <a:xfrm>
+          <a:off x="0" y="0"/>
+          <a:ext cx="0" cy="0"/>
+          <a:chOff x="0" y="0"/>
+          <a:chExt cx="0" cy="0"/>
+        </a:xfrm>
+      </p:grpSpPr>
+      <p:sp>
+        <p:nvSpPr>
+          <p:cNvPr id="6" name="Title 3"/>
+          <p:cNvSpPr txBox="1">
+            <a:spLocks/>
+          </p:cNvSpPr>
+          <p:nvPr/>
+        </p:nvSpPr>
+        <p:spPr>
+          <a:xfrm>
+            <a:off x="1524001" y="1446915"/>
+            <a:ext cx="9144000" cy="511630"/>
+          </a:xfrm>
+          <a:prstGeom prst="rect">
+            <a:avLst/>
+          </a:prstGeom>
+        </p:spPr>
+        <p:txBody>
+          <a:bodyPr vert="horz" lIns="91440" tIns="45720" rIns="91440" bIns="45720" rtlCol="0" anchor="t">
+            <a:normAutofit lnSpcReduction="10000"/>
+          </a:bodyPr>
+          <a:lstStyle>
+            <a:lvl1pPr algn="ctr" defTabSz="914400" rtl="0" eaLnBrk="1" latinLnBrk="0" hangingPunct="1">
+              <a:lnSpc>
+                <a:spcPct val="90000"/>
+              </a:lnSpc>
+              <a:spcBef>
+                <a:spcPct val="0"/>
+              </a:spcBef>
+              <a:buNone/>
+              <a:defRPr sz="6000" kern="1200">
+                <a:solidFill>
+                  <a:schemeClr val="tx1"/>
+                </a:solidFill>
+                <a:latin typeface="+mj-lt"/>
+                <a:ea typeface="+mj-ea"/>
+                <a:cs typeface="+mj-cs"/>
+              </a:defRPr>
+            </a:lvl1pPr>
+          </a:lstStyle>
+          <a:p>
+            <a:pPr algn="l">
+              <a:lnSpc>
+                <a:spcPct val="100000"/>
+              </a:lnSpc>
+            </a:pPr>
+            <a:r>
+              <a:rPr lang="en-AU" sz="2800" dirty="0" smtClean="0">
+                <a:solidFill>
+                  <a:srgbClr val="111111"/>
+                </a:solidFill>
+                <a:latin typeface="Open Sans" panose="020B0606030504020204" pitchFamily="34" charset="0"/>
+                <a:ea typeface="Open Sans" panose="020B0606030504020204" pitchFamily="34" charset="0"/>
+                <a:cs typeface="Open Sans" panose="020B0606030504020204" pitchFamily="34" charset="0"/>
+              </a:rPr>
+              <a:t>separator</a:t>
+            </a:r>
+          </a:p>
+        </p:txBody>
+      </p:sp>
+      <p:sp>
+        <p:nvSpPr>
+          <p:cNvPr id="2" name="TextBox 1"/>
+          <p:cNvSpPr txBox="1"/>
+          <p:nvPr/>
+        </p:nvSpPr>
+        <p:spPr>
+          <a:xfrm>
+            <a:off x="1524000" y="1958544"/>
+            <a:ext cx="9144000" cy="492443"/>
+          </a:xfrm>
+          <a:prstGeom prst="rect">
+            <a:avLst/>
+          </a:prstGeom>
+          <a:noFill/>
+        </p:spPr>
+        <p:txBody>
+          <a:bodyPr wrap="square" rtlCol="0">
+            <a:spAutoFit/>
+          </a:bodyPr>
+          <a:lstStyle/>
+          <a:p>
+            <a:pPr marL="285750" indent="-285750">
+              <a:buFont typeface="Arial" panose="020B0604020202020204" pitchFamily="34" charset="0"/>
+              <a:buChar char="•"/>
+            </a:pPr>
+            <a:r>
+              <a:rPr lang="en-AU" sz="2600" dirty="0" smtClean="0">
+                <a:solidFill>
+                  <a:srgbClr val="EEEEEE"/>
+                </a:solidFill>
+                <a:latin typeface="Open Sans" panose="020B0606030504020204" pitchFamily="34" charset="0"/>
+                <a:ea typeface="Open Sans" panose="020B0606030504020204" pitchFamily="34" charset="0"/>
+                <a:cs typeface="Open Sans" panose="020B0606030504020204" pitchFamily="34" charset="0"/>
+              </a:rPr>
+              <a:t>Click “Screen Saver”</a:t>
+            </a:r>
+            <a:endParaRPr lang="en-AU" sz="2600" dirty="0" smtClean="0">
+              <a:solidFill>
+                <a:srgbClr val="EEEEEE"/>
+              </a:solidFill>
+              <a:latin typeface="Open Sans" panose="020B0606030504020204" pitchFamily="34" charset="0"/>
+              <a:ea typeface="Open Sans" panose="020B0606030504020204" pitchFamily="34" charset="0"/>
+              <a:cs typeface="Open Sans" panose="020B0606030504020204" pitchFamily="34" charset="0"/>
+            </a:endParaRPr>
+          </a:p>
+        </p:txBody>
+      </p:sp>
+      <p:pic>
+        <p:nvPicPr>
+          <p:cNvPr id="4" name="Picture 3"/>
+          <p:cNvPicPr>
+            <a:picLocks noChangeAspect="1"/>
+          </p:cNvPicPr>
+          <p:nvPr/>
+        </p:nvPicPr>
+        <p:blipFill>
+          <a:blip r:embed="rId2">
+            <a:extLst>
+              <a:ext uri="{28A0092B-C50C-407E-A947-70E740481C1C}">
+                <a14:useLocalDpi xmlns:a14="http://schemas.microsoft.com/office/drawing/2010/main" val="0"/>
+              </a:ext>
+            </a:extLst>
+          </a:blip>
+          <a:stretch>
+            <a:fillRect/>
+          </a:stretch>
+        </p:blipFill>
+        <p:spPr>
+          <a:xfrm>
+            <a:off x="1066800" y="2962616"/>
+            <a:ext cx="10058400" cy="880110"/>
+          </a:xfrm>
+          <a:prstGeom prst="rect">
+            <a:avLst/>
+          </a:prstGeom>
+        </p:spPr>
+      </p:pic>
+    </p:spTree>
+    <p:extLst>
+      <p:ext uri="{BB962C8B-B14F-4D97-AF65-F5344CB8AC3E}">
+        <p14:creationId xmlns:p14="http://schemas.microsoft.com/office/powerpoint/2010/main" val="1968599781"/>
+      </p:ext>
+    </p:extLst>
+  </p:cSld>
+  <p:clrMapOvr>
+    <a:masterClrMapping/>
+  </p:clrMapOvr>
+  <p:transition spd="slow">
+    <p:push/>
+  </p:transition>
+  <p:timing>
+    <p:tnLst>
+      <p:par>
+        <p:cTn id="1" dur="indefinite" restart="never" nodeType="tmRoot"/>
+      </p:par>
+    </p:tnLst>
+  </p:timing>
+</p:sld>
+</file>
+
+<file path=ppt/slides/slide46.xml><?xml version="1.0" encoding="utf-8"?>
+<p:sld xmlns:a="http://schemas.openxmlformats.org/drawingml/2006/main" xmlns:r="http://schemas.openxmlformats.org/officeDocument/2006/relationships" xmlns:p="http://schemas.openxmlformats.org/presentationml/2006/main">
+  <p:cSld>
+    <p:bg>
+      <p:bgPr>
+        <a:solidFill>
+          <a:srgbClr val="111111"/>
+        </a:solidFill>
+        <a:effectLst/>
+      </p:bgPr>
+    </p:bg>
+    <p:spTree>
+      <p:nvGrpSpPr>
+        <p:cNvPr id="1" name=""/>
+        <p:cNvGrpSpPr/>
+        <p:nvPr/>
+      </p:nvGrpSpPr>
+      <p:grpSpPr>
+        <a:xfrm>
+          <a:off x="0" y="0"/>
+          <a:ext cx="0" cy="0"/>
+          <a:chOff x="0" y="0"/>
+          <a:chExt cx="0" cy="0"/>
+        </a:xfrm>
+      </p:grpSpPr>
+      <p:sp>
+        <p:nvSpPr>
+          <p:cNvPr id="6" name="Title 3"/>
+          <p:cNvSpPr txBox="1">
+            <a:spLocks/>
+          </p:cNvSpPr>
+          <p:nvPr/>
+        </p:nvSpPr>
+        <p:spPr>
+          <a:xfrm>
+            <a:off x="1524001" y="1446915"/>
+            <a:ext cx="9144000" cy="511630"/>
+          </a:xfrm>
+          <a:prstGeom prst="rect">
+            <a:avLst/>
+          </a:prstGeom>
+        </p:spPr>
+        <p:txBody>
+          <a:bodyPr vert="horz" lIns="91440" tIns="45720" rIns="91440" bIns="45720" rtlCol="0" anchor="t">
+            <a:normAutofit lnSpcReduction="10000"/>
+          </a:bodyPr>
+          <a:lstStyle>
+            <a:lvl1pPr algn="ctr" defTabSz="914400" rtl="0" eaLnBrk="1" latinLnBrk="0" hangingPunct="1">
+              <a:lnSpc>
+                <a:spcPct val="90000"/>
+              </a:lnSpc>
+              <a:spcBef>
+                <a:spcPct val="0"/>
+              </a:spcBef>
+              <a:buNone/>
+              <a:defRPr sz="6000" kern="1200">
+                <a:solidFill>
+                  <a:schemeClr val="tx1"/>
+                </a:solidFill>
+                <a:latin typeface="+mj-lt"/>
+                <a:ea typeface="+mj-ea"/>
+                <a:cs typeface="+mj-cs"/>
+              </a:defRPr>
+            </a:lvl1pPr>
+          </a:lstStyle>
+          <a:p>
+            <a:pPr algn="l">
+              <a:lnSpc>
+                <a:spcPct val="100000"/>
+              </a:lnSpc>
+            </a:pPr>
+            <a:r>
+              <a:rPr lang="en-AU" sz="2800" dirty="0" smtClean="0">
+                <a:solidFill>
+                  <a:srgbClr val="111111"/>
+                </a:solidFill>
+                <a:latin typeface="Open Sans" panose="020B0606030504020204" pitchFamily="34" charset="0"/>
+                <a:ea typeface="Open Sans" panose="020B0606030504020204" pitchFamily="34" charset="0"/>
+                <a:cs typeface="Open Sans" panose="020B0606030504020204" pitchFamily="34" charset="0"/>
+              </a:rPr>
+              <a:t>separator</a:t>
+            </a:r>
+          </a:p>
+        </p:txBody>
+      </p:sp>
+      <p:sp>
+        <p:nvSpPr>
+          <p:cNvPr id="2" name="TextBox 1"/>
+          <p:cNvSpPr txBox="1"/>
+          <p:nvPr/>
+        </p:nvSpPr>
+        <p:spPr>
+          <a:xfrm>
+            <a:off x="1524000" y="708250"/>
+            <a:ext cx="9144000" cy="892552"/>
+          </a:xfrm>
+          <a:prstGeom prst="rect">
+            <a:avLst/>
+          </a:prstGeom>
+          <a:noFill/>
+        </p:spPr>
+        <p:txBody>
+          <a:bodyPr wrap="square" rtlCol="0">
+            <a:spAutoFit/>
+          </a:bodyPr>
+          <a:lstStyle/>
+          <a:p>
+            <a:pPr marL="285750" indent="-285750">
+              <a:buFont typeface="Arial" panose="020B0604020202020204" pitchFamily="34" charset="0"/>
+              <a:buChar char="•"/>
+            </a:pPr>
+            <a:r>
+              <a:rPr lang="en-AU" sz="2600" dirty="0" smtClean="0">
+                <a:solidFill>
+                  <a:srgbClr val="EEEEEE"/>
+                </a:solidFill>
+                <a:latin typeface="Open Sans" panose="020B0606030504020204" pitchFamily="34" charset="0"/>
+                <a:ea typeface="Open Sans" panose="020B0606030504020204" pitchFamily="34" charset="0"/>
+                <a:cs typeface="Open Sans" panose="020B0606030504020204" pitchFamily="34" charset="0"/>
+              </a:rPr>
+              <a:t>Ensure that the “On resume, display logon screen” checkbox is ticked</a:t>
+            </a:r>
+            <a:endParaRPr lang="en-AU" sz="2600" dirty="0" smtClean="0">
+              <a:solidFill>
+                <a:srgbClr val="EEEEEE"/>
+              </a:solidFill>
+              <a:latin typeface="Open Sans" panose="020B0606030504020204" pitchFamily="34" charset="0"/>
+              <a:ea typeface="Open Sans" panose="020B0606030504020204" pitchFamily="34" charset="0"/>
+              <a:cs typeface="Open Sans" panose="020B0606030504020204" pitchFamily="34" charset="0"/>
+            </a:endParaRPr>
+          </a:p>
+        </p:txBody>
+      </p:sp>
+      <p:pic>
+        <p:nvPicPr>
+          <p:cNvPr id="3" name="Picture 2"/>
+          <p:cNvPicPr>
+            <a:picLocks noChangeAspect="1"/>
+          </p:cNvPicPr>
+          <p:nvPr/>
+        </p:nvPicPr>
+        <p:blipFill>
+          <a:blip r:embed="rId2">
+            <a:extLst>
+              <a:ext uri="{28A0092B-C50C-407E-A947-70E740481C1C}">
+                <a14:useLocalDpi xmlns:a14="http://schemas.microsoft.com/office/drawing/2010/main" val="0"/>
+              </a:ext>
+            </a:extLst>
+          </a:blip>
+          <a:stretch>
+            <a:fillRect/>
+          </a:stretch>
+        </p:blipFill>
+        <p:spPr>
+          <a:xfrm>
+            <a:off x="4120443" y="1958545"/>
+            <a:ext cx="3951114" cy="4257594"/>
+          </a:xfrm>
+          <a:prstGeom prst="rect">
+            <a:avLst/>
+          </a:prstGeom>
+        </p:spPr>
+      </p:pic>
+    </p:spTree>
+    <p:extLst>
+      <p:ext uri="{BB962C8B-B14F-4D97-AF65-F5344CB8AC3E}">
+        <p14:creationId xmlns:p14="http://schemas.microsoft.com/office/powerpoint/2010/main" val="3748283835"/>
+      </p:ext>
+    </p:extLst>
+  </p:cSld>
+  <p:clrMapOvr>
+    <a:masterClrMapping/>
+  </p:clrMapOvr>
+  <p:transition spd="slow">
+    <p:push/>
+  </p:transition>
+  <p:timing>
+    <p:tnLst>
+      <p:par>
+        <p:cTn id="1" dur="indefinite" restart="never" nodeType="tmRoot"/>
+      </p:par>
+    </p:tnLst>
+  </p:timing>
+</p:sld>
+</file>
+
+<file path=ppt/slides/slide47.xml><?xml version="1.0" encoding="utf-8"?>
+<p:sld xmlns:a="http://schemas.openxmlformats.org/drawingml/2006/main" xmlns:r="http://schemas.openxmlformats.org/officeDocument/2006/relationships" xmlns:p="http://schemas.openxmlformats.org/presentationml/2006/main">
+  <p:cSld>
+    <p:bg>
+      <p:bgPr>
+        <a:solidFill>
+          <a:srgbClr val="111111"/>
+        </a:solidFill>
+        <a:effectLst/>
+      </p:bgPr>
+    </p:bg>
+    <p:spTree>
+      <p:nvGrpSpPr>
+        <p:cNvPr id="1" name=""/>
+        <p:cNvGrpSpPr/>
+        <p:nvPr/>
+      </p:nvGrpSpPr>
+      <p:grpSpPr>
+        <a:xfrm>
+          <a:off x="0" y="0"/>
+          <a:ext cx="0" cy="0"/>
+          <a:chOff x="0" y="0"/>
+          <a:chExt cx="0" cy="0"/>
+        </a:xfrm>
+      </p:grpSpPr>
+      <p:sp>
+        <p:nvSpPr>
+          <p:cNvPr id="4" name="Title 3"/>
+          <p:cNvSpPr>
+            <a:spLocks noGrp="1"/>
+          </p:cNvSpPr>
+          <p:nvPr>
+            <p:ph type="ctrTitle"/>
+          </p:nvPr>
+        </p:nvSpPr>
+        <p:spPr>
+          <a:xfrm>
+            <a:off x="1524000" y="0"/>
+            <a:ext cx="9144000" cy="2917370"/>
+          </a:xfrm>
+        </p:spPr>
+        <p:txBody>
+          <a:bodyPr anchor="b">
+            <a:normAutofit/>
+          </a:bodyPr>
+          <a:lstStyle/>
+          <a:p>
+            <a:pPr algn="l"/>
+            <a:r>
+              <a:rPr lang="en-AU" sz="4400" b="1" dirty="0" smtClean="0">
+                <a:solidFill>
+                  <a:srgbClr val="EEEEEE"/>
+                </a:solidFill>
+                <a:latin typeface="Open Sans" panose="020B0606030504020204" pitchFamily="34" charset="0"/>
+                <a:ea typeface="Open Sans" panose="020B0606030504020204" pitchFamily="34" charset="0"/>
+                <a:cs typeface="Open Sans" panose="020B0606030504020204" pitchFamily="34" charset="0"/>
+              </a:rPr>
+              <a:t>Whenever the screen saver is deactivated…</a:t>
+            </a:r>
+          </a:p>
+        </p:txBody>
+      </p:sp>
+      <p:sp>
+        <p:nvSpPr>
+          <p:cNvPr id="6" name="Title 3"/>
+          <p:cNvSpPr txBox="1">
+            <a:spLocks/>
+          </p:cNvSpPr>
+          <p:nvPr/>
+        </p:nvSpPr>
+        <p:spPr>
+          <a:xfrm>
+            <a:off x="1524001" y="2917370"/>
+            <a:ext cx="9144000" cy="511630"/>
+          </a:xfrm>
+          <a:prstGeom prst="rect">
+            <a:avLst/>
+          </a:prstGeom>
+        </p:spPr>
+        <p:txBody>
+          <a:bodyPr vert="horz" lIns="91440" tIns="45720" rIns="91440" bIns="45720" rtlCol="0" anchor="t">
+            <a:normAutofit lnSpcReduction="10000"/>
+          </a:bodyPr>
+          <a:lstStyle>
+            <a:lvl1pPr algn="ctr" defTabSz="914400" rtl="0" eaLnBrk="1" latinLnBrk="0" hangingPunct="1">
+              <a:lnSpc>
+                <a:spcPct val="90000"/>
+              </a:lnSpc>
+              <a:spcBef>
+                <a:spcPct val="0"/>
+              </a:spcBef>
+              <a:buNone/>
+              <a:defRPr sz="6000" kern="1200">
+                <a:solidFill>
+                  <a:schemeClr val="tx1"/>
+                </a:solidFill>
+                <a:latin typeface="+mj-lt"/>
+                <a:ea typeface="+mj-ea"/>
+                <a:cs typeface="+mj-cs"/>
+              </a:defRPr>
+            </a:lvl1pPr>
+          </a:lstStyle>
+          <a:p>
+            <a:pPr algn="l">
+              <a:lnSpc>
+                <a:spcPct val="100000"/>
+              </a:lnSpc>
+            </a:pPr>
+            <a:r>
+              <a:rPr lang="en-AU" sz="2800" dirty="0" smtClean="0">
+                <a:solidFill>
+                  <a:srgbClr val="111111"/>
+                </a:solidFill>
+                <a:latin typeface="Open Sans" panose="020B0606030504020204" pitchFamily="34" charset="0"/>
+                <a:ea typeface="Open Sans" panose="020B0606030504020204" pitchFamily="34" charset="0"/>
+                <a:cs typeface="Open Sans" panose="020B0606030504020204" pitchFamily="34" charset="0"/>
+              </a:rPr>
+              <a:t>separator</a:t>
+            </a:r>
+          </a:p>
+        </p:txBody>
+      </p:sp>
+      <p:sp>
+        <p:nvSpPr>
+          <p:cNvPr id="2" name="TextBox 1"/>
+          <p:cNvSpPr txBox="1"/>
+          <p:nvPr/>
+        </p:nvSpPr>
+        <p:spPr>
+          <a:xfrm>
+            <a:off x="1524000" y="3428999"/>
+            <a:ext cx="9144000" cy="892552"/>
+          </a:xfrm>
+          <a:prstGeom prst="rect">
+            <a:avLst/>
+          </a:prstGeom>
+          <a:noFill/>
+        </p:spPr>
+        <p:txBody>
+          <a:bodyPr wrap="square" rtlCol="0">
+            <a:spAutoFit/>
+          </a:bodyPr>
+          <a:lstStyle/>
+          <a:p>
+            <a:pPr marL="285750" indent="-285750">
+              <a:buFont typeface="Arial" panose="020B0604020202020204" pitchFamily="34" charset="0"/>
+              <a:buChar char="•"/>
+            </a:pPr>
+            <a:r>
+              <a:rPr lang="en-AU" sz="2600" dirty="0" smtClean="0">
+                <a:solidFill>
+                  <a:srgbClr val="EEEEEE"/>
+                </a:solidFill>
+                <a:latin typeface="Open Sans" panose="020B0606030504020204" pitchFamily="34" charset="0"/>
+                <a:ea typeface="Open Sans" panose="020B0606030504020204" pitchFamily="34" charset="0"/>
+                <a:cs typeface="Open Sans" panose="020B0606030504020204" pitchFamily="34" charset="0"/>
+              </a:rPr>
+              <a:t>It will prompt the user to log in with their correct password</a:t>
+            </a:r>
+            <a:endParaRPr lang="en-AU" sz="2600" dirty="0" smtClean="0">
+              <a:solidFill>
+                <a:srgbClr val="EEEEEE"/>
+              </a:solidFill>
+              <a:latin typeface="Open Sans" panose="020B0606030504020204" pitchFamily="34" charset="0"/>
+              <a:ea typeface="Open Sans" panose="020B0606030504020204" pitchFamily="34" charset="0"/>
+              <a:cs typeface="Open Sans" panose="020B0606030504020204" pitchFamily="34" charset="0"/>
+            </a:endParaRPr>
+          </a:p>
+        </p:txBody>
+      </p:sp>
+    </p:spTree>
+    <p:extLst>
+      <p:ext uri="{BB962C8B-B14F-4D97-AF65-F5344CB8AC3E}">
+        <p14:creationId xmlns:p14="http://schemas.microsoft.com/office/powerpoint/2010/main" val="149940636"/>
+      </p:ext>
+    </p:extLst>
+  </p:cSld>
+  <p:clrMapOvr>
+    <a:masterClrMapping/>
+  </p:clrMapOvr>
+  <p:transition spd="slow">
+    <p:push/>
+  </p:transition>
+  <p:timing>
+    <p:tnLst>
+      <p:par>
+        <p:cTn id="1" dur="indefinite" restart="never" nodeType="tmRoot"/>
+      </p:par>
+    </p:tnLst>
+  </p:timing>
+</p:sld>
+</file>
+
+<file path=ppt/slides/slide48.xml><?xml version="1.0" encoding="utf-8"?>
+<p:sld xmlns:a="http://schemas.openxmlformats.org/drawingml/2006/main" xmlns:r="http://schemas.openxmlformats.org/officeDocument/2006/relationships" xmlns:p="http://schemas.openxmlformats.org/presentationml/2006/main">
+  <p:cSld>
+    <p:bg>
+      <p:bgPr>
+        <a:solidFill>
+          <a:srgbClr val="111111"/>
+        </a:solidFill>
+        <a:effectLst/>
+      </p:bgPr>
+    </p:bg>
+    <p:spTree>
+      <p:nvGrpSpPr>
+        <p:cNvPr id="1" name=""/>
+        <p:cNvGrpSpPr/>
+        <p:nvPr/>
+      </p:nvGrpSpPr>
+      <p:grpSpPr>
+        <a:xfrm>
+          <a:off x="0" y="0"/>
+          <a:ext cx="0" cy="0"/>
+          <a:chOff x="0" y="0"/>
+          <a:chExt cx="0" cy="0"/>
+        </a:xfrm>
+      </p:grpSpPr>
+      <p:sp>
+        <p:nvSpPr>
+          <p:cNvPr id="4" name="Title 3"/>
+          <p:cNvSpPr>
+            <a:spLocks noGrp="1"/>
+          </p:cNvSpPr>
+          <p:nvPr>
+            <p:ph type="ctrTitle"/>
+          </p:nvPr>
+        </p:nvSpPr>
+        <p:spPr>
+          <a:xfrm>
+            <a:off x="1524000" y="-1470455"/>
+            <a:ext cx="9144000" cy="2917370"/>
+          </a:xfrm>
+        </p:spPr>
+        <p:txBody>
+          <a:bodyPr anchor="b">
+            <a:normAutofit/>
+          </a:bodyPr>
+          <a:lstStyle/>
+          <a:p>
+            <a:pPr algn="l"/>
+            <a:r>
+              <a:rPr lang="en-AU" sz="4400" b="1" dirty="0" smtClean="0">
+                <a:solidFill>
+                  <a:srgbClr val="EEEEEE"/>
+                </a:solidFill>
+                <a:latin typeface="Open Sans" panose="020B0606030504020204" pitchFamily="34" charset="0"/>
+                <a:ea typeface="Open Sans" panose="020B0606030504020204" pitchFamily="34" charset="0"/>
+                <a:cs typeface="Open Sans" panose="020B0606030504020204" pitchFamily="34" charset="0"/>
+              </a:rPr>
+              <a:t>Choosing a password</a:t>
+            </a:r>
+            <a:endParaRPr lang="en-AU" sz="3200" dirty="0">
+              <a:solidFill>
+                <a:srgbClr val="EEEEEE"/>
+              </a:solidFill>
+              <a:latin typeface="Open Sans" panose="020B0606030504020204" pitchFamily="34" charset="0"/>
+              <a:ea typeface="Open Sans" panose="020B0606030504020204" pitchFamily="34" charset="0"/>
+              <a:cs typeface="Open Sans" panose="020B0606030504020204" pitchFamily="34" charset="0"/>
+            </a:endParaRPr>
+          </a:p>
+        </p:txBody>
+      </p:sp>
+      <p:sp>
+        <p:nvSpPr>
+          <p:cNvPr id="6" name="Title 3"/>
+          <p:cNvSpPr txBox="1">
+            <a:spLocks/>
+          </p:cNvSpPr>
+          <p:nvPr/>
+        </p:nvSpPr>
+        <p:spPr>
+          <a:xfrm>
+            <a:off x="1524001" y="1446915"/>
+            <a:ext cx="9144000" cy="511630"/>
+          </a:xfrm>
+          <a:prstGeom prst="rect">
+            <a:avLst/>
+          </a:prstGeom>
+        </p:spPr>
+        <p:txBody>
+          <a:bodyPr vert="horz" lIns="91440" tIns="45720" rIns="91440" bIns="45720" rtlCol="0" anchor="t">
+            <a:normAutofit lnSpcReduction="10000"/>
+          </a:bodyPr>
+          <a:lstStyle>
+            <a:lvl1pPr algn="ctr" defTabSz="914400" rtl="0" eaLnBrk="1" latinLnBrk="0" hangingPunct="1">
+              <a:lnSpc>
+                <a:spcPct val="90000"/>
+              </a:lnSpc>
+              <a:spcBef>
+                <a:spcPct val="0"/>
+              </a:spcBef>
+              <a:buNone/>
+              <a:defRPr sz="6000" kern="1200">
+                <a:solidFill>
+                  <a:schemeClr val="tx1"/>
+                </a:solidFill>
+                <a:latin typeface="+mj-lt"/>
+                <a:ea typeface="+mj-ea"/>
+                <a:cs typeface="+mj-cs"/>
+              </a:defRPr>
+            </a:lvl1pPr>
+          </a:lstStyle>
+          <a:p>
+            <a:pPr algn="l">
+              <a:lnSpc>
+                <a:spcPct val="100000"/>
+              </a:lnSpc>
+            </a:pPr>
+            <a:r>
+              <a:rPr lang="en-AU" sz="2800" dirty="0" smtClean="0">
+                <a:solidFill>
+                  <a:srgbClr val="111111"/>
+                </a:solidFill>
+                <a:latin typeface="Open Sans" panose="020B0606030504020204" pitchFamily="34" charset="0"/>
+                <a:ea typeface="Open Sans" panose="020B0606030504020204" pitchFamily="34" charset="0"/>
+                <a:cs typeface="Open Sans" panose="020B0606030504020204" pitchFamily="34" charset="0"/>
+              </a:rPr>
+              <a:t>separator</a:t>
+            </a:r>
+          </a:p>
+        </p:txBody>
+      </p:sp>
+      <p:sp>
+        <p:nvSpPr>
+          <p:cNvPr id="2" name="TextBox 1"/>
+          <p:cNvSpPr txBox="1"/>
+          <p:nvPr/>
+        </p:nvSpPr>
+        <p:spPr>
+          <a:xfrm>
+            <a:off x="1524000" y="1958544"/>
+            <a:ext cx="9144000" cy="492443"/>
+          </a:xfrm>
+          <a:prstGeom prst="rect">
+            <a:avLst/>
+          </a:prstGeom>
+          <a:noFill/>
+        </p:spPr>
+        <p:txBody>
+          <a:bodyPr wrap="square" rtlCol="0">
+            <a:spAutoFit/>
+          </a:bodyPr>
+          <a:lstStyle/>
+          <a:p>
+            <a:pPr marL="285750" indent="-285750">
+              <a:buFont typeface="Arial" panose="020B0604020202020204" pitchFamily="34" charset="0"/>
+              <a:buChar char="•"/>
+            </a:pPr>
+            <a:r>
+              <a:rPr lang="en-AU" sz="2600" dirty="0" smtClean="0">
+                <a:solidFill>
+                  <a:srgbClr val="EEEEEE"/>
+                </a:solidFill>
+                <a:latin typeface="Open Sans" panose="020B0606030504020204" pitchFamily="34" charset="0"/>
+                <a:ea typeface="Open Sans" panose="020B0606030504020204" pitchFamily="34" charset="0"/>
+                <a:cs typeface="Open Sans" panose="020B0606030504020204" pitchFamily="34" charset="0"/>
+              </a:rPr>
+              <a:t>Simple passwords </a:t>
+            </a:r>
+            <a:endParaRPr lang="en-AU" sz="2600" dirty="0" smtClean="0">
+              <a:solidFill>
+                <a:srgbClr val="EEEEEE"/>
+              </a:solidFill>
+              <a:latin typeface="Open Sans" panose="020B0606030504020204" pitchFamily="34" charset="0"/>
+              <a:ea typeface="Open Sans" panose="020B0606030504020204" pitchFamily="34" charset="0"/>
+              <a:cs typeface="Open Sans" panose="020B0606030504020204" pitchFamily="34" charset="0"/>
+            </a:endParaRPr>
+          </a:p>
+        </p:txBody>
+      </p:sp>
+    </p:spTree>
+    <p:extLst>
+      <p:ext uri="{BB962C8B-B14F-4D97-AF65-F5344CB8AC3E}">
+        <p14:creationId xmlns:p14="http://schemas.microsoft.com/office/powerpoint/2010/main" val="1350017555"/>
+      </p:ext>
+    </p:extLst>
+  </p:cSld>
+  <p:clrMapOvr>
+    <a:masterClrMapping/>
+  </p:clrMapOvr>
+  <p:transition spd="slow">
+    <p:push/>
+  </p:transition>
+  <p:timing>
+    <p:tnLst>
+      <p:par>
+        <p:cTn id="1" dur="indefinite" restart="never" nodeType="tmRoot"/>
+      </p:par>
+    </p:tnLst>
+  </p:timing>
+</p:sld>
+</file>
+
+<file path=ppt/slides/slide49.xml><?xml version="1.0" encoding="utf-8"?>
 <p:sld xmlns:a="http://schemas.openxmlformats.org/drawingml/2006/main" xmlns:r="http://schemas.openxmlformats.org/officeDocument/2006/relationships" xmlns:p="http://schemas.openxmlformats.org/presentationml/2006/main">
   <p:cSld>
     <p:bg>
@@ -13020,406 +15720,6 @@
 </p:sld>
 </file>
 
-<file path=ppt/slides/slide37.xml><?xml version="1.0" encoding="utf-8"?>
-<p:sld xmlns:a="http://schemas.openxmlformats.org/drawingml/2006/main" xmlns:r="http://schemas.openxmlformats.org/officeDocument/2006/relationships" xmlns:p="http://schemas.openxmlformats.org/presentationml/2006/main">
-  <p:cSld>
-    <p:bg>
-      <p:bgPr>
-        <a:solidFill>
-          <a:srgbClr val="111111"/>
-        </a:solidFill>
-        <a:effectLst/>
-      </p:bgPr>
-    </p:bg>
-    <p:spTree>
-      <p:nvGrpSpPr>
-        <p:cNvPr id="1" name=""/>
-        <p:cNvGrpSpPr/>
-        <p:nvPr/>
-      </p:nvGrpSpPr>
-      <p:grpSpPr>
-        <a:xfrm>
-          <a:off x="0" y="0"/>
-          <a:ext cx="0" cy="0"/>
-          <a:chOff x="0" y="0"/>
-          <a:chExt cx="0" cy="0"/>
-        </a:xfrm>
-      </p:grpSpPr>
-      <p:sp>
-        <p:nvSpPr>
-          <p:cNvPr id="4" name="Title 3"/>
-          <p:cNvSpPr>
-            <a:spLocks noGrp="1"/>
-          </p:cNvSpPr>
-          <p:nvPr>
-            <p:ph type="ctrTitle"/>
-          </p:nvPr>
-        </p:nvSpPr>
-        <p:spPr>
-          <a:xfrm>
-            <a:off x="1524000" y="1"/>
-            <a:ext cx="9144000" cy="970843"/>
-          </a:xfrm>
-        </p:spPr>
-        <p:txBody>
-          <a:bodyPr anchor="b">
-            <a:normAutofit/>
-          </a:bodyPr>
-          <a:lstStyle/>
-          <a:p>
-            <a:pPr algn="l"/>
-            <a:r>
-              <a:rPr lang="en-AU" sz="4400" b="1" dirty="0" smtClean="0">
-                <a:solidFill>
-                  <a:srgbClr val="EEEEEE"/>
-                </a:solidFill>
-                <a:latin typeface="Open Sans" panose="020B0606030504020204" pitchFamily="34" charset="0"/>
-                <a:ea typeface="Open Sans" panose="020B0606030504020204" pitchFamily="34" charset="0"/>
-                <a:cs typeface="Open Sans" panose="020B0606030504020204" pitchFamily="34" charset="0"/>
-              </a:rPr>
-              <a:t>References</a:t>
-            </a:r>
-            <a:endParaRPr lang="en-AU" sz="2800" dirty="0">
-              <a:solidFill>
-                <a:srgbClr val="EEEEEE"/>
-              </a:solidFill>
-              <a:latin typeface="Open Sans" panose="020B0606030504020204" pitchFamily="34" charset="0"/>
-              <a:ea typeface="Open Sans" panose="020B0606030504020204" pitchFamily="34" charset="0"/>
-              <a:cs typeface="Open Sans" panose="020B0606030504020204" pitchFamily="34" charset="0"/>
-            </a:endParaRPr>
-          </a:p>
-        </p:txBody>
-      </p:sp>
-      <p:sp>
-        <p:nvSpPr>
-          <p:cNvPr id="5" name="Title 3"/>
-          <p:cNvSpPr txBox="1">
-            <a:spLocks/>
-          </p:cNvSpPr>
-          <p:nvPr/>
-        </p:nvSpPr>
-        <p:spPr>
-          <a:xfrm>
-            <a:off x="338667" y="970844"/>
-            <a:ext cx="11514666" cy="5339645"/>
-          </a:xfrm>
-          <a:prstGeom prst="rect">
-            <a:avLst/>
-          </a:prstGeom>
-        </p:spPr>
-        <p:txBody>
-          <a:bodyPr vert="horz" lIns="91440" tIns="45720" rIns="91440" bIns="45720" rtlCol="0" anchor="t">
-            <a:normAutofit/>
-          </a:bodyPr>
-          <a:lstStyle>
-            <a:lvl1pPr algn="ctr" defTabSz="914400" rtl="0" eaLnBrk="1" latinLnBrk="0" hangingPunct="1">
-              <a:lnSpc>
-                <a:spcPct val="90000"/>
-              </a:lnSpc>
-              <a:spcBef>
-                <a:spcPct val="0"/>
-              </a:spcBef>
-              <a:buNone/>
-              <a:defRPr sz="6000" kern="1200">
-                <a:solidFill>
-                  <a:schemeClr val="tx1"/>
-                </a:solidFill>
-                <a:latin typeface="+mj-lt"/>
-                <a:ea typeface="+mj-ea"/>
-                <a:cs typeface="+mj-cs"/>
-              </a:defRPr>
-            </a:lvl1pPr>
-          </a:lstStyle>
-          <a:p>
-            <a:pPr marL="457200" indent="-457200" algn="l">
-              <a:lnSpc>
-                <a:spcPct val="100000"/>
-              </a:lnSpc>
-              <a:buFont typeface="Arial" panose="020B0604020202020204" pitchFamily="34" charset="0"/>
-              <a:buChar char="•"/>
-            </a:pPr>
-            <a:r>
-              <a:rPr lang="en-AU" sz="2000" dirty="0">
-                <a:solidFill>
-                  <a:srgbClr val="EEEEEE"/>
-                </a:solidFill>
-                <a:latin typeface="Open Sans" panose="020B0606030504020204" pitchFamily="34" charset="0"/>
-                <a:ea typeface="Open Sans" panose="020B0606030504020204" pitchFamily="34" charset="0"/>
-                <a:cs typeface="Open Sans" panose="020B0606030504020204" pitchFamily="34" charset="0"/>
-              </a:rPr>
-              <a:t>Microsoft. (2015). Microsoft Support Lifecycle. Microsoft. Retrieved February 27, 2015, from http://support.microsoft.com/lifecycle/search/default.aspx?alpha=Vista</a:t>
-            </a:r>
-          </a:p>
-        </p:txBody>
-      </p:sp>
-    </p:spTree>
-    <p:extLst>
-      <p:ext uri="{BB962C8B-B14F-4D97-AF65-F5344CB8AC3E}">
-        <p14:creationId xmlns:p14="http://schemas.microsoft.com/office/powerpoint/2010/main" val="636747076"/>
-      </p:ext>
-    </p:extLst>
-  </p:cSld>
-  <p:clrMapOvr>
-    <a:masterClrMapping/>
-  </p:clrMapOvr>
-  <p:transition spd="slow">
-    <p:push/>
-  </p:transition>
-  <p:timing>
-    <p:tnLst>
-      <p:par>
-        <p:cTn id="1" dur="indefinite" restart="never" nodeType="tmRoot"/>
-      </p:par>
-    </p:tnLst>
-  </p:timing>
-</p:sld>
-</file>
-
-<file path=ppt/slides/slide4.xml><?xml version="1.0" encoding="utf-8"?>
-<p:sld xmlns:a="http://schemas.openxmlformats.org/drawingml/2006/main" xmlns:r="http://schemas.openxmlformats.org/officeDocument/2006/relationships" xmlns:p="http://schemas.openxmlformats.org/presentationml/2006/main">
-  <p:cSld>
-    <p:bg>
-      <p:bgPr>
-        <a:solidFill>
-          <a:srgbClr val="111111"/>
-        </a:solidFill>
-        <a:effectLst/>
-      </p:bgPr>
-    </p:bg>
-    <p:spTree>
-      <p:nvGrpSpPr>
-        <p:cNvPr id="1" name=""/>
-        <p:cNvGrpSpPr/>
-        <p:nvPr/>
-      </p:nvGrpSpPr>
-      <p:grpSpPr>
-        <a:xfrm>
-          <a:off x="0" y="0"/>
-          <a:ext cx="0" cy="0"/>
-          <a:chOff x="0" y="0"/>
-          <a:chExt cx="0" cy="0"/>
-        </a:xfrm>
-      </p:grpSpPr>
-      <p:sp>
-        <p:nvSpPr>
-          <p:cNvPr id="4" name="Title 3"/>
-          <p:cNvSpPr>
-            <a:spLocks noGrp="1"/>
-          </p:cNvSpPr>
-          <p:nvPr>
-            <p:ph type="ctrTitle"/>
-          </p:nvPr>
-        </p:nvSpPr>
-        <p:spPr>
-          <a:xfrm>
-            <a:off x="1524000" y="1"/>
-            <a:ext cx="9144000" cy="2917370"/>
-          </a:xfrm>
-        </p:spPr>
-        <p:txBody>
-          <a:bodyPr anchor="b">
-            <a:normAutofit/>
-          </a:bodyPr>
-          <a:lstStyle/>
-          <a:p>
-            <a:pPr algn="l"/>
-            <a:r>
-              <a:rPr lang="en-AU" sz="4400" b="1" dirty="0" smtClean="0">
-                <a:solidFill>
-                  <a:srgbClr val="EEEEEE"/>
-                </a:solidFill>
-                <a:latin typeface="Open Sans" panose="020B0606030504020204" pitchFamily="34" charset="0"/>
-                <a:ea typeface="Open Sans" panose="020B0606030504020204" pitchFamily="34" charset="0"/>
-                <a:cs typeface="Open Sans" panose="020B0606030504020204" pitchFamily="34" charset="0"/>
-              </a:rPr>
-              <a:t>In the previous report…</a:t>
-            </a:r>
-            <a:br>
-              <a:rPr lang="en-AU" sz="4400" b="1" dirty="0" smtClean="0">
-                <a:solidFill>
-                  <a:srgbClr val="EEEEEE"/>
-                </a:solidFill>
-                <a:latin typeface="Open Sans" panose="020B0606030504020204" pitchFamily="34" charset="0"/>
-                <a:ea typeface="Open Sans" panose="020B0606030504020204" pitchFamily="34" charset="0"/>
-                <a:cs typeface="Open Sans" panose="020B0606030504020204" pitchFamily="34" charset="0"/>
-              </a:rPr>
-            </a:br>
-            <a:r>
-              <a:rPr lang="en-AU" sz="4400" b="1" dirty="0">
-                <a:solidFill>
-                  <a:srgbClr val="EEEEEE"/>
-                </a:solidFill>
-                <a:latin typeface="Open Sans" panose="020B0606030504020204" pitchFamily="34" charset="0"/>
-                <a:ea typeface="Open Sans" panose="020B0606030504020204" pitchFamily="34" charset="0"/>
-                <a:cs typeface="Open Sans" panose="020B0606030504020204" pitchFamily="34" charset="0"/>
-              </a:rPr>
-              <a:t/>
-            </a:r>
-            <a:br>
-              <a:rPr lang="en-AU" sz="4400" b="1" dirty="0">
-                <a:solidFill>
-                  <a:srgbClr val="EEEEEE"/>
-                </a:solidFill>
-                <a:latin typeface="Open Sans" panose="020B0606030504020204" pitchFamily="34" charset="0"/>
-                <a:ea typeface="Open Sans" panose="020B0606030504020204" pitchFamily="34" charset="0"/>
-                <a:cs typeface="Open Sans" panose="020B0606030504020204" pitchFamily="34" charset="0"/>
-              </a:rPr>
-            </a:br>
-            <a:r>
-              <a:rPr lang="en-AU" sz="2800" dirty="0" smtClean="0">
-                <a:solidFill>
-                  <a:srgbClr val="EEEEEE"/>
-                </a:solidFill>
-                <a:latin typeface="Open Sans" panose="020B0606030504020204" pitchFamily="34" charset="0"/>
-                <a:ea typeface="Open Sans" panose="020B0606030504020204" pitchFamily="34" charset="0"/>
-                <a:cs typeface="Open Sans" panose="020B0606030504020204" pitchFamily="34" charset="0"/>
-              </a:rPr>
-              <a:t>We found security issues with:</a:t>
-            </a:r>
-            <a:endParaRPr lang="en-AU" sz="2800" dirty="0">
-              <a:solidFill>
-                <a:srgbClr val="EEEEEE"/>
-              </a:solidFill>
-              <a:latin typeface="Open Sans" panose="020B0606030504020204" pitchFamily="34" charset="0"/>
-              <a:ea typeface="Open Sans" panose="020B0606030504020204" pitchFamily="34" charset="0"/>
-              <a:cs typeface="Open Sans" panose="020B0606030504020204" pitchFamily="34" charset="0"/>
-            </a:endParaRPr>
-          </a:p>
-        </p:txBody>
-      </p:sp>
-      <p:sp>
-        <p:nvSpPr>
-          <p:cNvPr id="5" name="Title 3"/>
-          <p:cNvSpPr txBox="1">
-            <a:spLocks/>
-          </p:cNvSpPr>
-          <p:nvPr/>
-        </p:nvSpPr>
-        <p:spPr>
-          <a:xfrm>
-            <a:off x="1524000" y="3429001"/>
-            <a:ext cx="9144000" cy="3429000"/>
-          </a:xfrm>
-          <a:prstGeom prst="rect">
-            <a:avLst/>
-          </a:prstGeom>
-        </p:spPr>
-        <p:txBody>
-          <a:bodyPr vert="horz" lIns="91440" tIns="45720" rIns="91440" bIns="45720" rtlCol="0" anchor="t">
-            <a:normAutofit/>
-          </a:bodyPr>
-          <a:lstStyle>
-            <a:lvl1pPr algn="ctr" defTabSz="914400" rtl="0" eaLnBrk="1" latinLnBrk="0" hangingPunct="1">
-              <a:lnSpc>
-                <a:spcPct val="90000"/>
-              </a:lnSpc>
-              <a:spcBef>
-                <a:spcPct val="0"/>
-              </a:spcBef>
-              <a:buNone/>
-              <a:defRPr sz="6000" kern="1200">
-                <a:solidFill>
-                  <a:schemeClr val="tx1"/>
-                </a:solidFill>
-                <a:latin typeface="+mj-lt"/>
-                <a:ea typeface="+mj-ea"/>
-                <a:cs typeface="+mj-cs"/>
-              </a:defRPr>
-            </a:lvl1pPr>
-          </a:lstStyle>
-          <a:p>
-            <a:pPr marL="457200" indent="-457200" algn="l">
-              <a:lnSpc>
-                <a:spcPct val="100000"/>
-              </a:lnSpc>
-              <a:buFont typeface="Arial" panose="020B0604020202020204" pitchFamily="34" charset="0"/>
-              <a:buChar char="•"/>
-            </a:pPr>
-            <a:r>
-              <a:rPr lang="en-AU" sz="2800" dirty="0" smtClean="0">
-                <a:solidFill>
-                  <a:srgbClr val="EEEEEE"/>
-                </a:solidFill>
-                <a:latin typeface="Open Sans" panose="020B0606030504020204" pitchFamily="34" charset="0"/>
-                <a:ea typeface="Open Sans" panose="020B0606030504020204" pitchFamily="34" charset="0"/>
-                <a:cs typeface="Open Sans" panose="020B0606030504020204" pitchFamily="34" charset="0"/>
-              </a:rPr>
-              <a:t>The operating system</a:t>
-            </a:r>
-          </a:p>
-          <a:p>
-            <a:pPr marL="457200" indent="-457200" algn="l">
-              <a:lnSpc>
-                <a:spcPct val="100000"/>
-              </a:lnSpc>
-              <a:buFont typeface="Arial" panose="020B0604020202020204" pitchFamily="34" charset="0"/>
-              <a:buChar char="•"/>
-            </a:pPr>
-            <a:r>
-              <a:rPr lang="en-AU" sz="2800" dirty="0" smtClean="0">
-                <a:solidFill>
-                  <a:srgbClr val="EEEEEE"/>
-                </a:solidFill>
-                <a:latin typeface="Open Sans" panose="020B0606030504020204" pitchFamily="34" charset="0"/>
-                <a:ea typeface="Open Sans" panose="020B0606030504020204" pitchFamily="34" charset="0"/>
-                <a:cs typeface="Open Sans" panose="020B0606030504020204" pitchFamily="34" charset="0"/>
-              </a:rPr>
-              <a:t>Third party applications</a:t>
-            </a:r>
-          </a:p>
-          <a:p>
-            <a:pPr marL="457200" indent="-457200" algn="l">
-              <a:lnSpc>
-                <a:spcPct val="100000"/>
-              </a:lnSpc>
-              <a:buFont typeface="Arial" panose="020B0604020202020204" pitchFamily="34" charset="0"/>
-              <a:buChar char="•"/>
-            </a:pPr>
-            <a:r>
-              <a:rPr lang="en-AU" sz="2800" dirty="0" smtClean="0">
-                <a:solidFill>
-                  <a:srgbClr val="EEEEEE"/>
-                </a:solidFill>
-                <a:latin typeface="Open Sans" panose="020B0606030504020204" pitchFamily="34" charset="0"/>
-                <a:ea typeface="Open Sans" panose="020B0606030504020204" pitchFamily="34" charset="0"/>
-                <a:cs typeface="Open Sans" panose="020B0606030504020204" pitchFamily="34" charset="0"/>
-              </a:rPr>
-              <a:t>User practices</a:t>
-            </a:r>
-            <a:endParaRPr lang="en-AU" sz="2800" dirty="0">
-              <a:solidFill>
-                <a:srgbClr val="EEEEEE"/>
-              </a:solidFill>
-              <a:latin typeface="Open Sans" panose="020B0606030504020204" pitchFamily="34" charset="0"/>
-              <a:ea typeface="Open Sans" panose="020B0606030504020204" pitchFamily="34" charset="0"/>
-              <a:cs typeface="Open Sans" panose="020B0606030504020204" pitchFamily="34" charset="0"/>
-            </a:endParaRPr>
-          </a:p>
-        </p:txBody>
-      </p:sp>
-    </p:spTree>
-    <p:extLst>
-      <p:ext uri="{BB962C8B-B14F-4D97-AF65-F5344CB8AC3E}">
-        <p14:creationId xmlns:p14="http://schemas.microsoft.com/office/powerpoint/2010/main" val="3868876745"/>
-      </p:ext>
-    </p:extLst>
-  </p:cSld>
-  <p:clrMapOvr>
-    <a:masterClrMapping/>
-  </p:clrMapOvr>
-  <p:transition spd="slow">
-    <p:push/>
-  </p:transition>
-  <p:timing>
-    <p:tnLst>
-      <p:par>
-        <p:cTn id="1" dur="indefinite" restart="never" nodeType="tmRoot"/>
-      </p:par>
-    </p:tnLst>
-  </p:timing>
-</p:sld>
-</file>
-
 <file path=ppt/slides/slide5.xml><?xml version="1.0" encoding="utf-8"?>
 <p:sld xmlns:a="http://schemas.openxmlformats.org/drawingml/2006/main" xmlns:r="http://schemas.openxmlformats.org/officeDocument/2006/relationships" xmlns:p="http://schemas.openxmlformats.org/presentationml/2006/main">
   <p:cSld>
@@ -13664,29 +15964,7 @@
                 <a:ea typeface="Open Sans" panose="020B0606030504020204" pitchFamily="34" charset="0"/>
                 <a:cs typeface="Open Sans" panose="020B0606030504020204" pitchFamily="34" charset="0"/>
               </a:rPr>
-              <a:t>S</a:t>
-            </a:r>
-            <a:r>
-              <a:rPr lang="en-AU" sz="4400" b="1" dirty="0" smtClean="0">
-                <a:solidFill>
-                  <a:srgbClr val="EEEEEE"/>
-                </a:solidFill>
-                <a:latin typeface="Open Sans" panose="020B0606030504020204" pitchFamily="34" charset="0"/>
-                <a:ea typeface="Open Sans" panose="020B0606030504020204" pitchFamily="34" charset="0"/>
-                <a:cs typeface="Open Sans" panose="020B0606030504020204" pitchFamily="34" charset="0"/>
-              </a:rPr>
-              <a:t>tarting </a:t>
-            </a:r>
-            <a:r>
-              <a:rPr lang="en-AU" sz="4400" b="1" dirty="0" smtClean="0">
-                <a:solidFill>
-                  <a:srgbClr val="EEEEEE"/>
-                </a:solidFill>
-                <a:latin typeface="Open Sans" panose="020B0606030504020204" pitchFamily="34" charset="0"/>
-                <a:ea typeface="Open Sans" panose="020B0606030504020204" pitchFamily="34" charset="0"/>
-                <a:cs typeface="Open Sans" panose="020B0606030504020204" pitchFamily="34" charset="0"/>
-              </a:rPr>
-              <a:t>with…</a:t>
+              <a:t>Starting with…</a:t>
             </a:r>
             <a:endParaRPr lang="en-AU" sz="4400" b="1" dirty="0">
               <a:solidFill>
@@ -13703,6 +15981,161 @@
     <p:extLst>
       <p:ext uri="{BB962C8B-B14F-4D97-AF65-F5344CB8AC3E}">
         <p14:creationId xmlns:p14="http://schemas.microsoft.com/office/powerpoint/2010/main" val="1636340109"/>
+      </p:ext>
+    </p:extLst>
+  </p:cSld>
+  <p:clrMapOvr>
+    <a:masterClrMapping/>
+  </p:clrMapOvr>
+  <p:transition spd="slow">
+    <p:push/>
+  </p:transition>
+  <p:timing>
+    <p:tnLst>
+      <p:par>
+        <p:cTn id="1" dur="indefinite" restart="never" nodeType="tmRoot"/>
+      </p:par>
+    </p:tnLst>
+  </p:timing>
+</p:sld>
+</file>
+
+<file path=ppt/slides/slide50.xml><?xml version="1.0" encoding="utf-8"?>
+<p:sld xmlns:a="http://schemas.openxmlformats.org/drawingml/2006/main" xmlns:r="http://schemas.openxmlformats.org/officeDocument/2006/relationships" xmlns:p="http://schemas.openxmlformats.org/presentationml/2006/main">
+  <p:cSld>
+    <p:bg>
+      <p:bgPr>
+        <a:solidFill>
+          <a:srgbClr val="111111"/>
+        </a:solidFill>
+        <a:effectLst/>
+      </p:bgPr>
+    </p:bg>
+    <p:spTree>
+      <p:nvGrpSpPr>
+        <p:cNvPr id="1" name=""/>
+        <p:cNvGrpSpPr/>
+        <p:nvPr/>
+      </p:nvGrpSpPr>
+      <p:grpSpPr>
+        <a:xfrm>
+          <a:off x="0" y="0"/>
+          <a:ext cx="0" cy="0"/>
+          <a:chOff x="0" y="0"/>
+          <a:chExt cx="0" cy="0"/>
+        </a:xfrm>
+      </p:grpSpPr>
+      <p:sp>
+        <p:nvSpPr>
+          <p:cNvPr id="4" name="Title 3"/>
+          <p:cNvSpPr>
+            <a:spLocks noGrp="1"/>
+          </p:cNvSpPr>
+          <p:nvPr>
+            <p:ph type="ctrTitle"/>
+          </p:nvPr>
+        </p:nvSpPr>
+        <p:spPr>
+          <a:xfrm>
+            <a:off x="1524000" y="1"/>
+            <a:ext cx="9144000" cy="970843"/>
+          </a:xfrm>
+        </p:spPr>
+        <p:txBody>
+          <a:bodyPr anchor="b">
+            <a:normAutofit/>
+          </a:bodyPr>
+          <a:lstStyle/>
+          <a:p>
+            <a:pPr algn="l"/>
+            <a:r>
+              <a:rPr lang="en-AU" sz="4400" b="1" dirty="0" smtClean="0">
+                <a:solidFill>
+                  <a:srgbClr val="EEEEEE"/>
+                </a:solidFill>
+                <a:latin typeface="Open Sans" panose="020B0606030504020204" pitchFamily="34" charset="0"/>
+                <a:ea typeface="Open Sans" panose="020B0606030504020204" pitchFamily="34" charset="0"/>
+                <a:cs typeface="Open Sans" panose="020B0606030504020204" pitchFamily="34" charset="0"/>
+              </a:rPr>
+              <a:t>References</a:t>
+            </a:r>
+            <a:endParaRPr lang="en-AU" sz="2800" dirty="0">
+              <a:solidFill>
+                <a:srgbClr val="EEEEEE"/>
+              </a:solidFill>
+              <a:latin typeface="Open Sans" panose="020B0606030504020204" pitchFamily="34" charset="0"/>
+              <a:ea typeface="Open Sans" panose="020B0606030504020204" pitchFamily="34" charset="0"/>
+              <a:cs typeface="Open Sans" panose="020B0606030504020204" pitchFamily="34" charset="0"/>
+            </a:endParaRPr>
+          </a:p>
+        </p:txBody>
+      </p:sp>
+      <p:sp>
+        <p:nvSpPr>
+          <p:cNvPr id="5" name="Title 3"/>
+          <p:cNvSpPr txBox="1">
+            <a:spLocks/>
+          </p:cNvSpPr>
+          <p:nvPr/>
+        </p:nvSpPr>
+        <p:spPr>
+          <a:xfrm>
+            <a:off x="338667" y="970844"/>
+            <a:ext cx="11514666" cy="5339645"/>
+          </a:xfrm>
+          <a:prstGeom prst="rect">
+            <a:avLst/>
+          </a:prstGeom>
+        </p:spPr>
+        <p:txBody>
+          <a:bodyPr vert="horz" lIns="91440" tIns="45720" rIns="91440" bIns="45720" rtlCol="0" anchor="t">
+            <a:normAutofit/>
+          </a:bodyPr>
+          <a:lstStyle>
+            <a:lvl1pPr algn="ctr" defTabSz="914400" rtl="0" eaLnBrk="1" latinLnBrk="0" hangingPunct="1">
+              <a:lnSpc>
+                <a:spcPct val="90000"/>
+              </a:lnSpc>
+              <a:spcBef>
+                <a:spcPct val="0"/>
+              </a:spcBef>
+              <a:buNone/>
+              <a:defRPr sz="6000" kern="1200">
+                <a:solidFill>
+                  <a:schemeClr val="tx1"/>
+                </a:solidFill>
+                <a:latin typeface="+mj-lt"/>
+                <a:ea typeface="+mj-ea"/>
+                <a:cs typeface="+mj-cs"/>
+              </a:defRPr>
+            </a:lvl1pPr>
+          </a:lstStyle>
+          <a:p>
+            <a:pPr marL="457200" indent="-457200" algn="l">
+              <a:lnSpc>
+                <a:spcPct val="100000"/>
+              </a:lnSpc>
+              <a:buFont typeface="Arial" panose="020B0604020202020204" pitchFamily="34" charset="0"/>
+              <a:buChar char="•"/>
+            </a:pPr>
+            <a:r>
+              <a:rPr lang="en-AU" sz="2000" dirty="0">
+                <a:solidFill>
+                  <a:srgbClr val="EEEEEE"/>
+                </a:solidFill>
+                <a:latin typeface="Open Sans" panose="020B0606030504020204" pitchFamily="34" charset="0"/>
+                <a:ea typeface="Open Sans" panose="020B0606030504020204" pitchFamily="34" charset="0"/>
+                <a:cs typeface="Open Sans" panose="020B0606030504020204" pitchFamily="34" charset="0"/>
+              </a:rPr>
+              <a:t>Microsoft. (2015). Microsoft Support Lifecycle. Microsoft. Retrieved February 27, 2015, from http://support.microsoft.com/lifecycle/search/default.aspx?alpha=Vista</a:t>
+            </a:r>
+          </a:p>
+        </p:txBody>
+      </p:sp>
+    </p:spTree>
+    <p:extLst>
+      <p:ext uri="{BB962C8B-B14F-4D97-AF65-F5344CB8AC3E}">
+        <p14:creationId xmlns:p14="http://schemas.microsoft.com/office/powerpoint/2010/main" val="636747076"/>
       </p:ext>
     </p:extLst>
   </p:cSld>
@@ -14015,14 +16448,6 @@
               </a:rPr>
               <a:t>Which lead to vulnerabilities</a:t>
             </a:r>
-            <a:endParaRPr lang="en-AU" sz="2600" dirty="0" smtClean="0">
-              <a:solidFill>
-                <a:srgbClr val="EEEEEE"/>
-              </a:solidFill>
-              <a:latin typeface="Open Sans" panose="020B0606030504020204" pitchFamily="34" charset="0"/>
-              <a:ea typeface="Open Sans" panose="020B0606030504020204" pitchFamily="34" charset="0"/>
-              <a:cs typeface="Open Sans" panose="020B0606030504020204" pitchFamily="34" charset="0"/>
-            </a:endParaRPr>
           </a:p>
         </p:txBody>
       </p:sp>
@@ -14262,18 +16687,7 @@
                 <a:ea typeface="Open Sans" panose="020B0606030504020204" pitchFamily="34" charset="0"/>
                 <a:cs typeface="Open Sans" panose="020B0606030504020204" pitchFamily="34" charset="0"/>
               </a:rPr>
-              <a:t>Some facts about </a:t>
-            </a:r>
-            <a:r>
-              <a:rPr lang="en-AU" sz="4400" b="1" dirty="0" smtClean="0">
-                <a:solidFill>
-                  <a:srgbClr val="EEEEEE"/>
-                </a:solidFill>
-                <a:latin typeface="Open Sans" panose="020B0606030504020204" pitchFamily="34" charset="0"/>
-                <a:ea typeface="Open Sans" panose="020B0606030504020204" pitchFamily="34" charset="0"/>
-                <a:cs typeface="Open Sans" panose="020B0606030504020204" pitchFamily="34" charset="0"/>
-              </a:rPr>
-              <a:t>YOUR operating system…</a:t>
+              <a:t>Some facts about YOUR operating system…</a:t>
             </a:r>
             <a:endParaRPr lang="en-AU" sz="2800" dirty="0">
               <a:solidFill>
@@ -14381,29 +16795,7 @@
                 <a:ea typeface="Open Sans" panose="020B0606030504020204" pitchFamily="34" charset="0"/>
                 <a:cs typeface="Open Sans" panose="020B0606030504020204" pitchFamily="34" charset="0"/>
               </a:rPr>
-              <a:t>Windows Vista is</a:t>
-            </a:r>
-            <a:r>
-              <a:rPr lang="en-AU" sz="2600" dirty="0" smtClean="0">
-                <a:solidFill>
-                  <a:srgbClr val="EEEEEE"/>
-                </a:solidFill>
-                <a:latin typeface="Open Sans" panose="020B0606030504020204" pitchFamily="34" charset="0"/>
-                <a:ea typeface="Open Sans" panose="020B0606030504020204" pitchFamily="34" charset="0"/>
-                <a:cs typeface="Open Sans" panose="020B0606030504020204" pitchFamily="34" charset="0"/>
-              </a:rPr>
-              <a:t> </a:t>
-            </a:r>
-            <a:r>
-              <a:rPr lang="en-AU" sz="2600" dirty="0" smtClean="0">
-                <a:solidFill>
-                  <a:srgbClr val="EEEEEE"/>
-                </a:solidFill>
-                <a:latin typeface="Open Sans" panose="020B0606030504020204" pitchFamily="34" charset="0"/>
-                <a:ea typeface="Open Sans" panose="020B0606030504020204" pitchFamily="34" charset="0"/>
-                <a:cs typeface="Open Sans" panose="020B0606030504020204" pitchFamily="34" charset="0"/>
-              </a:rPr>
-              <a:t>getting old</a:t>
+              <a:t>Windows Vista is getting old</a:t>
             </a:r>
           </a:p>
           <a:p>

</xml_diff>

<commit_message>
CSI1101 A2: updated password section
</commit_message>
<xml_diff>
--- a/year_1/sem_2/CSI1101_computer_security/0b_assignment_2_[22MAY15_0900]/dev/CSI1101_PONCE_A2_v01.pptx
+++ b/year_1/sem_2/CSI1101_computer_security/0b_assignment_2_[22MAY15_0900]/dev/CSI1101_PONCE_A2_v01.pptx
@@ -303,7 +303,7 @@
           <a:p>
             <a:fld id="{7B1A49F8-424C-43DF-ABBC-6BF9F0D68733}" type="datetimeFigureOut">
               <a:rPr lang="en-AU" smtClean="0"/>
-              <a:t>30/04/2015</a:t>
+              <a:t>1/05/2015</a:t>
             </a:fld>
             <a:endParaRPr lang="en-AU"/>
           </a:p>
@@ -473,7 +473,7 @@
           <a:p>
             <a:fld id="{7B1A49F8-424C-43DF-ABBC-6BF9F0D68733}" type="datetimeFigureOut">
               <a:rPr lang="en-AU" smtClean="0"/>
-              <a:t>30/04/2015</a:t>
+              <a:t>1/05/2015</a:t>
             </a:fld>
             <a:endParaRPr lang="en-AU"/>
           </a:p>
@@ -653,7 +653,7 @@
           <a:p>
             <a:fld id="{7B1A49F8-424C-43DF-ABBC-6BF9F0D68733}" type="datetimeFigureOut">
               <a:rPr lang="en-AU" smtClean="0"/>
-              <a:t>30/04/2015</a:t>
+              <a:t>1/05/2015</a:t>
             </a:fld>
             <a:endParaRPr lang="en-AU"/>
           </a:p>
@@ -823,7 +823,7 @@
           <a:p>
             <a:fld id="{7B1A49F8-424C-43DF-ABBC-6BF9F0D68733}" type="datetimeFigureOut">
               <a:rPr lang="en-AU" smtClean="0"/>
-              <a:t>30/04/2015</a:t>
+              <a:t>1/05/2015</a:t>
             </a:fld>
             <a:endParaRPr lang="en-AU"/>
           </a:p>
@@ -1069,7 +1069,7 @@
           <a:p>
             <a:fld id="{7B1A49F8-424C-43DF-ABBC-6BF9F0D68733}" type="datetimeFigureOut">
               <a:rPr lang="en-AU" smtClean="0"/>
-              <a:t>30/04/2015</a:t>
+              <a:t>1/05/2015</a:t>
             </a:fld>
             <a:endParaRPr lang="en-AU"/>
           </a:p>
@@ -1301,7 +1301,7 @@
           <a:p>
             <a:fld id="{7B1A49F8-424C-43DF-ABBC-6BF9F0D68733}" type="datetimeFigureOut">
               <a:rPr lang="en-AU" smtClean="0"/>
-              <a:t>30/04/2015</a:t>
+              <a:t>1/05/2015</a:t>
             </a:fld>
             <a:endParaRPr lang="en-AU"/>
           </a:p>
@@ -1668,7 +1668,7 @@
           <a:p>
             <a:fld id="{7B1A49F8-424C-43DF-ABBC-6BF9F0D68733}" type="datetimeFigureOut">
               <a:rPr lang="en-AU" smtClean="0"/>
-              <a:t>30/04/2015</a:t>
+              <a:t>1/05/2015</a:t>
             </a:fld>
             <a:endParaRPr lang="en-AU"/>
           </a:p>
@@ -1786,7 +1786,7 @@
           <a:p>
             <a:fld id="{7B1A49F8-424C-43DF-ABBC-6BF9F0D68733}" type="datetimeFigureOut">
               <a:rPr lang="en-AU" smtClean="0"/>
-              <a:t>30/04/2015</a:t>
+              <a:t>1/05/2015</a:t>
             </a:fld>
             <a:endParaRPr lang="en-AU"/>
           </a:p>
@@ -1881,7 +1881,7 @@
           <a:p>
             <a:fld id="{7B1A49F8-424C-43DF-ABBC-6BF9F0D68733}" type="datetimeFigureOut">
               <a:rPr lang="en-AU" smtClean="0"/>
-              <a:t>30/04/2015</a:t>
+              <a:t>1/05/2015</a:t>
             </a:fld>
             <a:endParaRPr lang="en-AU"/>
           </a:p>
@@ -2158,7 +2158,7 @@
           <a:p>
             <a:fld id="{7B1A49F8-424C-43DF-ABBC-6BF9F0D68733}" type="datetimeFigureOut">
               <a:rPr lang="en-AU" smtClean="0"/>
-              <a:t>30/04/2015</a:t>
+              <a:t>1/05/2015</a:t>
             </a:fld>
             <a:endParaRPr lang="en-AU"/>
           </a:p>
@@ -2415,7 +2415,7 @@
           <a:p>
             <a:fld id="{7B1A49F8-424C-43DF-ABBC-6BF9F0D68733}" type="datetimeFigureOut">
               <a:rPr lang="en-AU" smtClean="0"/>
-              <a:t>30/04/2015</a:t>
+              <a:t>1/05/2015</a:t>
             </a:fld>
             <a:endParaRPr lang="en-AU"/>
           </a:p>
@@ -2628,7 +2628,7 @@
           <a:p>
             <a:fld id="{7B1A49F8-424C-43DF-ABBC-6BF9F0D68733}" type="datetimeFigureOut">
               <a:rPr lang="en-AU" smtClean="0"/>
-              <a:t>30/04/2015</a:t>
+              <a:t>1/05/2015</a:t>
             </a:fld>
             <a:endParaRPr lang="en-AU"/>
           </a:p>
@@ -5252,18 +5252,7 @@
                 <a:ea typeface="Open Sans" panose="020B0606030504020204" pitchFamily="34" charset="0"/>
                 <a:cs typeface="Open Sans" panose="020B0606030504020204" pitchFamily="34" charset="0"/>
               </a:rPr>
-              <a:t>A vulnerability in Windows </a:t>
-            </a:r>
-            <a:r>
-              <a:rPr lang="en-AU" sz="2600" dirty="0" smtClean="0">
-                <a:solidFill>
-                  <a:srgbClr val="EEEEEE"/>
-                </a:solidFill>
-                <a:latin typeface="Open Sans" panose="020B0606030504020204" pitchFamily="34" charset="0"/>
-                <a:ea typeface="Open Sans" panose="020B0606030504020204" pitchFamily="34" charset="0"/>
-                <a:cs typeface="Open Sans" panose="020B0606030504020204" pitchFamily="34" charset="0"/>
-              </a:rPr>
-              <a:t>Vista</a:t>
+              <a:t>A vulnerability in Windows Vista</a:t>
             </a:r>
           </a:p>
           <a:p>
@@ -5280,18 +5269,7 @@
                 <a:ea typeface="Open Sans" panose="020B0606030504020204" pitchFamily="34" charset="0"/>
                 <a:cs typeface="Open Sans" panose="020B0606030504020204" pitchFamily="34" charset="0"/>
               </a:rPr>
-              <a:t>Allows </a:t>
-            </a:r>
-            <a:r>
-              <a:rPr lang="en-AU" sz="2600" dirty="0" smtClean="0">
-                <a:solidFill>
-                  <a:srgbClr val="EEEEEE"/>
-                </a:solidFill>
-                <a:latin typeface="Open Sans" panose="020B0606030504020204" pitchFamily="34" charset="0"/>
-                <a:ea typeface="Open Sans" panose="020B0606030504020204" pitchFamily="34" charset="0"/>
-                <a:cs typeface="Open Sans" panose="020B0606030504020204" pitchFamily="34" charset="0"/>
-              </a:rPr>
-              <a:t>an attacker to include malicious code on removable media</a:t>
+              <a:t>Allows an attacker to include malicious code on removable media</a:t>
             </a:r>
           </a:p>
           <a:p>
@@ -7253,29 +7231,7 @@
                 <a:ea typeface="Open Sans" panose="020B0606030504020204" pitchFamily="34" charset="0"/>
                 <a:cs typeface="Open Sans" panose="020B0606030504020204" pitchFamily="34" charset="0"/>
               </a:rPr>
-              <a:t>So how </a:t>
-            </a:r>
-            <a:r>
-              <a:rPr lang="en-AU" sz="4400" b="1" dirty="0" smtClean="0">
-                <a:solidFill>
-                  <a:srgbClr val="EEEEEE"/>
-                </a:solidFill>
-                <a:latin typeface="Open Sans" panose="020B0606030504020204" pitchFamily="34" charset="0"/>
-                <a:ea typeface="Open Sans" panose="020B0606030504020204" pitchFamily="34" charset="0"/>
-                <a:cs typeface="Open Sans" panose="020B0606030504020204" pitchFamily="34" charset="0"/>
-              </a:rPr>
-              <a:t>can </a:t>
-            </a:r>
-            <a:r>
-              <a:rPr lang="en-AU" sz="4400" b="1" dirty="0" smtClean="0">
-                <a:solidFill>
-                  <a:srgbClr val="EEEEEE"/>
-                </a:solidFill>
-                <a:latin typeface="Open Sans" panose="020B0606030504020204" pitchFamily="34" charset="0"/>
-                <a:ea typeface="Open Sans" panose="020B0606030504020204" pitchFamily="34" charset="0"/>
-                <a:cs typeface="Open Sans" panose="020B0606030504020204" pitchFamily="34" charset="0"/>
-              </a:rPr>
-              <a:t>we fix it?</a:t>
+              <a:t>So how can we fix it?</a:t>
             </a:r>
             <a:endParaRPr lang="en-AU" sz="4400" dirty="0">
               <a:solidFill>
@@ -8839,40 +8795,7 @@
                 <a:ea typeface="Open Sans" panose="020B0606030504020204" pitchFamily="34" charset="0"/>
                 <a:cs typeface="Open Sans" panose="020B0606030504020204" pitchFamily="34" charset="0"/>
               </a:rPr>
-              <a:t>So how </a:t>
-            </a:r>
-            <a:r>
-              <a:rPr lang="en-AU" sz="4400" b="1" dirty="0" smtClean="0">
-                <a:solidFill>
-                  <a:srgbClr val="EEEEEE"/>
-                </a:solidFill>
-                <a:latin typeface="Open Sans" panose="020B0606030504020204" pitchFamily="34" charset="0"/>
-                <a:ea typeface="Open Sans" panose="020B0606030504020204" pitchFamily="34" charset="0"/>
-                <a:cs typeface="Open Sans" panose="020B0606030504020204" pitchFamily="34" charset="0"/>
-              </a:rPr>
-              <a:t>can</a:t>
-            </a:r>
-            <a:r>
-              <a:rPr lang="en-AU" sz="4400" b="1" dirty="0" smtClean="0">
-                <a:solidFill>
-                  <a:srgbClr val="EEEEEE"/>
-                </a:solidFill>
-                <a:latin typeface="Open Sans" panose="020B0606030504020204" pitchFamily="34" charset="0"/>
-                <a:ea typeface="Open Sans" panose="020B0606030504020204" pitchFamily="34" charset="0"/>
-                <a:cs typeface="Open Sans" panose="020B0606030504020204" pitchFamily="34" charset="0"/>
-              </a:rPr>
-              <a:t> </a:t>
-            </a:r>
-            <a:r>
-              <a:rPr lang="en-AU" sz="4400" b="1" dirty="0" smtClean="0">
-                <a:solidFill>
-                  <a:srgbClr val="EEEEEE"/>
-                </a:solidFill>
-                <a:latin typeface="Open Sans" panose="020B0606030504020204" pitchFamily="34" charset="0"/>
-                <a:ea typeface="Open Sans" panose="020B0606030504020204" pitchFamily="34" charset="0"/>
-                <a:cs typeface="Open Sans" panose="020B0606030504020204" pitchFamily="34" charset="0"/>
-              </a:rPr>
-              <a:t>we fix it?</a:t>
+              <a:t>So how can we fix it?</a:t>
             </a:r>
             <a:endParaRPr lang="en-AU" sz="3200" dirty="0">
               <a:solidFill>
@@ -10933,29 +10856,7 @@
                 <a:ea typeface="Open Sans" panose="020B0606030504020204" pitchFamily="34" charset="0"/>
                 <a:cs typeface="Open Sans" panose="020B0606030504020204" pitchFamily="34" charset="0"/>
               </a:rPr>
-              <a:t>So how </a:t>
-            </a:r>
-            <a:r>
-              <a:rPr lang="en-AU" sz="4400" b="1" dirty="0" smtClean="0">
-                <a:solidFill>
-                  <a:srgbClr val="EEEEEE"/>
-                </a:solidFill>
-                <a:latin typeface="Open Sans" panose="020B0606030504020204" pitchFamily="34" charset="0"/>
-                <a:ea typeface="Open Sans" panose="020B0606030504020204" pitchFamily="34" charset="0"/>
-                <a:cs typeface="Open Sans" panose="020B0606030504020204" pitchFamily="34" charset="0"/>
-              </a:rPr>
-              <a:t>can </a:t>
-            </a:r>
-            <a:r>
-              <a:rPr lang="en-AU" sz="4400" b="1" dirty="0" smtClean="0">
-                <a:solidFill>
-                  <a:srgbClr val="EEEEEE"/>
-                </a:solidFill>
-                <a:latin typeface="Open Sans" panose="020B0606030504020204" pitchFamily="34" charset="0"/>
-                <a:ea typeface="Open Sans" panose="020B0606030504020204" pitchFamily="34" charset="0"/>
-                <a:cs typeface="Open Sans" panose="020B0606030504020204" pitchFamily="34" charset="0"/>
-              </a:rPr>
-              <a:t>we fix it?</a:t>
+              <a:t>So how can we fix it?</a:t>
             </a:r>
             <a:br>
               <a:rPr lang="en-AU" sz="4400" b="1" dirty="0" smtClean="0">
@@ -11079,7 +10980,7 @@
         <p:spPr>
           <a:xfrm>
             <a:off x="1524000" y="3428999"/>
-            <a:ext cx="9144000" cy="1692771"/>
+            <a:ext cx="9144000" cy="2092881"/>
           </a:xfrm>
           <a:prstGeom prst="rect">
             <a:avLst/>
@@ -11122,8 +11023,27 @@
                 <a:ea typeface="Open Sans" panose="020B0606030504020204" pitchFamily="34" charset="0"/>
                 <a:cs typeface="Open Sans" panose="020B0606030504020204" pitchFamily="34" charset="0"/>
               </a:rPr>
-              <a:t>In order to mitigate as many vulnerabilities as possible, it is important to install updates to programs regularly</a:t>
-            </a:r>
+              <a:t>In order to mitigate as many vulnerabilities as possible, it is important to install </a:t>
+            </a:r>
+            <a:r>
+              <a:rPr lang="en-AU" sz="2600" dirty="0" smtClean="0">
+                <a:solidFill>
+                  <a:srgbClr val="EEEEEE"/>
+                </a:solidFill>
+                <a:latin typeface="Open Sans" panose="020B0606030504020204" pitchFamily="34" charset="0"/>
+                <a:ea typeface="Open Sans" panose="020B0606030504020204" pitchFamily="34" charset="0"/>
+                <a:cs typeface="Open Sans" panose="020B0606030504020204" pitchFamily="34" charset="0"/>
+              </a:rPr>
+              <a:t>these updates for your third-party applications regularly</a:t>
+            </a:r>
+            <a:endParaRPr lang="en-AU" sz="2600" dirty="0" smtClean="0">
+              <a:solidFill>
+                <a:srgbClr val="EEEEEE"/>
+              </a:solidFill>
+              <a:latin typeface="Open Sans" panose="020B0606030504020204" pitchFamily="34" charset="0"/>
+              <a:ea typeface="Open Sans" panose="020B0606030504020204" pitchFamily="34" charset="0"/>
+              <a:cs typeface="Open Sans" panose="020B0606030504020204" pitchFamily="34" charset="0"/>
+            </a:endParaRPr>
           </a:p>
         </p:txBody>
       </p:sp>
@@ -12991,18 +12911,7 @@
                 <a:ea typeface="Open Sans" panose="020B0606030504020204" pitchFamily="34" charset="0"/>
                 <a:cs typeface="Open Sans" panose="020B0606030504020204" pitchFamily="34" charset="0"/>
               </a:rPr>
-              <a:t>Blue Ink’s computers automatically log into the user “gree</a:t>
-            </a:r>
-            <a:r>
-              <a:rPr lang="en-AU" sz="2600" dirty="0" smtClean="0">
-                <a:solidFill>
-                  <a:srgbClr val="EEEEEE"/>
-                </a:solidFill>
-                <a:latin typeface="Open Sans" panose="020B0606030504020204" pitchFamily="34" charset="0"/>
-                <a:ea typeface="Open Sans" panose="020B0606030504020204" pitchFamily="34" charset="0"/>
-                <a:cs typeface="Open Sans" panose="020B0606030504020204" pitchFamily="34" charset="0"/>
-              </a:rPr>
-              <a:t>n” account without authentication</a:t>
+              <a:t>Blue Ink’s computers automatically log into the user “green” account without authentication</a:t>
             </a:r>
           </a:p>
           <a:p>
@@ -13072,14 +12981,6 @@
               </a:rPr>
               <a:t>Use the computer while the victim was not at his/her desk</a:t>
             </a:r>
-            <a:endParaRPr lang="en-AU" sz="2600" dirty="0" smtClean="0">
-              <a:solidFill>
-                <a:srgbClr val="EEEEEE"/>
-              </a:solidFill>
-              <a:latin typeface="Open Sans" panose="020B0606030504020204" pitchFamily="34" charset="0"/>
-              <a:ea typeface="Open Sans" panose="020B0606030504020204" pitchFamily="34" charset="0"/>
-              <a:cs typeface="Open Sans" panose="020B0606030504020204" pitchFamily="34" charset="0"/>
-            </a:endParaRPr>
           </a:p>
         </p:txBody>
       </p:sp>
@@ -13271,14 +13172,8 @@
                 <a:ea typeface="Open Sans" panose="020B0606030504020204" pitchFamily="34" charset="0"/>
                 <a:cs typeface="Open Sans" panose="020B0606030504020204" pitchFamily="34" charset="0"/>
               </a:rPr>
-              <a:t>Set a password for the account</a:t>
-            </a:r>
-          </a:p>
-          <a:p>
-            <a:pPr marL="285750" indent="-285750">
-              <a:buFont typeface="Arial" panose="020B0604020202020204" pitchFamily="34" charset="0"/>
-              <a:buChar char="•"/>
-            </a:pPr>
+              <a:t>Set a password for </a:t>
+            </a:r>
             <a:r>
               <a:rPr lang="en-AU" sz="2600" dirty="0" smtClean="0">
                 <a:solidFill>
@@ -13288,7 +13183,18 @@
                 <a:ea typeface="Open Sans" panose="020B0606030504020204" pitchFamily="34" charset="0"/>
                 <a:cs typeface="Open Sans" panose="020B0606030504020204" pitchFamily="34" charset="0"/>
               </a:rPr>
-              <a:t>Password protect the screen saver</a:t>
+              <a:t>user</a:t>
+            </a:r>
+            <a:r>
+              <a:rPr lang="en-AU" sz="2600" dirty="0" smtClean="0">
+                <a:solidFill>
+                  <a:srgbClr val="EEEEEE"/>
+                </a:solidFill>
+                <a:latin typeface="Open Sans" panose="020B0606030504020204" pitchFamily="34" charset="0"/>
+                <a:ea typeface="Open Sans" panose="020B0606030504020204" pitchFamily="34" charset="0"/>
+                <a:cs typeface="Open Sans" panose="020B0606030504020204" pitchFamily="34" charset="0"/>
+              </a:rPr>
+              <a:t> accounts</a:t>
             </a:r>
             <a:endParaRPr lang="en-AU" sz="2600" dirty="0" smtClean="0">
               <a:solidFill>
@@ -13298,6 +13204,23 @@
               <a:ea typeface="Open Sans" panose="020B0606030504020204" pitchFamily="34" charset="0"/>
               <a:cs typeface="Open Sans" panose="020B0606030504020204" pitchFamily="34" charset="0"/>
             </a:endParaRPr>
+          </a:p>
+          <a:p>
+            <a:pPr marL="285750" indent="-285750">
+              <a:buFont typeface="Arial" panose="020B0604020202020204" pitchFamily="34" charset="0"/>
+              <a:buChar char="•"/>
+            </a:pPr>
+            <a:r>
+              <a:rPr lang="en-AU" sz="2600" dirty="0" smtClean="0">
+                <a:solidFill>
+                  <a:srgbClr val="EEEEEE"/>
+                </a:solidFill>
+                <a:latin typeface="Open Sans" panose="020B0606030504020204" pitchFamily="34" charset="0"/>
+                <a:ea typeface="Open Sans" panose="020B0606030504020204" pitchFamily="34" charset="0"/>
+                <a:cs typeface="Open Sans" panose="020B0606030504020204" pitchFamily="34" charset="0"/>
+              </a:rPr>
+              <a:t>Password protect the screen saver</a:t>
+            </a:r>
           </a:p>
         </p:txBody>
       </p:sp>
@@ -13491,14 +13414,6 @@
               </a:rPr>
               <a:t>Click “User Accounts” in the Control Panel</a:t>
             </a:r>
-            <a:endParaRPr lang="en-AU" sz="2600" dirty="0" smtClean="0">
-              <a:solidFill>
-                <a:srgbClr val="EEEEEE"/>
-              </a:solidFill>
-              <a:latin typeface="Open Sans" panose="020B0606030504020204" pitchFamily="34" charset="0"/>
-              <a:ea typeface="Open Sans" panose="020B0606030504020204" pitchFamily="34" charset="0"/>
-              <a:cs typeface="Open Sans" panose="020B0606030504020204" pitchFamily="34" charset="0"/>
-            </a:endParaRPr>
           </a:p>
         </p:txBody>
       </p:sp>
@@ -13922,14 +13837,6 @@
               </a:rPr>
               <a:t>Click “Change your Windows password”</a:t>
             </a:r>
-            <a:endParaRPr lang="en-AU" sz="2600" dirty="0" smtClean="0">
-              <a:solidFill>
-                <a:srgbClr val="EEEEEE"/>
-              </a:solidFill>
-              <a:latin typeface="Open Sans" panose="020B0606030504020204" pitchFamily="34" charset="0"/>
-              <a:ea typeface="Open Sans" panose="020B0606030504020204" pitchFamily="34" charset="0"/>
-              <a:cs typeface="Open Sans" panose="020B0606030504020204" pitchFamily="34" charset="0"/>
-            </a:endParaRPr>
           </a:p>
         </p:txBody>
       </p:sp>
@@ -14108,14 +14015,6 @@
               </a:rPr>
               <a:t>Click “Create password for your account”</a:t>
             </a:r>
-            <a:endParaRPr lang="en-AU" sz="2600" dirty="0" smtClean="0">
-              <a:solidFill>
-                <a:srgbClr val="EEEEEE"/>
-              </a:solidFill>
-              <a:latin typeface="Open Sans" panose="020B0606030504020204" pitchFamily="34" charset="0"/>
-              <a:ea typeface="Open Sans" panose="020B0606030504020204" pitchFamily="34" charset="0"/>
-              <a:cs typeface="Open Sans" panose="020B0606030504020204" pitchFamily="34" charset="0"/>
-            </a:endParaRPr>
           </a:p>
         </p:txBody>
       </p:sp>
@@ -14294,14 +14193,6 @@
               </a:rPr>
               <a:t>Enter and confirm your new password and click “Create password”</a:t>
             </a:r>
-            <a:endParaRPr lang="en-AU" sz="2600" dirty="0" smtClean="0">
-              <a:solidFill>
-                <a:srgbClr val="EEEEEE"/>
-              </a:solidFill>
-              <a:latin typeface="Open Sans" panose="020B0606030504020204" pitchFamily="34" charset="0"/>
-              <a:ea typeface="Open Sans" panose="020B0606030504020204" pitchFamily="34" charset="0"/>
-              <a:cs typeface="Open Sans" panose="020B0606030504020204" pitchFamily="34" charset="0"/>
-            </a:endParaRPr>
           </a:p>
         </p:txBody>
       </p:sp>
@@ -14525,14 +14416,6 @@
               </a:rPr>
               <a:t>In order to authenticate the user and log into the computer</a:t>
             </a:r>
-            <a:endParaRPr lang="en-AU" sz="2600" dirty="0" smtClean="0">
-              <a:solidFill>
-                <a:srgbClr val="EEEEEE"/>
-              </a:solidFill>
-              <a:latin typeface="Open Sans" panose="020B0606030504020204" pitchFamily="34" charset="0"/>
-              <a:ea typeface="Open Sans" panose="020B0606030504020204" pitchFamily="34" charset="0"/>
-              <a:cs typeface="Open Sans" panose="020B0606030504020204" pitchFamily="34" charset="0"/>
-            </a:endParaRPr>
           </a:p>
         </p:txBody>
       </p:sp>
@@ -14743,14 +14626,6 @@
               </a:rPr>
               <a:t>Click “Personalize”</a:t>
             </a:r>
-            <a:endParaRPr lang="en-AU" sz="2600" dirty="0" smtClean="0">
-              <a:solidFill>
-                <a:srgbClr val="EEEEEE"/>
-              </a:solidFill>
-              <a:latin typeface="Open Sans" panose="020B0606030504020204" pitchFamily="34" charset="0"/>
-              <a:ea typeface="Open Sans" panose="020B0606030504020204" pitchFamily="34" charset="0"/>
-              <a:cs typeface="Open Sans" panose="020B0606030504020204" pitchFamily="34" charset="0"/>
-            </a:endParaRPr>
           </a:p>
         </p:txBody>
       </p:sp>
@@ -14929,14 +14804,6 @@
               </a:rPr>
               <a:t>Click “Screen Saver”</a:t>
             </a:r>
-            <a:endParaRPr lang="en-AU" sz="2600" dirty="0" smtClean="0">
-              <a:solidFill>
-                <a:srgbClr val="EEEEEE"/>
-              </a:solidFill>
-              <a:latin typeface="Open Sans" panose="020B0606030504020204" pitchFamily="34" charset="0"/>
-              <a:ea typeface="Open Sans" panose="020B0606030504020204" pitchFamily="34" charset="0"/>
-              <a:cs typeface="Open Sans" panose="020B0606030504020204" pitchFamily="34" charset="0"/>
-            </a:endParaRPr>
           </a:p>
         </p:txBody>
       </p:sp>
@@ -15115,14 +14982,6 @@
               </a:rPr>
               <a:t>Ensure that the “On resume, display logon screen” checkbox is ticked</a:t>
             </a:r>
-            <a:endParaRPr lang="en-AU" sz="2600" dirty="0" smtClean="0">
-              <a:solidFill>
-                <a:srgbClr val="EEEEEE"/>
-              </a:solidFill>
-              <a:latin typeface="Open Sans" panose="020B0606030504020204" pitchFamily="34" charset="0"/>
-              <a:ea typeface="Open Sans" panose="020B0606030504020204" pitchFamily="34" charset="0"/>
-              <a:cs typeface="Open Sans" panose="020B0606030504020204" pitchFamily="34" charset="0"/>
-            </a:endParaRPr>
           </a:p>
         </p:txBody>
       </p:sp>
@@ -15338,14 +15197,6 @@
               </a:rPr>
               <a:t>It will prompt the user to log in with their correct password</a:t>
             </a:r>
-            <a:endParaRPr lang="en-AU" sz="2600" dirty="0" smtClean="0">
-              <a:solidFill>
-                <a:srgbClr val="EEEEEE"/>
-              </a:solidFill>
-              <a:latin typeface="Open Sans" panose="020B0606030504020204" pitchFamily="34" charset="0"/>
-              <a:ea typeface="Open Sans" panose="020B0606030504020204" pitchFamily="34" charset="0"/>
-              <a:cs typeface="Open Sans" panose="020B0606030504020204" pitchFamily="34" charset="0"/>
-            </a:endParaRPr>
           </a:p>
         </p:txBody>
       </p:sp>
@@ -15538,6 +15389,17 @@
                 <a:cs typeface="Open Sans" panose="020B0606030504020204" pitchFamily="34" charset="0"/>
               </a:rPr>
               <a:t>Simple passwords </a:t>
+            </a:r>
+            <a:r>
+              <a:rPr lang="en-AU" sz="2600" dirty="0" smtClean="0">
+                <a:solidFill>
+                  <a:srgbClr val="EEEEEE"/>
+                </a:solidFill>
+                <a:latin typeface="Open Sans" panose="020B0606030504020204" pitchFamily="34" charset="0"/>
+                <a:ea typeface="Open Sans" panose="020B0606030504020204" pitchFamily="34" charset="0"/>
+                <a:cs typeface="Open Sans" panose="020B0606030504020204" pitchFamily="34" charset="0"/>
+              </a:rPr>
+              <a:t>are easy to guess</a:t>
             </a:r>
             <a:endParaRPr lang="en-AU" sz="2600" dirty="0" smtClean="0">
               <a:solidFill>

</xml_diff>

<commit_message>
CSI1101 A2: finished passwords, user privileges
</commit_message>
<xml_diff>
--- a/year_1/sem_2/CSI1101_computer_security/0b_assignment_2_[22MAY15_0900]/dev/CSI1101_PONCE_A2_v01.pptx
+++ b/year_1/sem_2/CSI1101_computer_security/0b_assignment_2_[22MAY15_0900]/dev/CSI1101_PONCE_A2_v01.pptx
@@ -25,7 +25,7 @@
     <p:sldId id="273" r:id="rId19"/>
     <p:sldId id="274" r:id="rId20"/>
     <p:sldId id="275" r:id="rId21"/>
-    <p:sldId id="276" r:id="rId22"/>
+    <p:sldId id="319" r:id="rId22"/>
     <p:sldId id="277" r:id="rId23"/>
     <p:sldId id="280" r:id="rId24"/>
     <p:sldId id="281" r:id="rId25"/>
@@ -53,8 +53,20 @@
     <p:sldId id="305" r:id="rId47"/>
     <p:sldId id="306" r:id="rId48"/>
     <p:sldId id="307" r:id="rId49"/>
-    <p:sldId id="291" r:id="rId50"/>
-    <p:sldId id="272" r:id="rId51"/>
+    <p:sldId id="308" r:id="rId50"/>
+    <p:sldId id="291" r:id="rId51"/>
+    <p:sldId id="309" r:id="rId52"/>
+    <p:sldId id="310" r:id="rId53"/>
+    <p:sldId id="311" r:id="rId54"/>
+    <p:sldId id="312" r:id="rId55"/>
+    <p:sldId id="313" r:id="rId56"/>
+    <p:sldId id="314" r:id="rId57"/>
+    <p:sldId id="315" r:id="rId58"/>
+    <p:sldId id="316" r:id="rId59"/>
+    <p:sldId id="317" r:id="rId60"/>
+    <p:sldId id="318" r:id="rId61"/>
+    <p:sldId id="276" r:id="rId62"/>
+    <p:sldId id="272" r:id="rId63"/>
   </p:sldIdLst>
   <p:sldSz cx="12192000" cy="6858000"/>
   <p:notesSz cx="6858000" cy="9144000"/>
@@ -303,7 +315,7 @@
           <a:p>
             <a:fld id="{7B1A49F8-424C-43DF-ABBC-6BF9F0D68733}" type="datetimeFigureOut">
               <a:rPr lang="en-AU" smtClean="0"/>
-              <a:t>1/05/2015</a:t>
+              <a:t>6/05/2015</a:t>
             </a:fld>
             <a:endParaRPr lang="en-AU"/>
           </a:p>
@@ -473,7 +485,7 @@
           <a:p>
             <a:fld id="{7B1A49F8-424C-43DF-ABBC-6BF9F0D68733}" type="datetimeFigureOut">
               <a:rPr lang="en-AU" smtClean="0"/>
-              <a:t>1/05/2015</a:t>
+              <a:t>6/05/2015</a:t>
             </a:fld>
             <a:endParaRPr lang="en-AU"/>
           </a:p>
@@ -653,7 +665,7 @@
           <a:p>
             <a:fld id="{7B1A49F8-424C-43DF-ABBC-6BF9F0D68733}" type="datetimeFigureOut">
               <a:rPr lang="en-AU" smtClean="0"/>
-              <a:t>1/05/2015</a:t>
+              <a:t>6/05/2015</a:t>
             </a:fld>
             <a:endParaRPr lang="en-AU"/>
           </a:p>
@@ -823,7 +835,7 @@
           <a:p>
             <a:fld id="{7B1A49F8-424C-43DF-ABBC-6BF9F0D68733}" type="datetimeFigureOut">
               <a:rPr lang="en-AU" smtClean="0"/>
-              <a:t>1/05/2015</a:t>
+              <a:t>6/05/2015</a:t>
             </a:fld>
             <a:endParaRPr lang="en-AU"/>
           </a:p>
@@ -1069,7 +1081,7 @@
           <a:p>
             <a:fld id="{7B1A49F8-424C-43DF-ABBC-6BF9F0D68733}" type="datetimeFigureOut">
               <a:rPr lang="en-AU" smtClean="0"/>
-              <a:t>1/05/2015</a:t>
+              <a:t>6/05/2015</a:t>
             </a:fld>
             <a:endParaRPr lang="en-AU"/>
           </a:p>
@@ -1301,7 +1313,7 @@
           <a:p>
             <a:fld id="{7B1A49F8-424C-43DF-ABBC-6BF9F0D68733}" type="datetimeFigureOut">
               <a:rPr lang="en-AU" smtClean="0"/>
-              <a:t>1/05/2015</a:t>
+              <a:t>6/05/2015</a:t>
             </a:fld>
             <a:endParaRPr lang="en-AU"/>
           </a:p>
@@ -1668,7 +1680,7 @@
           <a:p>
             <a:fld id="{7B1A49F8-424C-43DF-ABBC-6BF9F0D68733}" type="datetimeFigureOut">
               <a:rPr lang="en-AU" smtClean="0"/>
-              <a:t>1/05/2015</a:t>
+              <a:t>6/05/2015</a:t>
             </a:fld>
             <a:endParaRPr lang="en-AU"/>
           </a:p>
@@ -1786,7 +1798,7 @@
           <a:p>
             <a:fld id="{7B1A49F8-424C-43DF-ABBC-6BF9F0D68733}" type="datetimeFigureOut">
               <a:rPr lang="en-AU" smtClean="0"/>
-              <a:t>1/05/2015</a:t>
+              <a:t>6/05/2015</a:t>
             </a:fld>
             <a:endParaRPr lang="en-AU"/>
           </a:p>
@@ -1881,7 +1893,7 @@
           <a:p>
             <a:fld id="{7B1A49F8-424C-43DF-ABBC-6BF9F0D68733}" type="datetimeFigureOut">
               <a:rPr lang="en-AU" smtClean="0"/>
-              <a:t>1/05/2015</a:t>
+              <a:t>6/05/2015</a:t>
             </a:fld>
             <a:endParaRPr lang="en-AU"/>
           </a:p>
@@ -2158,7 +2170,7 @@
           <a:p>
             <a:fld id="{7B1A49F8-424C-43DF-ABBC-6BF9F0D68733}" type="datetimeFigureOut">
               <a:rPr lang="en-AU" smtClean="0"/>
-              <a:t>1/05/2015</a:t>
+              <a:t>6/05/2015</a:t>
             </a:fld>
             <a:endParaRPr lang="en-AU"/>
           </a:p>
@@ -2415,7 +2427,7 @@
           <a:p>
             <a:fld id="{7B1A49F8-424C-43DF-ABBC-6BF9F0D68733}" type="datetimeFigureOut">
               <a:rPr lang="en-AU" smtClean="0"/>
-              <a:t>1/05/2015</a:t>
+              <a:t>6/05/2015</a:t>
             </a:fld>
             <a:endParaRPr lang="en-AU"/>
           </a:p>
@@ -2628,7 +2640,7 @@
           <a:p>
             <a:fld id="{7B1A49F8-424C-43DF-ABBC-6BF9F0D68733}" type="datetimeFigureOut">
               <a:rPr lang="en-AU" smtClean="0"/>
-              <a:t>1/05/2015</a:t>
+              <a:t>6/05/2015</a:t>
             </a:fld>
             <a:endParaRPr lang="en-AU"/>
           </a:p>
@@ -7773,7 +7785,7 @@
     </p:spTree>
     <p:extLst>
       <p:ext uri="{BB962C8B-B14F-4D97-AF65-F5344CB8AC3E}">
-        <p14:creationId xmlns:p14="http://schemas.microsoft.com/office/powerpoint/2010/main" val="1029629349"/>
+        <p14:creationId xmlns:p14="http://schemas.microsoft.com/office/powerpoint/2010/main" val="540446113"/>
       </p:ext>
     </p:extLst>
   </p:cSld>
@@ -11023,27 +11035,8 @@
                 <a:ea typeface="Open Sans" panose="020B0606030504020204" pitchFamily="34" charset="0"/>
                 <a:cs typeface="Open Sans" panose="020B0606030504020204" pitchFamily="34" charset="0"/>
               </a:rPr>
-              <a:t>In order to mitigate as many vulnerabilities as possible, it is important to install </a:t>
-            </a:r>
-            <a:r>
-              <a:rPr lang="en-AU" sz="2600" dirty="0" smtClean="0">
-                <a:solidFill>
-                  <a:srgbClr val="EEEEEE"/>
-                </a:solidFill>
-                <a:latin typeface="Open Sans" panose="020B0606030504020204" pitchFamily="34" charset="0"/>
-                <a:ea typeface="Open Sans" panose="020B0606030504020204" pitchFamily="34" charset="0"/>
-                <a:cs typeface="Open Sans" panose="020B0606030504020204" pitchFamily="34" charset="0"/>
-              </a:rPr>
-              <a:t>these updates for your third-party applications regularly</a:t>
-            </a:r>
-            <a:endParaRPr lang="en-AU" sz="2600" dirty="0" smtClean="0">
-              <a:solidFill>
-                <a:srgbClr val="EEEEEE"/>
-              </a:solidFill>
-              <a:latin typeface="Open Sans" panose="020B0606030504020204" pitchFamily="34" charset="0"/>
-              <a:ea typeface="Open Sans" panose="020B0606030504020204" pitchFamily="34" charset="0"/>
-              <a:cs typeface="Open Sans" panose="020B0606030504020204" pitchFamily="34" charset="0"/>
-            </a:endParaRPr>
+              <a:t>In order to mitigate as many vulnerabilities as possible, it is important to install these updates for your third-party applications regularly</a:t>
+            </a:r>
           </a:p>
         </p:txBody>
       </p:sp>
@@ -13172,38 +13165,8 @@
                 <a:ea typeface="Open Sans" panose="020B0606030504020204" pitchFamily="34" charset="0"/>
                 <a:cs typeface="Open Sans" panose="020B0606030504020204" pitchFamily="34" charset="0"/>
               </a:rPr>
-              <a:t>Set a password for </a:t>
-            </a:r>
-            <a:r>
-              <a:rPr lang="en-AU" sz="2600" dirty="0" smtClean="0">
-                <a:solidFill>
-                  <a:srgbClr val="EEEEEE"/>
-                </a:solidFill>
-                <a:latin typeface="Open Sans" panose="020B0606030504020204" pitchFamily="34" charset="0"/>
-                <a:ea typeface="Open Sans" panose="020B0606030504020204" pitchFamily="34" charset="0"/>
-                <a:cs typeface="Open Sans" panose="020B0606030504020204" pitchFamily="34" charset="0"/>
-              </a:rPr>
-              <a:t>user</a:t>
-            </a:r>
-            <a:r>
-              <a:rPr lang="en-AU" sz="2600" dirty="0" smtClean="0">
-                <a:solidFill>
-                  <a:srgbClr val="EEEEEE"/>
-                </a:solidFill>
-                <a:latin typeface="Open Sans" panose="020B0606030504020204" pitchFamily="34" charset="0"/>
-                <a:ea typeface="Open Sans" panose="020B0606030504020204" pitchFamily="34" charset="0"/>
-                <a:cs typeface="Open Sans" panose="020B0606030504020204" pitchFamily="34" charset="0"/>
-              </a:rPr>
-              <a:t> accounts</a:t>
-            </a:r>
-            <a:endParaRPr lang="en-AU" sz="2600" dirty="0" smtClean="0">
-              <a:solidFill>
-                <a:srgbClr val="EEEEEE"/>
-              </a:solidFill>
-              <a:latin typeface="Open Sans" panose="020B0606030504020204" pitchFamily="34" charset="0"/>
-              <a:ea typeface="Open Sans" panose="020B0606030504020204" pitchFamily="34" charset="0"/>
-              <a:cs typeface="Open Sans" panose="020B0606030504020204" pitchFamily="34" charset="0"/>
-            </a:endParaRPr>
+              <a:t>Set a password for user accounts</a:t>
+            </a:r>
           </a:p>
           <a:p>
             <a:pPr marL="285750" indent="-285750">
@@ -14414,8 +14377,38 @@
                 <a:ea typeface="Open Sans" panose="020B0606030504020204" pitchFamily="34" charset="0"/>
                 <a:cs typeface="Open Sans" panose="020B0606030504020204" pitchFamily="34" charset="0"/>
               </a:rPr>
-              <a:t>In order to authenticate the user and log into the computer</a:t>
-            </a:r>
+              <a:t>When the computer is turned on, requiring the user to authentica</a:t>
+            </a:r>
+            <a:r>
+              <a:rPr lang="en-AU" sz="2600" dirty="0" smtClean="0">
+                <a:solidFill>
+                  <a:srgbClr val="EEEEEE"/>
+                </a:solidFill>
+                <a:latin typeface="Open Sans" panose="020B0606030504020204" pitchFamily="34" charset="0"/>
+                <a:ea typeface="Open Sans" panose="020B0606030504020204" pitchFamily="34" charset="0"/>
+                <a:cs typeface="Open Sans" panose="020B0606030504020204" pitchFamily="34" charset="0"/>
+              </a:rPr>
+              <a:t>te </a:t>
+            </a:r>
+            <a:r>
+              <a:rPr lang="en-AU" sz="2600" dirty="0" smtClean="0">
+                <a:solidFill>
+                  <a:srgbClr val="EEEEEE"/>
+                </a:solidFill>
+                <a:latin typeface="Open Sans" panose="020B0606030504020204" pitchFamily="34" charset="0"/>
+                <a:ea typeface="Open Sans" panose="020B0606030504020204" pitchFamily="34" charset="0"/>
+                <a:cs typeface="Open Sans" panose="020B0606030504020204" pitchFamily="34" charset="0"/>
+              </a:rPr>
+              <a:t>before being able to continue</a:t>
+            </a:r>
+            <a:endParaRPr lang="en-AU" sz="2600" dirty="0" smtClean="0">
+              <a:solidFill>
+                <a:srgbClr val="EEEEEE"/>
+              </a:solidFill>
+              <a:latin typeface="Open Sans" panose="020B0606030504020204" pitchFamily="34" charset="0"/>
+              <a:ea typeface="Open Sans" panose="020B0606030504020204" pitchFamily="34" charset="0"/>
+              <a:cs typeface="Open Sans" panose="020B0606030504020204" pitchFamily="34" charset="0"/>
+            </a:endParaRPr>
           </a:p>
         </p:txBody>
       </p:sp>
@@ -15169,7 +15162,7 @@
         <p:spPr>
           <a:xfrm>
             <a:off x="1524000" y="3428999"/>
-            <a:ext cx="9144000" cy="892552"/>
+            <a:ext cx="9144000" cy="1692771"/>
           </a:xfrm>
           <a:prstGeom prst="rect">
             <a:avLst/>
@@ -15195,8 +15188,44 @@
                 <a:ea typeface="Open Sans" panose="020B0606030504020204" pitchFamily="34" charset="0"/>
                 <a:cs typeface="Open Sans" panose="020B0606030504020204" pitchFamily="34" charset="0"/>
               </a:rPr>
-              <a:t>It will prompt the user to log in with their correct password</a:t>
-            </a:r>
+              <a:t>It will prompt the user to log in with their correct </a:t>
+            </a:r>
+            <a:r>
+              <a:rPr lang="en-AU" sz="2600" dirty="0" smtClean="0">
+                <a:solidFill>
+                  <a:srgbClr val="EEEEEE"/>
+                </a:solidFill>
+                <a:latin typeface="Open Sans" panose="020B0606030504020204" pitchFamily="34" charset="0"/>
+                <a:ea typeface="Open Sans" panose="020B0606030504020204" pitchFamily="34" charset="0"/>
+                <a:cs typeface="Open Sans" panose="020B0606030504020204" pitchFamily="34" charset="0"/>
+              </a:rPr>
+              <a:t>password</a:t>
+            </a:r>
+          </a:p>
+          <a:p>
+            <a:pPr marL="285750" indent="-285750">
+              <a:buFont typeface="Arial" panose="020B0604020202020204" pitchFamily="34" charset="0"/>
+              <a:buChar char="•"/>
+            </a:pPr>
+            <a:r>
+              <a:rPr lang="en-AU" sz="2600" dirty="0" smtClean="0">
+                <a:solidFill>
+                  <a:srgbClr val="EEEEEE"/>
+                </a:solidFill>
+                <a:latin typeface="Open Sans" panose="020B0606030504020204" pitchFamily="34" charset="0"/>
+                <a:ea typeface="Open Sans" panose="020B0606030504020204" pitchFamily="34" charset="0"/>
+                <a:cs typeface="Open Sans" panose="020B0606030504020204" pitchFamily="34" charset="0"/>
+              </a:rPr>
+              <a:t>User must authenticate before gaining access to the computer again</a:t>
+            </a:r>
+            <a:endParaRPr lang="en-AU" sz="2600" dirty="0" smtClean="0">
+              <a:solidFill>
+                <a:srgbClr val="EEEEEE"/>
+              </a:solidFill>
+              <a:latin typeface="Open Sans" panose="020B0606030504020204" pitchFamily="34" charset="0"/>
+              <a:ea typeface="Open Sans" panose="020B0606030504020204" pitchFamily="34" charset="0"/>
+              <a:cs typeface="Open Sans" panose="020B0606030504020204" pitchFamily="34" charset="0"/>
+            </a:endParaRPr>
           </a:p>
         </p:txBody>
       </p:sp>
@@ -15280,7 +15309,7 @@
                 <a:ea typeface="Open Sans" panose="020B0606030504020204" pitchFamily="34" charset="0"/>
                 <a:cs typeface="Open Sans" panose="020B0606030504020204" pitchFamily="34" charset="0"/>
               </a:rPr>
-              <a:t>Choosing a password</a:t>
+              <a:t>Choosing passwords</a:t>
             </a:r>
             <a:endParaRPr lang="en-AU" sz="3200" dirty="0">
               <a:solidFill>
@@ -15362,7 +15391,7 @@
         <p:spPr>
           <a:xfrm>
             <a:off x="1524000" y="1958544"/>
-            <a:ext cx="9144000" cy="492443"/>
+            <a:ext cx="9144000" cy="3293209"/>
           </a:xfrm>
           <a:prstGeom prst="rect">
             <a:avLst/>
@@ -15388,8 +15417,14 @@
                 <a:ea typeface="Open Sans" panose="020B0606030504020204" pitchFamily="34" charset="0"/>
                 <a:cs typeface="Open Sans" panose="020B0606030504020204" pitchFamily="34" charset="0"/>
               </a:rPr>
-              <a:t>Simple passwords </a:t>
-            </a:r>
+              <a:t>Very important</a:t>
+            </a:r>
+          </a:p>
+          <a:p>
+            <a:pPr marL="285750" indent="-285750">
+              <a:buFont typeface="Arial" panose="020B0604020202020204" pitchFamily="34" charset="0"/>
+              <a:buChar char="•"/>
+            </a:pPr>
             <a:r>
               <a:rPr lang="en-AU" sz="2600" dirty="0" smtClean="0">
                 <a:solidFill>
@@ -15399,7 +15434,86 @@
                 <a:ea typeface="Open Sans" panose="020B0606030504020204" pitchFamily="34" charset="0"/>
                 <a:cs typeface="Open Sans" panose="020B0606030504020204" pitchFamily="34" charset="0"/>
               </a:rPr>
-              <a:t>are easy to guess</a:t>
+              <a:t>If password too simple</a:t>
+            </a:r>
+          </a:p>
+          <a:p>
+            <a:pPr marL="742950" lvl="1" indent="-285750">
+              <a:buFont typeface="Arial" panose="020B0604020202020204" pitchFamily="34" charset="0"/>
+              <a:buChar char="•"/>
+            </a:pPr>
+            <a:r>
+              <a:rPr lang="en-AU" sz="2600" dirty="0">
+                <a:solidFill>
+                  <a:srgbClr val="EEEEEE"/>
+                </a:solidFill>
+                <a:latin typeface="Open Sans" panose="020B0606030504020204" pitchFamily="34" charset="0"/>
+                <a:ea typeface="Open Sans" panose="020B0606030504020204" pitchFamily="34" charset="0"/>
+                <a:cs typeface="Open Sans" panose="020B0606030504020204" pitchFamily="34" charset="0"/>
+              </a:rPr>
+              <a:t>C</a:t>
+            </a:r>
+            <a:r>
+              <a:rPr lang="en-AU" sz="2600" dirty="0" smtClean="0">
+                <a:solidFill>
+                  <a:srgbClr val="EEEEEE"/>
+                </a:solidFill>
+                <a:latin typeface="Open Sans" panose="020B0606030504020204" pitchFamily="34" charset="0"/>
+                <a:ea typeface="Open Sans" panose="020B0606030504020204" pitchFamily="34" charset="0"/>
+                <a:cs typeface="Open Sans" panose="020B0606030504020204" pitchFamily="34" charset="0"/>
+              </a:rPr>
+              <a:t>an easily be guessed with online brute-force or offline dictionary attack</a:t>
+            </a:r>
+          </a:p>
+          <a:p>
+            <a:pPr marL="285750" indent="-285750">
+              <a:buFont typeface="Arial" panose="020B0604020202020204" pitchFamily="34" charset="0"/>
+              <a:buChar char="•"/>
+            </a:pPr>
+            <a:r>
+              <a:rPr lang="en-AU" sz="2600" dirty="0" smtClean="0">
+                <a:solidFill>
+                  <a:srgbClr val="EEEEEE"/>
+                </a:solidFill>
+                <a:latin typeface="Open Sans" panose="020B0606030504020204" pitchFamily="34" charset="0"/>
+                <a:ea typeface="Open Sans" panose="020B0606030504020204" pitchFamily="34" charset="0"/>
+                <a:cs typeface="Open Sans" panose="020B0606030504020204" pitchFamily="34" charset="0"/>
+              </a:rPr>
+              <a:t>If password too complicated</a:t>
+            </a:r>
+          </a:p>
+          <a:p>
+            <a:pPr marL="742950" lvl="1" indent="-285750">
+              <a:buFont typeface="Arial" panose="020B0604020202020204" pitchFamily="34" charset="0"/>
+              <a:buChar char="•"/>
+            </a:pPr>
+            <a:r>
+              <a:rPr lang="en-AU" sz="2600" dirty="0" smtClean="0">
+                <a:solidFill>
+                  <a:srgbClr val="EEEEEE"/>
+                </a:solidFill>
+                <a:latin typeface="Open Sans" panose="020B0606030504020204" pitchFamily="34" charset="0"/>
+                <a:ea typeface="Open Sans" panose="020B0606030504020204" pitchFamily="34" charset="0"/>
+                <a:cs typeface="Open Sans" panose="020B0606030504020204" pitchFamily="34" charset="0"/>
+              </a:rPr>
+              <a:t>Too hard to remember</a:t>
+            </a:r>
+          </a:p>
+          <a:p>
+            <a:pPr marL="742950" lvl="1" indent="-285750">
+              <a:buFont typeface="Arial" panose="020B0604020202020204" pitchFamily="34" charset="0"/>
+              <a:buChar char="•"/>
+            </a:pPr>
+            <a:r>
+              <a:rPr lang="en-AU" sz="2600" dirty="0" smtClean="0">
+                <a:solidFill>
+                  <a:srgbClr val="EEEEEE"/>
+                </a:solidFill>
+                <a:latin typeface="Open Sans" panose="020B0606030504020204" pitchFamily="34" charset="0"/>
+                <a:ea typeface="Open Sans" panose="020B0606030504020204" pitchFamily="34" charset="0"/>
+                <a:cs typeface="Open Sans" panose="020B0606030504020204" pitchFamily="34" charset="0"/>
+              </a:rPr>
+              <a:t>May lead to users writing down their password in plain-text (physical or digital)</a:t>
             </a:r>
             <a:endParaRPr lang="en-AU" sz="2600" dirty="0" smtClean="0">
               <a:solidFill>
@@ -15436,6 +15550,570 @@
 </file>
 
 <file path=ppt/slides/slide49.xml><?xml version="1.0" encoding="utf-8"?>
+<p:sld xmlns:a="http://schemas.openxmlformats.org/drawingml/2006/main" xmlns:r="http://schemas.openxmlformats.org/officeDocument/2006/relationships" xmlns:p="http://schemas.openxmlformats.org/presentationml/2006/main">
+  <p:cSld>
+    <p:bg>
+      <p:bgPr>
+        <a:solidFill>
+          <a:srgbClr val="111111"/>
+        </a:solidFill>
+        <a:effectLst/>
+      </p:bgPr>
+    </p:bg>
+    <p:spTree>
+      <p:nvGrpSpPr>
+        <p:cNvPr id="1" name=""/>
+        <p:cNvGrpSpPr/>
+        <p:nvPr/>
+      </p:nvGrpSpPr>
+      <p:grpSpPr>
+        <a:xfrm>
+          <a:off x="0" y="0"/>
+          <a:ext cx="0" cy="0"/>
+          <a:chOff x="0" y="0"/>
+          <a:chExt cx="0" cy="0"/>
+        </a:xfrm>
+      </p:grpSpPr>
+      <p:sp>
+        <p:nvSpPr>
+          <p:cNvPr id="4" name="Title 3"/>
+          <p:cNvSpPr>
+            <a:spLocks noGrp="1"/>
+          </p:cNvSpPr>
+          <p:nvPr>
+            <p:ph type="ctrTitle"/>
+          </p:nvPr>
+        </p:nvSpPr>
+        <p:spPr>
+          <a:xfrm>
+            <a:off x="1524000" y="0"/>
+            <a:ext cx="9144000" cy="2917370"/>
+          </a:xfrm>
+        </p:spPr>
+        <p:txBody>
+          <a:bodyPr anchor="b">
+            <a:normAutofit/>
+          </a:bodyPr>
+          <a:lstStyle/>
+          <a:p>
+            <a:pPr algn="l"/>
+            <a:r>
+              <a:rPr lang="en-AU" sz="4400" b="1" dirty="0" smtClean="0">
+                <a:solidFill>
+                  <a:srgbClr val="EEEEEE"/>
+                </a:solidFill>
+                <a:latin typeface="Open Sans" panose="020B0606030504020204" pitchFamily="34" charset="0"/>
+                <a:ea typeface="Open Sans" panose="020B0606030504020204" pitchFamily="34" charset="0"/>
+                <a:cs typeface="Open Sans" panose="020B0606030504020204" pitchFamily="34" charset="0"/>
+              </a:rPr>
+              <a:t>Password strategy:</a:t>
+            </a:r>
+            <a:br>
+              <a:rPr lang="en-AU" sz="4400" b="1" dirty="0" smtClean="0">
+                <a:solidFill>
+                  <a:srgbClr val="EEEEEE"/>
+                </a:solidFill>
+                <a:latin typeface="Open Sans" panose="020B0606030504020204" pitchFamily="34" charset="0"/>
+                <a:ea typeface="Open Sans" panose="020B0606030504020204" pitchFamily="34" charset="0"/>
+                <a:cs typeface="Open Sans" panose="020B0606030504020204" pitchFamily="34" charset="0"/>
+              </a:rPr>
+            </a:br>
+            <a:r>
+              <a:rPr lang="en-AU" sz="4400" b="1" dirty="0" smtClean="0">
+                <a:solidFill>
+                  <a:srgbClr val="EEEEEE"/>
+                </a:solidFill>
+                <a:latin typeface="Open Sans" panose="020B0606030504020204" pitchFamily="34" charset="0"/>
+                <a:ea typeface="Open Sans" panose="020B0606030504020204" pitchFamily="34" charset="0"/>
+                <a:cs typeface="Open Sans" panose="020B0606030504020204" pitchFamily="34" charset="0"/>
+              </a:rPr>
+              <a:t>passphrases</a:t>
+            </a:r>
+            <a:endParaRPr lang="en-AU" sz="3200" dirty="0">
+              <a:solidFill>
+                <a:srgbClr val="EEEEEE"/>
+              </a:solidFill>
+              <a:latin typeface="Open Sans" panose="020B0606030504020204" pitchFamily="34" charset="0"/>
+              <a:ea typeface="Open Sans" panose="020B0606030504020204" pitchFamily="34" charset="0"/>
+              <a:cs typeface="Open Sans" panose="020B0606030504020204" pitchFamily="34" charset="0"/>
+            </a:endParaRPr>
+          </a:p>
+        </p:txBody>
+      </p:sp>
+      <p:sp>
+        <p:nvSpPr>
+          <p:cNvPr id="6" name="Title 3"/>
+          <p:cNvSpPr txBox="1">
+            <a:spLocks/>
+          </p:cNvSpPr>
+          <p:nvPr/>
+        </p:nvSpPr>
+        <p:spPr>
+          <a:xfrm>
+            <a:off x="1524001" y="2917370"/>
+            <a:ext cx="9144000" cy="511630"/>
+          </a:xfrm>
+          <a:prstGeom prst="rect">
+            <a:avLst/>
+          </a:prstGeom>
+        </p:spPr>
+        <p:txBody>
+          <a:bodyPr vert="horz" lIns="91440" tIns="45720" rIns="91440" bIns="45720" rtlCol="0" anchor="t">
+            <a:normAutofit lnSpcReduction="10000"/>
+          </a:bodyPr>
+          <a:lstStyle>
+            <a:lvl1pPr algn="ctr" defTabSz="914400" rtl="0" eaLnBrk="1" latinLnBrk="0" hangingPunct="1">
+              <a:lnSpc>
+                <a:spcPct val="90000"/>
+              </a:lnSpc>
+              <a:spcBef>
+                <a:spcPct val="0"/>
+              </a:spcBef>
+              <a:buNone/>
+              <a:defRPr sz="6000" kern="1200">
+                <a:solidFill>
+                  <a:schemeClr val="tx1"/>
+                </a:solidFill>
+                <a:latin typeface="+mj-lt"/>
+                <a:ea typeface="+mj-ea"/>
+                <a:cs typeface="+mj-cs"/>
+              </a:defRPr>
+            </a:lvl1pPr>
+          </a:lstStyle>
+          <a:p>
+            <a:pPr algn="l">
+              <a:lnSpc>
+                <a:spcPct val="100000"/>
+              </a:lnSpc>
+            </a:pPr>
+            <a:r>
+              <a:rPr lang="en-AU" sz="2800" dirty="0" smtClean="0">
+                <a:solidFill>
+                  <a:srgbClr val="111111"/>
+                </a:solidFill>
+                <a:latin typeface="Open Sans" panose="020B0606030504020204" pitchFamily="34" charset="0"/>
+                <a:ea typeface="Open Sans" panose="020B0606030504020204" pitchFamily="34" charset="0"/>
+                <a:cs typeface="Open Sans" panose="020B0606030504020204" pitchFamily="34" charset="0"/>
+              </a:rPr>
+              <a:t>separator</a:t>
+            </a:r>
+          </a:p>
+        </p:txBody>
+      </p:sp>
+      <p:sp>
+        <p:nvSpPr>
+          <p:cNvPr id="2" name="TextBox 1"/>
+          <p:cNvSpPr txBox="1"/>
+          <p:nvPr/>
+        </p:nvSpPr>
+        <p:spPr>
+          <a:xfrm>
+            <a:off x="1524000" y="3428999"/>
+            <a:ext cx="9144000" cy="1692771"/>
+          </a:xfrm>
+          <a:prstGeom prst="rect">
+            <a:avLst/>
+          </a:prstGeom>
+          <a:noFill/>
+        </p:spPr>
+        <p:txBody>
+          <a:bodyPr wrap="square" rtlCol="0">
+            <a:spAutoFit/>
+          </a:bodyPr>
+          <a:lstStyle/>
+          <a:p>
+            <a:pPr marL="285750" indent="-285750">
+              <a:buFont typeface="Arial" panose="020B0604020202020204" pitchFamily="34" charset="0"/>
+              <a:buChar char="•"/>
+            </a:pPr>
+            <a:r>
+              <a:rPr lang="en-AU" sz="2600" dirty="0" err="1" smtClean="0">
+                <a:solidFill>
+                  <a:srgbClr val="EEEEEE"/>
+                </a:solidFill>
+                <a:latin typeface="Open Sans" panose="020B0606030504020204" pitchFamily="34" charset="0"/>
+                <a:ea typeface="Open Sans" panose="020B0606030504020204" pitchFamily="34" charset="0"/>
+                <a:cs typeface="Open Sans" panose="020B0606030504020204" pitchFamily="34" charset="0"/>
+              </a:rPr>
+              <a:t>Youtube</a:t>
+            </a:r>
+            <a:r>
+              <a:rPr lang="en-AU" sz="2600" dirty="0" smtClean="0">
+                <a:solidFill>
+                  <a:srgbClr val="EEEEEE"/>
+                </a:solidFill>
+                <a:latin typeface="Open Sans" panose="020B0606030504020204" pitchFamily="34" charset="0"/>
+                <a:ea typeface="Open Sans" panose="020B0606030504020204" pitchFamily="34" charset="0"/>
+                <a:cs typeface="Open Sans" panose="020B0606030504020204" pitchFamily="34" charset="0"/>
+              </a:rPr>
+              <a:t> v</a:t>
+            </a:r>
+            <a:r>
+              <a:rPr lang="en-AU" sz="2600" dirty="0" smtClean="0">
+                <a:solidFill>
+                  <a:srgbClr val="EEEEEE"/>
+                </a:solidFill>
+                <a:latin typeface="Open Sans" panose="020B0606030504020204" pitchFamily="34" charset="0"/>
+                <a:ea typeface="Open Sans" panose="020B0606030504020204" pitchFamily="34" charset="0"/>
+                <a:cs typeface="Open Sans" panose="020B0606030504020204" pitchFamily="34" charset="0"/>
+              </a:rPr>
+              <a:t>ideo on next slide demonstrates how to choose a strong, memorable password with passphrases</a:t>
+            </a:r>
+            <a:r>
+              <a:rPr lang="en-AU" sz="2600" dirty="0">
+                <a:solidFill>
+                  <a:srgbClr val="EEEEEE"/>
+                </a:solidFill>
+                <a:latin typeface="Open Sans" panose="020B0606030504020204" pitchFamily="34" charset="0"/>
+                <a:ea typeface="Open Sans" panose="020B0606030504020204" pitchFamily="34" charset="0"/>
+                <a:cs typeface="Open Sans" panose="020B0606030504020204" pitchFamily="34" charset="0"/>
+              </a:rPr>
+              <a:t> </a:t>
+            </a:r>
+            <a:r>
+              <a:rPr lang="en-AU" sz="2600" dirty="0" smtClean="0">
+                <a:solidFill>
+                  <a:srgbClr val="EEEEEE"/>
+                </a:solidFill>
+                <a:latin typeface="Open Sans" panose="020B0606030504020204" pitchFamily="34" charset="0"/>
+                <a:ea typeface="Open Sans" panose="020B0606030504020204" pitchFamily="34" charset="0"/>
+                <a:cs typeface="Open Sans" panose="020B0606030504020204" pitchFamily="34" charset="0"/>
+                <a:hlinkClick r:id="rId2"/>
+              </a:rPr>
+              <a:t>(Oliver &amp; Snowden, 2015)</a:t>
+            </a:r>
+            <a:endParaRPr lang="en-AU" sz="2600" dirty="0" smtClean="0">
+              <a:solidFill>
+                <a:srgbClr val="EEEEEE"/>
+              </a:solidFill>
+              <a:latin typeface="Open Sans" panose="020B0606030504020204" pitchFamily="34" charset="0"/>
+              <a:ea typeface="Open Sans" panose="020B0606030504020204" pitchFamily="34" charset="0"/>
+              <a:cs typeface="Open Sans" panose="020B0606030504020204" pitchFamily="34" charset="0"/>
+            </a:endParaRPr>
+          </a:p>
+          <a:p>
+            <a:pPr marL="285750" indent="-285750">
+              <a:buFont typeface="Arial" panose="020B0604020202020204" pitchFamily="34" charset="0"/>
+              <a:buChar char="•"/>
+            </a:pPr>
+            <a:r>
+              <a:rPr lang="en-AU" sz="2600" dirty="0" smtClean="0">
+                <a:solidFill>
+                  <a:srgbClr val="EEEEEE"/>
+                </a:solidFill>
+                <a:latin typeface="Open Sans" panose="020B0606030504020204" pitchFamily="34" charset="0"/>
+                <a:ea typeface="Open Sans" panose="020B0606030504020204" pitchFamily="34" charset="0"/>
+                <a:cs typeface="Open Sans" panose="020B0606030504020204" pitchFamily="34" charset="0"/>
+              </a:rPr>
+              <a:t>Give it a moment to load</a:t>
+            </a:r>
+          </a:p>
+        </p:txBody>
+      </p:sp>
+    </p:spTree>
+    <p:extLst>
+      <p:ext uri="{BB962C8B-B14F-4D97-AF65-F5344CB8AC3E}">
+        <p14:creationId xmlns:p14="http://schemas.microsoft.com/office/powerpoint/2010/main" val="2672398625"/>
+      </p:ext>
+    </p:extLst>
+  </p:cSld>
+  <p:clrMapOvr>
+    <a:masterClrMapping/>
+  </p:clrMapOvr>
+  <p:transition spd="slow">
+    <p:push/>
+  </p:transition>
+  <p:timing>
+    <p:tnLst>
+      <p:par>
+        <p:cTn id="1" dur="indefinite" restart="never" nodeType="tmRoot"/>
+      </p:par>
+    </p:tnLst>
+  </p:timing>
+</p:sld>
+</file>
+
+<file path=ppt/slides/slide5.xml><?xml version="1.0" encoding="utf-8"?>
+<p:sld xmlns:a="http://schemas.openxmlformats.org/drawingml/2006/main" xmlns:r="http://schemas.openxmlformats.org/officeDocument/2006/relationships" xmlns:p="http://schemas.openxmlformats.org/presentationml/2006/main">
+  <p:cSld>
+    <p:bg>
+      <p:bgPr>
+        <a:solidFill>
+          <a:srgbClr val="111111"/>
+        </a:solidFill>
+        <a:effectLst/>
+      </p:bgPr>
+    </p:bg>
+    <p:spTree>
+      <p:nvGrpSpPr>
+        <p:cNvPr id="1" name=""/>
+        <p:cNvGrpSpPr/>
+        <p:nvPr/>
+      </p:nvGrpSpPr>
+      <p:grpSpPr>
+        <a:xfrm>
+          <a:off x="0" y="0"/>
+          <a:ext cx="0" cy="0"/>
+          <a:chOff x="0" y="0"/>
+          <a:chExt cx="0" cy="0"/>
+        </a:xfrm>
+      </p:grpSpPr>
+      <p:sp>
+        <p:nvSpPr>
+          <p:cNvPr id="4" name="Title 3"/>
+          <p:cNvSpPr>
+            <a:spLocks noGrp="1"/>
+          </p:cNvSpPr>
+          <p:nvPr>
+            <p:ph type="ctrTitle"/>
+          </p:nvPr>
+        </p:nvSpPr>
+        <p:spPr>
+          <a:xfrm>
+            <a:off x="1524000" y="1"/>
+            <a:ext cx="9144000" cy="2917370"/>
+          </a:xfrm>
+        </p:spPr>
+        <p:txBody>
+          <a:bodyPr anchor="b">
+            <a:normAutofit/>
+          </a:bodyPr>
+          <a:lstStyle/>
+          <a:p>
+            <a:pPr algn="l"/>
+            <a:r>
+              <a:rPr lang="en-AU" sz="4400" b="1" dirty="0" smtClean="0">
+                <a:solidFill>
+                  <a:srgbClr val="EEEEEE"/>
+                </a:solidFill>
+                <a:latin typeface="Open Sans" panose="020B0606030504020204" pitchFamily="34" charset="0"/>
+                <a:ea typeface="Open Sans" panose="020B0606030504020204" pitchFamily="34" charset="0"/>
+                <a:cs typeface="Open Sans" panose="020B0606030504020204" pitchFamily="34" charset="0"/>
+              </a:rPr>
+              <a:t>This presentation will…</a:t>
+            </a:r>
+            <a:br>
+              <a:rPr lang="en-AU" sz="4400" b="1" dirty="0" smtClean="0">
+                <a:solidFill>
+                  <a:srgbClr val="EEEEEE"/>
+                </a:solidFill>
+                <a:latin typeface="Open Sans" panose="020B0606030504020204" pitchFamily="34" charset="0"/>
+                <a:ea typeface="Open Sans" panose="020B0606030504020204" pitchFamily="34" charset="0"/>
+                <a:cs typeface="Open Sans" panose="020B0606030504020204" pitchFamily="34" charset="0"/>
+              </a:rPr>
+            </a:br>
+            <a:r>
+              <a:rPr lang="en-AU" sz="4400" b="1" dirty="0">
+                <a:solidFill>
+                  <a:srgbClr val="EEEEEE"/>
+                </a:solidFill>
+                <a:latin typeface="Open Sans" panose="020B0606030504020204" pitchFamily="34" charset="0"/>
+                <a:ea typeface="Open Sans" panose="020B0606030504020204" pitchFamily="34" charset="0"/>
+                <a:cs typeface="Open Sans" panose="020B0606030504020204" pitchFamily="34" charset="0"/>
+              </a:rPr>
+              <a:t/>
+            </a:r>
+            <a:br>
+              <a:rPr lang="en-AU" sz="4400" b="1" dirty="0">
+                <a:solidFill>
+                  <a:srgbClr val="EEEEEE"/>
+                </a:solidFill>
+                <a:latin typeface="Open Sans" panose="020B0606030504020204" pitchFamily="34" charset="0"/>
+                <a:ea typeface="Open Sans" panose="020B0606030504020204" pitchFamily="34" charset="0"/>
+                <a:cs typeface="Open Sans" panose="020B0606030504020204" pitchFamily="34" charset="0"/>
+              </a:rPr>
+            </a:br>
+            <a:r>
+              <a:rPr lang="en-AU" sz="2800" dirty="0" smtClean="0">
+                <a:solidFill>
+                  <a:srgbClr val="EEEEEE"/>
+                </a:solidFill>
+                <a:latin typeface="Open Sans" panose="020B0606030504020204" pitchFamily="34" charset="0"/>
+                <a:ea typeface="Open Sans" panose="020B0606030504020204" pitchFamily="34" charset="0"/>
+                <a:cs typeface="Open Sans" panose="020B0606030504020204" pitchFamily="34" charset="0"/>
+              </a:rPr>
+              <a:t>Recommend solutions to each of those issues and:</a:t>
+            </a:r>
+            <a:endParaRPr lang="en-AU" sz="2800" dirty="0">
+              <a:solidFill>
+                <a:srgbClr val="EEEEEE"/>
+              </a:solidFill>
+              <a:latin typeface="Open Sans" panose="020B0606030504020204" pitchFamily="34" charset="0"/>
+              <a:ea typeface="Open Sans" panose="020B0606030504020204" pitchFamily="34" charset="0"/>
+              <a:cs typeface="Open Sans" panose="020B0606030504020204" pitchFamily="34" charset="0"/>
+            </a:endParaRPr>
+          </a:p>
+        </p:txBody>
+      </p:sp>
+      <p:sp>
+        <p:nvSpPr>
+          <p:cNvPr id="5" name="Title 3"/>
+          <p:cNvSpPr txBox="1">
+            <a:spLocks/>
+          </p:cNvSpPr>
+          <p:nvPr/>
+        </p:nvSpPr>
+        <p:spPr>
+          <a:xfrm>
+            <a:off x="1524000" y="3429001"/>
+            <a:ext cx="9144000" cy="3429000"/>
+          </a:xfrm>
+          <a:prstGeom prst="rect">
+            <a:avLst/>
+          </a:prstGeom>
+        </p:spPr>
+        <p:txBody>
+          <a:bodyPr vert="horz" lIns="91440" tIns="45720" rIns="91440" bIns="45720" rtlCol="0" anchor="t">
+            <a:normAutofit/>
+          </a:bodyPr>
+          <a:lstStyle>
+            <a:lvl1pPr algn="ctr" defTabSz="914400" rtl="0" eaLnBrk="1" latinLnBrk="0" hangingPunct="1">
+              <a:lnSpc>
+                <a:spcPct val="90000"/>
+              </a:lnSpc>
+              <a:spcBef>
+                <a:spcPct val="0"/>
+              </a:spcBef>
+              <a:buNone/>
+              <a:defRPr sz="6000" kern="1200">
+                <a:solidFill>
+                  <a:schemeClr val="tx1"/>
+                </a:solidFill>
+                <a:latin typeface="+mj-lt"/>
+                <a:ea typeface="+mj-ea"/>
+                <a:cs typeface="+mj-cs"/>
+              </a:defRPr>
+            </a:lvl1pPr>
+          </a:lstStyle>
+          <a:p>
+            <a:pPr marL="457200" indent="-457200" algn="l">
+              <a:lnSpc>
+                <a:spcPct val="100000"/>
+              </a:lnSpc>
+              <a:buFont typeface="Arial" panose="020B0604020202020204" pitchFamily="34" charset="0"/>
+              <a:buChar char="•"/>
+            </a:pPr>
+            <a:r>
+              <a:rPr lang="en-AU" sz="2800" dirty="0" smtClean="0">
+                <a:solidFill>
+                  <a:srgbClr val="EEEEEE"/>
+                </a:solidFill>
+                <a:latin typeface="Open Sans" panose="020B0606030504020204" pitchFamily="34" charset="0"/>
+                <a:ea typeface="Open Sans" panose="020B0606030504020204" pitchFamily="34" charset="0"/>
+                <a:cs typeface="Open Sans" panose="020B0606030504020204" pitchFamily="34" charset="0"/>
+              </a:rPr>
+              <a:t>Outline advantages/disadvantages where possible</a:t>
+            </a:r>
+          </a:p>
+          <a:p>
+            <a:pPr marL="457200" indent="-457200" algn="l">
+              <a:lnSpc>
+                <a:spcPct val="100000"/>
+              </a:lnSpc>
+              <a:buFont typeface="Arial" panose="020B0604020202020204" pitchFamily="34" charset="0"/>
+              <a:buChar char="•"/>
+            </a:pPr>
+            <a:r>
+              <a:rPr lang="en-AU" sz="2800" dirty="0" smtClean="0">
+                <a:solidFill>
+                  <a:srgbClr val="EEEEEE"/>
+                </a:solidFill>
+                <a:latin typeface="Open Sans" panose="020B0606030504020204" pitchFamily="34" charset="0"/>
+                <a:ea typeface="Open Sans" panose="020B0606030504020204" pitchFamily="34" charset="0"/>
+                <a:cs typeface="Open Sans" panose="020B0606030504020204" pitchFamily="34" charset="0"/>
+              </a:rPr>
+              <a:t>Introduce alternatives where possible</a:t>
+            </a:r>
+          </a:p>
+          <a:p>
+            <a:pPr marL="457200" indent="-457200" algn="l">
+              <a:lnSpc>
+                <a:spcPct val="100000"/>
+              </a:lnSpc>
+              <a:buFont typeface="Arial" panose="020B0604020202020204" pitchFamily="34" charset="0"/>
+              <a:buChar char="•"/>
+            </a:pPr>
+            <a:r>
+              <a:rPr lang="en-AU" sz="2800" dirty="0" smtClean="0">
+                <a:solidFill>
+                  <a:srgbClr val="EEEEEE"/>
+                </a:solidFill>
+                <a:latin typeface="Open Sans" panose="020B0606030504020204" pitchFamily="34" charset="0"/>
+                <a:ea typeface="Open Sans" panose="020B0606030504020204" pitchFamily="34" charset="0"/>
+                <a:cs typeface="Open Sans" panose="020B0606030504020204" pitchFamily="34" charset="0"/>
+              </a:rPr>
+              <a:t>Briefly discuss process where possible</a:t>
+            </a:r>
+          </a:p>
+          <a:p>
+            <a:pPr marL="457200" indent="-457200" algn="l">
+              <a:lnSpc>
+                <a:spcPct val="100000"/>
+              </a:lnSpc>
+              <a:buFont typeface="Arial" panose="020B0604020202020204" pitchFamily="34" charset="0"/>
+              <a:buChar char="•"/>
+            </a:pPr>
+            <a:endParaRPr lang="en-AU" sz="2800" dirty="0">
+              <a:solidFill>
+                <a:srgbClr val="EEEEEE"/>
+              </a:solidFill>
+              <a:latin typeface="Open Sans" panose="020B0606030504020204" pitchFamily="34" charset="0"/>
+              <a:ea typeface="Open Sans" panose="020B0606030504020204" pitchFamily="34" charset="0"/>
+              <a:cs typeface="Open Sans" panose="020B0606030504020204" pitchFamily="34" charset="0"/>
+            </a:endParaRPr>
+          </a:p>
+          <a:p>
+            <a:pPr>
+              <a:lnSpc>
+                <a:spcPct val="100000"/>
+              </a:lnSpc>
+            </a:pPr>
+            <a:r>
+              <a:rPr lang="en-AU" sz="4400" b="1" dirty="0" smtClean="0">
+                <a:solidFill>
+                  <a:srgbClr val="EEEEEE"/>
+                </a:solidFill>
+                <a:latin typeface="Open Sans" panose="020B0606030504020204" pitchFamily="34" charset="0"/>
+                <a:ea typeface="Open Sans" panose="020B0606030504020204" pitchFamily="34" charset="0"/>
+                <a:cs typeface="Open Sans" panose="020B0606030504020204" pitchFamily="34" charset="0"/>
+              </a:rPr>
+              <a:t>Starting with…</a:t>
+            </a:r>
+            <a:endParaRPr lang="en-AU" sz="4400" b="1" dirty="0">
+              <a:solidFill>
+                <a:srgbClr val="EEEEEE"/>
+              </a:solidFill>
+              <a:latin typeface="Open Sans" panose="020B0606030504020204" pitchFamily="34" charset="0"/>
+              <a:ea typeface="Open Sans" panose="020B0606030504020204" pitchFamily="34" charset="0"/>
+              <a:cs typeface="Open Sans" panose="020B0606030504020204" pitchFamily="34" charset="0"/>
+            </a:endParaRPr>
+          </a:p>
+        </p:txBody>
+      </p:sp>
+    </p:spTree>
+    <p:extLst>
+      <p:ext uri="{BB962C8B-B14F-4D97-AF65-F5344CB8AC3E}">
+        <p14:creationId xmlns:p14="http://schemas.microsoft.com/office/powerpoint/2010/main" val="1636340109"/>
+      </p:ext>
+    </p:extLst>
+  </p:cSld>
+  <p:clrMapOvr>
+    <a:masterClrMapping/>
+  </p:clrMapOvr>
+  <p:transition spd="slow">
+    <p:push/>
+  </p:transition>
+  <p:timing>
+    <p:tnLst>
+      <p:par>
+        <p:cTn id="1" dur="indefinite" restart="never" nodeType="tmRoot"/>
+      </p:par>
+    </p:tnLst>
+  </p:timing>
+</p:sld>
+</file>
+
+<file path=ppt/slides/slide50.xml><?xml version="1.0" encoding="utf-8"?>
 <p:sld xmlns:a="http://schemas.openxmlformats.org/drawingml/2006/main" xmlns:r="http://schemas.openxmlformats.org/officeDocument/2006/relationships" xmlns:p="http://schemas.openxmlformats.org/presentationml/2006/main">
   <p:cSld>
     <p:bg>
@@ -15582,7 +16260,7 @@
 </p:sld>
 </file>
 
-<file path=ppt/slides/slide5.xml><?xml version="1.0" encoding="utf-8"?>
+<file path=ppt/slides/slide51.xml><?xml version="1.0" encoding="utf-8"?>
 <p:sld xmlns:a="http://schemas.openxmlformats.org/drawingml/2006/main" xmlns:r="http://schemas.openxmlformats.org/officeDocument/2006/relationships" xmlns:p="http://schemas.openxmlformats.org/presentationml/2006/main">
   <p:cSld>
     <p:bg>
@@ -15619,7 +16297,7 @@
         </p:nvSpPr>
         <p:spPr>
           <a:xfrm>
-            <a:off x="1524000" y="1"/>
+            <a:off x="1524000" y="-1730099"/>
             <a:ext cx="9144000" cy="2917370"/>
           </a:xfrm>
         </p:spPr>
@@ -15639,9 +16317,9 @@
                 <a:ea typeface="Open Sans" panose="020B0606030504020204" pitchFamily="34" charset="0"/>
                 <a:cs typeface="Open Sans" panose="020B0606030504020204" pitchFamily="34" charset="0"/>
               </a:rPr>
-              <a:t>This presentation will…</a:t>
-            </a:r>
-            <a:br>
+              <a:t>Effective p</a:t>
+            </a:r>
+            <a:r>
               <a:rPr lang="en-AU" sz="4400" b="1" dirty="0" smtClean="0">
                 <a:solidFill>
                   <a:srgbClr val="EEEEEE"/>
@@ -15650,40 +16328,9 @@
                 <a:ea typeface="Open Sans" panose="020B0606030504020204" pitchFamily="34" charset="0"/>
                 <a:cs typeface="Open Sans" panose="020B0606030504020204" pitchFamily="34" charset="0"/>
               </a:rPr>
-            </a:br>
-            <a:r>
-              <a:rPr lang="en-AU" sz="4400" b="1" dirty="0">
-                <a:solidFill>
-                  <a:srgbClr val="EEEEEE"/>
-                </a:solidFill>
-                <a:latin typeface="Open Sans" panose="020B0606030504020204" pitchFamily="34" charset="0"/>
-                <a:ea typeface="Open Sans" panose="020B0606030504020204" pitchFamily="34" charset="0"/>
-                <a:cs typeface="Open Sans" panose="020B0606030504020204" pitchFamily="34" charset="0"/>
-              </a:rPr>
-              <a:t/>
-            </a:r>
-            <a:br>
-              <a:rPr lang="en-AU" sz="4400" b="1" dirty="0">
-                <a:solidFill>
-                  <a:srgbClr val="EEEEEE"/>
-                </a:solidFill>
-                <a:latin typeface="Open Sans" panose="020B0606030504020204" pitchFamily="34" charset="0"/>
-                <a:ea typeface="Open Sans" panose="020B0606030504020204" pitchFamily="34" charset="0"/>
-                <a:cs typeface="Open Sans" panose="020B0606030504020204" pitchFamily="34" charset="0"/>
-              </a:rPr>
-            </a:br>
-            <a:r>
-              <a:rPr lang="en-AU" sz="2800" dirty="0" smtClean="0">
-                <a:solidFill>
-                  <a:srgbClr val="EEEEEE"/>
-                </a:solidFill>
-                <a:latin typeface="Open Sans" panose="020B0606030504020204" pitchFamily="34" charset="0"/>
-                <a:ea typeface="Open Sans" panose="020B0606030504020204" pitchFamily="34" charset="0"/>
-                <a:cs typeface="Open Sans" panose="020B0606030504020204" pitchFamily="34" charset="0"/>
-              </a:rPr>
-              <a:t>Recommend solutions to each of those issues and:</a:t>
-            </a:r>
-            <a:endParaRPr lang="en-AU" sz="2800" dirty="0">
+              <a:t>assword policy</a:t>
+            </a:r>
+            <a:endParaRPr lang="en-AU" sz="3200" dirty="0">
               <a:solidFill>
                 <a:srgbClr val="EEEEEE"/>
               </a:solidFill>
@@ -15696,7 +16343,7 @@
       </p:sp>
       <p:sp>
         <p:nvSpPr>
-          <p:cNvPr id="5" name="Title 3"/>
+          <p:cNvPr id="6" name="Title 3"/>
           <p:cNvSpPr txBox="1">
             <a:spLocks/>
           </p:cNvSpPr>
@@ -15704,8 +16351,8 @@
         </p:nvSpPr>
         <p:spPr>
           <a:xfrm>
-            <a:off x="1524000" y="3429001"/>
-            <a:ext cx="9144000" cy="3429000"/>
+            <a:off x="1524001" y="1187271"/>
+            <a:ext cx="9144000" cy="511630"/>
           </a:xfrm>
           <a:prstGeom prst="rect">
             <a:avLst/>
@@ -15713,7 +16360,7 @@
         </p:spPr>
         <p:txBody>
           <a:bodyPr vert="horz" lIns="91440" tIns="45720" rIns="91440" bIns="45720" rtlCol="0" anchor="t">
-            <a:normAutofit/>
+            <a:normAutofit lnSpcReduction="10000"/>
           </a:bodyPr>
           <a:lstStyle>
             <a:lvl1pPr algn="ctr" defTabSz="914400" rtl="0" eaLnBrk="1" latinLnBrk="0" hangingPunct="1">
@@ -15735,74 +16382,166 @@
             </a:lvl1pPr>
           </a:lstStyle>
           <a:p>
-            <a:pPr marL="457200" indent="-457200" algn="l">
+            <a:pPr algn="l">
               <a:lnSpc>
                 <a:spcPct val="100000"/>
               </a:lnSpc>
+            </a:pPr>
+            <a:r>
+              <a:rPr lang="en-AU" sz="2800" dirty="0" smtClean="0">
+                <a:solidFill>
+                  <a:srgbClr val="111111"/>
+                </a:solidFill>
+                <a:latin typeface="Open Sans" panose="020B0606030504020204" pitchFamily="34" charset="0"/>
+                <a:ea typeface="Open Sans" panose="020B0606030504020204" pitchFamily="34" charset="0"/>
+                <a:cs typeface="Open Sans" panose="020B0606030504020204" pitchFamily="34" charset="0"/>
+              </a:rPr>
+              <a:t>separator</a:t>
+            </a:r>
+          </a:p>
+        </p:txBody>
+      </p:sp>
+      <p:sp>
+        <p:nvSpPr>
+          <p:cNvPr id="2" name="TextBox 1"/>
+          <p:cNvSpPr txBox="1"/>
+          <p:nvPr/>
+        </p:nvSpPr>
+        <p:spPr>
+          <a:xfrm>
+            <a:off x="1524000" y="1698900"/>
+            <a:ext cx="9144000" cy="4493538"/>
+          </a:xfrm>
+          <a:prstGeom prst="rect">
+            <a:avLst/>
+          </a:prstGeom>
+          <a:noFill/>
+        </p:spPr>
+        <p:txBody>
+          <a:bodyPr wrap="square" rtlCol="0">
+            <a:spAutoFit/>
+          </a:bodyPr>
+          <a:lstStyle/>
+          <a:p>
+            <a:pPr marL="285750" indent="-285750">
               <a:buFont typeface="Arial" panose="020B0604020202020204" pitchFamily="34" charset="0"/>
               <a:buChar char="•"/>
             </a:pPr>
             <a:r>
-              <a:rPr lang="en-AU" sz="2800" dirty="0" smtClean="0">
-                <a:solidFill>
-                  <a:srgbClr val="EEEEEE"/>
-                </a:solidFill>
-                <a:latin typeface="Open Sans" panose="020B0606030504020204" pitchFamily="34" charset="0"/>
-                <a:ea typeface="Open Sans" panose="020B0606030504020204" pitchFamily="34" charset="0"/>
-                <a:cs typeface="Open Sans" panose="020B0606030504020204" pitchFamily="34" charset="0"/>
-              </a:rPr>
-              <a:t>Outline advantages/disadvantages where possible</a:t>
-            </a:r>
-          </a:p>
-          <a:p>
-            <a:pPr marL="457200" indent="-457200" algn="l">
-              <a:lnSpc>
-                <a:spcPct val="100000"/>
-              </a:lnSpc>
+              <a:rPr lang="en-AU" sz="2600" dirty="0" smtClean="0">
+                <a:solidFill>
+                  <a:srgbClr val="EEEEEE"/>
+                </a:solidFill>
+                <a:latin typeface="Open Sans" panose="020B0606030504020204" pitchFamily="34" charset="0"/>
+                <a:ea typeface="Open Sans" panose="020B0606030504020204" pitchFamily="34" charset="0"/>
+                <a:cs typeface="Open Sans" panose="020B0606030504020204" pitchFamily="34" charset="0"/>
+                <a:hlinkClick r:id="rId2"/>
+              </a:rPr>
+              <a:t>Goodin (2014)</a:t>
+            </a:r>
+            <a:r>
+              <a:rPr lang="en-AU" sz="2600" dirty="0" smtClean="0">
+                <a:solidFill>
+                  <a:srgbClr val="EEEEEE"/>
+                </a:solidFill>
+                <a:latin typeface="Open Sans" panose="020B0606030504020204" pitchFamily="34" charset="0"/>
+                <a:ea typeface="Open Sans" panose="020B0606030504020204" pitchFamily="34" charset="0"/>
+                <a:cs typeface="Open Sans" panose="020B0606030504020204" pitchFamily="34" charset="0"/>
+              </a:rPr>
+              <a:t> reports that Stanford University’s IT department has implemented an effective password policy</a:t>
+            </a:r>
+          </a:p>
+          <a:p>
+            <a:pPr marL="285750" indent="-285750">
               <a:buFont typeface="Arial" panose="020B0604020202020204" pitchFamily="34" charset="0"/>
               <a:buChar char="•"/>
             </a:pPr>
             <a:r>
-              <a:rPr lang="en-AU" sz="2800" dirty="0" smtClean="0">
-                <a:solidFill>
-                  <a:srgbClr val="EEEEEE"/>
-                </a:solidFill>
-                <a:latin typeface="Open Sans" panose="020B0606030504020204" pitchFamily="34" charset="0"/>
-                <a:ea typeface="Open Sans" panose="020B0606030504020204" pitchFamily="34" charset="0"/>
-                <a:cs typeface="Open Sans" panose="020B0606030504020204" pitchFamily="34" charset="0"/>
-              </a:rPr>
-              <a:t>Introduce alternatives where possible</a:t>
-            </a:r>
-          </a:p>
-          <a:p>
-            <a:pPr marL="457200" indent="-457200" algn="l">
-              <a:lnSpc>
-                <a:spcPct val="100000"/>
-              </a:lnSpc>
+              <a:rPr lang="en-AU" sz="2600" dirty="0" smtClean="0">
+                <a:solidFill>
+                  <a:srgbClr val="EEEEEE"/>
+                </a:solidFill>
+                <a:latin typeface="Open Sans" panose="020B0606030504020204" pitchFamily="34" charset="0"/>
+                <a:ea typeface="Open Sans" panose="020B0606030504020204" pitchFamily="34" charset="0"/>
+                <a:cs typeface="Open Sans" panose="020B0606030504020204" pitchFamily="34" charset="0"/>
+              </a:rPr>
+              <a:t>As the length of characters in a password increase, the requirements for specific characters decrease</a:t>
+            </a:r>
+          </a:p>
+          <a:p>
+            <a:pPr marL="742950" lvl="1" indent="-285750">
               <a:buFont typeface="Arial" panose="020B0604020202020204" pitchFamily="34" charset="0"/>
               <a:buChar char="•"/>
             </a:pPr>
             <a:r>
-              <a:rPr lang="en-AU" sz="2800" dirty="0" smtClean="0">
-                <a:solidFill>
-                  <a:srgbClr val="EEEEEE"/>
-                </a:solidFill>
-                <a:latin typeface="Open Sans" panose="020B0606030504020204" pitchFamily="34" charset="0"/>
-                <a:ea typeface="Open Sans" panose="020B0606030504020204" pitchFamily="34" charset="0"/>
-                <a:cs typeface="Open Sans" panose="020B0606030504020204" pitchFamily="34" charset="0"/>
-              </a:rPr>
-              <a:t>Briefly discuss process where possible</a:t>
-            </a:r>
-          </a:p>
-          <a:p>
-            <a:pPr marL="457200" indent="-457200" algn="l">
-              <a:lnSpc>
-                <a:spcPct val="100000"/>
-              </a:lnSpc>
+              <a:rPr lang="en-AU" sz="2600" dirty="0" smtClean="0">
+                <a:solidFill>
+                  <a:srgbClr val="EEEEEE"/>
+                </a:solidFill>
+                <a:latin typeface="Open Sans" panose="020B0606030504020204" pitchFamily="34" charset="0"/>
+                <a:ea typeface="Open Sans" panose="020B0606030504020204" pitchFamily="34" charset="0"/>
+                <a:cs typeface="Open Sans" panose="020B0606030504020204" pitchFamily="34" charset="0"/>
+              </a:rPr>
+              <a:t>Promotes longer but more memorable passphrases rather than short complicated passwords</a:t>
+            </a:r>
+          </a:p>
+          <a:p>
+            <a:pPr marL="285750" indent="-285750">
               <a:buFont typeface="Arial" panose="020B0604020202020204" pitchFamily="34" charset="0"/>
               <a:buChar char="•"/>
             </a:pPr>
-            <a:endParaRPr lang="en-AU" sz="2800" dirty="0">
+            <a:r>
+              <a:rPr lang="en-AU" sz="2600" dirty="0" smtClean="0">
+                <a:solidFill>
+                  <a:srgbClr val="EEEEEE"/>
+                </a:solidFill>
+                <a:latin typeface="Open Sans" panose="020B0606030504020204" pitchFamily="34" charset="0"/>
+                <a:ea typeface="Open Sans" panose="020B0606030504020204" pitchFamily="34" charset="0"/>
+                <a:cs typeface="Open Sans" panose="020B0606030504020204" pitchFamily="34" charset="0"/>
+              </a:rPr>
+              <a:t>Follow </a:t>
+            </a:r>
+            <a:r>
+              <a:rPr lang="en-AU" sz="2600" dirty="0" smtClean="0">
+                <a:solidFill>
+                  <a:srgbClr val="EEEEEE"/>
+                </a:solidFill>
+                <a:latin typeface="Open Sans" panose="020B0606030504020204" pitchFamily="34" charset="0"/>
+                <a:ea typeface="Open Sans" panose="020B0606030504020204" pitchFamily="34" charset="0"/>
+                <a:cs typeface="Open Sans" panose="020B0606030504020204" pitchFamily="34" charset="0"/>
+                <a:hlinkClick r:id="rId3"/>
+              </a:rPr>
+              <a:t>this link</a:t>
+            </a:r>
+            <a:r>
+              <a:rPr lang="en-AU" sz="2600" dirty="0" smtClean="0">
+                <a:solidFill>
+                  <a:srgbClr val="EEEEEE"/>
+                </a:solidFill>
+                <a:latin typeface="Open Sans" panose="020B0606030504020204" pitchFamily="34" charset="0"/>
+                <a:ea typeface="Open Sans" panose="020B0606030504020204" pitchFamily="34" charset="0"/>
+                <a:cs typeface="Open Sans" panose="020B0606030504020204" pitchFamily="34" charset="0"/>
+              </a:rPr>
+              <a:t> for Stanford University’s quick guide which visually explains their password policy</a:t>
+            </a:r>
+          </a:p>
+          <a:p>
+            <a:pPr marL="285750" indent="-285750">
+              <a:buFont typeface="Arial" panose="020B0604020202020204" pitchFamily="34" charset="0"/>
+              <a:buChar char="•"/>
+            </a:pPr>
+            <a:r>
+              <a:rPr lang="en-AU" sz="2600" dirty="0" smtClean="0">
+                <a:solidFill>
+                  <a:srgbClr val="EEEEEE"/>
+                </a:solidFill>
+                <a:latin typeface="Open Sans" panose="020B0606030504020204" pitchFamily="34" charset="0"/>
+                <a:ea typeface="Open Sans" panose="020B0606030504020204" pitchFamily="34" charset="0"/>
+                <a:cs typeface="Open Sans" panose="020B0606030504020204" pitchFamily="34" charset="0"/>
+              </a:rPr>
+              <a:t>Blue Ink can adapt this password policy for their own requirements</a:t>
+            </a:r>
+            <a:endParaRPr lang="en-AU" sz="2600" dirty="0" smtClean="0">
               <a:solidFill>
                 <a:srgbClr val="EEEEEE"/>
               </a:solidFill>
@@ -15811,38 +16550,12 @@
               <a:cs typeface="Open Sans" panose="020B0606030504020204" pitchFamily="34" charset="0"/>
             </a:endParaRPr>
           </a:p>
-          <a:p>
-            <a:pPr>
-              <a:lnSpc>
-                <a:spcPct val="100000"/>
-              </a:lnSpc>
-            </a:pPr>
-            <a:r>
-              <a:rPr lang="en-AU" sz="4400" b="1" dirty="0" smtClean="0">
-                <a:solidFill>
-                  <a:srgbClr val="EEEEEE"/>
-                </a:solidFill>
-                <a:latin typeface="Open Sans" panose="020B0606030504020204" pitchFamily="34" charset="0"/>
-                <a:ea typeface="Open Sans" panose="020B0606030504020204" pitchFamily="34" charset="0"/>
-                <a:cs typeface="Open Sans" panose="020B0606030504020204" pitchFamily="34" charset="0"/>
-              </a:rPr>
-              <a:t>Starting with…</a:t>
-            </a:r>
-            <a:endParaRPr lang="en-AU" sz="4400" b="1" dirty="0">
-              <a:solidFill>
-                <a:srgbClr val="EEEEEE"/>
-              </a:solidFill>
-              <a:latin typeface="Open Sans" panose="020B0606030504020204" pitchFamily="34" charset="0"/>
-              <a:ea typeface="Open Sans" panose="020B0606030504020204" pitchFamily="34" charset="0"/>
-              <a:cs typeface="Open Sans" panose="020B0606030504020204" pitchFamily="34" charset="0"/>
-            </a:endParaRPr>
-          </a:p>
         </p:txBody>
       </p:sp>
     </p:spTree>
     <p:extLst>
       <p:ext uri="{BB962C8B-B14F-4D97-AF65-F5344CB8AC3E}">
-        <p14:creationId xmlns:p14="http://schemas.microsoft.com/office/powerpoint/2010/main" val="1636340109"/>
+        <p14:creationId xmlns:p14="http://schemas.microsoft.com/office/powerpoint/2010/main" val="3487301805"/>
       </p:ext>
     </p:extLst>
   </p:cSld>
@@ -15862,7 +16575,7 @@
 </p:sld>
 </file>
 
-<file path=ppt/slides/slide50.xml><?xml version="1.0" encoding="utf-8"?>
+<file path=ppt/slides/slide52.xml><?xml version="1.0" encoding="utf-8"?>
 <p:sld xmlns:a="http://schemas.openxmlformats.org/drawingml/2006/main" xmlns:r="http://schemas.openxmlformats.org/officeDocument/2006/relationships" xmlns:p="http://schemas.openxmlformats.org/presentationml/2006/main">
   <p:cSld>
     <p:bg>
@@ -15899,8 +16612,8 @@
         </p:nvSpPr>
         <p:spPr>
           <a:xfrm>
-            <a:off x="1524000" y="1"/>
-            <a:ext cx="9144000" cy="970843"/>
+            <a:off x="1524000" y="-1470455"/>
+            <a:ext cx="9144000" cy="2917370"/>
           </a:xfrm>
         </p:spPr>
         <p:txBody>
@@ -15919,9 +16632,9 @@
                 <a:ea typeface="Open Sans" panose="020B0606030504020204" pitchFamily="34" charset="0"/>
                 <a:cs typeface="Open Sans" panose="020B0606030504020204" pitchFamily="34" charset="0"/>
               </a:rPr>
-              <a:t>References</a:t>
-            </a:r>
-            <a:endParaRPr lang="en-AU" sz="2800" dirty="0">
+              <a:t>Storing passwords</a:t>
+            </a:r>
+            <a:endParaRPr lang="en-AU" sz="3200" dirty="0">
               <a:solidFill>
                 <a:srgbClr val="EEEEEE"/>
               </a:solidFill>
@@ -15934,7 +16647,7 @@
       </p:sp>
       <p:sp>
         <p:nvSpPr>
-          <p:cNvPr id="5" name="Title 3"/>
+          <p:cNvPr id="6" name="Title 3"/>
           <p:cNvSpPr txBox="1">
             <a:spLocks/>
           </p:cNvSpPr>
@@ -15942,8 +16655,8 @@
         </p:nvSpPr>
         <p:spPr>
           <a:xfrm>
-            <a:off x="338667" y="970844"/>
-            <a:ext cx="11514666" cy="5339645"/>
+            <a:off x="1524001" y="1446915"/>
+            <a:ext cx="9144000" cy="511630"/>
           </a:xfrm>
           <a:prstGeom prst="rect">
             <a:avLst/>
@@ -15951,7 +16664,7 @@
         </p:spPr>
         <p:txBody>
           <a:bodyPr vert="horz" lIns="91440" tIns="45720" rIns="91440" bIns="45720" rtlCol="0" anchor="t">
-            <a:normAutofit/>
+            <a:normAutofit lnSpcReduction="10000"/>
           </a:bodyPr>
           <a:lstStyle>
             <a:lvl1pPr algn="ctr" defTabSz="914400" rtl="0" eaLnBrk="1" latinLnBrk="0" hangingPunct="1">
@@ -15973,31 +16686,2103 @@
             </a:lvl1pPr>
           </a:lstStyle>
           <a:p>
-            <a:pPr marL="457200" indent="-457200" algn="l">
+            <a:pPr algn="l">
               <a:lnSpc>
                 <a:spcPct val="100000"/>
               </a:lnSpc>
+            </a:pPr>
+            <a:r>
+              <a:rPr lang="en-AU" sz="2800" dirty="0" smtClean="0">
+                <a:solidFill>
+                  <a:srgbClr val="111111"/>
+                </a:solidFill>
+                <a:latin typeface="Open Sans" panose="020B0606030504020204" pitchFamily="34" charset="0"/>
+                <a:ea typeface="Open Sans" panose="020B0606030504020204" pitchFamily="34" charset="0"/>
+                <a:cs typeface="Open Sans" panose="020B0606030504020204" pitchFamily="34" charset="0"/>
+              </a:rPr>
+              <a:t>separator</a:t>
+            </a:r>
+          </a:p>
+        </p:txBody>
+      </p:sp>
+      <p:sp>
+        <p:nvSpPr>
+          <p:cNvPr id="2" name="TextBox 1"/>
+          <p:cNvSpPr txBox="1"/>
+          <p:nvPr/>
+        </p:nvSpPr>
+        <p:spPr>
+          <a:xfrm>
+            <a:off x="1524000" y="1958544"/>
+            <a:ext cx="9144000" cy="892552"/>
+          </a:xfrm>
+          <a:prstGeom prst="rect">
+            <a:avLst/>
+          </a:prstGeom>
+          <a:noFill/>
+        </p:spPr>
+        <p:txBody>
+          <a:bodyPr wrap="square" rtlCol="0">
+            <a:spAutoFit/>
+          </a:bodyPr>
+          <a:lstStyle/>
+          <a:p>
+            <a:pPr marL="285750" indent="-285750">
               <a:buFont typeface="Arial" panose="020B0604020202020204" pitchFamily="34" charset="0"/>
               <a:buChar char="•"/>
             </a:pPr>
             <a:r>
-              <a:rPr lang="en-AU" sz="2000" dirty="0">
-                <a:solidFill>
-                  <a:srgbClr val="EEEEEE"/>
-                </a:solidFill>
-                <a:latin typeface="Open Sans" panose="020B0606030504020204" pitchFamily="34" charset="0"/>
-                <a:ea typeface="Open Sans" panose="020B0606030504020204" pitchFamily="34" charset="0"/>
-                <a:cs typeface="Open Sans" panose="020B0606030504020204" pitchFamily="34" charset="0"/>
-              </a:rPr>
-              <a:t>Microsoft. (2015). Microsoft Support Lifecycle. Microsoft. Retrieved February 27, 2015, from http://support.microsoft.com/lifecycle/search/default.aspx?alpha=Vista</a:t>
-            </a:r>
-          </a:p>
-        </p:txBody>
-      </p:sp>
+              <a:rPr lang="en-AU" sz="2600" dirty="0" smtClean="0">
+                <a:solidFill>
+                  <a:srgbClr val="EEEEEE"/>
+                </a:solidFill>
+                <a:latin typeface="Open Sans" panose="020B0606030504020204" pitchFamily="34" charset="0"/>
+                <a:ea typeface="Open Sans" panose="020B0606030504020204" pitchFamily="34" charset="0"/>
+                <a:cs typeface="Open Sans" panose="020B0606030504020204" pitchFamily="34" charset="0"/>
+              </a:rPr>
+              <a:t>Never store passwords in plaintext!</a:t>
+            </a:r>
+          </a:p>
+          <a:p>
+            <a:pPr marL="742950" lvl="1" indent="-285750">
+              <a:buFont typeface="Arial" panose="020B0604020202020204" pitchFamily="34" charset="0"/>
+              <a:buChar char="•"/>
+            </a:pPr>
+            <a:r>
+              <a:rPr lang="en-AU" sz="2600" dirty="0" smtClean="0">
+                <a:solidFill>
+                  <a:srgbClr val="EEEEEE"/>
+                </a:solidFill>
+                <a:latin typeface="Open Sans" panose="020B0606030504020204" pitchFamily="34" charset="0"/>
+                <a:ea typeface="Open Sans" panose="020B0606030504020204" pitchFamily="34" charset="0"/>
+                <a:cs typeface="Open Sans" panose="020B0606030504020204" pitchFamily="34" charset="0"/>
+              </a:rPr>
+              <a:t>Like user “green” did in “My Documents” folder</a:t>
+            </a:r>
+            <a:endParaRPr lang="en-AU" sz="2600" dirty="0" smtClean="0">
+              <a:solidFill>
+                <a:srgbClr val="EEEEEE"/>
+              </a:solidFill>
+              <a:latin typeface="Open Sans" panose="020B0606030504020204" pitchFamily="34" charset="0"/>
+              <a:ea typeface="Open Sans" panose="020B0606030504020204" pitchFamily="34" charset="0"/>
+              <a:cs typeface="Open Sans" panose="020B0606030504020204" pitchFamily="34" charset="0"/>
+            </a:endParaRPr>
+          </a:p>
+        </p:txBody>
+      </p:sp>
+      <p:pic>
+        <p:nvPicPr>
+          <p:cNvPr id="3" name="Picture 2"/>
+          <p:cNvPicPr>
+            <a:picLocks noChangeAspect="1"/>
+          </p:cNvPicPr>
+          <p:nvPr/>
+        </p:nvPicPr>
+        <p:blipFill>
+          <a:blip r:embed="rId2">
+            <a:extLst>
+              <a:ext uri="{28A0092B-C50C-407E-A947-70E740481C1C}">
+                <a14:useLocalDpi xmlns:a14="http://schemas.microsoft.com/office/drawing/2010/main" val="0"/>
+              </a:ext>
+            </a:extLst>
+          </a:blip>
+          <a:stretch>
+            <a:fillRect/>
+          </a:stretch>
+        </p:blipFill>
+        <p:spPr>
+          <a:xfrm>
+            <a:off x="3747910" y="3079871"/>
+            <a:ext cx="4696180" cy="3123402"/>
+          </a:xfrm>
+          <a:prstGeom prst="rect">
+            <a:avLst/>
+          </a:prstGeom>
+        </p:spPr>
+      </p:pic>
     </p:spTree>
     <p:extLst>
       <p:ext uri="{BB962C8B-B14F-4D97-AF65-F5344CB8AC3E}">
-        <p14:creationId xmlns:p14="http://schemas.microsoft.com/office/powerpoint/2010/main" val="636747076"/>
+        <p14:creationId xmlns:p14="http://schemas.microsoft.com/office/powerpoint/2010/main" val="1010630425"/>
+      </p:ext>
+    </p:extLst>
+  </p:cSld>
+  <p:clrMapOvr>
+    <a:masterClrMapping/>
+  </p:clrMapOvr>
+  <p:transition spd="slow">
+    <p:push/>
+  </p:transition>
+  <p:timing>
+    <p:tnLst>
+      <p:par>
+        <p:cTn id="1" dur="indefinite" restart="never" nodeType="tmRoot"/>
+      </p:par>
+    </p:tnLst>
+  </p:timing>
+</p:sld>
+</file>
+
+<file path=ppt/slides/slide53.xml><?xml version="1.0" encoding="utf-8"?>
+<p:sld xmlns:a="http://schemas.openxmlformats.org/drawingml/2006/main" xmlns:r="http://schemas.openxmlformats.org/officeDocument/2006/relationships" xmlns:p="http://schemas.openxmlformats.org/presentationml/2006/main">
+  <p:cSld>
+    <p:bg>
+      <p:bgPr>
+        <a:solidFill>
+          <a:srgbClr val="111111"/>
+        </a:solidFill>
+        <a:effectLst/>
+      </p:bgPr>
+    </p:bg>
+    <p:spTree>
+      <p:nvGrpSpPr>
+        <p:cNvPr id="1" name=""/>
+        <p:cNvGrpSpPr/>
+        <p:nvPr/>
+      </p:nvGrpSpPr>
+      <p:grpSpPr>
+        <a:xfrm>
+          <a:off x="0" y="0"/>
+          <a:ext cx="0" cy="0"/>
+          <a:chOff x="0" y="0"/>
+          <a:chExt cx="0" cy="0"/>
+        </a:xfrm>
+      </p:grpSpPr>
+      <p:sp>
+        <p:nvSpPr>
+          <p:cNvPr id="4" name="Title 3"/>
+          <p:cNvSpPr>
+            <a:spLocks noGrp="1"/>
+          </p:cNvSpPr>
+          <p:nvPr>
+            <p:ph type="ctrTitle"/>
+          </p:nvPr>
+        </p:nvSpPr>
+        <p:spPr>
+          <a:xfrm>
+            <a:off x="1524000" y="-1470455"/>
+            <a:ext cx="9144000" cy="2917370"/>
+          </a:xfrm>
+        </p:spPr>
+        <p:txBody>
+          <a:bodyPr anchor="b">
+            <a:normAutofit/>
+          </a:bodyPr>
+          <a:lstStyle/>
+          <a:p>
+            <a:pPr algn="l"/>
+            <a:r>
+              <a:rPr lang="en-AU" sz="4400" b="1" dirty="0" smtClean="0">
+                <a:solidFill>
+                  <a:srgbClr val="EEEEEE"/>
+                </a:solidFill>
+                <a:latin typeface="Open Sans" panose="020B0606030504020204" pitchFamily="34" charset="0"/>
+                <a:ea typeface="Open Sans" panose="020B0606030504020204" pitchFamily="34" charset="0"/>
+                <a:cs typeface="Open Sans" panose="020B0606030504020204" pitchFamily="34" charset="0"/>
+              </a:rPr>
+              <a:t>Writing passwords down</a:t>
+            </a:r>
+            <a:endParaRPr lang="en-AU" sz="3200" dirty="0">
+              <a:solidFill>
+                <a:srgbClr val="EEEEEE"/>
+              </a:solidFill>
+              <a:latin typeface="Open Sans" panose="020B0606030504020204" pitchFamily="34" charset="0"/>
+              <a:ea typeface="Open Sans" panose="020B0606030504020204" pitchFamily="34" charset="0"/>
+              <a:cs typeface="Open Sans" panose="020B0606030504020204" pitchFamily="34" charset="0"/>
+            </a:endParaRPr>
+          </a:p>
+        </p:txBody>
+      </p:sp>
+      <p:sp>
+        <p:nvSpPr>
+          <p:cNvPr id="6" name="Title 3"/>
+          <p:cNvSpPr txBox="1">
+            <a:spLocks/>
+          </p:cNvSpPr>
+          <p:nvPr/>
+        </p:nvSpPr>
+        <p:spPr>
+          <a:xfrm>
+            <a:off x="1524001" y="1446915"/>
+            <a:ext cx="9144000" cy="511630"/>
+          </a:xfrm>
+          <a:prstGeom prst="rect">
+            <a:avLst/>
+          </a:prstGeom>
+        </p:spPr>
+        <p:txBody>
+          <a:bodyPr vert="horz" lIns="91440" tIns="45720" rIns="91440" bIns="45720" rtlCol="0" anchor="t">
+            <a:normAutofit lnSpcReduction="10000"/>
+          </a:bodyPr>
+          <a:lstStyle>
+            <a:lvl1pPr algn="ctr" defTabSz="914400" rtl="0" eaLnBrk="1" latinLnBrk="0" hangingPunct="1">
+              <a:lnSpc>
+                <a:spcPct val="90000"/>
+              </a:lnSpc>
+              <a:spcBef>
+                <a:spcPct val="0"/>
+              </a:spcBef>
+              <a:buNone/>
+              <a:defRPr sz="6000" kern="1200">
+                <a:solidFill>
+                  <a:schemeClr val="tx1"/>
+                </a:solidFill>
+                <a:latin typeface="+mj-lt"/>
+                <a:ea typeface="+mj-ea"/>
+                <a:cs typeface="+mj-cs"/>
+              </a:defRPr>
+            </a:lvl1pPr>
+          </a:lstStyle>
+          <a:p>
+            <a:pPr algn="l">
+              <a:lnSpc>
+                <a:spcPct val="100000"/>
+              </a:lnSpc>
+            </a:pPr>
+            <a:r>
+              <a:rPr lang="en-AU" sz="2800" dirty="0" smtClean="0">
+                <a:solidFill>
+                  <a:srgbClr val="111111"/>
+                </a:solidFill>
+                <a:latin typeface="Open Sans" panose="020B0606030504020204" pitchFamily="34" charset="0"/>
+                <a:ea typeface="Open Sans" panose="020B0606030504020204" pitchFamily="34" charset="0"/>
+                <a:cs typeface="Open Sans" panose="020B0606030504020204" pitchFamily="34" charset="0"/>
+              </a:rPr>
+              <a:t>separator</a:t>
+            </a:r>
+          </a:p>
+        </p:txBody>
+      </p:sp>
+      <p:sp>
+        <p:nvSpPr>
+          <p:cNvPr id="2" name="TextBox 1"/>
+          <p:cNvSpPr txBox="1"/>
+          <p:nvPr/>
+        </p:nvSpPr>
+        <p:spPr>
+          <a:xfrm>
+            <a:off x="1524000" y="1958544"/>
+            <a:ext cx="9144000" cy="3293209"/>
+          </a:xfrm>
+          <a:prstGeom prst="rect">
+            <a:avLst/>
+          </a:prstGeom>
+          <a:noFill/>
+        </p:spPr>
+        <p:txBody>
+          <a:bodyPr wrap="square" rtlCol="0">
+            <a:spAutoFit/>
+          </a:bodyPr>
+          <a:lstStyle/>
+          <a:p>
+            <a:pPr marL="285750" indent="-285750">
+              <a:buFont typeface="Arial" panose="020B0604020202020204" pitchFamily="34" charset="0"/>
+              <a:buChar char="•"/>
+            </a:pPr>
+            <a:r>
+              <a:rPr lang="en-AU" sz="2600" dirty="0">
+                <a:solidFill>
+                  <a:srgbClr val="EEEEEE"/>
+                </a:solidFill>
+                <a:latin typeface="Open Sans" panose="020B0606030504020204" pitchFamily="34" charset="0"/>
+                <a:ea typeface="Open Sans" panose="020B0606030504020204" pitchFamily="34" charset="0"/>
+                <a:cs typeface="Open Sans" panose="020B0606030504020204" pitchFamily="34" charset="0"/>
+              </a:rPr>
+              <a:t>W</a:t>
+            </a:r>
+            <a:r>
+              <a:rPr lang="en-AU" sz="2600" dirty="0" smtClean="0">
+                <a:solidFill>
+                  <a:srgbClr val="EEEEEE"/>
+                </a:solidFill>
+                <a:latin typeface="Open Sans" panose="020B0606030504020204" pitchFamily="34" charset="0"/>
+                <a:ea typeface="Open Sans" panose="020B0606030504020204" pitchFamily="34" charset="0"/>
+                <a:cs typeface="Open Sans" panose="020B0606030504020204" pitchFamily="34" charset="0"/>
+              </a:rPr>
+              <a:t>riting passwords down on paper like a sticky-note also puts your account at risk with attackers</a:t>
+            </a:r>
+          </a:p>
+          <a:p>
+            <a:pPr marL="285750" indent="-285750">
+              <a:buFont typeface="Arial" panose="020B0604020202020204" pitchFamily="34" charset="0"/>
+              <a:buChar char="•"/>
+            </a:pPr>
+            <a:r>
+              <a:rPr lang="en-AU" sz="2600" dirty="0" smtClean="0">
+                <a:solidFill>
+                  <a:srgbClr val="EEEEEE"/>
+                </a:solidFill>
+                <a:latin typeface="Open Sans" panose="020B0606030504020204" pitchFamily="34" charset="0"/>
+                <a:ea typeface="Open Sans" panose="020B0606030504020204" pitchFamily="34" charset="0"/>
+                <a:cs typeface="Open Sans" panose="020B0606030504020204" pitchFamily="34" charset="0"/>
+              </a:rPr>
+              <a:t>As seen in recent disclosure of French TV network social networking passwords via </a:t>
+            </a:r>
+            <a:r>
+              <a:rPr lang="en-AU" sz="2600" dirty="0" err="1" smtClean="0">
+                <a:solidFill>
+                  <a:srgbClr val="EEEEEE"/>
+                </a:solidFill>
+                <a:latin typeface="Open Sans" panose="020B0606030504020204" pitchFamily="34" charset="0"/>
+                <a:ea typeface="Open Sans" panose="020B0606030504020204" pitchFamily="34" charset="0"/>
+                <a:cs typeface="Open Sans" panose="020B0606030504020204" pitchFamily="34" charset="0"/>
+              </a:rPr>
+              <a:t>Youtube</a:t>
+            </a:r>
+            <a:r>
+              <a:rPr lang="en-AU" sz="2600" dirty="0" smtClean="0">
+                <a:solidFill>
+                  <a:srgbClr val="EEEEEE"/>
+                </a:solidFill>
+                <a:latin typeface="Open Sans" panose="020B0606030504020204" pitchFamily="34" charset="0"/>
+                <a:ea typeface="Open Sans" panose="020B0606030504020204" pitchFamily="34" charset="0"/>
+                <a:cs typeface="Open Sans" panose="020B0606030504020204" pitchFamily="34" charset="0"/>
+              </a:rPr>
+              <a:t> </a:t>
+            </a:r>
+            <a:r>
+              <a:rPr lang="en-AU" sz="2600" dirty="0">
+                <a:solidFill>
+                  <a:srgbClr val="EEEEEE"/>
+                </a:solidFill>
+                <a:latin typeface="Open Sans" panose="020B0606030504020204" pitchFamily="34" charset="0"/>
+                <a:ea typeface="Open Sans" panose="020B0606030504020204" pitchFamily="34" charset="0"/>
+                <a:cs typeface="Open Sans" panose="020B0606030504020204" pitchFamily="34" charset="0"/>
+                <a:hlinkClick r:id="rId2"/>
+              </a:rPr>
+              <a:t>(</a:t>
+            </a:r>
+            <a:r>
+              <a:rPr lang="en-AU" sz="2600" dirty="0" err="1" smtClean="0">
+                <a:solidFill>
+                  <a:srgbClr val="EEEEEE"/>
+                </a:solidFill>
+                <a:latin typeface="Open Sans" panose="020B0606030504020204" pitchFamily="34" charset="0"/>
+                <a:ea typeface="Open Sans" panose="020B0606030504020204" pitchFamily="34" charset="0"/>
+                <a:cs typeface="Open Sans" panose="020B0606030504020204" pitchFamily="34" charset="0"/>
+                <a:hlinkClick r:id="rId2"/>
+              </a:rPr>
+              <a:t>Machkovech</a:t>
+            </a:r>
+            <a:r>
+              <a:rPr lang="en-AU" sz="2600" dirty="0" smtClean="0">
+                <a:solidFill>
+                  <a:srgbClr val="EEEEEE"/>
+                </a:solidFill>
+                <a:latin typeface="Open Sans" panose="020B0606030504020204" pitchFamily="34" charset="0"/>
+                <a:ea typeface="Open Sans" panose="020B0606030504020204" pitchFamily="34" charset="0"/>
+                <a:cs typeface="Open Sans" panose="020B0606030504020204" pitchFamily="34" charset="0"/>
+                <a:hlinkClick r:id="rId2"/>
+              </a:rPr>
+              <a:t>, 2015)</a:t>
+            </a:r>
+            <a:endParaRPr lang="en-AU" sz="2600" dirty="0" smtClean="0">
+              <a:solidFill>
+                <a:srgbClr val="EEEEEE"/>
+              </a:solidFill>
+              <a:latin typeface="Open Sans" panose="020B0606030504020204" pitchFamily="34" charset="0"/>
+              <a:ea typeface="Open Sans" panose="020B0606030504020204" pitchFamily="34" charset="0"/>
+              <a:cs typeface="Open Sans" panose="020B0606030504020204" pitchFamily="34" charset="0"/>
+            </a:endParaRPr>
+          </a:p>
+          <a:p>
+            <a:pPr marL="742950" lvl="1" indent="-285750">
+              <a:buFont typeface="Arial" panose="020B0604020202020204" pitchFamily="34" charset="0"/>
+              <a:buChar char="•"/>
+            </a:pPr>
+            <a:r>
+              <a:rPr lang="en-AU" sz="2600" dirty="0" smtClean="0">
+                <a:solidFill>
+                  <a:srgbClr val="EEEEEE"/>
+                </a:solidFill>
+                <a:latin typeface="Open Sans" panose="020B0606030504020204" pitchFamily="34" charset="0"/>
+                <a:ea typeface="Open Sans" panose="020B0606030504020204" pitchFamily="34" charset="0"/>
+                <a:cs typeface="Open Sans" panose="020B0606030504020204" pitchFamily="34" charset="0"/>
+              </a:rPr>
+              <a:t>Passwords on sticky-notes behind TV reporter during an interview</a:t>
+            </a:r>
+          </a:p>
+          <a:p>
+            <a:pPr marL="285750" indent="-285750">
+              <a:buFont typeface="Arial" panose="020B0604020202020204" pitchFamily="34" charset="0"/>
+              <a:buChar char="•"/>
+            </a:pPr>
+            <a:r>
+              <a:rPr lang="en-AU" sz="2600" dirty="0" smtClean="0">
+                <a:solidFill>
+                  <a:srgbClr val="EEEEEE"/>
+                </a:solidFill>
+                <a:latin typeface="Open Sans" panose="020B0606030504020204" pitchFamily="34" charset="0"/>
+                <a:ea typeface="Open Sans" panose="020B0606030504020204" pitchFamily="34" charset="0"/>
+                <a:cs typeface="Open Sans" panose="020B0606030504020204" pitchFamily="34" charset="0"/>
+              </a:rPr>
+              <a:t>Local attacker can easily retrieve your written passwords too</a:t>
+            </a:r>
+            <a:endParaRPr lang="en-AU" sz="2600" dirty="0" smtClean="0">
+              <a:solidFill>
+                <a:srgbClr val="EEEEEE"/>
+              </a:solidFill>
+              <a:latin typeface="Open Sans" panose="020B0606030504020204" pitchFamily="34" charset="0"/>
+              <a:ea typeface="Open Sans" panose="020B0606030504020204" pitchFamily="34" charset="0"/>
+              <a:cs typeface="Open Sans" panose="020B0606030504020204" pitchFamily="34" charset="0"/>
+            </a:endParaRPr>
+          </a:p>
+        </p:txBody>
+      </p:sp>
+    </p:spTree>
+    <p:extLst>
+      <p:ext uri="{BB962C8B-B14F-4D97-AF65-F5344CB8AC3E}">
+        <p14:creationId xmlns:p14="http://schemas.microsoft.com/office/powerpoint/2010/main" val="3120452219"/>
+      </p:ext>
+    </p:extLst>
+  </p:cSld>
+  <p:clrMapOvr>
+    <a:masterClrMapping/>
+  </p:clrMapOvr>
+  <p:transition spd="slow">
+    <p:push/>
+  </p:transition>
+  <p:timing>
+    <p:tnLst>
+      <p:par>
+        <p:cTn id="1" dur="indefinite" restart="never" nodeType="tmRoot"/>
+      </p:par>
+    </p:tnLst>
+  </p:timing>
+</p:sld>
+</file>
+
+<file path=ppt/slides/slide54.xml><?xml version="1.0" encoding="utf-8"?>
+<p:sld xmlns:a="http://schemas.openxmlformats.org/drawingml/2006/main" xmlns:r="http://schemas.openxmlformats.org/officeDocument/2006/relationships" xmlns:p="http://schemas.openxmlformats.org/presentationml/2006/main">
+  <p:cSld>
+    <p:bg>
+      <p:bgPr>
+        <a:solidFill>
+          <a:srgbClr val="111111"/>
+        </a:solidFill>
+        <a:effectLst/>
+      </p:bgPr>
+    </p:bg>
+    <p:spTree>
+      <p:nvGrpSpPr>
+        <p:cNvPr id="1" name=""/>
+        <p:cNvGrpSpPr/>
+        <p:nvPr/>
+      </p:nvGrpSpPr>
+      <p:grpSpPr>
+        <a:xfrm>
+          <a:off x="0" y="0"/>
+          <a:ext cx="0" cy="0"/>
+          <a:chOff x="0" y="0"/>
+          <a:chExt cx="0" cy="0"/>
+        </a:xfrm>
+      </p:grpSpPr>
+      <p:sp>
+        <p:nvSpPr>
+          <p:cNvPr id="4" name="Title 3"/>
+          <p:cNvSpPr>
+            <a:spLocks noGrp="1"/>
+          </p:cNvSpPr>
+          <p:nvPr>
+            <p:ph type="ctrTitle"/>
+          </p:nvPr>
+        </p:nvSpPr>
+        <p:spPr>
+          <a:xfrm>
+            <a:off x="1524000" y="-1944587"/>
+            <a:ext cx="9144000" cy="2917370"/>
+          </a:xfrm>
+        </p:spPr>
+        <p:txBody>
+          <a:bodyPr anchor="b">
+            <a:normAutofit/>
+          </a:bodyPr>
+          <a:lstStyle/>
+          <a:p>
+            <a:pPr algn="l"/>
+            <a:r>
+              <a:rPr lang="en-AU" sz="4400" b="1" dirty="0" smtClean="0">
+                <a:solidFill>
+                  <a:srgbClr val="EEEEEE"/>
+                </a:solidFill>
+                <a:latin typeface="Open Sans" panose="020B0606030504020204" pitchFamily="34" charset="0"/>
+                <a:ea typeface="Open Sans" panose="020B0606030504020204" pitchFamily="34" charset="0"/>
+                <a:cs typeface="Open Sans" panose="020B0606030504020204" pitchFamily="34" charset="0"/>
+              </a:rPr>
+              <a:t>So how can we fix it?</a:t>
+            </a:r>
+            <a:endParaRPr lang="en-AU" sz="3200" dirty="0">
+              <a:solidFill>
+                <a:srgbClr val="EEEEEE"/>
+              </a:solidFill>
+              <a:latin typeface="Open Sans" panose="020B0606030504020204" pitchFamily="34" charset="0"/>
+              <a:ea typeface="Open Sans" panose="020B0606030504020204" pitchFamily="34" charset="0"/>
+              <a:cs typeface="Open Sans" panose="020B0606030504020204" pitchFamily="34" charset="0"/>
+            </a:endParaRPr>
+          </a:p>
+        </p:txBody>
+      </p:sp>
+      <p:sp>
+        <p:nvSpPr>
+          <p:cNvPr id="6" name="Title 3"/>
+          <p:cNvSpPr txBox="1">
+            <a:spLocks/>
+          </p:cNvSpPr>
+          <p:nvPr/>
+        </p:nvSpPr>
+        <p:spPr>
+          <a:xfrm>
+            <a:off x="1524001" y="972783"/>
+            <a:ext cx="9144000" cy="511630"/>
+          </a:xfrm>
+          <a:prstGeom prst="rect">
+            <a:avLst/>
+          </a:prstGeom>
+        </p:spPr>
+        <p:txBody>
+          <a:bodyPr vert="horz" lIns="91440" tIns="45720" rIns="91440" bIns="45720" rtlCol="0" anchor="t">
+            <a:normAutofit lnSpcReduction="10000"/>
+          </a:bodyPr>
+          <a:lstStyle>
+            <a:lvl1pPr algn="ctr" defTabSz="914400" rtl="0" eaLnBrk="1" latinLnBrk="0" hangingPunct="1">
+              <a:lnSpc>
+                <a:spcPct val="90000"/>
+              </a:lnSpc>
+              <a:spcBef>
+                <a:spcPct val="0"/>
+              </a:spcBef>
+              <a:buNone/>
+              <a:defRPr sz="6000" kern="1200">
+                <a:solidFill>
+                  <a:schemeClr val="tx1"/>
+                </a:solidFill>
+                <a:latin typeface="+mj-lt"/>
+                <a:ea typeface="+mj-ea"/>
+                <a:cs typeface="+mj-cs"/>
+              </a:defRPr>
+            </a:lvl1pPr>
+          </a:lstStyle>
+          <a:p>
+            <a:pPr algn="l">
+              <a:lnSpc>
+                <a:spcPct val="100000"/>
+              </a:lnSpc>
+            </a:pPr>
+            <a:r>
+              <a:rPr lang="en-AU" sz="2800" dirty="0" smtClean="0">
+                <a:solidFill>
+                  <a:srgbClr val="111111"/>
+                </a:solidFill>
+                <a:latin typeface="Open Sans" panose="020B0606030504020204" pitchFamily="34" charset="0"/>
+                <a:ea typeface="Open Sans" panose="020B0606030504020204" pitchFamily="34" charset="0"/>
+                <a:cs typeface="Open Sans" panose="020B0606030504020204" pitchFamily="34" charset="0"/>
+              </a:rPr>
+              <a:t>separator</a:t>
+            </a:r>
+          </a:p>
+        </p:txBody>
+      </p:sp>
+      <p:sp>
+        <p:nvSpPr>
+          <p:cNvPr id="2" name="TextBox 1"/>
+          <p:cNvSpPr txBox="1"/>
+          <p:nvPr/>
+        </p:nvSpPr>
+        <p:spPr>
+          <a:xfrm>
+            <a:off x="1524000" y="1484412"/>
+            <a:ext cx="9144000" cy="4893647"/>
+          </a:xfrm>
+          <a:prstGeom prst="rect">
+            <a:avLst/>
+          </a:prstGeom>
+          <a:noFill/>
+        </p:spPr>
+        <p:txBody>
+          <a:bodyPr wrap="square" rtlCol="0">
+            <a:spAutoFit/>
+          </a:bodyPr>
+          <a:lstStyle/>
+          <a:p>
+            <a:pPr marL="285750" indent="-285750">
+              <a:buFont typeface="Arial" panose="020B0604020202020204" pitchFamily="34" charset="0"/>
+              <a:buChar char="•"/>
+            </a:pPr>
+            <a:r>
+              <a:rPr lang="en-AU" sz="2600" dirty="0" smtClean="0">
+                <a:solidFill>
+                  <a:srgbClr val="EEEEEE"/>
+                </a:solidFill>
+                <a:latin typeface="Open Sans" panose="020B0606030504020204" pitchFamily="34" charset="0"/>
+                <a:ea typeface="Open Sans" panose="020B0606030504020204" pitchFamily="34" charset="0"/>
+                <a:cs typeface="Open Sans" panose="020B0606030504020204" pitchFamily="34" charset="0"/>
+              </a:rPr>
+              <a:t>Delete </a:t>
+            </a:r>
+            <a:r>
+              <a:rPr lang="en-AU" sz="2600" b="1" dirty="0" smtClean="0">
+                <a:solidFill>
+                  <a:srgbClr val="EEEEEE"/>
+                </a:solidFill>
+                <a:latin typeface="Open Sans" panose="020B0606030504020204" pitchFamily="34" charset="0"/>
+                <a:ea typeface="Open Sans" panose="020B0606030504020204" pitchFamily="34" charset="0"/>
+                <a:cs typeface="Open Sans" panose="020B0606030504020204" pitchFamily="34" charset="0"/>
+              </a:rPr>
+              <a:t>all</a:t>
+            </a:r>
+            <a:r>
+              <a:rPr lang="en-AU" sz="2600" dirty="0" smtClean="0">
+                <a:solidFill>
+                  <a:srgbClr val="EEEEEE"/>
+                </a:solidFill>
+                <a:latin typeface="Open Sans" panose="020B0606030504020204" pitchFamily="34" charset="0"/>
+                <a:ea typeface="Open Sans" panose="020B0606030504020204" pitchFamily="34" charset="0"/>
+                <a:cs typeface="Open Sans" panose="020B0606030504020204" pitchFamily="34" charset="0"/>
+              </a:rPr>
+              <a:t> plain-text files containing passwords</a:t>
+            </a:r>
+          </a:p>
+          <a:p>
+            <a:pPr marL="742950" lvl="1" indent="-285750">
+              <a:buFont typeface="Arial" panose="020B0604020202020204" pitchFamily="34" charset="0"/>
+              <a:buChar char="•"/>
+            </a:pPr>
+            <a:r>
+              <a:rPr lang="en-AU" sz="2600" dirty="0" smtClean="0">
+                <a:solidFill>
+                  <a:srgbClr val="EEEEEE"/>
+                </a:solidFill>
+                <a:latin typeface="Open Sans" panose="020B0606030504020204" pitchFamily="34" charset="0"/>
+                <a:ea typeface="Open Sans" panose="020B0606030504020204" pitchFamily="34" charset="0"/>
+                <a:cs typeface="Open Sans" panose="020B0606030504020204" pitchFamily="34" charset="0"/>
+              </a:rPr>
+              <a:t>Not only text *.txt files</a:t>
+            </a:r>
+          </a:p>
+          <a:p>
+            <a:pPr marL="742950" lvl="1" indent="-285750">
+              <a:buFont typeface="Arial" panose="020B0604020202020204" pitchFamily="34" charset="0"/>
+              <a:buChar char="•"/>
+            </a:pPr>
+            <a:r>
+              <a:rPr lang="en-AU" sz="2600" dirty="0" smtClean="0">
+                <a:solidFill>
+                  <a:srgbClr val="EEEEEE"/>
+                </a:solidFill>
+                <a:latin typeface="Open Sans" panose="020B0606030504020204" pitchFamily="34" charset="0"/>
+                <a:ea typeface="Open Sans" panose="020B0606030504020204" pitchFamily="34" charset="0"/>
+                <a:cs typeface="Open Sans" panose="020B0606030504020204" pitchFamily="34" charset="0"/>
+              </a:rPr>
+              <a:t>Also PDFs, Excel files etc.</a:t>
+            </a:r>
+          </a:p>
+          <a:p>
+            <a:pPr marL="285750" indent="-285750">
+              <a:buFont typeface="Arial" panose="020B0604020202020204" pitchFamily="34" charset="0"/>
+              <a:buChar char="•"/>
+            </a:pPr>
+            <a:r>
+              <a:rPr lang="en-AU" sz="2600" dirty="0" smtClean="0">
+                <a:solidFill>
+                  <a:srgbClr val="EEEEEE"/>
+                </a:solidFill>
+                <a:latin typeface="Open Sans" panose="020B0606030504020204" pitchFamily="34" charset="0"/>
+                <a:ea typeface="Open Sans" panose="020B0606030504020204" pitchFamily="34" charset="0"/>
+                <a:cs typeface="Open Sans" panose="020B0606030504020204" pitchFamily="34" charset="0"/>
+              </a:rPr>
+              <a:t>Dispose of written passwords securely</a:t>
+            </a:r>
+          </a:p>
+          <a:p>
+            <a:pPr marL="742950" lvl="1" indent="-285750">
+              <a:buFont typeface="Arial" panose="020B0604020202020204" pitchFamily="34" charset="0"/>
+              <a:buChar char="•"/>
+            </a:pPr>
+            <a:r>
+              <a:rPr lang="en-AU" sz="2600" dirty="0" smtClean="0">
+                <a:solidFill>
+                  <a:srgbClr val="EEEEEE"/>
+                </a:solidFill>
+                <a:latin typeface="Open Sans" panose="020B0606030504020204" pitchFamily="34" charset="0"/>
+                <a:ea typeface="Open Sans" panose="020B0606030504020204" pitchFamily="34" charset="0"/>
+                <a:cs typeface="Open Sans" panose="020B0606030504020204" pitchFamily="34" charset="0"/>
+              </a:rPr>
+              <a:t>Shred paper</a:t>
+            </a:r>
+          </a:p>
+          <a:p>
+            <a:pPr marL="742950" lvl="1" indent="-285750">
+              <a:buFont typeface="Arial" panose="020B0604020202020204" pitchFamily="34" charset="0"/>
+              <a:buChar char="•"/>
+            </a:pPr>
+            <a:r>
+              <a:rPr lang="en-AU" sz="2600" dirty="0" smtClean="0">
+                <a:solidFill>
+                  <a:srgbClr val="EEEEEE"/>
+                </a:solidFill>
+                <a:latin typeface="Open Sans" panose="020B0606030504020204" pitchFamily="34" charset="0"/>
+                <a:ea typeface="Open Sans" panose="020B0606030504020204" pitchFamily="34" charset="0"/>
+                <a:cs typeface="Open Sans" panose="020B0606030504020204" pitchFamily="34" charset="0"/>
+              </a:rPr>
+              <a:t>Burn</a:t>
+            </a:r>
+          </a:p>
+          <a:p>
+            <a:pPr marL="285750" indent="-285750">
+              <a:buFont typeface="Arial" panose="020B0604020202020204" pitchFamily="34" charset="0"/>
+              <a:buChar char="•"/>
+            </a:pPr>
+            <a:r>
+              <a:rPr lang="en-AU" sz="2600" dirty="0" smtClean="0">
+                <a:solidFill>
+                  <a:srgbClr val="EEEEEE"/>
+                </a:solidFill>
+                <a:latin typeface="Open Sans" panose="020B0606030504020204" pitchFamily="34" charset="0"/>
+                <a:ea typeface="Open Sans" panose="020B0606030504020204" pitchFamily="34" charset="0"/>
+                <a:cs typeface="Open Sans" panose="020B0606030504020204" pitchFamily="34" charset="0"/>
+              </a:rPr>
+              <a:t>Use password manager such as </a:t>
+            </a:r>
+            <a:r>
+              <a:rPr lang="en-AU" sz="2600" dirty="0" err="1" smtClean="0">
+                <a:solidFill>
+                  <a:srgbClr val="EEEEEE"/>
+                </a:solidFill>
+                <a:latin typeface="Open Sans" panose="020B0606030504020204" pitchFamily="34" charset="0"/>
+                <a:ea typeface="Open Sans" panose="020B0606030504020204" pitchFamily="34" charset="0"/>
+                <a:cs typeface="Open Sans" panose="020B0606030504020204" pitchFamily="34" charset="0"/>
+              </a:rPr>
+              <a:t>Keepass</a:t>
+            </a:r>
+            <a:r>
+              <a:rPr lang="en-AU" sz="2600" dirty="0" smtClean="0">
+                <a:solidFill>
+                  <a:srgbClr val="EEEEEE"/>
+                </a:solidFill>
+                <a:latin typeface="Open Sans" panose="020B0606030504020204" pitchFamily="34" charset="0"/>
+                <a:ea typeface="Open Sans" panose="020B0606030504020204" pitchFamily="34" charset="0"/>
+                <a:cs typeface="Open Sans" panose="020B0606030504020204" pitchFamily="34" charset="0"/>
+              </a:rPr>
+              <a:t> to store passwords</a:t>
+            </a:r>
+          </a:p>
+          <a:p>
+            <a:pPr marL="742950" lvl="1" indent="-285750">
+              <a:buFont typeface="Arial" panose="020B0604020202020204" pitchFamily="34" charset="0"/>
+              <a:buChar char="•"/>
+            </a:pPr>
+            <a:r>
+              <a:rPr lang="en-AU" sz="2600" dirty="0" smtClean="0">
+                <a:solidFill>
+                  <a:srgbClr val="EEEEEE"/>
+                </a:solidFill>
+                <a:latin typeface="Open Sans" panose="020B0606030504020204" pitchFamily="34" charset="0"/>
+                <a:ea typeface="Open Sans" panose="020B0606030504020204" pitchFamily="34" charset="0"/>
+                <a:cs typeface="Open Sans" panose="020B0606030504020204" pitchFamily="34" charset="0"/>
+              </a:rPr>
+              <a:t>Encrypts / hashes passwords</a:t>
+            </a:r>
+          </a:p>
+          <a:p>
+            <a:pPr marL="285750" indent="-285750">
+              <a:buFont typeface="Arial" panose="020B0604020202020204" pitchFamily="34" charset="0"/>
+              <a:buChar char="•"/>
+            </a:pPr>
+            <a:r>
+              <a:rPr lang="en-AU" sz="2600" dirty="0" smtClean="0">
+                <a:solidFill>
+                  <a:srgbClr val="EEEEEE"/>
+                </a:solidFill>
+                <a:latin typeface="Open Sans" panose="020B0606030504020204" pitchFamily="34" charset="0"/>
+                <a:ea typeface="Open Sans" panose="020B0606030504020204" pitchFamily="34" charset="0"/>
+                <a:cs typeface="Open Sans" panose="020B0606030504020204" pitchFamily="34" charset="0"/>
+              </a:rPr>
+              <a:t>Use virtual encrypted device to store password/s</a:t>
+            </a:r>
+          </a:p>
+          <a:p>
+            <a:pPr marL="742950" lvl="1" indent="-285750">
+              <a:buFont typeface="Arial" panose="020B0604020202020204" pitchFamily="34" charset="0"/>
+              <a:buChar char="•"/>
+            </a:pPr>
+            <a:r>
+              <a:rPr lang="en-AU" sz="2600" dirty="0" err="1" smtClean="0">
+                <a:solidFill>
+                  <a:srgbClr val="EEEEEE"/>
+                </a:solidFill>
+                <a:latin typeface="Open Sans" panose="020B0606030504020204" pitchFamily="34" charset="0"/>
+                <a:ea typeface="Open Sans" panose="020B0606030504020204" pitchFamily="34" charset="0"/>
+                <a:cs typeface="Open Sans" panose="020B0606030504020204" pitchFamily="34" charset="0"/>
+              </a:rPr>
+              <a:t>ie</a:t>
+            </a:r>
+            <a:r>
+              <a:rPr lang="en-AU" sz="2600" dirty="0" smtClean="0">
+                <a:solidFill>
+                  <a:srgbClr val="EEEEEE"/>
+                </a:solidFill>
+                <a:latin typeface="Open Sans" panose="020B0606030504020204" pitchFamily="34" charset="0"/>
+                <a:ea typeface="Open Sans" panose="020B0606030504020204" pitchFamily="34" charset="0"/>
+                <a:cs typeface="Open Sans" panose="020B0606030504020204" pitchFamily="34" charset="0"/>
+              </a:rPr>
+              <a:t>. </a:t>
+            </a:r>
+            <a:r>
+              <a:rPr lang="en-AU" sz="2600" dirty="0" err="1" smtClean="0">
+                <a:solidFill>
+                  <a:srgbClr val="EEEEEE"/>
+                </a:solidFill>
+                <a:latin typeface="Open Sans" panose="020B0606030504020204" pitchFamily="34" charset="0"/>
+                <a:ea typeface="Open Sans" panose="020B0606030504020204" pitchFamily="34" charset="0"/>
+                <a:cs typeface="Open Sans" panose="020B0606030504020204" pitchFamily="34" charset="0"/>
+              </a:rPr>
+              <a:t>Truecrypt</a:t>
+            </a:r>
+            <a:endParaRPr lang="en-AU" sz="2600" dirty="0" smtClean="0">
+              <a:solidFill>
+                <a:srgbClr val="EEEEEE"/>
+              </a:solidFill>
+              <a:latin typeface="Open Sans" panose="020B0606030504020204" pitchFamily="34" charset="0"/>
+              <a:ea typeface="Open Sans" panose="020B0606030504020204" pitchFamily="34" charset="0"/>
+              <a:cs typeface="Open Sans" panose="020B0606030504020204" pitchFamily="34" charset="0"/>
+            </a:endParaRPr>
+          </a:p>
+          <a:p>
+            <a:pPr marL="285750" indent="-285750">
+              <a:buFont typeface="Arial" panose="020B0604020202020204" pitchFamily="34" charset="0"/>
+              <a:buChar char="•"/>
+            </a:pPr>
+            <a:r>
+              <a:rPr lang="en-AU" sz="2600" dirty="0" smtClean="0">
+                <a:solidFill>
+                  <a:srgbClr val="EEEEEE"/>
+                </a:solidFill>
+                <a:latin typeface="Open Sans" panose="020B0606030504020204" pitchFamily="34" charset="0"/>
+                <a:ea typeface="Open Sans" panose="020B0606030504020204" pitchFamily="34" charset="0"/>
+                <a:cs typeface="Open Sans" panose="020B0606030504020204" pitchFamily="34" charset="0"/>
+              </a:rPr>
+              <a:t>Choose a long, memorable master passphrase</a:t>
+            </a:r>
+          </a:p>
+        </p:txBody>
+      </p:sp>
+    </p:spTree>
+    <p:extLst>
+      <p:ext uri="{BB962C8B-B14F-4D97-AF65-F5344CB8AC3E}">
+        <p14:creationId xmlns:p14="http://schemas.microsoft.com/office/powerpoint/2010/main" val="4185824800"/>
+      </p:ext>
+    </p:extLst>
+  </p:cSld>
+  <p:clrMapOvr>
+    <a:masterClrMapping/>
+  </p:clrMapOvr>
+  <p:transition spd="slow">
+    <p:push/>
+  </p:transition>
+  <p:timing>
+    <p:tnLst>
+      <p:par>
+        <p:cTn id="1" dur="indefinite" restart="never" nodeType="tmRoot"/>
+      </p:par>
+    </p:tnLst>
+  </p:timing>
+</p:sld>
+</file>
+
+<file path=ppt/slides/slide55.xml><?xml version="1.0" encoding="utf-8"?>
+<p:sld xmlns:a="http://schemas.openxmlformats.org/drawingml/2006/main" xmlns:r="http://schemas.openxmlformats.org/officeDocument/2006/relationships" xmlns:p="http://schemas.openxmlformats.org/presentationml/2006/main">
+  <p:cSld>
+    <p:bg>
+      <p:bgPr>
+        <a:solidFill>
+          <a:srgbClr val="111111"/>
+        </a:solidFill>
+        <a:effectLst/>
+      </p:bgPr>
+    </p:bg>
+    <p:spTree>
+      <p:nvGrpSpPr>
+        <p:cNvPr id="1" name=""/>
+        <p:cNvGrpSpPr/>
+        <p:nvPr/>
+      </p:nvGrpSpPr>
+      <p:grpSpPr>
+        <a:xfrm>
+          <a:off x="0" y="0"/>
+          <a:ext cx="0" cy="0"/>
+          <a:chOff x="0" y="0"/>
+          <a:chExt cx="0" cy="0"/>
+        </a:xfrm>
+      </p:grpSpPr>
+      <p:sp>
+        <p:nvSpPr>
+          <p:cNvPr id="4" name="Title 3"/>
+          <p:cNvSpPr>
+            <a:spLocks noGrp="1"/>
+          </p:cNvSpPr>
+          <p:nvPr>
+            <p:ph type="ctrTitle"/>
+          </p:nvPr>
+        </p:nvSpPr>
+        <p:spPr>
+          <a:xfrm>
+            <a:off x="1524000" y="-1470455"/>
+            <a:ext cx="9144000" cy="2917370"/>
+          </a:xfrm>
+        </p:spPr>
+        <p:txBody>
+          <a:bodyPr anchor="b">
+            <a:normAutofit/>
+          </a:bodyPr>
+          <a:lstStyle/>
+          <a:p>
+            <a:pPr algn="l"/>
+            <a:r>
+              <a:rPr lang="en-AU" sz="4400" b="1" dirty="0" smtClean="0">
+                <a:solidFill>
+                  <a:srgbClr val="EEEEEE"/>
+                </a:solidFill>
+                <a:latin typeface="Open Sans" panose="020B0606030504020204" pitchFamily="34" charset="0"/>
+                <a:ea typeface="Open Sans" panose="020B0606030504020204" pitchFamily="34" charset="0"/>
+                <a:cs typeface="Open Sans" panose="020B0606030504020204" pitchFamily="34" charset="0"/>
+              </a:rPr>
+              <a:t>User privileges</a:t>
+            </a:r>
+            <a:endParaRPr lang="en-AU" sz="3200" dirty="0">
+              <a:solidFill>
+                <a:srgbClr val="EEEEEE"/>
+              </a:solidFill>
+              <a:latin typeface="Open Sans" panose="020B0606030504020204" pitchFamily="34" charset="0"/>
+              <a:ea typeface="Open Sans" panose="020B0606030504020204" pitchFamily="34" charset="0"/>
+              <a:cs typeface="Open Sans" panose="020B0606030504020204" pitchFamily="34" charset="0"/>
+            </a:endParaRPr>
+          </a:p>
+        </p:txBody>
+      </p:sp>
+      <p:sp>
+        <p:nvSpPr>
+          <p:cNvPr id="6" name="Title 3"/>
+          <p:cNvSpPr txBox="1">
+            <a:spLocks/>
+          </p:cNvSpPr>
+          <p:nvPr/>
+        </p:nvSpPr>
+        <p:spPr>
+          <a:xfrm>
+            <a:off x="1524001" y="1446915"/>
+            <a:ext cx="9144000" cy="511630"/>
+          </a:xfrm>
+          <a:prstGeom prst="rect">
+            <a:avLst/>
+          </a:prstGeom>
+        </p:spPr>
+        <p:txBody>
+          <a:bodyPr vert="horz" lIns="91440" tIns="45720" rIns="91440" bIns="45720" rtlCol="0" anchor="t">
+            <a:normAutofit lnSpcReduction="10000"/>
+          </a:bodyPr>
+          <a:lstStyle>
+            <a:lvl1pPr algn="ctr" defTabSz="914400" rtl="0" eaLnBrk="1" latinLnBrk="0" hangingPunct="1">
+              <a:lnSpc>
+                <a:spcPct val="90000"/>
+              </a:lnSpc>
+              <a:spcBef>
+                <a:spcPct val="0"/>
+              </a:spcBef>
+              <a:buNone/>
+              <a:defRPr sz="6000" kern="1200">
+                <a:solidFill>
+                  <a:schemeClr val="tx1"/>
+                </a:solidFill>
+                <a:latin typeface="+mj-lt"/>
+                <a:ea typeface="+mj-ea"/>
+                <a:cs typeface="+mj-cs"/>
+              </a:defRPr>
+            </a:lvl1pPr>
+          </a:lstStyle>
+          <a:p>
+            <a:pPr algn="l">
+              <a:lnSpc>
+                <a:spcPct val="100000"/>
+              </a:lnSpc>
+            </a:pPr>
+            <a:r>
+              <a:rPr lang="en-AU" sz="2800" dirty="0" smtClean="0">
+                <a:solidFill>
+                  <a:srgbClr val="111111"/>
+                </a:solidFill>
+                <a:latin typeface="Open Sans" panose="020B0606030504020204" pitchFamily="34" charset="0"/>
+                <a:ea typeface="Open Sans" panose="020B0606030504020204" pitchFamily="34" charset="0"/>
+                <a:cs typeface="Open Sans" panose="020B0606030504020204" pitchFamily="34" charset="0"/>
+              </a:rPr>
+              <a:t>separator</a:t>
+            </a:r>
+          </a:p>
+        </p:txBody>
+      </p:sp>
+      <p:sp>
+        <p:nvSpPr>
+          <p:cNvPr id="2" name="TextBox 1"/>
+          <p:cNvSpPr txBox="1"/>
+          <p:nvPr/>
+        </p:nvSpPr>
+        <p:spPr>
+          <a:xfrm>
+            <a:off x="1524000" y="1958544"/>
+            <a:ext cx="9144000" cy="3293209"/>
+          </a:xfrm>
+          <a:prstGeom prst="rect">
+            <a:avLst/>
+          </a:prstGeom>
+          <a:noFill/>
+        </p:spPr>
+        <p:txBody>
+          <a:bodyPr wrap="square" rtlCol="0">
+            <a:spAutoFit/>
+          </a:bodyPr>
+          <a:lstStyle/>
+          <a:p>
+            <a:pPr marL="285750" indent="-285750">
+              <a:buFont typeface="Arial" panose="020B0604020202020204" pitchFamily="34" charset="0"/>
+              <a:buChar char="•"/>
+            </a:pPr>
+            <a:r>
+              <a:rPr lang="en-AU" sz="2600" dirty="0" smtClean="0">
+                <a:solidFill>
+                  <a:srgbClr val="EEEEEE"/>
+                </a:solidFill>
+                <a:latin typeface="Open Sans" panose="020B0606030504020204" pitchFamily="34" charset="0"/>
+                <a:ea typeface="Open Sans" panose="020B0606030504020204" pitchFamily="34" charset="0"/>
+                <a:cs typeface="Open Sans" panose="020B0606030504020204" pitchFamily="34" charset="0"/>
+              </a:rPr>
+              <a:t>Blue Ink’s default users allowed too many privileges</a:t>
+            </a:r>
+          </a:p>
+          <a:p>
+            <a:pPr marL="742950" lvl="1" indent="-285750">
+              <a:buFont typeface="Arial" panose="020B0604020202020204" pitchFamily="34" charset="0"/>
+              <a:buChar char="•"/>
+            </a:pPr>
+            <a:r>
+              <a:rPr lang="en-AU" sz="2600" dirty="0" smtClean="0">
+                <a:solidFill>
+                  <a:srgbClr val="EEEEEE"/>
+                </a:solidFill>
+                <a:latin typeface="Open Sans" panose="020B0606030504020204" pitchFamily="34" charset="0"/>
+                <a:ea typeface="Open Sans" panose="020B0606030504020204" pitchFamily="34" charset="0"/>
+                <a:cs typeface="Open Sans" panose="020B0606030504020204" pitchFamily="34" charset="0"/>
+              </a:rPr>
+              <a:t>Currently have administrator rights</a:t>
+            </a:r>
+          </a:p>
+          <a:p>
+            <a:pPr marL="285750" indent="-285750">
+              <a:buFont typeface="Arial" panose="020B0604020202020204" pitchFamily="34" charset="0"/>
+              <a:buChar char="•"/>
+            </a:pPr>
+            <a:r>
+              <a:rPr lang="en-AU" sz="2600" dirty="0" smtClean="0">
+                <a:solidFill>
+                  <a:srgbClr val="EEEEEE"/>
+                </a:solidFill>
+                <a:latin typeface="Open Sans" panose="020B0606030504020204" pitchFamily="34" charset="0"/>
+                <a:ea typeface="Open Sans" panose="020B0606030504020204" pitchFamily="34" charset="0"/>
+                <a:cs typeface="Open Sans" panose="020B0606030504020204" pitchFamily="34" charset="0"/>
+              </a:rPr>
+              <a:t>Admin rights allow a user to</a:t>
+            </a:r>
+          </a:p>
+          <a:p>
+            <a:pPr marL="742950" lvl="1" indent="-285750">
+              <a:buFont typeface="Arial" panose="020B0604020202020204" pitchFamily="34" charset="0"/>
+              <a:buChar char="•"/>
+            </a:pPr>
+            <a:r>
+              <a:rPr lang="en-AU" sz="2600" dirty="0" smtClean="0">
+                <a:solidFill>
+                  <a:srgbClr val="EEEEEE"/>
+                </a:solidFill>
+                <a:latin typeface="Open Sans" panose="020B0606030504020204" pitchFamily="34" charset="0"/>
+                <a:ea typeface="Open Sans" panose="020B0606030504020204" pitchFamily="34" charset="0"/>
+                <a:cs typeface="Open Sans" panose="020B0606030504020204" pitchFamily="34" charset="0"/>
+              </a:rPr>
+              <a:t>Install </a:t>
+            </a:r>
+            <a:r>
+              <a:rPr lang="en-AU" sz="2600" b="1" dirty="0" smtClean="0">
+                <a:solidFill>
+                  <a:srgbClr val="EEEEEE"/>
+                </a:solidFill>
+                <a:latin typeface="Open Sans" panose="020B0606030504020204" pitchFamily="34" charset="0"/>
+                <a:ea typeface="Open Sans" panose="020B0606030504020204" pitchFamily="34" charset="0"/>
+                <a:cs typeface="Open Sans" panose="020B0606030504020204" pitchFamily="34" charset="0"/>
+              </a:rPr>
+              <a:t>any</a:t>
+            </a:r>
+            <a:r>
+              <a:rPr lang="en-AU" sz="2600" dirty="0" smtClean="0">
+                <a:solidFill>
+                  <a:srgbClr val="EEEEEE"/>
+                </a:solidFill>
+                <a:latin typeface="Open Sans" panose="020B0606030504020204" pitchFamily="34" charset="0"/>
+                <a:ea typeface="Open Sans" panose="020B0606030504020204" pitchFamily="34" charset="0"/>
+                <a:cs typeface="Open Sans" panose="020B0606030504020204" pitchFamily="34" charset="0"/>
+              </a:rPr>
+              <a:t> software</a:t>
+            </a:r>
+          </a:p>
+          <a:p>
+            <a:pPr marL="742950" lvl="1" indent="-285750">
+              <a:buFont typeface="Arial" panose="020B0604020202020204" pitchFamily="34" charset="0"/>
+              <a:buChar char="•"/>
+            </a:pPr>
+            <a:r>
+              <a:rPr lang="en-AU" sz="2600" dirty="0" smtClean="0">
+                <a:solidFill>
+                  <a:srgbClr val="EEEEEE"/>
+                </a:solidFill>
+                <a:latin typeface="Open Sans" panose="020B0606030504020204" pitchFamily="34" charset="0"/>
+                <a:ea typeface="Open Sans" panose="020B0606030504020204" pitchFamily="34" charset="0"/>
+                <a:cs typeface="Open Sans" panose="020B0606030504020204" pitchFamily="34" charset="0"/>
+              </a:rPr>
+              <a:t>Make critical system wide changes to settings</a:t>
+            </a:r>
+          </a:p>
+          <a:p>
+            <a:pPr marL="1200150" lvl="2" indent="-285750">
+              <a:buFont typeface="Arial" panose="020B0604020202020204" pitchFamily="34" charset="0"/>
+              <a:buChar char="•"/>
+            </a:pPr>
+            <a:r>
+              <a:rPr lang="en-AU" sz="2600" dirty="0" err="1">
+                <a:solidFill>
+                  <a:srgbClr val="EEEEEE"/>
+                </a:solidFill>
+                <a:latin typeface="Open Sans" panose="020B0606030504020204" pitchFamily="34" charset="0"/>
+                <a:ea typeface="Open Sans" panose="020B0606030504020204" pitchFamily="34" charset="0"/>
+                <a:cs typeface="Open Sans" panose="020B0606030504020204" pitchFamily="34" charset="0"/>
+              </a:rPr>
+              <a:t>i</a:t>
+            </a:r>
+            <a:r>
+              <a:rPr lang="en-AU" sz="2600" dirty="0" err="1" smtClean="0">
+                <a:solidFill>
+                  <a:srgbClr val="EEEEEE"/>
+                </a:solidFill>
+                <a:latin typeface="Open Sans" panose="020B0606030504020204" pitchFamily="34" charset="0"/>
+                <a:ea typeface="Open Sans" panose="020B0606030504020204" pitchFamily="34" charset="0"/>
+                <a:cs typeface="Open Sans" panose="020B0606030504020204" pitchFamily="34" charset="0"/>
+              </a:rPr>
+              <a:t>e</a:t>
+            </a:r>
+            <a:r>
+              <a:rPr lang="en-AU" sz="2600" dirty="0" smtClean="0">
+                <a:solidFill>
+                  <a:srgbClr val="EEEEEE"/>
+                </a:solidFill>
+                <a:latin typeface="Open Sans" panose="020B0606030504020204" pitchFamily="34" charset="0"/>
+                <a:ea typeface="Open Sans" panose="020B0606030504020204" pitchFamily="34" charset="0"/>
+                <a:cs typeface="Open Sans" panose="020B0606030504020204" pitchFamily="34" charset="0"/>
+              </a:rPr>
+              <a:t>. Modify other user rights</a:t>
+            </a:r>
+          </a:p>
+          <a:p>
+            <a:pPr marL="285750" indent="-285750">
+              <a:buFont typeface="Arial" panose="020B0604020202020204" pitchFamily="34" charset="0"/>
+              <a:buChar char="•"/>
+            </a:pPr>
+            <a:r>
+              <a:rPr lang="en-AU" sz="2600" dirty="0" smtClean="0">
+                <a:solidFill>
+                  <a:srgbClr val="EEEEEE"/>
+                </a:solidFill>
+                <a:latin typeface="Open Sans" panose="020B0606030504020204" pitchFamily="34" charset="0"/>
+                <a:ea typeface="Open Sans" panose="020B0606030504020204" pitchFamily="34" charset="0"/>
+                <a:cs typeface="Open Sans" panose="020B0606030504020204" pitchFamily="34" charset="0"/>
+              </a:rPr>
+              <a:t>If a user with admin rights is attacked, the attacker may also inherit these privileges</a:t>
+            </a:r>
+            <a:endParaRPr lang="en-AU" sz="2600" dirty="0" smtClean="0">
+              <a:solidFill>
+                <a:srgbClr val="EEEEEE"/>
+              </a:solidFill>
+              <a:latin typeface="Open Sans" panose="020B0606030504020204" pitchFamily="34" charset="0"/>
+              <a:ea typeface="Open Sans" panose="020B0606030504020204" pitchFamily="34" charset="0"/>
+              <a:cs typeface="Open Sans" panose="020B0606030504020204" pitchFamily="34" charset="0"/>
+            </a:endParaRPr>
+          </a:p>
+        </p:txBody>
+      </p:sp>
+    </p:spTree>
+    <p:extLst>
+      <p:ext uri="{BB962C8B-B14F-4D97-AF65-F5344CB8AC3E}">
+        <p14:creationId xmlns:p14="http://schemas.microsoft.com/office/powerpoint/2010/main" val="54147768"/>
+      </p:ext>
+    </p:extLst>
+  </p:cSld>
+  <p:clrMapOvr>
+    <a:masterClrMapping/>
+  </p:clrMapOvr>
+  <p:transition spd="slow">
+    <p:push/>
+  </p:transition>
+  <p:timing>
+    <p:tnLst>
+      <p:par>
+        <p:cTn id="1" dur="indefinite" restart="never" nodeType="tmRoot"/>
+      </p:par>
+    </p:tnLst>
+  </p:timing>
+</p:sld>
+</file>
+
+<file path=ppt/slides/slide56.xml><?xml version="1.0" encoding="utf-8"?>
+<p:sld xmlns:a="http://schemas.openxmlformats.org/drawingml/2006/main" xmlns:r="http://schemas.openxmlformats.org/officeDocument/2006/relationships" xmlns:p="http://schemas.openxmlformats.org/presentationml/2006/main">
+  <p:cSld>
+    <p:bg>
+      <p:bgPr>
+        <a:solidFill>
+          <a:srgbClr val="111111"/>
+        </a:solidFill>
+        <a:effectLst/>
+      </p:bgPr>
+    </p:bg>
+    <p:spTree>
+      <p:nvGrpSpPr>
+        <p:cNvPr id="1" name=""/>
+        <p:cNvGrpSpPr/>
+        <p:nvPr/>
+      </p:nvGrpSpPr>
+      <p:grpSpPr>
+        <a:xfrm>
+          <a:off x="0" y="0"/>
+          <a:ext cx="0" cy="0"/>
+          <a:chOff x="0" y="0"/>
+          <a:chExt cx="0" cy="0"/>
+        </a:xfrm>
+      </p:grpSpPr>
+      <p:sp>
+        <p:nvSpPr>
+          <p:cNvPr id="4" name="Title 3"/>
+          <p:cNvSpPr>
+            <a:spLocks noGrp="1"/>
+          </p:cNvSpPr>
+          <p:nvPr>
+            <p:ph type="ctrTitle"/>
+          </p:nvPr>
+        </p:nvSpPr>
+        <p:spPr>
+          <a:xfrm>
+            <a:off x="1524000" y="0"/>
+            <a:ext cx="9144000" cy="2917370"/>
+          </a:xfrm>
+        </p:spPr>
+        <p:txBody>
+          <a:bodyPr anchor="b">
+            <a:normAutofit/>
+          </a:bodyPr>
+          <a:lstStyle/>
+          <a:p>
+            <a:pPr algn="l"/>
+            <a:r>
+              <a:rPr lang="en-AU" sz="4400" b="1" dirty="0" smtClean="0">
+                <a:solidFill>
+                  <a:srgbClr val="EEEEEE"/>
+                </a:solidFill>
+                <a:latin typeface="Open Sans" panose="020B0606030504020204" pitchFamily="34" charset="0"/>
+                <a:ea typeface="Open Sans" panose="020B0606030504020204" pitchFamily="34" charset="0"/>
+                <a:cs typeface="Open Sans" panose="020B0606030504020204" pitchFamily="34" charset="0"/>
+              </a:rPr>
+              <a:t>So how can we fix it?</a:t>
+            </a:r>
+            <a:endParaRPr lang="en-AU" sz="3200" dirty="0">
+              <a:solidFill>
+                <a:srgbClr val="EEEEEE"/>
+              </a:solidFill>
+              <a:latin typeface="Open Sans" panose="020B0606030504020204" pitchFamily="34" charset="0"/>
+              <a:ea typeface="Open Sans" panose="020B0606030504020204" pitchFamily="34" charset="0"/>
+              <a:cs typeface="Open Sans" panose="020B0606030504020204" pitchFamily="34" charset="0"/>
+            </a:endParaRPr>
+          </a:p>
+        </p:txBody>
+      </p:sp>
+      <p:sp>
+        <p:nvSpPr>
+          <p:cNvPr id="6" name="Title 3"/>
+          <p:cNvSpPr txBox="1">
+            <a:spLocks/>
+          </p:cNvSpPr>
+          <p:nvPr/>
+        </p:nvSpPr>
+        <p:spPr>
+          <a:xfrm>
+            <a:off x="1524001" y="2917370"/>
+            <a:ext cx="9144000" cy="511630"/>
+          </a:xfrm>
+          <a:prstGeom prst="rect">
+            <a:avLst/>
+          </a:prstGeom>
+        </p:spPr>
+        <p:txBody>
+          <a:bodyPr vert="horz" lIns="91440" tIns="45720" rIns="91440" bIns="45720" rtlCol="0" anchor="t">
+            <a:normAutofit lnSpcReduction="10000"/>
+          </a:bodyPr>
+          <a:lstStyle>
+            <a:lvl1pPr algn="ctr" defTabSz="914400" rtl="0" eaLnBrk="1" latinLnBrk="0" hangingPunct="1">
+              <a:lnSpc>
+                <a:spcPct val="90000"/>
+              </a:lnSpc>
+              <a:spcBef>
+                <a:spcPct val="0"/>
+              </a:spcBef>
+              <a:buNone/>
+              <a:defRPr sz="6000" kern="1200">
+                <a:solidFill>
+                  <a:schemeClr val="tx1"/>
+                </a:solidFill>
+                <a:latin typeface="+mj-lt"/>
+                <a:ea typeface="+mj-ea"/>
+                <a:cs typeface="+mj-cs"/>
+              </a:defRPr>
+            </a:lvl1pPr>
+          </a:lstStyle>
+          <a:p>
+            <a:pPr algn="l">
+              <a:lnSpc>
+                <a:spcPct val="100000"/>
+              </a:lnSpc>
+            </a:pPr>
+            <a:r>
+              <a:rPr lang="en-AU" sz="2800" dirty="0" smtClean="0">
+                <a:solidFill>
+                  <a:srgbClr val="111111"/>
+                </a:solidFill>
+                <a:latin typeface="Open Sans" panose="020B0606030504020204" pitchFamily="34" charset="0"/>
+                <a:ea typeface="Open Sans" panose="020B0606030504020204" pitchFamily="34" charset="0"/>
+                <a:cs typeface="Open Sans" panose="020B0606030504020204" pitchFamily="34" charset="0"/>
+              </a:rPr>
+              <a:t>separator</a:t>
+            </a:r>
+          </a:p>
+        </p:txBody>
+      </p:sp>
+      <p:sp>
+        <p:nvSpPr>
+          <p:cNvPr id="2" name="TextBox 1"/>
+          <p:cNvSpPr txBox="1"/>
+          <p:nvPr/>
+        </p:nvSpPr>
+        <p:spPr>
+          <a:xfrm>
+            <a:off x="1524000" y="3428999"/>
+            <a:ext cx="9144000" cy="1292662"/>
+          </a:xfrm>
+          <a:prstGeom prst="rect">
+            <a:avLst/>
+          </a:prstGeom>
+          <a:noFill/>
+        </p:spPr>
+        <p:txBody>
+          <a:bodyPr wrap="square" rtlCol="0">
+            <a:spAutoFit/>
+          </a:bodyPr>
+          <a:lstStyle/>
+          <a:p>
+            <a:pPr marL="285750" indent="-285750">
+              <a:buFont typeface="Arial" panose="020B0604020202020204" pitchFamily="34" charset="0"/>
+              <a:buChar char="•"/>
+            </a:pPr>
+            <a:r>
+              <a:rPr lang="en-AU" sz="2600" dirty="0" smtClean="0">
+                <a:solidFill>
+                  <a:srgbClr val="EEEEEE"/>
+                </a:solidFill>
+                <a:latin typeface="Open Sans" panose="020B0606030504020204" pitchFamily="34" charset="0"/>
+                <a:ea typeface="Open Sans" panose="020B0606030504020204" pitchFamily="34" charset="0"/>
+                <a:cs typeface="Open Sans" panose="020B0606030504020204" pitchFamily="34" charset="0"/>
+              </a:rPr>
+              <a:t>Reserve administrator accounts for IT support personnel only</a:t>
+            </a:r>
+          </a:p>
+          <a:p>
+            <a:pPr marL="285750" indent="-285750">
+              <a:buFont typeface="Arial" panose="020B0604020202020204" pitchFamily="34" charset="0"/>
+              <a:buChar char="•"/>
+            </a:pPr>
+            <a:r>
+              <a:rPr lang="en-AU" sz="2600" dirty="0" smtClean="0">
+                <a:solidFill>
+                  <a:srgbClr val="EEEEEE"/>
+                </a:solidFill>
+                <a:latin typeface="Open Sans" panose="020B0606030504020204" pitchFamily="34" charset="0"/>
+                <a:ea typeface="Open Sans" panose="020B0606030504020204" pitchFamily="34" charset="0"/>
+                <a:cs typeface="Open Sans" panose="020B0606030504020204" pitchFamily="34" charset="0"/>
+              </a:rPr>
+              <a:t>Set normal employees as “Standard” users </a:t>
+            </a:r>
+          </a:p>
+        </p:txBody>
+      </p:sp>
+    </p:spTree>
+    <p:extLst>
+      <p:ext uri="{BB962C8B-B14F-4D97-AF65-F5344CB8AC3E}">
+        <p14:creationId xmlns:p14="http://schemas.microsoft.com/office/powerpoint/2010/main" val="2558443386"/>
+      </p:ext>
+    </p:extLst>
+  </p:cSld>
+  <p:clrMapOvr>
+    <a:masterClrMapping/>
+  </p:clrMapOvr>
+  <p:transition spd="slow">
+    <p:push/>
+  </p:transition>
+  <p:timing>
+    <p:tnLst>
+      <p:par>
+        <p:cTn id="1" dur="indefinite" restart="never" nodeType="tmRoot"/>
+      </p:par>
+    </p:tnLst>
+  </p:timing>
+</p:sld>
+</file>
+
+<file path=ppt/slides/slide57.xml><?xml version="1.0" encoding="utf-8"?>
+<p:sld xmlns:a="http://schemas.openxmlformats.org/drawingml/2006/main" xmlns:r="http://schemas.openxmlformats.org/officeDocument/2006/relationships" xmlns:p="http://schemas.openxmlformats.org/presentationml/2006/main">
+  <p:cSld>
+    <p:bg>
+      <p:bgPr>
+        <a:solidFill>
+          <a:srgbClr val="111111"/>
+        </a:solidFill>
+        <a:effectLst/>
+      </p:bgPr>
+    </p:bg>
+    <p:spTree>
+      <p:nvGrpSpPr>
+        <p:cNvPr id="1" name=""/>
+        <p:cNvGrpSpPr/>
+        <p:nvPr/>
+      </p:nvGrpSpPr>
+      <p:grpSpPr>
+        <a:xfrm>
+          <a:off x="0" y="0"/>
+          <a:ext cx="0" cy="0"/>
+          <a:chOff x="0" y="0"/>
+          <a:chExt cx="0" cy="0"/>
+        </a:xfrm>
+      </p:grpSpPr>
+      <p:sp>
+        <p:nvSpPr>
+          <p:cNvPr id="4" name="Title 3"/>
+          <p:cNvSpPr>
+            <a:spLocks noGrp="1"/>
+          </p:cNvSpPr>
+          <p:nvPr>
+            <p:ph type="ctrTitle"/>
+          </p:nvPr>
+        </p:nvSpPr>
+        <p:spPr>
+          <a:xfrm>
+            <a:off x="1524000" y="-1470455"/>
+            <a:ext cx="9144000" cy="2917370"/>
+          </a:xfrm>
+        </p:spPr>
+        <p:txBody>
+          <a:bodyPr anchor="b">
+            <a:normAutofit/>
+          </a:bodyPr>
+          <a:lstStyle/>
+          <a:p>
+            <a:pPr algn="l"/>
+            <a:r>
+              <a:rPr lang="en-AU" sz="4400" b="1" dirty="0" smtClean="0">
+                <a:solidFill>
+                  <a:srgbClr val="EEEEEE"/>
+                </a:solidFill>
+                <a:latin typeface="Open Sans" panose="020B0606030504020204" pitchFamily="34" charset="0"/>
+                <a:ea typeface="Open Sans" panose="020B0606030504020204" pitchFamily="34" charset="0"/>
+                <a:cs typeface="Open Sans" panose="020B0606030504020204" pitchFamily="34" charset="0"/>
+              </a:rPr>
+              <a:t>Modifying user privileges:</a:t>
+            </a:r>
+            <a:endParaRPr lang="en-AU" sz="3200" dirty="0">
+              <a:solidFill>
+                <a:srgbClr val="EEEEEE"/>
+              </a:solidFill>
+              <a:latin typeface="Open Sans" panose="020B0606030504020204" pitchFamily="34" charset="0"/>
+              <a:ea typeface="Open Sans" panose="020B0606030504020204" pitchFamily="34" charset="0"/>
+              <a:cs typeface="Open Sans" panose="020B0606030504020204" pitchFamily="34" charset="0"/>
+            </a:endParaRPr>
+          </a:p>
+        </p:txBody>
+      </p:sp>
+      <p:sp>
+        <p:nvSpPr>
+          <p:cNvPr id="6" name="Title 3"/>
+          <p:cNvSpPr txBox="1">
+            <a:spLocks/>
+          </p:cNvSpPr>
+          <p:nvPr/>
+        </p:nvSpPr>
+        <p:spPr>
+          <a:xfrm>
+            <a:off x="1524001" y="1446915"/>
+            <a:ext cx="9144000" cy="511630"/>
+          </a:xfrm>
+          <a:prstGeom prst="rect">
+            <a:avLst/>
+          </a:prstGeom>
+        </p:spPr>
+        <p:txBody>
+          <a:bodyPr vert="horz" lIns="91440" tIns="45720" rIns="91440" bIns="45720" rtlCol="0" anchor="t">
+            <a:normAutofit lnSpcReduction="10000"/>
+          </a:bodyPr>
+          <a:lstStyle>
+            <a:lvl1pPr algn="ctr" defTabSz="914400" rtl="0" eaLnBrk="1" latinLnBrk="0" hangingPunct="1">
+              <a:lnSpc>
+                <a:spcPct val="90000"/>
+              </a:lnSpc>
+              <a:spcBef>
+                <a:spcPct val="0"/>
+              </a:spcBef>
+              <a:buNone/>
+              <a:defRPr sz="6000" kern="1200">
+                <a:solidFill>
+                  <a:schemeClr val="tx1"/>
+                </a:solidFill>
+                <a:latin typeface="+mj-lt"/>
+                <a:ea typeface="+mj-ea"/>
+                <a:cs typeface="+mj-cs"/>
+              </a:defRPr>
+            </a:lvl1pPr>
+          </a:lstStyle>
+          <a:p>
+            <a:pPr algn="l">
+              <a:lnSpc>
+                <a:spcPct val="100000"/>
+              </a:lnSpc>
+            </a:pPr>
+            <a:r>
+              <a:rPr lang="en-AU" sz="2800" dirty="0" smtClean="0">
+                <a:solidFill>
+                  <a:srgbClr val="111111"/>
+                </a:solidFill>
+                <a:latin typeface="Open Sans" panose="020B0606030504020204" pitchFamily="34" charset="0"/>
+                <a:ea typeface="Open Sans" panose="020B0606030504020204" pitchFamily="34" charset="0"/>
+                <a:cs typeface="Open Sans" panose="020B0606030504020204" pitchFamily="34" charset="0"/>
+              </a:rPr>
+              <a:t>separator</a:t>
+            </a:r>
+          </a:p>
+        </p:txBody>
+      </p:sp>
+      <p:sp>
+        <p:nvSpPr>
+          <p:cNvPr id="2" name="TextBox 1"/>
+          <p:cNvSpPr txBox="1"/>
+          <p:nvPr/>
+        </p:nvSpPr>
+        <p:spPr>
+          <a:xfrm>
+            <a:off x="1524000" y="1958544"/>
+            <a:ext cx="9144000" cy="892552"/>
+          </a:xfrm>
+          <a:prstGeom prst="rect">
+            <a:avLst/>
+          </a:prstGeom>
+          <a:noFill/>
+        </p:spPr>
+        <p:txBody>
+          <a:bodyPr wrap="square" rtlCol="0">
+            <a:spAutoFit/>
+          </a:bodyPr>
+          <a:lstStyle/>
+          <a:p>
+            <a:pPr marL="285750" indent="-285750">
+              <a:buFont typeface="Arial" panose="020B0604020202020204" pitchFamily="34" charset="0"/>
+              <a:buChar char="•"/>
+            </a:pPr>
+            <a:r>
+              <a:rPr lang="en-AU" sz="2600" b="1" dirty="0" smtClean="0">
+                <a:solidFill>
+                  <a:srgbClr val="EEEEEE"/>
+                </a:solidFill>
+                <a:latin typeface="Open Sans" panose="020B0606030504020204" pitchFamily="34" charset="0"/>
+                <a:ea typeface="Open Sans" panose="020B0606030504020204" pitchFamily="34" charset="0"/>
+                <a:cs typeface="Open Sans" panose="020B0606030504020204" pitchFamily="34" charset="0"/>
+              </a:rPr>
+              <a:t>As an administrator</a:t>
+            </a:r>
+            <a:r>
+              <a:rPr lang="en-AU" sz="2600" dirty="0" smtClean="0">
+                <a:solidFill>
+                  <a:srgbClr val="EEEEEE"/>
+                </a:solidFill>
+                <a:latin typeface="Open Sans" panose="020B0606030504020204" pitchFamily="34" charset="0"/>
+                <a:ea typeface="Open Sans" panose="020B0606030504020204" pitchFamily="34" charset="0"/>
+                <a:cs typeface="Open Sans" panose="020B0606030504020204" pitchFamily="34" charset="0"/>
+              </a:rPr>
+              <a:t>…</a:t>
+            </a:r>
+          </a:p>
+          <a:p>
+            <a:pPr marL="285750" indent="-285750">
+              <a:buFont typeface="Arial" panose="020B0604020202020204" pitchFamily="34" charset="0"/>
+              <a:buChar char="•"/>
+            </a:pPr>
+            <a:r>
+              <a:rPr lang="en-AU" sz="2600" dirty="0" smtClean="0">
+                <a:solidFill>
+                  <a:srgbClr val="EEEEEE"/>
+                </a:solidFill>
+                <a:latin typeface="Open Sans" panose="020B0606030504020204" pitchFamily="34" charset="0"/>
+                <a:ea typeface="Open Sans" panose="020B0606030504020204" pitchFamily="34" charset="0"/>
+                <a:cs typeface="Open Sans" panose="020B0606030504020204" pitchFamily="34" charset="0"/>
+              </a:rPr>
+              <a:t>Click “Add or remove user accounts” </a:t>
+            </a:r>
+            <a:r>
+              <a:rPr lang="en-AU" sz="2600" dirty="0" smtClean="0">
+                <a:solidFill>
+                  <a:srgbClr val="EEEEEE"/>
+                </a:solidFill>
+                <a:latin typeface="Open Sans" panose="020B0606030504020204" pitchFamily="34" charset="0"/>
+                <a:ea typeface="Open Sans" panose="020B0606030504020204" pitchFamily="34" charset="0"/>
+                <a:cs typeface="Open Sans" panose="020B0606030504020204" pitchFamily="34" charset="0"/>
+              </a:rPr>
+              <a:t>in the Control Panel</a:t>
+            </a:r>
+          </a:p>
+        </p:txBody>
+      </p:sp>
+      <p:pic>
+        <p:nvPicPr>
+          <p:cNvPr id="5" name="Picture 4"/>
+          <p:cNvPicPr>
+            <a:picLocks noChangeAspect="1"/>
+          </p:cNvPicPr>
+          <p:nvPr/>
+        </p:nvPicPr>
+        <p:blipFill>
+          <a:blip r:embed="rId2">
+            <a:extLst>
+              <a:ext uri="{28A0092B-C50C-407E-A947-70E740481C1C}">
+                <a14:useLocalDpi xmlns:a14="http://schemas.microsoft.com/office/drawing/2010/main" val="0"/>
+              </a:ext>
+            </a:extLst>
+          </a:blip>
+          <a:stretch>
+            <a:fillRect/>
+          </a:stretch>
+        </p:blipFill>
+        <p:spPr>
+          <a:xfrm>
+            <a:off x="1066800" y="3362725"/>
+            <a:ext cx="10058400" cy="1973961"/>
+          </a:xfrm>
+          <a:prstGeom prst="rect">
+            <a:avLst/>
+          </a:prstGeom>
+        </p:spPr>
+      </p:pic>
+    </p:spTree>
+    <p:extLst>
+      <p:ext uri="{BB962C8B-B14F-4D97-AF65-F5344CB8AC3E}">
+        <p14:creationId xmlns:p14="http://schemas.microsoft.com/office/powerpoint/2010/main" val="1044720835"/>
+      </p:ext>
+    </p:extLst>
+  </p:cSld>
+  <p:clrMapOvr>
+    <a:masterClrMapping/>
+  </p:clrMapOvr>
+  <p:transition spd="slow">
+    <p:push/>
+  </p:transition>
+  <p:timing>
+    <p:tnLst>
+      <p:par>
+        <p:cTn id="1" dur="indefinite" restart="never" nodeType="tmRoot"/>
+      </p:par>
+    </p:tnLst>
+  </p:timing>
+</p:sld>
+</file>
+
+<file path=ppt/slides/slide58.xml><?xml version="1.0" encoding="utf-8"?>
+<p:sld xmlns:a="http://schemas.openxmlformats.org/drawingml/2006/main" xmlns:r="http://schemas.openxmlformats.org/officeDocument/2006/relationships" xmlns:p="http://schemas.openxmlformats.org/presentationml/2006/main">
+  <p:cSld>
+    <p:bg>
+      <p:bgPr>
+        <a:solidFill>
+          <a:srgbClr val="111111"/>
+        </a:solidFill>
+        <a:effectLst/>
+      </p:bgPr>
+    </p:bg>
+    <p:spTree>
+      <p:nvGrpSpPr>
+        <p:cNvPr id="1" name=""/>
+        <p:cNvGrpSpPr/>
+        <p:nvPr/>
+      </p:nvGrpSpPr>
+      <p:grpSpPr>
+        <a:xfrm>
+          <a:off x="0" y="0"/>
+          <a:ext cx="0" cy="0"/>
+          <a:chOff x="0" y="0"/>
+          <a:chExt cx="0" cy="0"/>
+        </a:xfrm>
+      </p:grpSpPr>
+      <p:sp>
+        <p:nvSpPr>
+          <p:cNvPr id="6" name="Title 3"/>
+          <p:cNvSpPr txBox="1">
+            <a:spLocks/>
+          </p:cNvSpPr>
+          <p:nvPr/>
+        </p:nvSpPr>
+        <p:spPr>
+          <a:xfrm>
+            <a:off x="1524001" y="1446915"/>
+            <a:ext cx="9144000" cy="511630"/>
+          </a:xfrm>
+          <a:prstGeom prst="rect">
+            <a:avLst/>
+          </a:prstGeom>
+        </p:spPr>
+        <p:txBody>
+          <a:bodyPr vert="horz" lIns="91440" tIns="45720" rIns="91440" bIns="45720" rtlCol="0" anchor="t">
+            <a:normAutofit lnSpcReduction="10000"/>
+          </a:bodyPr>
+          <a:lstStyle>
+            <a:lvl1pPr algn="ctr" defTabSz="914400" rtl="0" eaLnBrk="1" latinLnBrk="0" hangingPunct="1">
+              <a:lnSpc>
+                <a:spcPct val="90000"/>
+              </a:lnSpc>
+              <a:spcBef>
+                <a:spcPct val="0"/>
+              </a:spcBef>
+              <a:buNone/>
+              <a:defRPr sz="6000" kern="1200">
+                <a:solidFill>
+                  <a:schemeClr val="tx1"/>
+                </a:solidFill>
+                <a:latin typeface="+mj-lt"/>
+                <a:ea typeface="+mj-ea"/>
+                <a:cs typeface="+mj-cs"/>
+              </a:defRPr>
+            </a:lvl1pPr>
+          </a:lstStyle>
+          <a:p>
+            <a:pPr algn="l">
+              <a:lnSpc>
+                <a:spcPct val="100000"/>
+              </a:lnSpc>
+            </a:pPr>
+            <a:r>
+              <a:rPr lang="en-AU" sz="2800" dirty="0" smtClean="0">
+                <a:solidFill>
+                  <a:srgbClr val="111111"/>
+                </a:solidFill>
+                <a:latin typeface="Open Sans" panose="020B0606030504020204" pitchFamily="34" charset="0"/>
+                <a:ea typeface="Open Sans" panose="020B0606030504020204" pitchFamily="34" charset="0"/>
+                <a:cs typeface="Open Sans" panose="020B0606030504020204" pitchFamily="34" charset="0"/>
+              </a:rPr>
+              <a:t>separator</a:t>
+            </a:r>
+          </a:p>
+        </p:txBody>
+      </p:sp>
+      <p:sp>
+        <p:nvSpPr>
+          <p:cNvPr id="2" name="TextBox 1"/>
+          <p:cNvSpPr txBox="1"/>
+          <p:nvPr/>
+        </p:nvSpPr>
+        <p:spPr>
+          <a:xfrm>
+            <a:off x="1524000" y="1958544"/>
+            <a:ext cx="9144000" cy="492443"/>
+          </a:xfrm>
+          <a:prstGeom prst="rect">
+            <a:avLst/>
+          </a:prstGeom>
+          <a:noFill/>
+        </p:spPr>
+        <p:txBody>
+          <a:bodyPr wrap="square" rtlCol="0">
+            <a:spAutoFit/>
+          </a:bodyPr>
+          <a:lstStyle/>
+          <a:p>
+            <a:pPr marL="285750" indent="-285750">
+              <a:buFont typeface="Arial" panose="020B0604020202020204" pitchFamily="34" charset="0"/>
+              <a:buChar char="•"/>
+            </a:pPr>
+            <a:r>
+              <a:rPr lang="en-AU" sz="2600" dirty="0" smtClean="0">
+                <a:solidFill>
+                  <a:srgbClr val="EEEEEE"/>
+                </a:solidFill>
+                <a:latin typeface="Open Sans" panose="020B0606030504020204" pitchFamily="34" charset="0"/>
+                <a:ea typeface="Open Sans" panose="020B0606030504020204" pitchFamily="34" charset="0"/>
+                <a:cs typeface="Open Sans" panose="020B0606030504020204" pitchFamily="34" charset="0"/>
+              </a:rPr>
+              <a:t>Click</a:t>
+            </a:r>
+            <a:r>
+              <a:rPr lang="en-AU" sz="2600" dirty="0" smtClean="0">
+                <a:solidFill>
+                  <a:srgbClr val="EEEEEE"/>
+                </a:solidFill>
+                <a:latin typeface="Open Sans" panose="020B0606030504020204" pitchFamily="34" charset="0"/>
+                <a:ea typeface="Open Sans" panose="020B0606030504020204" pitchFamily="34" charset="0"/>
+                <a:cs typeface="Open Sans" panose="020B0606030504020204" pitchFamily="34" charset="0"/>
+              </a:rPr>
+              <a:t> the account to be modified</a:t>
+            </a:r>
+            <a:endParaRPr lang="en-AU" sz="2600" dirty="0" smtClean="0">
+              <a:solidFill>
+                <a:srgbClr val="EEEEEE"/>
+              </a:solidFill>
+              <a:latin typeface="Open Sans" panose="020B0606030504020204" pitchFamily="34" charset="0"/>
+              <a:ea typeface="Open Sans" panose="020B0606030504020204" pitchFamily="34" charset="0"/>
+              <a:cs typeface="Open Sans" panose="020B0606030504020204" pitchFamily="34" charset="0"/>
+            </a:endParaRPr>
+          </a:p>
+        </p:txBody>
+      </p:sp>
+      <p:pic>
+        <p:nvPicPr>
+          <p:cNvPr id="5" name="Picture 4"/>
+          <p:cNvPicPr>
+            <a:picLocks noChangeAspect="1"/>
+          </p:cNvPicPr>
+          <p:nvPr/>
+        </p:nvPicPr>
+        <p:blipFill>
+          <a:blip r:embed="rId2">
+            <a:extLst>
+              <a:ext uri="{28A0092B-C50C-407E-A947-70E740481C1C}">
+                <a14:useLocalDpi xmlns:a14="http://schemas.microsoft.com/office/drawing/2010/main" val="0"/>
+              </a:ext>
+            </a:extLst>
+          </a:blip>
+          <a:stretch>
+            <a:fillRect/>
+          </a:stretch>
+        </p:blipFill>
+        <p:spPr>
+          <a:xfrm>
+            <a:off x="1066800" y="2962616"/>
+            <a:ext cx="10058400" cy="2740914"/>
+          </a:xfrm>
+          <a:prstGeom prst="rect">
+            <a:avLst/>
+          </a:prstGeom>
+        </p:spPr>
+      </p:pic>
+    </p:spTree>
+    <p:extLst>
+      <p:ext uri="{BB962C8B-B14F-4D97-AF65-F5344CB8AC3E}">
+        <p14:creationId xmlns:p14="http://schemas.microsoft.com/office/powerpoint/2010/main" val="2729974118"/>
+      </p:ext>
+    </p:extLst>
+  </p:cSld>
+  <p:clrMapOvr>
+    <a:masterClrMapping/>
+  </p:clrMapOvr>
+  <p:transition spd="slow">
+    <p:push/>
+  </p:transition>
+  <p:timing>
+    <p:tnLst>
+      <p:par>
+        <p:cTn id="1" dur="indefinite" restart="never" nodeType="tmRoot"/>
+      </p:par>
+    </p:tnLst>
+  </p:timing>
+</p:sld>
+</file>
+
+<file path=ppt/slides/slide59.xml><?xml version="1.0" encoding="utf-8"?>
+<p:sld xmlns:a="http://schemas.openxmlformats.org/drawingml/2006/main" xmlns:r="http://schemas.openxmlformats.org/officeDocument/2006/relationships" xmlns:p="http://schemas.openxmlformats.org/presentationml/2006/main">
+  <p:cSld>
+    <p:bg>
+      <p:bgPr>
+        <a:solidFill>
+          <a:srgbClr val="111111"/>
+        </a:solidFill>
+        <a:effectLst/>
+      </p:bgPr>
+    </p:bg>
+    <p:spTree>
+      <p:nvGrpSpPr>
+        <p:cNvPr id="1" name=""/>
+        <p:cNvGrpSpPr/>
+        <p:nvPr/>
+      </p:nvGrpSpPr>
+      <p:grpSpPr>
+        <a:xfrm>
+          <a:off x="0" y="0"/>
+          <a:ext cx="0" cy="0"/>
+          <a:chOff x="0" y="0"/>
+          <a:chExt cx="0" cy="0"/>
+        </a:xfrm>
+      </p:grpSpPr>
+      <p:sp>
+        <p:nvSpPr>
+          <p:cNvPr id="6" name="Title 3"/>
+          <p:cNvSpPr txBox="1">
+            <a:spLocks/>
+          </p:cNvSpPr>
+          <p:nvPr/>
+        </p:nvSpPr>
+        <p:spPr>
+          <a:xfrm>
+            <a:off x="1524001" y="1446915"/>
+            <a:ext cx="9144000" cy="511630"/>
+          </a:xfrm>
+          <a:prstGeom prst="rect">
+            <a:avLst/>
+          </a:prstGeom>
+        </p:spPr>
+        <p:txBody>
+          <a:bodyPr vert="horz" lIns="91440" tIns="45720" rIns="91440" bIns="45720" rtlCol="0" anchor="t">
+            <a:normAutofit lnSpcReduction="10000"/>
+          </a:bodyPr>
+          <a:lstStyle>
+            <a:lvl1pPr algn="ctr" defTabSz="914400" rtl="0" eaLnBrk="1" latinLnBrk="0" hangingPunct="1">
+              <a:lnSpc>
+                <a:spcPct val="90000"/>
+              </a:lnSpc>
+              <a:spcBef>
+                <a:spcPct val="0"/>
+              </a:spcBef>
+              <a:buNone/>
+              <a:defRPr sz="6000" kern="1200">
+                <a:solidFill>
+                  <a:schemeClr val="tx1"/>
+                </a:solidFill>
+                <a:latin typeface="+mj-lt"/>
+                <a:ea typeface="+mj-ea"/>
+                <a:cs typeface="+mj-cs"/>
+              </a:defRPr>
+            </a:lvl1pPr>
+          </a:lstStyle>
+          <a:p>
+            <a:pPr algn="l">
+              <a:lnSpc>
+                <a:spcPct val="100000"/>
+              </a:lnSpc>
+            </a:pPr>
+            <a:r>
+              <a:rPr lang="en-AU" sz="2800" dirty="0" smtClean="0">
+                <a:solidFill>
+                  <a:srgbClr val="111111"/>
+                </a:solidFill>
+                <a:latin typeface="Open Sans" panose="020B0606030504020204" pitchFamily="34" charset="0"/>
+                <a:ea typeface="Open Sans" panose="020B0606030504020204" pitchFamily="34" charset="0"/>
+                <a:cs typeface="Open Sans" panose="020B0606030504020204" pitchFamily="34" charset="0"/>
+              </a:rPr>
+              <a:t>separator</a:t>
+            </a:r>
+          </a:p>
+        </p:txBody>
+      </p:sp>
+      <p:sp>
+        <p:nvSpPr>
+          <p:cNvPr id="2" name="TextBox 1"/>
+          <p:cNvSpPr txBox="1"/>
+          <p:nvPr/>
+        </p:nvSpPr>
+        <p:spPr>
+          <a:xfrm>
+            <a:off x="1524000" y="1958544"/>
+            <a:ext cx="9144000" cy="492443"/>
+          </a:xfrm>
+          <a:prstGeom prst="rect">
+            <a:avLst/>
+          </a:prstGeom>
+          <a:noFill/>
+        </p:spPr>
+        <p:txBody>
+          <a:bodyPr wrap="square" rtlCol="0">
+            <a:spAutoFit/>
+          </a:bodyPr>
+          <a:lstStyle/>
+          <a:p>
+            <a:pPr marL="285750" indent="-285750">
+              <a:buFont typeface="Arial" panose="020B0604020202020204" pitchFamily="34" charset="0"/>
+              <a:buChar char="•"/>
+            </a:pPr>
+            <a:r>
+              <a:rPr lang="en-AU" sz="2600" dirty="0" smtClean="0">
+                <a:solidFill>
+                  <a:srgbClr val="EEEEEE"/>
+                </a:solidFill>
+                <a:latin typeface="Open Sans" panose="020B0606030504020204" pitchFamily="34" charset="0"/>
+                <a:ea typeface="Open Sans" panose="020B0606030504020204" pitchFamily="34" charset="0"/>
+                <a:cs typeface="Open Sans" panose="020B0606030504020204" pitchFamily="34" charset="0"/>
+              </a:rPr>
+              <a:t>Click</a:t>
+            </a:r>
+            <a:r>
+              <a:rPr lang="en-AU" sz="2600" dirty="0" smtClean="0">
+                <a:solidFill>
+                  <a:srgbClr val="EEEEEE"/>
+                </a:solidFill>
+                <a:latin typeface="Open Sans" panose="020B0606030504020204" pitchFamily="34" charset="0"/>
+                <a:ea typeface="Open Sans" panose="020B0606030504020204" pitchFamily="34" charset="0"/>
+                <a:cs typeface="Open Sans" panose="020B0606030504020204" pitchFamily="34" charset="0"/>
+              </a:rPr>
+              <a:t> “Change the account type”</a:t>
+            </a:r>
+            <a:endParaRPr lang="en-AU" sz="2600" dirty="0" smtClean="0">
+              <a:solidFill>
+                <a:srgbClr val="EEEEEE"/>
+              </a:solidFill>
+              <a:latin typeface="Open Sans" panose="020B0606030504020204" pitchFamily="34" charset="0"/>
+              <a:ea typeface="Open Sans" panose="020B0606030504020204" pitchFamily="34" charset="0"/>
+              <a:cs typeface="Open Sans" panose="020B0606030504020204" pitchFamily="34" charset="0"/>
+            </a:endParaRPr>
+          </a:p>
+        </p:txBody>
+      </p:sp>
+      <p:pic>
+        <p:nvPicPr>
+          <p:cNvPr id="5" name="Picture 4"/>
+          <p:cNvPicPr>
+            <a:picLocks noChangeAspect="1"/>
+          </p:cNvPicPr>
+          <p:nvPr/>
+        </p:nvPicPr>
+        <p:blipFill>
+          <a:blip r:embed="rId2">
+            <a:extLst>
+              <a:ext uri="{28A0092B-C50C-407E-A947-70E740481C1C}">
+                <a14:useLocalDpi xmlns:a14="http://schemas.microsoft.com/office/drawing/2010/main" val="0"/>
+              </a:ext>
+            </a:extLst>
+          </a:blip>
+          <a:stretch>
+            <a:fillRect/>
+          </a:stretch>
+        </p:blipFill>
+        <p:spPr>
+          <a:xfrm>
+            <a:off x="1066800" y="3025481"/>
+            <a:ext cx="10058400" cy="2615184"/>
+          </a:xfrm>
+          <a:prstGeom prst="rect">
+            <a:avLst/>
+          </a:prstGeom>
+        </p:spPr>
+      </p:pic>
+    </p:spTree>
+    <p:extLst>
+      <p:ext uri="{BB962C8B-B14F-4D97-AF65-F5344CB8AC3E}">
+        <p14:creationId xmlns:p14="http://schemas.microsoft.com/office/powerpoint/2010/main" val="1657544964"/>
       </p:ext>
     </p:extLst>
   </p:cSld>
@@ -16090,6 +18875,599 @@
     <p:extLst>
       <p:ext uri="{BB962C8B-B14F-4D97-AF65-F5344CB8AC3E}">
         <p14:creationId xmlns:p14="http://schemas.microsoft.com/office/powerpoint/2010/main" val="2714318788"/>
+      </p:ext>
+    </p:extLst>
+  </p:cSld>
+  <p:clrMapOvr>
+    <a:masterClrMapping/>
+  </p:clrMapOvr>
+  <p:transition spd="slow">
+    <p:push/>
+  </p:transition>
+  <p:timing>
+    <p:tnLst>
+      <p:par>
+        <p:cTn id="1" dur="indefinite" restart="never" nodeType="tmRoot"/>
+      </p:par>
+    </p:tnLst>
+  </p:timing>
+</p:sld>
+</file>
+
+<file path=ppt/slides/slide60.xml><?xml version="1.0" encoding="utf-8"?>
+<p:sld xmlns:a="http://schemas.openxmlformats.org/drawingml/2006/main" xmlns:r="http://schemas.openxmlformats.org/officeDocument/2006/relationships" xmlns:p="http://schemas.openxmlformats.org/presentationml/2006/main">
+  <p:cSld>
+    <p:bg>
+      <p:bgPr>
+        <a:solidFill>
+          <a:srgbClr val="111111"/>
+        </a:solidFill>
+        <a:effectLst/>
+      </p:bgPr>
+    </p:bg>
+    <p:spTree>
+      <p:nvGrpSpPr>
+        <p:cNvPr id="1" name=""/>
+        <p:cNvGrpSpPr/>
+        <p:nvPr/>
+      </p:nvGrpSpPr>
+      <p:grpSpPr>
+        <a:xfrm>
+          <a:off x="0" y="0"/>
+          <a:ext cx="0" cy="0"/>
+          <a:chOff x="0" y="0"/>
+          <a:chExt cx="0" cy="0"/>
+        </a:xfrm>
+      </p:grpSpPr>
+      <p:sp>
+        <p:nvSpPr>
+          <p:cNvPr id="6" name="Title 3"/>
+          <p:cNvSpPr txBox="1">
+            <a:spLocks/>
+          </p:cNvSpPr>
+          <p:nvPr/>
+        </p:nvSpPr>
+        <p:spPr>
+          <a:xfrm>
+            <a:off x="1524001" y="1446915"/>
+            <a:ext cx="9144000" cy="511630"/>
+          </a:xfrm>
+          <a:prstGeom prst="rect">
+            <a:avLst/>
+          </a:prstGeom>
+        </p:spPr>
+        <p:txBody>
+          <a:bodyPr vert="horz" lIns="91440" tIns="45720" rIns="91440" bIns="45720" rtlCol="0" anchor="t">
+            <a:normAutofit lnSpcReduction="10000"/>
+          </a:bodyPr>
+          <a:lstStyle>
+            <a:lvl1pPr algn="ctr" defTabSz="914400" rtl="0" eaLnBrk="1" latinLnBrk="0" hangingPunct="1">
+              <a:lnSpc>
+                <a:spcPct val="90000"/>
+              </a:lnSpc>
+              <a:spcBef>
+                <a:spcPct val="0"/>
+              </a:spcBef>
+              <a:buNone/>
+              <a:defRPr sz="6000" kern="1200">
+                <a:solidFill>
+                  <a:schemeClr val="tx1"/>
+                </a:solidFill>
+                <a:latin typeface="+mj-lt"/>
+                <a:ea typeface="+mj-ea"/>
+                <a:cs typeface="+mj-cs"/>
+              </a:defRPr>
+            </a:lvl1pPr>
+          </a:lstStyle>
+          <a:p>
+            <a:pPr algn="l">
+              <a:lnSpc>
+                <a:spcPct val="100000"/>
+              </a:lnSpc>
+            </a:pPr>
+            <a:r>
+              <a:rPr lang="en-AU" sz="2800" dirty="0" smtClean="0">
+                <a:solidFill>
+                  <a:srgbClr val="111111"/>
+                </a:solidFill>
+                <a:latin typeface="Open Sans" panose="020B0606030504020204" pitchFamily="34" charset="0"/>
+                <a:ea typeface="Open Sans" panose="020B0606030504020204" pitchFamily="34" charset="0"/>
+                <a:cs typeface="Open Sans" panose="020B0606030504020204" pitchFamily="34" charset="0"/>
+              </a:rPr>
+              <a:t>separator</a:t>
+            </a:r>
+          </a:p>
+        </p:txBody>
+      </p:sp>
+      <p:sp>
+        <p:nvSpPr>
+          <p:cNvPr id="2" name="TextBox 1"/>
+          <p:cNvSpPr txBox="1"/>
+          <p:nvPr/>
+        </p:nvSpPr>
+        <p:spPr>
+          <a:xfrm>
+            <a:off x="1524000" y="1446915"/>
+            <a:ext cx="9144000" cy="492443"/>
+          </a:xfrm>
+          <a:prstGeom prst="rect">
+            <a:avLst/>
+          </a:prstGeom>
+          <a:noFill/>
+        </p:spPr>
+        <p:txBody>
+          <a:bodyPr wrap="square" rtlCol="0">
+            <a:spAutoFit/>
+          </a:bodyPr>
+          <a:lstStyle/>
+          <a:p>
+            <a:pPr marL="285750" indent="-285750">
+              <a:buFont typeface="Arial" panose="020B0604020202020204" pitchFamily="34" charset="0"/>
+              <a:buChar char="•"/>
+            </a:pPr>
+            <a:r>
+              <a:rPr lang="en-AU" sz="2600" dirty="0" smtClean="0">
+                <a:solidFill>
+                  <a:srgbClr val="EEEEEE"/>
+                </a:solidFill>
+                <a:latin typeface="Open Sans" panose="020B0606030504020204" pitchFamily="34" charset="0"/>
+                <a:ea typeface="Open Sans" panose="020B0606030504020204" pitchFamily="34" charset="0"/>
+                <a:cs typeface="Open Sans" panose="020B0606030504020204" pitchFamily="34" charset="0"/>
+              </a:rPr>
+              <a:t>Select “Standard user” and click “Change Account Type”</a:t>
+            </a:r>
+            <a:endParaRPr lang="en-AU" sz="2600" dirty="0" smtClean="0">
+              <a:solidFill>
+                <a:srgbClr val="EEEEEE"/>
+              </a:solidFill>
+              <a:latin typeface="Open Sans" panose="020B0606030504020204" pitchFamily="34" charset="0"/>
+              <a:ea typeface="Open Sans" panose="020B0606030504020204" pitchFamily="34" charset="0"/>
+              <a:cs typeface="Open Sans" panose="020B0606030504020204" pitchFamily="34" charset="0"/>
+            </a:endParaRPr>
+          </a:p>
+        </p:txBody>
+      </p:sp>
+      <p:pic>
+        <p:nvPicPr>
+          <p:cNvPr id="3" name="Picture 2"/>
+          <p:cNvPicPr>
+            <a:picLocks noChangeAspect="1"/>
+          </p:cNvPicPr>
+          <p:nvPr/>
+        </p:nvPicPr>
+        <p:blipFill>
+          <a:blip r:embed="rId2">
+            <a:extLst>
+              <a:ext uri="{28A0092B-C50C-407E-A947-70E740481C1C}">
+                <a14:useLocalDpi xmlns:a14="http://schemas.microsoft.com/office/drawing/2010/main" val="0"/>
+              </a:ext>
+            </a:extLst>
+          </a:blip>
+          <a:stretch>
+            <a:fillRect/>
+          </a:stretch>
+        </p:blipFill>
+        <p:spPr>
+          <a:xfrm>
+            <a:off x="1066800" y="2513852"/>
+            <a:ext cx="10058400" cy="3759326"/>
+          </a:xfrm>
+          <a:prstGeom prst="rect">
+            <a:avLst/>
+          </a:prstGeom>
+        </p:spPr>
+      </p:pic>
+    </p:spTree>
+    <p:extLst>
+      <p:ext uri="{BB962C8B-B14F-4D97-AF65-F5344CB8AC3E}">
+        <p14:creationId xmlns:p14="http://schemas.microsoft.com/office/powerpoint/2010/main" val="3043731167"/>
+      </p:ext>
+    </p:extLst>
+  </p:cSld>
+  <p:clrMapOvr>
+    <a:masterClrMapping/>
+  </p:clrMapOvr>
+  <p:transition spd="slow">
+    <p:push/>
+  </p:transition>
+  <p:timing>
+    <p:tnLst>
+      <p:par>
+        <p:cTn id="1" dur="indefinite" restart="never" nodeType="tmRoot"/>
+      </p:par>
+    </p:tnLst>
+  </p:timing>
+</p:sld>
+</file>
+
+<file path=ppt/slides/slide61.xml><?xml version="1.0" encoding="utf-8"?>
+<p:sld xmlns:a="http://schemas.openxmlformats.org/drawingml/2006/main" xmlns:r="http://schemas.openxmlformats.org/officeDocument/2006/relationships" xmlns:p="http://schemas.openxmlformats.org/presentationml/2006/main">
+  <p:cSld>
+    <p:bg>
+      <p:bgPr>
+        <a:solidFill>
+          <a:srgbClr val="111111"/>
+        </a:solidFill>
+        <a:effectLst/>
+      </p:bgPr>
+    </p:bg>
+    <p:spTree>
+      <p:nvGrpSpPr>
+        <p:cNvPr id="1" name=""/>
+        <p:cNvGrpSpPr/>
+        <p:nvPr/>
+      </p:nvGrpSpPr>
+      <p:grpSpPr>
+        <a:xfrm>
+          <a:off x="0" y="0"/>
+          <a:ext cx="0" cy="0"/>
+          <a:chOff x="0" y="0"/>
+          <a:chExt cx="0" cy="0"/>
+        </a:xfrm>
+      </p:grpSpPr>
+      <p:sp>
+        <p:nvSpPr>
+          <p:cNvPr id="4" name="Title 3"/>
+          <p:cNvSpPr>
+            <a:spLocks noGrp="1"/>
+          </p:cNvSpPr>
+          <p:nvPr>
+            <p:ph type="ctrTitle"/>
+          </p:nvPr>
+        </p:nvSpPr>
+        <p:spPr>
+          <a:xfrm>
+            <a:off x="1524000" y="-687008"/>
+            <a:ext cx="9144000" cy="2917370"/>
+          </a:xfrm>
+        </p:spPr>
+        <p:txBody>
+          <a:bodyPr anchor="b">
+            <a:normAutofit/>
+          </a:bodyPr>
+          <a:lstStyle/>
+          <a:p>
+            <a:pPr algn="l"/>
+            <a:r>
+              <a:rPr lang="en-AU" sz="4400" b="1" dirty="0" smtClean="0">
+                <a:solidFill>
+                  <a:srgbClr val="EEEEEE"/>
+                </a:solidFill>
+                <a:latin typeface="Open Sans" panose="020B0606030504020204" pitchFamily="34" charset="0"/>
+                <a:ea typeface="Open Sans" panose="020B0606030504020204" pitchFamily="34" charset="0"/>
+                <a:cs typeface="Open Sans" panose="020B0606030504020204" pitchFamily="34" charset="0"/>
+              </a:rPr>
+              <a:t>Advantages</a:t>
+            </a:r>
+            <a:endParaRPr lang="en-AU" sz="2800" dirty="0">
+              <a:solidFill>
+                <a:srgbClr val="EEEEEE"/>
+              </a:solidFill>
+              <a:latin typeface="Open Sans" panose="020B0606030504020204" pitchFamily="34" charset="0"/>
+              <a:ea typeface="Open Sans" panose="020B0606030504020204" pitchFamily="34" charset="0"/>
+              <a:cs typeface="Open Sans" panose="020B0606030504020204" pitchFamily="34" charset="0"/>
+            </a:endParaRPr>
+          </a:p>
+        </p:txBody>
+      </p:sp>
+      <p:sp>
+        <p:nvSpPr>
+          <p:cNvPr id="6" name="Title 3"/>
+          <p:cNvSpPr txBox="1">
+            <a:spLocks/>
+          </p:cNvSpPr>
+          <p:nvPr/>
+        </p:nvSpPr>
+        <p:spPr>
+          <a:xfrm>
+            <a:off x="1524001" y="2230361"/>
+            <a:ext cx="9144000" cy="511630"/>
+          </a:xfrm>
+          <a:prstGeom prst="rect">
+            <a:avLst/>
+          </a:prstGeom>
+        </p:spPr>
+        <p:txBody>
+          <a:bodyPr vert="horz" lIns="91440" tIns="45720" rIns="91440" bIns="45720" rtlCol="0" anchor="t">
+            <a:normAutofit lnSpcReduction="10000"/>
+          </a:bodyPr>
+          <a:lstStyle>
+            <a:lvl1pPr algn="ctr" defTabSz="914400" rtl="0" eaLnBrk="1" latinLnBrk="0" hangingPunct="1">
+              <a:lnSpc>
+                <a:spcPct val="90000"/>
+              </a:lnSpc>
+              <a:spcBef>
+                <a:spcPct val="0"/>
+              </a:spcBef>
+              <a:buNone/>
+              <a:defRPr sz="6000" kern="1200">
+                <a:solidFill>
+                  <a:schemeClr val="tx1"/>
+                </a:solidFill>
+                <a:latin typeface="+mj-lt"/>
+                <a:ea typeface="+mj-ea"/>
+                <a:cs typeface="+mj-cs"/>
+              </a:defRPr>
+            </a:lvl1pPr>
+          </a:lstStyle>
+          <a:p>
+            <a:pPr algn="l">
+              <a:lnSpc>
+                <a:spcPct val="100000"/>
+              </a:lnSpc>
+            </a:pPr>
+            <a:r>
+              <a:rPr lang="en-AU" sz="2800" dirty="0" smtClean="0">
+                <a:solidFill>
+                  <a:srgbClr val="111111"/>
+                </a:solidFill>
+                <a:latin typeface="Open Sans" panose="020B0606030504020204" pitchFamily="34" charset="0"/>
+                <a:ea typeface="Open Sans" panose="020B0606030504020204" pitchFamily="34" charset="0"/>
+                <a:cs typeface="Open Sans" panose="020B0606030504020204" pitchFamily="34" charset="0"/>
+              </a:rPr>
+              <a:t>separator</a:t>
+            </a:r>
+          </a:p>
+        </p:txBody>
+      </p:sp>
+      <p:sp>
+        <p:nvSpPr>
+          <p:cNvPr id="2" name="TextBox 1"/>
+          <p:cNvSpPr txBox="1"/>
+          <p:nvPr/>
+        </p:nvSpPr>
+        <p:spPr>
+          <a:xfrm>
+            <a:off x="1524000" y="2741991"/>
+            <a:ext cx="9144000" cy="2492990"/>
+          </a:xfrm>
+          <a:prstGeom prst="rect">
+            <a:avLst/>
+          </a:prstGeom>
+          <a:noFill/>
+        </p:spPr>
+        <p:txBody>
+          <a:bodyPr wrap="square" rtlCol="0">
+            <a:spAutoFit/>
+          </a:bodyPr>
+          <a:lstStyle/>
+          <a:p>
+            <a:pPr marL="285750" indent="-285750">
+              <a:buFont typeface="Arial" panose="020B0604020202020204" pitchFamily="34" charset="0"/>
+              <a:buChar char="•"/>
+            </a:pPr>
+            <a:r>
+              <a:rPr lang="en-AU" sz="2600" dirty="0" smtClean="0">
+                <a:solidFill>
+                  <a:srgbClr val="EEEEEE"/>
+                </a:solidFill>
+                <a:latin typeface="Open Sans" panose="020B0606030504020204" pitchFamily="34" charset="0"/>
+                <a:ea typeface="Open Sans" panose="020B0606030504020204" pitchFamily="34" charset="0"/>
+                <a:cs typeface="Open Sans" panose="020B0606030504020204" pitchFamily="34" charset="0"/>
+              </a:rPr>
+              <a:t>Standard users are not able to install software</a:t>
+            </a:r>
+          </a:p>
+          <a:p>
+            <a:pPr marL="742950" lvl="1" indent="-285750">
+              <a:buFont typeface="Arial" panose="020B0604020202020204" pitchFamily="34" charset="0"/>
+              <a:buChar char="•"/>
+            </a:pPr>
+            <a:r>
+              <a:rPr lang="en-AU" sz="2600" dirty="0" smtClean="0">
+                <a:solidFill>
+                  <a:srgbClr val="EEEEEE"/>
+                </a:solidFill>
+                <a:latin typeface="Open Sans" panose="020B0606030504020204" pitchFamily="34" charset="0"/>
+                <a:ea typeface="Open Sans" panose="020B0606030504020204" pitchFamily="34" charset="0"/>
+                <a:cs typeface="Open Sans" panose="020B0606030504020204" pitchFamily="34" charset="0"/>
+              </a:rPr>
+              <a:t>May mitigate malware propagation</a:t>
+            </a:r>
+          </a:p>
+          <a:p>
+            <a:pPr marL="285750" indent="-285750">
+              <a:buFont typeface="Arial" panose="020B0604020202020204" pitchFamily="34" charset="0"/>
+              <a:buChar char="•"/>
+            </a:pPr>
+            <a:r>
+              <a:rPr lang="en-AU" sz="2600" dirty="0" smtClean="0">
+                <a:solidFill>
+                  <a:srgbClr val="EEEEEE"/>
+                </a:solidFill>
+                <a:latin typeface="Open Sans" panose="020B0606030504020204" pitchFamily="34" charset="0"/>
+                <a:ea typeface="Open Sans" panose="020B0606030504020204" pitchFamily="34" charset="0"/>
+                <a:cs typeface="Open Sans" panose="020B0606030504020204" pitchFamily="34" charset="0"/>
+              </a:rPr>
+              <a:t>Require administrator permission to make any system changes</a:t>
+            </a:r>
+          </a:p>
+          <a:p>
+            <a:pPr marL="742950" lvl="1" indent="-285750">
+              <a:buFont typeface="Arial" panose="020B0604020202020204" pitchFamily="34" charset="0"/>
+              <a:buChar char="•"/>
+            </a:pPr>
+            <a:r>
+              <a:rPr lang="en-AU" sz="2600" dirty="0" smtClean="0">
+                <a:solidFill>
+                  <a:srgbClr val="EEEEEE"/>
+                </a:solidFill>
+                <a:latin typeface="Open Sans" panose="020B0606030504020204" pitchFamily="34" charset="0"/>
+                <a:ea typeface="Open Sans" panose="020B0606030504020204" pitchFamily="34" charset="0"/>
+                <a:cs typeface="Open Sans" panose="020B0606030504020204" pitchFamily="34" charset="0"/>
+              </a:rPr>
+              <a:t>May mitigate malware/viruses that make changes to system settings</a:t>
+            </a:r>
+            <a:endParaRPr lang="en-AU" sz="2600" dirty="0" smtClean="0">
+              <a:solidFill>
+                <a:srgbClr val="EEEEEE"/>
+              </a:solidFill>
+              <a:latin typeface="Open Sans" panose="020B0606030504020204" pitchFamily="34" charset="0"/>
+              <a:ea typeface="Open Sans" panose="020B0606030504020204" pitchFamily="34" charset="0"/>
+              <a:cs typeface="Open Sans" panose="020B0606030504020204" pitchFamily="34" charset="0"/>
+            </a:endParaRPr>
+          </a:p>
+        </p:txBody>
+      </p:sp>
+    </p:spTree>
+    <p:extLst>
+      <p:ext uri="{BB962C8B-B14F-4D97-AF65-F5344CB8AC3E}">
+        <p14:creationId xmlns:p14="http://schemas.microsoft.com/office/powerpoint/2010/main" val="1029629349"/>
+      </p:ext>
+    </p:extLst>
+  </p:cSld>
+  <p:clrMapOvr>
+    <a:masterClrMapping/>
+  </p:clrMapOvr>
+  <p:transition spd="slow">
+    <p:push/>
+  </p:transition>
+  <p:timing>
+    <p:tnLst>
+      <p:par>
+        <p:cTn id="1" dur="indefinite" restart="never" nodeType="tmRoot"/>
+      </p:par>
+    </p:tnLst>
+  </p:timing>
+</p:sld>
+</file>
+
+<file path=ppt/slides/slide62.xml><?xml version="1.0" encoding="utf-8"?>
+<p:sld xmlns:a="http://schemas.openxmlformats.org/drawingml/2006/main" xmlns:r="http://schemas.openxmlformats.org/officeDocument/2006/relationships" xmlns:p="http://schemas.openxmlformats.org/presentationml/2006/main">
+  <p:cSld>
+    <p:bg>
+      <p:bgPr>
+        <a:solidFill>
+          <a:srgbClr val="111111"/>
+        </a:solidFill>
+        <a:effectLst/>
+      </p:bgPr>
+    </p:bg>
+    <p:spTree>
+      <p:nvGrpSpPr>
+        <p:cNvPr id="1" name=""/>
+        <p:cNvGrpSpPr/>
+        <p:nvPr/>
+      </p:nvGrpSpPr>
+      <p:grpSpPr>
+        <a:xfrm>
+          <a:off x="0" y="0"/>
+          <a:ext cx="0" cy="0"/>
+          <a:chOff x="0" y="0"/>
+          <a:chExt cx="0" cy="0"/>
+        </a:xfrm>
+      </p:grpSpPr>
+      <p:sp>
+        <p:nvSpPr>
+          <p:cNvPr id="4" name="Title 3"/>
+          <p:cNvSpPr>
+            <a:spLocks noGrp="1"/>
+          </p:cNvSpPr>
+          <p:nvPr>
+            <p:ph type="ctrTitle"/>
+          </p:nvPr>
+        </p:nvSpPr>
+        <p:spPr>
+          <a:xfrm>
+            <a:off x="1524000" y="1"/>
+            <a:ext cx="9144000" cy="970843"/>
+          </a:xfrm>
+        </p:spPr>
+        <p:txBody>
+          <a:bodyPr anchor="b">
+            <a:normAutofit/>
+          </a:bodyPr>
+          <a:lstStyle/>
+          <a:p>
+            <a:pPr algn="l"/>
+            <a:r>
+              <a:rPr lang="en-AU" sz="4400" b="1" dirty="0" smtClean="0">
+                <a:solidFill>
+                  <a:srgbClr val="EEEEEE"/>
+                </a:solidFill>
+                <a:latin typeface="Open Sans" panose="020B0606030504020204" pitchFamily="34" charset="0"/>
+                <a:ea typeface="Open Sans" panose="020B0606030504020204" pitchFamily="34" charset="0"/>
+                <a:cs typeface="Open Sans" panose="020B0606030504020204" pitchFamily="34" charset="0"/>
+              </a:rPr>
+              <a:t>References</a:t>
+            </a:r>
+            <a:endParaRPr lang="en-AU" sz="2800" dirty="0">
+              <a:solidFill>
+                <a:srgbClr val="EEEEEE"/>
+              </a:solidFill>
+              <a:latin typeface="Open Sans" panose="020B0606030504020204" pitchFamily="34" charset="0"/>
+              <a:ea typeface="Open Sans" panose="020B0606030504020204" pitchFamily="34" charset="0"/>
+              <a:cs typeface="Open Sans" panose="020B0606030504020204" pitchFamily="34" charset="0"/>
+            </a:endParaRPr>
+          </a:p>
+        </p:txBody>
+      </p:sp>
+      <p:sp>
+        <p:nvSpPr>
+          <p:cNvPr id="5" name="Title 3"/>
+          <p:cNvSpPr txBox="1">
+            <a:spLocks/>
+          </p:cNvSpPr>
+          <p:nvPr/>
+        </p:nvSpPr>
+        <p:spPr>
+          <a:xfrm>
+            <a:off x="338667" y="970844"/>
+            <a:ext cx="11514666" cy="5339645"/>
+          </a:xfrm>
+          <a:prstGeom prst="rect">
+            <a:avLst/>
+          </a:prstGeom>
+        </p:spPr>
+        <p:txBody>
+          <a:bodyPr vert="horz" lIns="91440" tIns="45720" rIns="91440" bIns="45720" rtlCol="0" anchor="t">
+            <a:normAutofit/>
+          </a:bodyPr>
+          <a:lstStyle>
+            <a:lvl1pPr algn="ctr" defTabSz="914400" rtl="0" eaLnBrk="1" latinLnBrk="0" hangingPunct="1">
+              <a:lnSpc>
+                <a:spcPct val="90000"/>
+              </a:lnSpc>
+              <a:spcBef>
+                <a:spcPct val="0"/>
+              </a:spcBef>
+              <a:buNone/>
+              <a:defRPr sz="6000" kern="1200">
+                <a:solidFill>
+                  <a:schemeClr val="tx1"/>
+                </a:solidFill>
+                <a:latin typeface="+mj-lt"/>
+                <a:ea typeface="+mj-ea"/>
+                <a:cs typeface="+mj-cs"/>
+              </a:defRPr>
+            </a:lvl1pPr>
+          </a:lstStyle>
+          <a:p>
+            <a:pPr marL="457200" indent="-457200" algn="l">
+              <a:lnSpc>
+                <a:spcPct val="100000"/>
+              </a:lnSpc>
+              <a:buFont typeface="Arial" panose="020B0604020202020204" pitchFamily="34" charset="0"/>
+              <a:buChar char="•"/>
+            </a:pPr>
+            <a:r>
+              <a:rPr lang="en-AU" sz="2000" dirty="0">
+                <a:solidFill>
+                  <a:srgbClr val="EEEEEE"/>
+                </a:solidFill>
+                <a:latin typeface="Open Sans" panose="020B0606030504020204" pitchFamily="34" charset="0"/>
+                <a:ea typeface="Open Sans" panose="020B0606030504020204" pitchFamily="34" charset="0"/>
+                <a:cs typeface="Open Sans" panose="020B0606030504020204" pitchFamily="34" charset="0"/>
+              </a:rPr>
+              <a:t>Microsoft. (2015). Microsoft Support Lifecycle. Microsoft. Retrieved February 27, 2015, from http://support.microsoft.com/lifecycle/search/default.aspx?alpha=Vista</a:t>
+            </a:r>
+          </a:p>
+        </p:txBody>
+      </p:sp>
+    </p:spTree>
+    <p:extLst>
+      <p:ext uri="{BB962C8B-B14F-4D97-AF65-F5344CB8AC3E}">
+        <p14:creationId xmlns:p14="http://schemas.microsoft.com/office/powerpoint/2010/main" val="636747076"/>
       </p:ext>
     </p:extLst>
   </p:cSld>

</xml_diff>

<commit_message>
CSI1101 A2: started uac section
</commit_message>
<xml_diff>
--- a/year_1/sem_2/CSI1101_computer_security/0b_assignment_2_[22MAY15_0900]/dev/CSI1101_PONCE_A2_v01.pptx
+++ b/year_1/sem_2/CSI1101_computer_security/0b_assignment_2_[22MAY15_0900]/dev/CSI1101_PONCE_A2_v01.pptx
@@ -66,7 +66,10 @@
     <p:sldId id="317" r:id="rId60"/>
     <p:sldId id="318" r:id="rId61"/>
     <p:sldId id="276" r:id="rId62"/>
-    <p:sldId id="272" r:id="rId63"/>
+    <p:sldId id="320" r:id="rId63"/>
+    <p:sldId id="321" r:id="rId64"/>
+    <p:sldId id="322" r:id="rId65"/>
+    <p:sldId id="272" r:id="rId66"/>
   </p:sldIdLst>
   <p:sldSz cx="12192000" cy="6858000"/>
   <p:notesSz cx="6858000" cy="9144000"/>
@@ -14377,38 +14380,8 @@
                 <a:ea typeface="Open Sans" panose="020B0606030504020204" pitchFamily="34" charset="0"/>
                 <a:cs typeface="Open Sans" panose="020B0606030504020204" pitchFamily="34" charset="0"/>
               </a:rPr>
-              <a:t>When the computer is turned on, requiring the user to authentica</a:t>
-            </a:r>
-            <a:r>
-              <a:rPr lang="en-AU" sz="2600" dirty="0" smtClean="0">
-                <a:solidFill>
-                  <a:srgbClr val="EEEEEE"/>
-                </a:solidFill>
-                <a:latin typeface="Open Sans" panose="020B0606030504020204" pitchFamily="34" charset="0"/>
-                <a:ea typeface="Open Sans" panose="020B0606030504020204" pitchFamily="34" charset="0"/>
-                <a:cs typeface="Open Sans" panose="020B0606030504020204" pitchFamily="34" charset="0"/>
-              </a:rPr>
-              <a:t>te </a:t>
-            </a:r>
-            <a:r>
-              <a:rPr lang="en-AU" sz="2600" dirty="0" smtClean="0">
-                <a:solidFill>
-                  <a:srgbClr val="EEEEEE"/>
-                </a:solidFill>
-                <a:latin typeface="Open Sans" panose="020B0606030504020204" pitchFamily="34" charset="0"/>
-                <a:ea typeface="Open Sans" panose="020B0606030504020204" pitchFamily="34" charset="0"/>
-                <a:cs typeface="Open Sans" panose="020B0606030504020204" pitchFamily="34" charset="0"/>
-              </a:rPr>
-              <a:t>before being able to continue</a:t>
-            </a:r>
-            <a:endParaRPr lang="en-AU" sz="2600" dirty="0" smtClean="0">
-              <a:solidFill>
-                <a:srgbClr val="EEEEEE"/>
-              </a:solidFill>
-              <a:latin typeface="Open Sans" panose="020B0606030504020204" pitchFamily="34" charset="0"/>
-              <a:ea typeface="Open Sans" panose="020B0606030504020204" pitchFamily="34" charset="0"/>
-              <a:cs typeface="Open Sans" panose="020B0606030504020204" pitchFamily="34" charset="0"/>
-            </a:endParaRPr>
+              <a:t>When the computer is turned on, requiring the user to authenticate before being able to continue</a:t>
+            </a:r>
           </a:p>
         </p:txBody>
       </p:sp>
@@ -15188,18 +15161,7 @@
                 <a:ea typeface="Open Sans" panose="020B0606030504020204" pitchFamily="34" charset="0"/>
                 <a:cs typeface="Open Sans" panose="020B0606030504020204" pitchFamily="34" charset="0"/>
               </a:rPr>
-              <a:t>It will prompt the user to log in with their correct </a:t>
-            </a:r>
-            <a:r>
-              <a:rPr lang="en-AU" sz="2600" dirty="0" smtClean="0">
-                <a:solidFill>
-                  <a:srgbClr val="EEEEEE"/>
-                </a:solidFill>
-                <a:latin typeface="Open Sans" panose="020B0606030504020204" pitchFamily="34" charset="0"/>
-                <a:ea typeface="Open Sans" panose="020B0606030504020204" pitchFamily="34" charset="0"/>
-                <a:cs typeface="Open Sans" panose="020B0606030504020204" pitchFamily="34" charset="0"/>
-              </a:rPr>
-              <a:t>password</a:t>
+              <a:t>It will prompt the user to log in with their correct password</a:t>
             </a:r>
           </a:p>
           <a:p>
@@ -15218,14 +15180,6 @@
               </a:rPr>
               <a:t>User must authenticate before gaining access to the computer again</a:t>
             </a:r>
-            <a:endParaRPr lang="en-AU" sz="2600" dirty="0" smtClean="0">
-              <a:solidFill>
-                <a:srgbClr val="EEEEEE"/>
-              </a:solidFill>
-              <a:latin typeface="Open Sans" panose="020B0606030504020204" pitchFamily="34" charset="0"/>
-              <a:ea typeface="Open Sans" panose="020B0606030504020204" pitchFamily="34" charset="0"/>
-              <a:cs typeface="Open Sans" panose="020B0606030504020204" pitchFamily="34" charset="0"/>
-            </a:endParaRPr>
           </a:p>
         </p:txBody>
       </p:sp>
@@ -15515,14 +15469,6 @@
               </a:rPr>
               <a:t>May lead to users writing down their password in plain-text (physical or digital)</a:t>
             </a:r>
-            <a:endParaRPr lang="en-AU" sz="2600" dirty="0" smtClean="0">
-              <a:solidFill>
-                <a:srgbClr val="EEEEEE"/>
-              </a:solidFill>
-              <a:latin typeface="Open Sans" panose="020B0606030504020204" pitchFamily="34" charset="0"/>
-              <a:ea typeface="Open Sans" panose="020B0606030504020204" pitchFamily="34" charset="0"/>
-              <a:cs typeface="Open Sans" panose="020B0606030504020204" pitchFamily="34" charset="0"/>
-            </a:endParaRPr>
           </a:p>
         </p:txBody>
       </p:sp>
@@ -15746,18 +15692,7 @@
                 <a:ea typeface="Open Sans" panose="020B0606030504020204" pitchFamily="34" charset="0"/>
                 <a:cs typeface="Open Sans" panose="020B0606030504020204" pitchFamily="34" charset="0"/>
               </a:rPr>
-              <a:t> v</a:t>
-            </a:r>
-            <a:r>
-              <a:rPr lang="en-AU" sz="2600" dirty="0" smtClean="0">
-                <a:solidFill>
-                  <a:srgbClr val="EEEEEE"/>
-                </a:solidFill>
-                <a:latin typeface="Open Sans" panose="020B0606030504020204" pitchFamily="34" charset="0"/>
-                <a:ea typeface="Open Sans" panose="020B0606030504020204" pitchFamily="34" charset="0"/>
-                <a:cs typeface="Open Sans" panose="020B0606030504020204" pitchFamily="34" charset="0"/>
-              </a:rPr>
-              <a:t>ideo on next slide demonstrates how to choose a strong, memorable password with passphrases</a:t>
+              <a:t> video on next slide demonstrates how to choose a strong, memorable password with passphrases</a:t>
             </a:r>
             <a:r>
               <a:rPr lang="en-AU" sz="2600" dirty="0">
@@ -16317,18 +16252,7 @@
                 <a:ea typeface="Open Sans" panose="020B0606030504020204" pitchFamily="34" charset="0"/>
                 <a:cs typeface="Open Sans" panose="020B0606030504020204" pitchFamily="34" charset="0"/>
               </a:rPr>
-              <a:t>Effective p</a:t>
-            </a:r>
-            <a:r>
-              <a:rPr lang="en-AU" sz="4400" b="1" dirty="0" smtClean="0">
-                <a:solidFill>
-                  <a:srgbClr val="EEEEEE"/>
-                </a:solidFill>
-                <a:latin typeface="Open Sans" panose="020B0606030504020204" pitchFamily="34" charset="0"/>
-                <a:ea typeface="Open Sans" panose="020B0606030504020204" pitchFamily="34" charset="0"/>
-                <a:cs typeface="Open Sans" panose="020B0606030504020204" pitchFamily="34" charset="0"/>
-              </a:rPr>
-              <a:t>assword policy</a:t>
+              <a:t>Effective password policy</a:t>
             </a:r>
             <a:endParaRPr lang="en-AU" sz="3200" dirty="0">
               <a:solidFill>
@@ -16541,14 +16465,6 @@
               </a:rPr>
               <a:t>Blue Ink can adapt this password policy for their own requirements</a:t>
             </a:r>
-            <a:endParaRPr lang="en-AU" sz="2600" dirty="0" smtClean="0">
-              <a:solidFill>
-                <a:srgbClr val="EEEEEE"/>
-              </a:solidFill>
-              <a:latin typeface="Open Sans" panose="020B0606030504020204" pitchFamily="34" charset="0"/>
-              <a:ea typeface="Open Sans" panose="020B0606030504020204" pitchFamily="34" charset="0"/>
-              <a:cs typeface="Open Sans" panose="020B0606030504020204" pitchFamily="34" charset="0"/>
-            </a:endParaRPr>
           </a:p>
         </p:txBody>
       </p:sp>
@@ -16759,14 +16675,6 @@
               </a:rPr>
               <a:t>Like user “green” did in “My Documents” folder</a:t>
             </a:r>
-            <a:endParaRPr lang="en-AU" sz="2600" dirty="0" smtClean="0">
-              <a:solidFill>
-                <a:srgbClr val="EEEEEE"/>
-              </a:solidFill>
-              <a:latin typeface="Open Sans" panose="020B0606030504020204" pitchFamily="34" charset="0"/>
-              <a:ea typeface="Open Sans" panose="020B0606030504020204" pitchFamily="34" charset="0"/>
-              <a:cs typeface="Open Sans" panose="020B0606030504020204" pitchFamily="34" charset="0"/>
-            </a:endParaRPr>
           </a:p>
         </p:txBody>
       </p:sp>
@@ -17118,14 +17026,6 @@
               </a:rPr>
               <a:t>Local attacker can easily retrieve your written passwords too</a:t>
             </a:r>
-            <a:endParaRPr lang="en-AU" sz="2600" dirty="0" smtClean="0">
-              <a:solidFill>
-                <a:srgbClr val="EEEEEE"/>
-              </a:solidFill>
-              <a:latin typeface="Open Sans" panose="020B0606030504020204" pitchFamily="34" charset="0"/>
-              <a:ea typeface="Open Sans" panose="020B0606030504020204" pitchFamily="34" charset="0"/>
-              <a:cs typeface="Open Sans" panose="020B0606030504020204" pitchFamily="34" charset="0"/>
-            </a:endParaRPr>
           </a:p>
         </p:txBody>
       </p:sp>
@@ -17805,102 +17705,7 @@
                 <a:ea typeface="Open Sans" panose="020B0606030504020204" pitchFamily="34" charset="0"/>
                 <a:cs typeface="Open Sans" panose="020B0606030504020204" pitchFamily="34" charset="0"/>
               </a:rPr>
-              <a:t>Install </a:t>
-            </a:r>
-            <a:r>
-              <a:rPr lang="en-AU" sz="2600" b="1" dirty="0" smtClean="0">
-                <a:solidFill>
-                  <a:srgbClr val="EEEEEE"/>
-                </a:solidFill>
-                <a:latin typeface="Open Sans" panose="020B0606030504020204" pitchFamily="34" charset="0"/>
-                <a:ea typeface="Open Sans" panose="020B0606030504020204" pitchFamily="34" charset="0"/>
-                <a:cs typeface="Open Sans" panose="020B0606030504020204" pitchFamily="34" charset="0"/>
-              </a:rPr>
-              <a:t>any</a:t>
-            </a:r>
-            <a:r>
-              <a:rPr lang="en-AU" sz="2600" dirty="0" smtClean="0">
-                <a:solidFill>
-                  <a:srgbClr val="EEEEEE"/>
-                </a:solidFill>
-                <a:latin typeface="Open Sans" panose="020B0606030504020204" pitchFamily="34" charset="0"/>
-                <a:ea typeface="Open Sans" panose="020B0606030504020204" pitchFamily="34" charset="0"/>
-                <a:cs typeface="Open Sans" panose="020B0606030504020204" pitchFamily="34" charset="0"/>
-              </a:rPr>
-              <a:t> software</a:t>
-            </a:r>
-          </a:p>
-          <a:p>
-            <a:pPr marL="742950" lvl="1" indent="-285750">
-              <a:buFont typeface="Arial" panose="020B0604020202020204" pitchFamily="34" charset="0"/>
-              <a:buChar char="•"/>
-            </a:pPr>
-            <a:r>
-              <a:rPr lang="en-AU" sz="2600" dirty="0" smtClean="0">
-                <a:solidFill>
-                  <a:srgbClr val="EEEEEE"/>
-                </a:solidFill>
-                <a:latin typeface="Open Sans" panose="020B0606030504020204" pitchFamily="34" charset="0"/>
-                <a:ea typeface="Open Sans" panose="020B0606030504020204" pitchFamily="34" charset="0"/>
-                <a:cs typeface="Open Sans" panose="020B0606030504020204" pitchFamily="34" charset="0"/>
-              </a:rPr>
-              <a:t>Make critical system wide changes to settings</a:t>
-            </a:r>
-          </a:p>
-          <a:p>
-            <a:pPr marL="1200150" lvl="2" indent="-285750">
-              <a:buFont typeface="Arial" panose="020B0604020202020204" pitchFamily="34" charset="0"/>
-              <a:buChar char="•"/>
-            </a:pPr>
-            <a:r>
-              <a:rPr lang="en-AU" sz="2600" dirty="0" err="1">
-                <a:solidFill>
-                  <a:srgbClr val="EEEEEE"/>
-                </a:solidFill>
-                <a:latin typeface="Open Sans" panose="020B0606030504020204" pitchFamily="34" charset="0"/>
-                <a:ea typeface="Open Sans" panose="020B0606030504020204" pitchFamily="34" charset="0"/>
-                <a:cs typeface="Open Sans" panose="020B0606030504020204" pitchFamily="34" charset="0"/>
-              </a:rPr>
-              <a:t>i</a:t>
-            </a:r>
-            <a:r>
-              <a:rPr lang="en-AU" sz="2600" dirty="0" err="1" smtClean="0">
-                <a:solidFill>
-                  <a:srgbClr val="EEEEEE"/>
-                </a:solidFill>
-                <a:latin typeface="Open Sans" panose="020B0606030504020204" pitchFamily="34" charset="0"/>
-                <a:ea typeface="Open Sans" panose="020B0606030504020204" pitchFamily="34" charset="0"/>
-                <a:cs typeface="Open Sans" panose="020B0606030504020204" pitchFamily="34" charset="0"/>
-              </a:rPr>
-              <a:t>e</a:t>
-            </a:r>
-            <a:r>
-              <a:rPr lang="en-AU" sz="2600" dirty="0" smtClean="0">
-                <a:solidFill>
-                  <a:srgbClr val="EEEEEE"/>
-                </a:solidFill>
-                <a:latin typeface="Open Sans" panose="020B0606030504020204" pitchFamily="34" charset="0"/>
-                <a:ea typeface="Open Sans" panose="020B0606030504020204" pitchFamily="34" charset="0"/>
-                <a:cs typeface="Open Sans" panose="020B0606030504020204" pitchFamily="34" charset="0"/>
-              </a:rPr>
-              <a:t>. Modify other user rights</a:t>
-            </a:r>
-          </a:p>
-          <a:p>
-            <a:pPr marL="285750" indent="-285750">
-              <a:buFont typeface="Arial" panose="020B0604020202020204" pitchFamily="34" charset="0"/>
-              <a:buChar char="•"/>
-            </a:pPr>
-            <a:r>
-              <a:rPr lang="en-AU" sz="2600" dirty="0" smtClean="0">
-                <a:solidFill>
-                  <a:srgbClr val="EEEEEE"/>
-                </a:solidFill>
-                <a:latin typeface="Open Sans" panose="020B0606030504020204" pitchFamily="34" charset="0"/>
-                <a:ea typeface="Open Sans" panose="020B0606030504020204" pitchFamily="34" charset="0"/>
-                <a:cs typeface="Open Sans" panose="020B0606030504020204" pitchFamily="34" charset="0"/>
-              </a:rPr>
-              <a:t>If a user with admin rights is attacked, the attacker may also inherit these privileges</a:t>
+              <a:t>Install/uninstall software/drivers</a:t>
             </a:r>
             <a:endParaRPr lang="en-AU" sz="2600" dirty="0" smtClean="0">
               <a:solidFill>
@@ -17910,6 +17715,79 @@
               <a:ea typeface="Open Sans" panose="020B0606030504020204" pitchFamily="34" charset="0"/>
               <a:cs typeface="Open Sans" panose="020B0606030504020204" pitchFamily="34" charset="0"/>
             </a:endParaRPr>
+          </a:p>
+          <a:p>
+            <a:pPr marL="742950" lvl="1" indent="-285750">
+              <a:buFont typeface="Arial" panose="020B0604020202020204" pitchFamily="34" charset="0"/>
+              <a:buChar char="•"/>
+            </a:pPr>
+            <a:r>
+              <a:rPr lang="en-AU" sz="2600" dirty="0" smtClean="0">
+                <a:solidFill>
+                  <a:srgbClr val="EEEEEE"/>
+                </a:solidFill>
+                <a:latin typeface="Open Sans" panose="020B0606030504020204" pitchFamily="34" charset="0"/>
+                <a:ea typeface="Open Sans" panose="020B0606030504020204" pitchFamily="34" charset="0"/>
+                <a:cs typeface="Open Sans" panose="020B0606030504020204" pitchFamily="34" charset="0"/>
+              </a:rPr>
+              <a:t>Make critical system wide changes to settings</a:t>
+            </a:r>
+          </a:p>
+          <a:p>
+            <a:pPr marL="1200150" lvl="2" indent="-285750">
+              <a:buFont typeface="Arial" panose="020B0604020202020204" pitchFamily="34" charset="0"/>
+              <a:buChar char="•"/>
+            </a:pPr>
+            <a:r>
+              <a:rPr lang="en-AU" sz="2600" dirty="0" err="1">
+                <a:solidFill>
+                  <a:srgbClr val="EEEEEE"/>
+                </a:solidFill>
+                <a:latin typeface="Open Sans" panose="020B0606030504020204" pitchFamily="34" charset="0"/>
+                <a:ea typeface="Open Sans" panose="020B0606030504020204" pitchFamily="34" charset="0"/>
+                <a:cs typeface="Open Sans" panose="020B0606030504020204" pitchFamily="34" charset="0"/>
+              </a:rPr>
+              <a:t>i</a:t>
+            </a:r>
+            <a:r>
+              <a:rPr lang="en-AU" sz="2600" dirty="0" err="1" smtClean="0">
+                <a:solidFill>
+                  <a:srgbClr val="EEEEEE"/>
+                </a:solidFill>
+                <a:latin typeface="Open Sans" panose="020B0606030504020204" pitchFamily="34" charset="0"/>
+                <a:ea typeface="Open Sans" panose="020B0606030504020204" pitchFamily="34" charset="0"/>
+                <a:cs typeface="Open Sans" panose="020B0606030504020204" pitchFamily="34" charset="0"/>
+              </a:rPr>
+              <a:t>e</a:t>
+            </a:r>
+            <a:r>
+              <a:rPr lang="en-AU" sz="2600" dirty="0" smtClean="0">
+                <a:solidFill>
+                  <a:srgbClr val="EEEEEE"/>
+                </a:solidFill>
+                <a:latin typeface="Open Sans" panose="020B0606030504020204" pitchFamily="34" charset="0"/>
+                <a:ea typeface="Open Sans" panose="020B0606030504020204" pitchFamily="34" charset="0"/>
+                <a:cs typeface="Open Sans" panose="020B0606030504020204" pitchFamily="34" charset="0"/>
+              </a:rPr>
+              <a:t>. Modify other user rights</a:t>
+            </a:r>
+          </a:p>
+          <a:p>
+            <a:pPr marL="285750" indent="-285750">
+              <a:buFont typeface="Arial" panose="020B0604020202020204" pitchFamily="34" charset="0"/>
+              <a:buChar char="•"/>
+            </a:pPr>
+            <a:r>
+              <a:rPr lang="en-AU" sz="2600" dirty="0" smtClean="0">
+                <a:solidFill>
+                  <a:srgbClr val="EEEEEE"/>
+                </a:solidFill>
+                <a:latin typeface="Open Sans" panose="020B0606030504020204" pitchFamily="34" charset="0"/>
+                <a:ea typeface="Open Sans" panose="020B0606030504020204" pitchFamily="34" charset="0"/>
+                <a:cs typeface="Open Sans" panose="020B0606030504020204" pitchFamily="34" charset="0"/>
+              </a:rPr>
+              <a:t>If a user with admin rights is attacked, the attacker may also inherit these privileges</a:t>
+            </a:r>
           </a:p>
         </p:txBody>
       </p:sp>
@@ -18339,18 +18217,7 @@
                 <a:ea typeface="Open Sans" panose="020B0606030504020204" pitchFamily="34" charset="0"/>
                 <a:cs typeface="Open Sans" panose="020B0606030504020204" pitchFamily="34" charset="0"/>
               </a:rPr>
-              <a:t>Click “Add or remove user accounts” </a:t>
-            </a:r>
-            <a:r>
-              <a:rPr lang="en-AU" sz="2600" dirty="0" smtClean="0">
-                <a:solidFill>
-                  <a:srgbClr val="EEEEEE"/>
-                </a:solidFill>
-                <a:latin typeface="Open Sans" panose="020B0606030504020204" pitchFamily="34" charset="0"/>
-                <a:ea typeface="Open Sans" panose="020B0606030504020204" pitchFamily="34" charset="0"/>
-                <a:cs typeface="Open Sans" panose="020B0606030504020204" pitchFamily="34" charset="0"/>
-              </a:rPr>
-              <a:t>in the Control Panel</a:t>
+              <a:t>Click “Add or remove user accounts” in the Control Panel</a:t>
             </a:r>
           </a:p>
         </p:txBody>
@@ -18528,27 +18395,8 @@
                 <a:ea typeface="Open Sans" panose="020B0606030504020204" pitchFamily="34" charset="0"/>
                 <a:cs typeface="Open Sans" panose="020B0606030504020204" pitchFamily="34" charset="0"/>
               </a:rPr>
-              <a:t>Click</a:t>
-            </a:r>
-            <a:r>
-              <a:rPr lang="en-AU" sz="2600" dirty="0" smtClean="0">
-                <a:solidFill>
-                  <a:srgbClr val="EEEEEE"/>
-                </a:solidFill>
-                <a:latin typeface="Open Sans" panose="020B0606030504020204" pitchFamily="34" charset="0"/>
-                <a:ea typeface="Open Sans" panose="020B0606030504020204" pitchFamily="34" charset="0"/>
-                <a:cs typeface="Open Sans" panose="020B0606030504020204" pitchFamily="34" charset="0"/>
-              </a:rPr>
-              <a:t> the account to be modified</a:t>
-            </a:r>
-            <a:endParaRPr lang="en-AU" sz="2600" dirty="0" smtClean="0">
-              <a:solidFill>
-                <a:srgbClr val="EEEEEE"/>
-              </a:solidFill>
-              <a:latin typeface="Open Sans" panose="020B0606030504020204" pitchFamily="34" charset="0"/>
-              <a:ea typeface="Open Sans" panose="020B0606030504020204" pitchFamily="34" charset="0"/>
-              <a:cs typeface="Open Sans" panose="020B0606030504020204" pitchFamily="34" charset="0"/>
-            </a:endParaRPr>
+              <a:t>Click the account to be modified</a:t>
+            </a:r>
           </a:p>
         </p:txBody>
       </p:sp>
@@ -18725,27 +18573,8 @@
                 <a:ea typeface="Open Sans" panose="020B0606030504020204" pitchFamily="34" charset="0"/>
                 <a:cs typeface="Open Sans" panose="020B0606030504020204" pitchFamily="34" charset="0"/>
               </a:rPr>
-              <a:t>Click</a:t>
-            </a:r>
-            <a:r>
-              <a:rPr lang="en-AU" sz="2600" dirty="0" smtClean="0">
-                <a:solidFill>
-                  <a:srgbClr val="EEEEEE"/>
-                </a:solidFill>
-                <a:latin typeface="Open Sans" panose="020B0606030504020204" pitchFamily="34" charset="0"/>
-                <a:ea typeface="Open Sans" panose="020B0606030504020204" pitchFamily="34" charset="0"/>
-                <a:cs typeface="Open Sans" panose="020B0606030504020204" pitchFamily="34" charset="0"/>
-              </a:rPr>
-              <a:t> “Change the account type”</a:t>
-            </a:r>
-            <a:endParaRPr lang="en-AU" sz="2600" dirty="0" smtClean="0">
-              <a:solidFill>
-                <a:srgbClr val="EEEEEE"/>
-              </a:solidFill>
-              <a:latin typeface="Open Sans" panose="020B0606030504020204" pitchFamily="34" charset="0"/>
-              <a:ea typeface="Open Sans" panose="020B0606030504020204" pitchFamily="34" charset="0"/>
-              <a:cs typeface="Open Sans" panose="020B0606030504020204" pitchFamily="34" charset="0"/>
-            </a:endParaRPr>
+              <a:t>Click “Change the account type”</a:t>
+            </a:r>
           </a:p>
         </p:txBody>
       </p:sp>
@@ -19016,14 +18845,6 @@
               </a:rPr>
               <a:t>Select “Standard user” and click “Change Account Type”</a:t>
             </a:r>
-            <a:endParaRPr lang="en-AU" sz="2600" dirty="0" smtClean="0">
-              <a:solidFill>
-                <a:srgbClr val="EEEEEE"/>
-              </a:solidFill>
-              <a:latin typeface="Open Sans" panose="020B0606030504020204" pitchFamily="34" charset="0"/>
-              <a:ea typeface="Open Sans" panose="020B0606030504020204" pitchFamily="34" charset="0"/>
-              <a:cs typeface="Open Sans" panose="020B0606030504020204" pitchFamily="34" charset="0"/>
-            </a:endParaRPr>
           </a:p>
         </p:txBody>
       </p:sp>
@@ -19298,14 +19119,6 @@
               </a:rPr>
               <a:t>May mitigate malware/viruses that make changes to system settings</a:t>
             </a:r>
-            <a:endParaRPr lang="en-AU" sz="2600" dirty="0" smtClean="0">
-              <a:solidFill>
-                <a:srgbClr val="EEEEEE"/>
-              </a:solidFill>
-              <a:latin typeface="Open Sans" panose="020B0606030504020204" pitchFamily="34" charset="0"/>
-              <a:ea typeface="Open Sans" panose="020B0606030504020204" pitchFamily="34" charset="0"/>
-              <a:cs typeface="Open Sans" panose="020B0606030504020204" pitchFamily="34" charset="0"/>
-            </a:endParaRPr>
           </a:p>
         </p:txBody>
       </p:sp>
@@ -19333,6 +19146,737 @@
 </file>
 
 <file path=ppt/slides/slide62.xml><?xml version="1.0" encoding="utf-8"?>
+<p:sld xmlns:a="http://schemas.openxmlformats.org/drawingml/2006/main" xmlns:r="http://schemas.openxmlformats.org/officeDocument/2006/relationships" xmlns:p="http://schemas.openxmlformats.org/presentationml/2006/main">
+  <p:cSld>
+    <p:bg>
+      <p:bgPr>
+        <a:solidFill>
+          <a:srgbClr val="111111"/>
+        </a:solidFill>
+        <a:effectLst/>
+      </p:bgPr>
+    </p:bg>
+    <p:spTree>
+      <p:nvGrpSpPr>
+        <p:cNvPr id="1" name=""/>
+        <p:cNvGrpSpPr/>
+        <p:nvPr/>
+      </p:nvGrpSpPr>
+      <p:grpSpPr>
+        <a:xfrm>
+          <a:off x="0" y="0"/>
+          <a:ext cx="0" cy="0"/>
+          <a:chOff x="0" y="0"/>
+          <a:chExt cx="0" cy="0"/>
+        </a:xfrm>
+      </p:grpSpPr>
+      <p:sp>
+        <p:nvSpPr>
+          <p:cNvPr id="4" name="Title 3"/>
+          <p:cNvSpPr>
+            <a:spLocks noGrp="1"/>
+          </p:cNvSpPr>
+          <p:nvPr>
+            <p:ph type="ctrTitle"/>
+          </p:nvPr>
+        </p:nvSpPr>
+        <p:spPr>
+          <a:xfrm>
+            <a:off x="1524000" y="-440267"/>
+            <a:ext cx="9144000" cy="2917370"/>
+          </a:xfrm>
+        </p:spPr>
+        <p:txBody>
+          <a:bodyPr anchor="b">
+            <a:normAutofit/>
+          </a:bodyPr>
+          <a:lstStyle/>
+          <a:p>
+            <a:pPr algn="l"/>
+            <a:r>
+              <a:rPr lang="en-AU" sz="4400" b="1" dirty="0" smtClean="0">
+                <a:solidFill>
+                  <a:srgbClr val="EEEEEE"/>
+                </a:solidFill>
+                <a:latin typeface="Open Sans" panose="020B0606030504020204" pitchFamily="34" charset="0"/>
+                <a:ea typeface="Open Sans" panose="020B0606030504020204" pitchFamily="34" charset="0"/>
+                <a:cs typeface="Open Sans" panose="020B0606030504020204" pitchFamily="34" charset="0"/>
+              </a:rPr>
+              <a:t>User Account Control</a:t>
+            </a:r>
+            <a:endParaRPr lang="en-AU" sz="3200" dirty="0">
+              <a:solidFill>
+                <a:srgbClr val="EEEEEE"/>
+              </a:solidFill>
+              <a:latin typeface="Open Sans" panose="020B0606030504020204" pitchFamily="34" charset="0"/>
+              <a:ea typeface="Open Sans" panose="020B0606030504020204" pitchFamily="34" charset="0"/>
+              <a:cs typeface="Open Sans" panose="020B0606030504020204" pitchFamily="34" charset="0"/>
+            </a:endParaRPr>
+          </a:p>
+        </p:txBody>
+      </p:sp>
+      <p:sp>
+        <p:nvSpPr>
+          <p:cNvPr id="6" name="Title 3"/>
+          <p:cNvSpPr txBox="1">
+            <a:spLocks/>
+          </p:cNvSpPr>
+          <p:nvPr/>
+        </p:nvSpPr>
+        <p:spPr>
+          <a:xfrm>
+            <a:off x="1524001" y="2477103"/>
+            <a:ext cx="9144000" cy="511630"/>
+          </a:xfrm>
+          <a:prstGeom prst="rect">
+            <a:avLst/>
+          </a:prstGeom>
+        </p:spPr>
+        <p:txBody>
+          <a:bodyPr vert="horz" lIns="91440" tIns="45720" rIns="91440" bIns="45720" rtlCol="0" anchor="t">
+            <a:normAutofit lnSpcReduction="10000"/>
+          </a:bodyPr>
+          <a:lstStyle>
+            <a:lvl1pPr algn="ctr" defTabSz="914400" rtl="0" eaLnBrk="1" latinLnBrk="0" hangingPunct="1">
+              <a:lnSpc>
+                <a:spcPct val="90000"/>
+              </a:lnSpc>
+              <a:spcBef>
+                <a:spcPct val="0"/>
+              </a:spcBef>
+              <a:buNone/>
+              <a:defRPr sz="6000" kern="1200">
+                <a:solidFill>
+                  <a:schemeClr val="tx1"/>
+                </a:solidFill>
+                <a:latin typeface="+mj-lt"/>
+                <a:ea typeface="+mj-ea"/>
+                <a:cs typeface="+mj-cs"/>
+              </a:defRPr>
+            </a:lvl1pPr>
+          </a:lstStyle>
+          <a:p>
+            <a:pPr algn="l">
+              <a:lnSpc>
+                <a:spcPct val="100000"/>
+              </a:lnSpc>
+            </a:pPr>
+            <a:r>
+              <a:rPr lang="en-AU" sz="2800" dirty="0" smtClean="0">
+                <a:solidFill>
+                  <a:srgbClr val="111111"/>
+                </a:solidFill>
+                <a:latin typeface="Open Sans" panose="020B0606030504020204" pitchFamily="34" charset="0"/>
+                <a:ea typeface="Open Sans" panose="020B0606030504020204" pitchFamily="34" charset="0"/>
+                <a:cs typeface="Open Sans" panose="020B0606030504020204" pitchFamily="34" charset="0"/>
+              </a:rPr>
+              <a:t>separator</a:t>
+            </a:r>
+          </a:p>
+        </p:txBody>
+      </p:sp>
+      <p:sp>
+        <p:nvSpPr>
+          <p:cNvPr id="2" name="TextBox 1"/>
+          <p:cNvSpPr txBox="1"/>
+          <p:nvPr/>
+        </p:nvSpPr>
+        <p:spPr>
+          <a:xfrm>
+            <a:off x="1524000" y="2988732"/>
+            <a:ext cx="9144000" cy="1692771"/>
+          </a:xfrm>
+          <a:prstGeom prst="rect">
+            <a:avLst/>
+          </a:prstGeom>
+          <a:noFill/>
+        </p:spPr>
+        <p:txBody>
+          <a:bodyPr wrap="square" rtlCol="0">
+            <a:spAutoFit/>
+          </a:bodyPr>
+          <a:lstStyle/>
+          <a:p>
+            <a:pPr marL="285750" indent="-285750">
+              <a:buFont typeface="Arial" panose="020B0604020202020204" pitchFamily="34" charset="0"/>
+              <a:buChar char="•"/>
+            </a:pPr>
+            <a:r>
+              <a:rPr lang="en-AU" sz="2600" dirty="0" smtClean="0">
+                <a:solidFill>
+                  <a:srgbClr val="EEEEEE"/>
+                </a:solidFill>
+                <a:latin typeface="Open Sans" panose="020B0606030504020204" pitchFamily="34" charset="0"/>
+                <a:ea typeface="Open Sans" panose="020B0606030504020204" pitchFamily="34" charset="0"/>
+                <a:cs typeface="Open Sans" panose="020B0606030504020204" pitchFamily="34" charset="0"/>
+              </a:rPr>
+              <a:t>Assists in protecting the computer by:</a:t>
+            </a:r>
+          </a:p>
+          <a:p>
+            <a:pPr marL="285750" indent="-285750">
+              <a:buFont typeface="Arial" panose="020B0604020202020204" pitchFamily="34" charset="0"/>
+              <a:buChar char="•"/>
+            </a:pPr>
+            <a:r>
+              <a:rPr lang="en-AU" sz="2600" dirty="0" smtClean="0">
+                <a:solidFill>
+                  <a:srgbClr val="EEEEEE"/>
+                </a:solidFill>
+                <a:latin typeface="Open Sans" panose="020B0606030504020204" pitchFamily="34" charset="0"/>
+                <a:ea typeface="Open Sans" panose="020B0606030504020204" pitchFamily="34" charset="0"/>
+                <a:cs typeface="Open Sans" panose="020B0606030504020204" pitchFamily="34" charset="0"/>
+              </a:rPr>
+              <a:t>Preventing unauthorized changes to the computer </a:t>
+            </a:r>
+            <a:r>
+              <a:rPr lang="en-AU" sz="2600" dirty="0" smtClean="0">
+                <a:solidFill>
+                  <a:srgbClr val="EEEEEE"/>
+                </a:solidFill>
+                <a:latin typeface="Open Sans" panose="020B0606030504020204" pitchFamily="34" charset="0"/>
+                <a:ea typeface="Open Sans" panose="020B0606030504020204" pitchFamily="34" charset="0"/>
+                <a:cs typeface="Open Sans" panose="020B0606030504020204" pitchFamily="34" charset="0"/>
+                <a:hlinkClick r:id="rId2"/>
+              </a:rPr>
+              <a:t>(Microsoft, </a:t>
+            </a:r>
+            <a:r>
+              <a:rPr lang="en-AU" sz="2600" dirty="0" err="1" smtClean="0">
+                <a:solidFill>
+                  <a:srgbClr val="EEEEEE"/>
+                </a:solidFill>
+                <a:latin typeface="Open Sans" panose="020B0606030504020204" pitchFamily="34" charset="0"/>
+                <a:ea typeface="Open Sans" panose="020B0606030504020204" pitchFamily="34" charset="0"/>
+                <a:cs typeface="Open Sans" panose="020B0606030504020204" pitchFamily="34" charset="0"/>
+                <a:hlinkClick r:id="rId2"/>
+              </a:rPr>
+              <a:t>n.d.</a:t>
+            </a:r>
+            <a:r>
+              <a:rPr lang="en-AU" sz="2600" dirty="0" smtClean="0">
+                <a:solidFill>
+                  <a:srgbClr val="EEEEEE"/>
+                </a:solidFill>
+                <a:latin typeface="Open Sans" panose="020B0606030504020204" pitchFamily="34" charset="0"/>
+                <a:ea typeface="Open Sans" panose="020B0606030504020204" pitchFamily="34" charset="0"/>
+                <a:cs typeface="Open Sans" panose="020B0606030504020204" pitchFamily="34" charset="0"/>
+                <a:hlinkClick r:id="rId2"/>
+              </a:rPr>
+              <a:t>)</a:t>
+            </a:r>
+            <a:endParaRPr lang="en-AU" sz="2600" dirty="0" smtClean="0">
+              <a:solidFill>
+                <a:srgbClr val="EEEEEE"/>
+              </a:solidFill>
+              <a:latin typeface="Open Sans" panose="020B0606030504020204" pitchFamily="34" charset="0"/>
+              <a:ea typeface="Open Sans" panose="020B0606030504020204" pitchFamily="34" charset="0"/>
+              <a:cs typeface="Open Sans" panose="020B0606030504020204" pitchFamily="34" charset="0"/>
+            </a:endParaRPr>
+          </a:p>
+          <a:p>
+            <a:pPr marL="285750" indent="-285750">
+              <a:buFont typeface="Arial" panose="020B0604020202020204" pitchFamily="34" charset="0"/>
+              <a:buChar char="•"/>
+            </a:pPr>
+            <a:r>
+              <a:rPr lang="en-AU" sz="2600" dirty="0" smtClean="0">
+                <a:solidFill>
+                  <a:srgbClr val="EEEEEE"/>
+                </a:solidFill>
+                <a:latin typeface="Open Sans" panose="020B0606030504020204" pitchFamily="34" charset="0"/>
+                <a:ea typeface="Open Sans" panose="020B0606030504020204" pitchFamily="34" charset="0"/>
+                <a:cs typeface="Open Sans" panose="020B0606030504020204" pitchFamily="34" charset="0"/>
+              </a:rPr>
+              <a:t>Currently disabled in Blue Ink’s computers</a:t>
+            </a:r>
+            <a:endParaRPr lang="en-AU" sz="2600" dirty="0" smtClean="0">
+              <a:solidFill>
+                <a:srgbClr val="EEEEEE"/>
+              </a:solidFill>
+              <a:latin typeface="Open Sans" panose="020B0606030504020204" pitchFamily="34" charset="0"/>
+              <a:ea typeface="Open Sans" panose="020B0606030504020204" pitchFamily="34" charset="0"/>
+              <a:cs typeface="Open Sans" panose="020B0606030504020204" pitchFamily="34" charset="0"/>
+            </a:endParaRPr>
+          </a:p>
+        </p:txBody>
+      </p:sp>
+    </p:spTree>
+    <p:extLst>
+      <p:ext uri="{BB962C8B-B14F-4D97-AF65-F5344CB8AC3E}">
+        <p14:creationId xmlns:p14="http://schemas.microsoft.com/office/powerpoint/2010/main" val="3206176223"/>
+      </p:ext>
+    </p:extLst>
+  </p:cSld>
+  <p:clrMapOvr>
+    <a:masterClrMapping/>
+  </p:clrMapOvr>
+  <p:transition spd="slow">
+    <p:push/>
+  </p:transition>
+  <p:timing>
+    <p:tnLst>
+      <p:par>
+        <p:cTn id="1" dur="indefinite" restart="never" nodeType="tmRoot"/>
+      </p:par>
+    </p:tnLst>
+  </p:timing>
+</p:sld>
+</file>
+
+<file path=ppt/slides/slide63.xml><?xml version="1.0" encoding="utf-8"?>
+<p:sld xmlns:a="http://schemas.openxmlformats.org/drawingml/2006/main" xmlns:r="http://schemas.openxmlformats.org/officeDocument/2006/relationships" xmlns:p="http://schemas.openxmlformats.org/presentationml/2006/main">
+  <p:cSld>
+    <p:bg>
+      <p:bgPr>
+        <a:solidFill>
+          <a:srgbClr val="111111"/>
+        </a:solidFill>
+        <a:effectLst/>
+      </p:bgPr>
+    </p:bg>
+    <p:spTree>
+      <p:nvGrpSpPr>
+        <p:cNvPr id="1" name=""/>
+        <p:cNvGrpSpPr/>
+        <p:nvPr/>
+      </p:nvGrpSpPr>
+      <p:grpSpPr>
+        <a:xfrm>
+          <a:off x="0" y="0"/>
+          <a:ext cx="0" cy="0"/>
+          <a:chOff x="0" y="0"/>
+          <a:chExt cx="0" cy="0"/>
+        </a:xfrm>
+      </p:grpSpPr>
+      <p:sp>
+        <p:nvSpPr>
+          <p:cNvPr id="4" name="Title 3"/>
+          <p:cNvSpPr>
+            <a:spLocks noGrp="1"/>
+          </p:cNvSpPr>
+          <p:nvPr>
+            <p:ph type="ctrTitle"/>
+          </p:nvPr>
+        </p:nvSpPr>
+        <p:spPr>
+          <a:xfrm>
+            <a:off x="1524000" y="0"/>
+            <a:ext cx="9144000" cy="2917370"/>
+          </a:xfrm>
+        </p:spPr>
+        <p:txBody>
+          <a:bodyPr anchor="b">
+            <a:normAutofit/>
+          </a:bodyPr>
+          <a:lstStyle/>
+          <a:p>
+            <a:pPr algn="l"/>
+            <a:r>
+              <a:rPr lang="en-AU" sz="4400" b="1" dirty="0" smtClean="0">
+                <a:solidFill>
+                  <a:srgbClr val="EEEEEE"/>
+                </a:solidFill>
+                <a:latin typeface="Open Sans" panose="020B0606030504020204" pitchFamily="34" charset="0"/>
+                <a:ea typeface="Open Sans" panose="020B0606030504020204" pitchFamily="34" charset="0"/>
+                <a:cs typeface="Open Sans" panose="020B0606030504020204" pitchFamily="34" charset="0"/>
+              </a:rPr>
+              <a:t>So how can we fix it?</a:t>
+            </a:r>
+            <a:endParaRPr lang="en-AU" sz="3200" dirty="0">
+              <a:solidFill>
+                <a:srgbClr val="EEEEEE"/>
+              </a:solidFill>
+              <a:latin typeface="Open Sans" panose="020B0606030504020204" pitchFamily="34" charset="0"/>
+              <a:ea typeface="Open Sans" panose="020B0606030504020204" pitchFamily="34" charset="0"/>
+              <a:cs typeface="Open Sans" panose="020B0606030504020204" pitchFamily="34" charset="0"/>
+            </a:endParaRPr>
+          </a:p>
+        </p:txBody>
+      </p:sp>
+      <p:sp>
+        <p:nvSpPr>
+          <p:cNvPr id="6" name="Title 3"/>
+          <p:cNvSpPr txBox="1">
+            <a:spLocks/>
+          </p:cNvSpPr>
+          <p:nvPr/>
+        </p:nvSpPr>
+        <p:spPr>
+          <a:xfrm>
+            <a:off x="1524001" y="2917370"/>
+            <a:ext cx="9144000" cy="511630"/>
+          </a:xfrm>
+          <a:prstGeom prst="rect">
+            <a:avLst/>
+          </a:prstGeom>
+        </p:spPr>
+        <p:txBody>
+          <a:bodyPr vert="horz" lIns="91440" tIns="45720" rIns="91440" bIns="45720" rtlCol="0" anchor="t">
+            <a:normAutofit lnSpcReduction="10000"/>
+          </a:bodyPr>
+          <a:lstStyle>
+            <a:lvl1pPr algn="ctr" defTabSz="914400" rtl="0" eaLnBrk="1" latinLnBrk="0" hangingPunct="1">
+              <a:lnSpc>
+                <a:spcPct val="90000"/>
+              </a:lnSpc>
+              <a:spcBef>
+                <a:spcPct val="0"/>
+              </a:spcBef>
+              <a:buNone/>
+              <a:defRPr sz="6000" kern="1200">
+                <a:solidFill>
+                  <a:schemeClr val="tx1"/>
+                </a:solidFill>
+                <a:latin typeface="+mj-lt"/>
+                <a:ea typeface="+mj-ea"/>
+                <a:cs typeface="+mj-cs"/>
+              </a:defRPr>
+            </a:lvl1pPr>
+          </a:lstStyle>
+          <a:p>
+            <a:pPr algn="l">
+              <a:lnSpc>
+                <a:spcPct val="100000"/>
+              </a:lnSpc>
+            </a:pPr>
+            <a:r>
+              <a:rPr lang="en-AU" sz="2800" dirty="0" smtClean="0">
+                <a:solidFill>
+                  <a:srgbClr val="111111"/>
+                </a:solidFill>
+                <a:latin typeface="Open Sans" panose="020B0606030504020204" pitchFamily="34" charset="0"/>
+                <a:ea typeface="Open Sans" panose="020B0606030504020204" pitchFamily="34" charset="0"/>
+                <a:cs typeface="Open Sans" panose="020B0606030504020204" pitchFamily="34" charset="0"/>
+              </a:rPr>
+              <a:t>separator</a:t>
+            </a:r>
+          </a:p>
+        </p:txBody>
+      </p:sp>
+      <p:sp>
+        <p:nvSpPr>
+          <p:cNvPr id="2" name="TextBox 1"/>
+          <p:cNvSpPr txBox="1"/>
+          <p:nvPr/>
+        </p:nvSpPr>
+        <p:spPr>
+          <a:xfrm>
+            <a:off x="1524000" y="3428999"/>
+            <a:ext cx="9144000" cy="492443"/>
+          </a:xfrm>
+          <a:prstGeom prst="rect">
+            <a:avLst/>
+          </a:prstGeom>
+          <a:noFill/>
+        </p:spPr>
+        <p:txBody>
+          <a:bodyPr wrap="square" rtlCol="0">
+            <a:spAutoFit/>
+          </a:bodyPr>
+          <a:lstStyle/>
+          <a:p>
+            <a:pPr marL="285750" indent="-285750">
+              <a:buFont typeface="Arial" panose="020B0604020202020204" pitchFamily="34" charset="0"/>
+              <a:buChar char="•"/>
+            </a:pPr>
+            <a:r>
+              <a:rPr lang="en-AU" sz="2600" dirty="0" smtClean="0">
+                <a:solidFill>
+                  <a:srgbClr val="EEEEEE"/>
+                </a:solidFill>
+                <a:latin typeface="Open Sans" panose="020B0606030504020204" pitchFamily="34" charset="0"/>
+                <a:ea typeface="Open Sans" panose="020B0606030504020204" pitchFamily="34" charset="0"/>
+                <a:cs typeface="Open Sans" panose="020B0606030504020204" pitchFamily="34" charset="0"/>
+              </a:rPr>
+              <a:t>Enable UAC</a:t>
+            </a:r>
+            <a:endParaRPr lang="en-AU" sz="2600" dirty="0" smtClean="0">
+              <a:solidFill>
+                <a:srgbClr val="EEEEEE"/>
+              </a:solidFill>
+              <a:latin typeface="Open Sans" panose="020B0606030504020204" pitchFamily="34" charset="0"/>
+              <a:ea typeface="Open Sans" panose="020B0606030504020204" pitchFamily="34" charset="0"/>
+              <a:cs typeface="Open Sans" panose="020B0606030504020204" pitchFamily="34" charset="0"/>
+            </a:endParaRPr>
+          </a:p>
+        </p:txBody>
+      </p:sp>
+    </p:spTree>
+    <p:extLst>
+      <p:ext uri="{BB962C8B-B14F-4D97-AF65-F5344CB8AC3E}">
+        <p14:creationId xmlns:p14="http://schemas.microsoft.com/office/powerpoint/2010/main" val="3468888091"/>
+      </p:ext>
+    </p:extLst>
+  </p:cSld>
+  <p:clrMapOvr>
+    <a:masterClrMapping/>
+  </p:clrMapOvr>
+  <p:transition spd="slow">
+    <p:push/>
+  </p:transition>
+  <p:timing>
+    <p:tnLst>
+      <p:par>
+        <p:cTn id="1" dur="indefinite" restart="never" nodeType="tmRoot"/>
+      </p:par>
+    </p:tnLst>
+  </p:timing>
+</p:sld>
+</file>
+
+<file path=ppt/slides/slide64.xml><?xml version="1.0" encoding="utf-8"?>
+<p:sld xmlns:a="http://schemas.openxmlformats.org/drawingml/2006/main" xmlns:r="http://schemas.openxmlformats.org/officeDocument/2006/relationships" xmlns:p="http://schemas.openxmlformats.org/presentationml/2006/main">
+  <p:cSld>
+    <p:bg>
+      <p:bgPr>
+        <a:solidFill>
+          <a:srgbClr val="111111"/>
+        </a:solidFill>
+        <a:effectLst/>
+      </p:bgPr>
+    </p:bg>
+    <p:spTree>
+      <p:nvGrpSpPr>
+        <p:cNvPr id="1" name=""/>
+        <p:cNvGrpSpPr/>
+        <p:nvPr/>
+      </p:nvGrpSpPr>
+      <p:grpSpPr>
+        <a:xfrm>
+          <a:off x="0" y="0"/>
+          <a:ext cx="0" cy="0"/>
+          <a:chOff x="0" y="0"/>
+          <a:chExt cx="0" cy="0"/>
+        </a:xfrm>
+      </p:grpSpPr>
+      <p:sp>
+        <p:nvSpPr>
+          <p:cNvPr id="4" name="Title 3"/>
+          <p:cNvSpPr>
+            <a:spLocks noGrp="1"/>
+          </p:cNvSpPr>
+          <p:nvPr>
+            <p:ph type="ctrTitle"/>
+          </p:nvPr>
+        </p:nvSpPr>
+        <p:spPr>
+          <a:xfrm>
+            <a:off x="1524000" y="-1470455"/>
+            <a:ext cx="9144000" cy="2917370"/>
+          </a:xfrm>
+        </p:spPr>
+        <p:txBody>
+          <a:bodyPr anchor="b">
+            <a:normAutofit/>
+          </a:bodyPr>
+          <a:lstStyle/>
+          <a:p>
+            <a:pPr algn="l"/>
+            <a:r>
+              <a:rPr lang="en-AU" sz="4400" b="1" dirty="0" smtClean="0">
+                <a:solidFill>
+                  <a:srgbClr val="EEEEEE"/>
+                </a:solidFill>
+                <a:latin typeface="Open Sans" panose="020B0606030504020204" pitchFamily="34" charset="0"/>
+                <a:ea typeface="Open Sans" panose="020B0606030504020204" pitchFamily="34" charset="0"/>
+                <a:cs typeface="Open Sans" panose="020B0606030504020204" pitchFamily="34" charset="0"/>
+              </a:rPr>
+              <a:t>Modifying user privileges:</a:t>
+            </a:r>
+            <a:endParaRPr lang="en-AU" sz="3200" dirty="0">
+              <a:solidFill>
+                <a:srgbClr val="EEEEEE"/>
+              </a:solidFill>
+              <a:latin typeface="Open Sans" panose="020B0606030504020204" pitchFamily="34" charset="0"/>
+              <a:ea typeface="Open Sans" panose="020B0606030504020204" pitchFamily="34" charset="0"/>
+              <a:cs typeface="Open Sans" panose="020B0606030504020204" pitchFamily="34" charset="0"/>
+            </a:endParaRPr>
+          </a:p>
+        </p:txBody>
+      </p:sp>
+      <p:sp>
+        <p:nvSpPr>
+          <p:cNvPr id="6" name="Title 3"/>
+          <p:cNvSpPr txBox="1">
+            <a:spLocks/>
+          </p:cNvSpPr>
+          <p:nvPr/>
+        </p:nvSpPr>
+        <p:spPr>
+          <a:xfrm>
+            <a:off x="1524001" y="1446915"/>
+            <a:ext cx="9144000" cy="511630"/>
+          </a:xfrm>
+          <a:prstGeom prst="rect">
+            <a:avLst/>
+          </a:prstGeom>
+        </p:spPr>
+        <p:txBody>
+          <a:bodyPr vert="horz" lIns="91440" tIns="45720" rIns="91440" bIns="45720" rtlCol="0" anchor="t">
+            <a:normAutofit lnSpcReduction="10000"/>
+          </a:bodyPr>
+          <a:lstStyle>
+            <a:lvl1pPr algn="ctr" defTabSz="914400" rtl="0" eaLnBrk="1" latinLnBrk="0" hangingPunct="1">
+              <a:lnSpc>
+                <a:spcPct val="90000"/>
+              </a:lnSpc>
+              <a:spcBef>
+                <a:spcPct val="0"/>
+              </a:spcBef>
+              <a:buNone/>
+              <a:defRPr sz="6000" kern="1200">
+                <a:solidFill>
+                  <a:schemeClr val="tx1"/>
+                </a:solidFill>
+                <a:latin typeface="+mj-lt"/>
+                <a:ea typeface="+mj-ea"/>
+                <a:cs typeface="+mj-cs"/>
+              </a:defRPr>
+            </a:lvl1pPr>
+          </a:lstStyle>
+          <a:p>
+            <a:pPr algn="l">
+              <a:lnSpc>
+                <a:spcPct val="100000"/>
+              </a:lnSpc>
+            </a:pPr>
+            <a:r>
+              <a:rPr lang="en-AU" sz="2800" dirty="0" smtClean="0">
+                <a:solidFill>
+                  <a:srgbClr val="111111"/>
+                </a:solidFill>
+                <a:latin typeface="Open Sans" panose="020B0606030504020204" pitchFamily="34" charset="0"/>
+                <a:ea typeface="Open Sans" panose="020B0606030504020204" pitchFamily="34" charset="0"/>
+                <a:cs typeface="Open Sans" panose="020B0606030504020204" pitchFamily="34" charset="0"/>
+              </a:rPr>
+              <a:t>separator</a:t>
+            </a:r>
+          </a:p>
+        </p:txBody>
+      </p:sp>
+      <p:sp>
+        <p:nvSpPr>
+          <p:cNvPr id="2" name="TextBox 1"/>
+          <p:cNvSpPr txBox="1"/>
+          <p:nvPr/>
+        </p:nvSpPr>
+        <p:spPr>
+          <a:xfrm>
+            <a:off x="1524000" y="1958544"/>
+            <a:ext cx="9144000" cy="892552"/>
+          </a:xfrm>
+          <a:prstGeom prst="rect">
+            <a:avLst/>
+          </a:prstGeom>
+          <a:noFill/>
+        </p:spPr>
+        <p:txBody>
+          <a:bodyPr wrap="square" rtlCol="0">
+            <a:spAutoFit/>
+          </a:bodyPr>
+          <a:lstStyle/>
+          <a:p>
+            <a:pPr marL="285750" indent="-285750">
+              <a:buFont typeface="Arial" panose="020B0604020202020204" pitchFamily="34" charset="0"/>
+              <a:buChar char="•"/>
+            </a:pPr>
+            <a:r>
+              <a:rPr lang="en-AU" sz="2600" b="1" dirty="0" smtClean="0">
+                <a:solidFill>
+                  <a:srgbClr val="EEEEEE"/>
+                </a:solidFill>
+                <a:latin typeface="Open Sans" panose="020B0606030504020204" pitchFamily="34" charset="0"/>
+                <a:ea typeface="Open Sans" panose="020B0606030504020204" pitchFamily="34" charset="0"/>
+                <a:cs typeface="Open Sans" panose="020B0606030504020204" pitchFamily="34" charset="0"/>
+              </a:rPr>
+              <a:t>As an administrator</a:t>
+            </a:r>
+            <a:r>
+              <a:rPr lang="en-AU" sz="2600" dirty="0" smtClean="0">
+                <a:solidFill>
+                  <a:srgbClr val="EEEEEE"/>
+                </a:solidFill>
+                <a:latin typeface="Open Sans" panose="020B0606030504020204" pitchFamily="34" charset="0"/>
+                <a:ea typeface="Open Sans" panose="020B0606030504020204" pitchFamily="34" charset="0"/>
+                <a:cs typeface="Open Sans" panose="020B0606030504020204" pitchFamily="34" charset="0"/>
+              </a:rPr>
+              <a:t>…</a:t>
+            </a:r>
+          </a:p>
+          <a:p>
+            <a:pPr marL="285750" indent="-285750">
+              <a:buFont typeface="Arial" panose="020B0604020202020204" pitchFamily="34" charset="0"/>
+              <a:buChar char="•"/>
+            </a:pPr>
+            <a:r>
+              <a:rPr lang="en-AU" sz="2600" dirty="0" smtClean="0">
+                <a:solidFill>
+                  <a:srgbClr val="EEEEEE"/>
+                </a:solidFill>
+                <a:latin typeface="Open Sans" panose="020B0606030504020204" pitchFamily="34" charset="0"/>
+                <a:ea typeface="Open Sans" panose="020B0606030504020204" pitchFamily="34" charset="0"/>
+                <a:cs typeface="Open Sans" panose="020B0606030504020204" pitchFamily="34" charset="0"/>
+              </a:rPr>
+              <a:t>Click “Add or remove user accounts” in the Control Panel</a:t>
+            </a:r>
+          </a:p>
+        </p:txBody>
+      </p:sp>
+      <p:pic>
+        <p:nvPicPr>
+          <p:cNvPr id="5" name="Picture 4"/>
+          <p:cNvPicPr>
+            <a:picLocks noChangeAspect="1"/>
+          </p:cNvPicPr>
+          <p:nvPr/>
+        </p:nvPicPr>
+        <p:blipFill>
+          <a:blip r:embed="rId2">
+            <a:extLst>
+              <a:ext uri="{28A0092B-C50C-407E-A947-70E740481C1C}">
+                <a14:useLocalDpi xmlns:a14="http://schemas.microsoft.com/office/drawing/2010/main" val="0"/>
+              </a:ext>
+            </a:extLst>
+          </a:blip>
+          <a:stretch>
+            <a:fillRect/>
+          </a:stretch>
+        </p:blipFill>
+        <p:spPr>
+          <a:xfrm>
+            <a:off x="1066800" y="3362725"/>
+            <a:ext cx="10058400" cy="1973961"/>
+          </a:xfrm>
+          <a:prstGeom prst="rect">
+            <a:avLst/>
+          </a:prstGeom>
+        </p:spPr>
+      </p:pic>
+    </p:spTree>
+    <p:extLst>
+      <p:ext uri="{BB962C8B-B14F-4D97-AF65-F5344CB8AC3E}">
+        <p14:creationId xmlns:p14="http://schemas.microsoft.com/office/powerpoint/2010/main" val="3314633075"/>
+      </p:ext>
+    </p:extLst>
+  </p:cSld>
+  <p:clrMapOvr>
+    <a:masterClrMapping/>
+  </p:clrMapOvr>
+  <p:transition spd="slow">
+    <p:push/>
+  </p:transition>
+  <p:timing>
+    <p:tnLst>
+      <p:par>
+        <p:cTn id="1" dur="indefinite" restart="never" nodeType="tmRoot"/>
+      </p:par>
+    </p:tnLst>
+  </p:timing>
+</p:sld>
+</file>
+
+<file path=ppt/slides/slide65.xml><?xml version="1.0" encoding="utf-8"?>
 <p:sld xmlns:a="http://schemas.openxmlformats.org/drawingml/2006/main" xmlns:r="http://schemas.openxmlformats.org/officeDocument/2006/relationships" xmlns:p="http://schemas.openxmlformats.org/presentationml/2006/main">
   <p:cSld>
     <p:bg>

</xml_diff>